<commit_message>
Added few more things
</commit_message>
<xml_diff>
--- a/Assets/Textures/TextureIcons.pptx
+++ b/Assets/Textures/TextureIcons.pptx
@@ -6,6 +6,8 @@
   </p:sldMasterIdLst>
   <p:sldIdLst>
     <p:sldId id="256" r:id="rId2"/>
+    <p:sldId id="257" r:id="rId3"/>
+    <p:sldId id="258" r:id="rId4"/>
   </p:sldIdLst>
   <p:sldSz cx="9144000" cy="6858000" type="screen4x3"/>
   <p:notesSz cx="6858000" cy="9144000"/>
@@ -288,7 +290,7 @@
           <a:p>
             <a:fld id="{02BB6FDC-F2C4-464B-9BAC-FAE7AFB0E257}" type="datetimeFigureOut">
               <a:rPr lang="en-IN" smtClean="0"/>
-              <a:t>16-04-2021</a:t>
+              <a:t>18-04-2021</a:t>
             </a:fld>
             <a:endParaRPr lang="en-IN"/>
           </a:p>
@@ -458,7 +460,7 @@
           <a:p>
             <a:fld id="{02BB6FDC-F2C4-464B-9BAC-FAE7AFB0E257}" type="datetimeFigureOut">
               <a:rPr lang="en-IN" smtClean="0"/>
-              <a:t>16-04-2021</a:t>
+              <a:t>18-04-2021</a:t>
             </a:fld>
             <a:endParaRPr lang="en-IN"/>
           </a:p>
@@ -638,7 +640,7 @@
           <a:p>
             <a:fld id="{02BB6FDC-F2C4-464B-9BAC-FAE7AFB0E257}" type="datetimeFigureOut">
               <a:rPr lang="en-IN" smtClean="0"/>
-              <a:t>16-04-2021</a:t>
+              <a:t>18-04-2021</a:t>
             </a:fld>
             <a:endParaRPr lang="en-IN"/>
           </a:p>
@@ -808,7 +810,7 @@
           <a:p>
             <a:fld id="{02BB6FDC-F2C4-464B-9BAC-FAE7AFB0E257}" type="datetimeFigureOut">
               <a:rPr lang="en-IN" smtClean="0"/>
-              <a:t>16-04-2021</a:t>
+              <a:t>18-04-2021</a:t>
             </a:fld>
             <a:endParaRPr lang="en-IN"/>
           </a:p>
@@ -1054,7 +1056,7 @@
           <a:p>
             <a:fld id="{02BB6FDC-F2C4-464B-9BAC-FAE7AFB0E257}" type="datetimeFigureOut">
               <a:rPr lang="en-IN" smtClean="0"/>
-              <a:t>16-04-2021</a:t>
+              <a:t>18-04-2021</a:t>
             </a:fld>
             <a:endParaRPr lang="en-IN"/>
           </a:p>
@@ -1342,7 +1344,7 @@
           <a:p>
             <a:fld id="{02BB6FDC-F2C4-464B-9BAC-FAE7AFB0E257}" type="datetimeFigureOut">
               <a:rPr lang="en-IN" smtClean="0"/>
-              <a:t>16-04-2021</a:t>
+              <a:t>18-04-2021</a:t>
             </a:fld>
             <a:endParaRPr lang="en-IN"/>
           </a:p>
@@ -1764,7 +1766,7 @@
           <a:p>
             <a:fld id="{02BB6FDC-F2C4-464B-9BAC-FAE7AFB0E257}" type="datetimeFigureOut">
               <a:rPr lang="en-IN" smtClean="0"/>
-              <a:t>16-04-2021</a:t>
+              <a:t>18-04-2021</a:t>
             </a:fld>
             <a:endParaRPr lang="en-IN"/>
           </a:p>
@@ -1882,7 +1884,7 @@
           <a:p>
             <a:fld id="{02BB6FDC-F2C4-464B-9BAC-FAE7AFB0E257}" type="datetimeFigureOut">
               <a:rPr lang="en-IN" smtClean="0"/>
-              <a:t>16-04-2021</a:t>
+              <a:t>18-04-2021</a:t>
             </a:fld>
             <a:endParaRPr lang="en-IN"/>
           </a:p>
@@ -1977,7 +1979,7 @@
           <a:p>
             <a:fld id="{02BB6FDC-F2C4-464B-9BAC-FAE7AFB0E257}" type="datetimeFigureOut">
               <a:rPr lang="en-IN" smtClean="0"/>
-              <a:t>16-04-2021</a:t>
+              <a:t>18-04-2021</a:t>
             </a:fld>
             <a:endParaRPr lang="en-IN"/>
           </a:p>
@@ -2254,7 +2256,7 @@
           <a:p>
             <a:fld id="{02BB6FDC-F2C4-464B-9BAC-FAE7AFB0E257}" type="datetimeFigureOut">
               <a:rPr lang="en-IN" smtClean="0"/>
-              <a:t>16-04-2021</a:t>
+              <a:t>18-04-2021</a:t>
             </a:fld>
             <a:endParaRPr lang="en-IN"/>
           </a:p>
@@ -2507,7 +2509,7 @@
           <a:p>
             <a:fld id="{02BB6FDC-F2C4-464B-9BAC-FAE7AFB0E257}" type="datetimeFigureOut">
               <a:rPr lang="en-IN" smtClean="0"/>
-              <a:t>16-04-2021</a:t>
+              <a:t>18-04-2021</a:t>
             </a:fld>
             <a:endParaRPr lang="en-IN"/>
           </a:p>
@@ -2572,9 +2574,14 @@
 <p:sldMaster xmlns:a="http://schemas.openxmlformats.org/drawingml/2006/main" xmlns:r="http://schemas.openxmlformats.org/officeDocument/2006/relationships" xmlns:p="http://schemas.openxmlformats.org/presentationml/2006/main">
   <p:cSld>
     <p:bg>
-      <p:bgRef idx="1001">
-        <a:schemeClr val="bg1"/>
-      </p:bgRef>
+      <p:bgPr>
+        <a:solidFill>
+          <a:schemeClr val="bg1">
+            <a:lumMod val="75000"/>
+          </a:schemeClr>
+        </a:solidFill>
+        <a:effectLst/>
+      </p:bgPr>
     </p:bg>
     <p:spTree>
       <p:nvGrpSpPr>
@@ -2720,7 +2727,7 @@
           <a:p>
             <a:fld id="{02BB6FDC-F2C4-464B-9BAC-FAE7AFB0E257}" type="datetimeFigureOut">
               <a:rPr lang="en-IN" smtClean="0"/>
-              <a:t>16-04-2021</a:t>
+              <a:t>18-04-2021</a:t>
             </a:fld>
             <a:endParaRPr lang="en-IN"/>
           </a:p>
@@ -3081,16 +3088,6 @@
 <file path=ppt/slides/slide1.xml><?xml version="1.0" encoding="utf-8"?>
 <p:sld xmlns:a="http://schemas.openxmlformats.org/drawingml/2006/main" xmlns:r="http://schemas.openxmlformats.org/officeDocument/2006/relationships" xmlns:p="http://schemas.openxmlformats.org/presentationml/2006/main">
   <p:cSld>
-    <p:bg>
-      <p:bgPr>
-        <a:solidFill>
-          <a:schemeClr val="bg1">
-            <a:lumMod val="85000"/>
-          </a:schemeClr>
-        </a:solidFill>
-        <a:effectLst/>
-      </p:bgPr>
-    </p:bg>
     <p:spTree>
       <p:nvGrpSpPr>
         <p:cNvPr id="1" name=""/>
@@ -3155,6 +3152,487 @@
     <p:extLst>
       <p:ext uri="{BB962C8B-B14F-4D97-AF65-F5344CB8AC3E}">
         <p14:creationId xmlns:p14="http://schemas.microsoft.com/office/powerpoint/2010/main" val="1513403828"/>
+      </p:ext>
+    </p:extLst>
+  </p:cSld>
+  <p:clrMapOvr>
+    <a:masterClrMapping/>
+  </p:clrMapOvr>
+</p:sld>
+</file>
+
+<file path=ppt/slides/slide2.xml><?xml version="1.0" encoding="utf-8"?>
+<p:sld xmlns:a="http://schemas.openxmlformats.org/drawingml/2006/main" xmlns:r="http://schemas.openxmlformats.org/officeDocument/2006/relationships" xmlns:p="http://schemas.openxmlformats.org/presentationml/2006/main">
+  <p:cSld>
+    <p:spTree>
+      <p:nvGrpSpPr>
+        <p:cNvPr id="1" name=""/>
+        <p:cNvGrpSpPr/>
+        <p:nvPr/>
+      </p:nvGrpSpPr>
+      <p:grpSpPr>
+        <a:xfrm>
+          <a:off x="0" y="0"/>
+          <a:ext cx="0" cy="0"/>
+          <a:chOff x="0" y="0"/>
+          <a:chExt cx="0" cy="0"/>
+        </a:xfrm>
+      </p:grpSpPr>
+      <p:pic>
+        <p:nvPicPr>
+          <p:cNvPr id="1026" name="Picture 2"/>
+          <p:cNvPicPr>
+            <a:picLocks noChangeAspect="1" noChangeArrowheads="1"/>
+          </p:cNvPicPr>
+          <p:nvPr/>
+        </p:nvPicPr>
+        <p:blipFill>
+          <a:blip r:embed="rId2">
+            <a:extLst>
+              <a:ext uri="{28A0092B-C50C-407E-A947-70E740481C1C}">
+                <a14:useLocalDpi xmlns:a14="http://schemas.microsoft.com/office/drawing/2010/main" val="0"/>
+              </a:ext>
+            </a:extLst>
+          </a:blip>
+          <a:srcRect/>
+          <a:stretch>
+            <a:fillRect/>
+          </a:stretch>
+        </p:blipFill>
+        <p:spPr bwMode="auto">
+          <a:xfrm rot="10800000">
+            <a:off x="393700" y="2209800"/>
+            <a:ext cx="2438400" cy="2438400"/>
+          </a:xfrm>
+          <a:prstGeom prst="rect">
+            <a:avLst/>
+          </a:prstGeom>
+          <a:noFill/>
+          <a:ln>
+            <a:noFill/>
+          </a:ln>
+          <a:effectLst/>
+          <a:extLst>
+            <a:ext uri="{909E8E84-426E-40DD-AFC4-6F175D3DCCD1}">
+              <a14:hiddenFill xmlns:a14="http://schemas.microsoft.com/office/drawing/2010/main">
+                <a:solidFill>
+                  <a:schemeClr val="accent1"/>
+                </a:solidFill>
+              </a14:hiddenFill>
+            </a:ext>
+            <a:ext uri="{91240B29-F687-4F45-9708-019B960494DF}">
+              <a14:hiddenLine xmlns:a14="http://schemas.microsoft.com/office/drawing/2010/main" w="9525">
+                <a:solidFill>
+                  <a:schemeClr val="tx1"/>
+                </a:solidFill>
+                <a:miter lim="800000"/>
+                <a:headEnd/>
+                <a:tailEnd/>
+              </a14:hiddenLine>
+            </a:ext>
+            <a:ext uri="{AF507438-7753-43E0-B8FC-AC1667EBCBE1}">
+              <a14:hiddenEffects xmlns:a14="http://schemas.microsoft.com/office/drawing/2010/main">
+                <a:effectLst>
+                  <a:outerShdw dist="35921" dir="2700000" algn="ctr" rotWithShape="0">
+                    <a:schemeClr val="bg2"/>
+                  </a:outerShdw>
+                </a:effectLst>
+              </a14:hiddenEffects>
+            </a:ext>
+          </a:extLst>
+        </p:spPr>
+      </p:pic>
+      <p:grpSp>
+        <p:nvGrpSpPr>
+          <p:cNvPr id="11" name="Group 10"/>
+          <p:cNvGrpSpPr/>
+          <p:nvPr/>
+        </p:nvGrpSpPr>
+        <p:grpSpPr>
+          <a:xfrm>
+            <a:off x="3009389" y="1862115"/>
+            <a:ext cx="3132779" cy="3123763"/>
+            <a:chOff x="3009389" y="1862115"/>
+            <a:chExt cx="3132779" cy="3123763"/>
+          </a:xfrm>
+        </p:grpSpPr>
+        <p:sp>
+          <p:nvSpPr>
+            <p:cNvPr id="2" name="Diamond 1"/>
+            <p:cNvSpPr/>
+            <p:nvPr/>
+          </p:nvSpPr>
+          <p:spPr>
+            <a:xfrm>
+              <a:off x="3127754" y="1988819"/>
+              <a:ext cx="2888492" cy="2880362"/>
+            </a:xfrm>
+            <a:prstGeom prst="diamond">
+              <a:avLst/>
+            </a:prstGeom>
+            <a:solidFill>
+              <a:srgbClr val="17F541"/>
+            </a:solidFill>
+            <a:ln w="415925">
+              <a:solidFill>
+                <a:schemeClr val="tx1"/>
+              </a:solidFill>
+            </a:ln>
+          </p:spPr>
+          <p:style>
+            <a:lnRef idx="2">
+              <a:schemeClr val="accent1">
+                <a:shade val="50000"/>
+              </a:schemeClr>
+            </a:lnRef>
+            <a:fillRef idx="1">
+              <a:schemeClr val="accent1"/>
+            </a:fillRef>
+            <a:effectRef idx="0">
+              <a:schemeClr val="accent1"/>
+            </a:effectRef>
+            <a:fontRef idx="minor">
+              <a:schemeClr val="lt1"/>
+            </a:fontRef>
+          </p:style>
+          <p:txBody>
+            <a:bodyPr rtlCol="0" anchor="ctr"/>
+            <a:lstStyle/>
+            <a:p>
+              <a:pPr algn="ctr"/>
+              <a:endParaRPr lang="en-IN"/>
+            </a:p>
+          </p:txBody>
+        </p:sp>
+        <p:sp>
+          <p:nvSpPr>
+            <p:cNvPr id="3" name="Trapezoid 2"/>
+            <p:cNvSpPr/>
+            <p:nvPr/>
+          </p:nvSpPr>
+          <p:spPr>
+            <a:xfrm rot="8100000">
+              <a:off x="3009389" y="2634254"/>
+              <a:ext cx="2033615" cy="502281"/>
+            </a:xfrm>
+            <a:prstGeom prst="trapezoid">
+              <a:avLst>
+                <a:gd name="adj" fmla="val 97488"/>
+              </a:avLst>
+            </a:prstGeom>
+            <a:solidFill>
+              <a:srgbClr val="17F541"/>
+            </a:solidFill>
+            <a:ln w="127000">
+              <a:solidFill>
+                <a:schemeClr val="bg1"/>
+              </a:solidFill>
+            </a:ln>
+          </p:spPr>
+          <p:style>
+            <a:lnRef idx="2">
+              <a:schemeClr val="accent1">
+                <a:shade val="50000"/>
+              </a:schemeClr>
+            </a:lnRef>
+            <a:fillRef idx="1">
+              <a:schemeClr val="accent1"/>
+            </a:fillRef>
+            <a:effectRef idx="0">
+              <a:schemeClr val="accent1"/>
+            </a:effectRef>
+            <a:fontRef idx="minor">
+              <a:schemeClr val="lt1"/>
+            </a:fontRef>
+          </p:style>
+          <p:txBody>
+            <a:bodyPr rtlCol="0" anchor="ctr"/>
+            <a:lstStyle/>
+            <a:p>
+              <a:pPr algn="ctr"/>
+              <a:endParaRPr lang="en-IN"/>
+            </a:p>
+          </p:txBody>
+        </p:sp>
+        <p:sp>
+          <p:nvSpPr>
+            <p:cNvPr id="8" name="Trapezoid 7"/>
+            <p:cNvSpPr/>
+            <p:nvPr/>
+          </p:nvSpPr>
+          <p:spPr>
+            <a:xfrm rot="13500000">
+              <a:off x="4109335" y="2636936"/>
+              <a:ext cx="2033615" cy="483973"/>
+            </a:xfrm>
+            <a:prstGeom prst="trapezoid">
+              <a:avLst>
+                <a:gd name="adj" fmla="val 97488"/>
+              </a:avLst>
+            </a:prstGeom>
+            <a:solidFill>
+              <a:srgbClr val="0AE434"/>
+            </a:solidFill>
+            <a:ln w="127000">
+              <a:solidFill>
+                <a:schemeClr val="bg1"/>
+              </a:solidFill>
+            </a:ln>
+          </p:spPr>
+          <p:style>
+            <a:lnRef idx="2">
+              <a:schemeClr val="accent1">
+                <a:shade val="50000"/>
+              </a:schemeClr>
+            </a:lnRef>
+            <a:fillRef idx="1">
+              <a:schemeClr val="accent1"/>
+            </a:fillRef>
+            <a:effectRef idx="0">
+              <a:schemeClr val="accent1"/>
+            </a:effectRef>
+            <a:fontRef idx="minor">
+              <a:schemeClr val="lt1"/>
+            </a:fontRef>
+          </p:style>
+          <p:txBody>
+            <a:bodyPr rtlCol="0" anchor="ctr"/>
+            <a:lstStyle/>
+            <a:p>
+              <a:pPr algn="ctr"/>
+              <a:endParaRPr lang="en-IN"/>
+            </a:p>
+          </p:txBody>
+        </p:sp>
+        <p:sp>
+          <p:nvSpPr>
+            <p:cNvPr id="9" name="Trapezoid 8"/>
+            <p:cNvSpPr/>
+            <p:nvPr/>
+          </p:nvSpPr>
+          <p:spPr>
+            <a:xfrm rot="18900000">
+              <a:off x="4108553" y="3730694"/>
+              <a:ext cx="2033615" cy="486187"/>
+            </a:xfrm>
+            <a:prstGeom prst="trapezoid">
+              <a:avLst>
+                <a:gd name="adj" fmla="val 97488"/>
+              </a:avLst>
+            </a:prstGeom>
+            <a:solidFill>
+              <a:srgbClr val="08BC2A"/>
+            </a:solidFill>
+            <a:ln w="127000">
+              <a:solidFill>
+                <a:schemeClr val="bg1"/>
+              </a:solidFill>
+            </a:ln>
+          </p:spPr>
+          <p:style>
+            <a:lnRef idx="2">
+              <a:schemeClr val="accent1">
+                <a:shade val="50000"/>
+              </a:schemeClr>
+            </a:lnRef>
+            <a:fillRef idx="1">
+              <a:schemeClr val="accent1"/>
+            </a:fillRef>
+            <a:effectRef idx="0">
+              <a:schemeClr val="accent1"/>
+            </a:effectRef>
+            <a:fontRef idx="minor">
+              <a:schemeClr val="lt1"/>
+            </a:fontRef>
+          </p:style>
+          <p:txBody>
+            <a:bodyPr rtlCol="0" anchor="ctr"/>
+            <a:lstStyle/>
+            <a:p>
+              <a:pPr algn="ctr"/>
+              <a:endParaRPr lang="en-IN"/>
+            </a:p>
+          </p:txBody>
+        </p:sp>
+        <p:sp>
+          <p:nvSpPr>
+            <p:cNvPr id="10" name="Trapezoid 9"/>
+            <p:cNvSpPr/>
+            <p:nvPr/>
+          </p:nvSpPr>
+          <p:spPr>
+            <a:xfrm rot="2700000">
+              <a:off x="3008418" y="3719308"/>
+              <a:ext cx="2033615" cy="499525"/>
+            </a:xfrm>
+            <a:prstGeom prst="trapezoid">
+              <a:avLst>
+                <a:gd name="adj" fmla="val 97488"/>
+              </a:avLst>
+            </a:prstGeom>
+            <a:solidFill>
+              <a:srgbClr val="0AE434"/>
+            </a:solidFill>
+            <a:ln w="127000">
+              <a:solidFill>
+                <a:schemeClr val="bg1"/>
+              </a:solidFill>
+            </a:ln>
+          </p:spPr>
+          <p:style>
+            <a:lnRef idx="2">
+              <a:schemeClr val="accent1">
+                <a:shade val="50000"/>
+              </a:schemeClr>
+            </a:lnRef>
+            <a:fillRef idx="1">
+              <a:schemeClr val="accent1"/>
+            </a:fillRef>
+            <a:effectRef idx="0">
+              <a:schemeClr val="accent1"/>
+            </a:effectRef>
+            <a:fontRef idx="minor">
+              <a:schemeClr val="lt1"/>
+            </a:fontRef>
+          </p:style>
+          <p:txBody>
+            <a:bodyPr rtlCol="0" anchor="ctr"/>
+            <a:lstStyle/>
+            <a:p>
+              <a:pPr algn="ctr"/>
+              <a:endParaRPr lang="en-IN"/>
+            </a:p>
+          </p:txBody>
+        </p:sp>
+      </p:grpSp>
+    </p:spTree>
+    <p:extLst>
+      <p:ext uri="{BB962C8B-B14F-4D97-AF65-F5344CB8AC3E}">
+        <p14:creationId xmlns:p14="http://schemas.microsoft.com/office/powerpoint/2010/main" val="786505832"/>
+      </p:ext>
+    </p:extLst>
+  </p:cSld>
+  <p:clrMapOvr>
+    <a:masterClrMapping/>
+  </p:clrMapOvr>
+</p:sld>
+</file>
+
+<file path=ppt/slides/slide3.xml><?xml version="1.0" encoding="utf-8"?>
+<p:sld xmlns:a="http://schemas.openxmlformats.org/drawingml/2006/main" xmlns:r="http://schemas.openxmlformats.org/officeDocument/2006/relationships" xmlns:p="http://schemas.openxmlformats.org/presentationml/2006/main">
+  <p:cSld>
+    <p:spTree>
+      <p:nvGrpSpPr>
+        <p:cNvPr id="1" name=""/>
+        <p:cNvGrpSpPr/>
+        <p:nvPr/>
+      </p:nvGrpSpPr>
+      <p:grpSpPr>
+        <a:xfrm>
+          <a:off x="0" y="0"/>
+          <a:ext cx="0" cy="0"/>
+          <a:chOff x="0" y="0"/>
+          <a:chExt cx="0" cy="0"/>
+        </a:xfrm>
+      </p:grpSpPr>
+      <p:sp>
+        <p:nvSpPr>
+          <p:cNvPr id="4" name="TextBox 3"/>
+          <p:cNvSpPr txBox="1"/>
+          <p:nvPr/>
+        </p:nvSpPr>
+        <p:spPr>
+          <a:xfrm>
+            <a:off x="1007615" y="4509120"/>
+            <a:ext cx="7128769" cy="3960440"/>
+          </a:xfrm>
+          <a:prstGeom prst="rect">
+            <a:avLst/>
+          </a:prstGeom>
+          <a:noFill/>
+          <a:ln>
+            <a:noFill/>
+          </a:ln>
+        </p:spPr>
+        <p:txBody>
+          <a:bodyPr wrap="none" rtlCol="0">
+            <a:prstTxWarp prst="textArchUp">
+              <a:avLst>
+                <a:gd name="adj" fmla="val 10835211"/>
+              </a:avLst>
+            </a:prstTxWarp>
+            <a:spAutoFit/>
+          </a:bodyPr>
+          <a:lstStyle/>
+          <a:p>
+            <a:pPr algn="ctr"/>
+            <a:r>
+              <a:rPr lang="en-US" sz="11500" b="1" spc="600" dirty="0" smtClean="0">
+                <a:ln w="38100">
+                  <a:noFill/>
+                  <a:prstDash val="solid"/>
+                </a:ln>
+                <a:solidFill>
+                  <a:schemeClr val="bg1"/>
+                </a:solidFill>
+                <a:effectLst>
+                  <a:outerShdw blurRad="50800" dist="38100" dir="16200000" rotWithShape="0">
+                    <a:prstClr val="black">
+                      <a:alpha val="40000"/>
+                    </a:prstClr>
+                  </a:outerShdw>
+                </a:effectLst>
+                <a:latin typeface="Anton" pitchFamily="2" charset="0"/>
+              </a:rPr>
+              <a:t>SLIDE</a:t>
+            </a:r>
+          </a:p>
+          <a:p>
+            <a:pPr algn="ctr"/>
+            <a:r>
+              <a:rPr lang="en-US" sz="8800" b="1" spc="600" dirty="0" smtClean="0">
+                <a:ln w="38100">
+                  <a:noFill/>
+                  <a:prstDash val="solid"/>
+                </a:ln>
+                <a:solidFill>
+                  <a:schemeClr val="bg1"/>
+                </a:solidFill>
+                <a:effectLst>
+                  <a:outerShdw blurRad="50800" dist="38100" dir="16200000" rotWithShape="0">
+                    <a:prstClr val="black">
+                      <a:alpha val="40000"/>
+                    </a:prstClr>
+                  </a:outerShdw>
+                </a:effectLst>
+                <a:latin typeface="Anton" pitchFamily="2" charset="0"/>
+              </a:rPr>
+              <a:t>AWAY</a:t>
+            </a:r>
+            <a:endParaRPr lang="en-IN" sz="8800" b="1" spc="600" dirty="0">
+              <a:ln w="38100">
+                <a:noFill/>
+                <a:prstDash val="solid"/>
+              </a:ln>
+              <a:solidFill>
+                <a:schemeClr val="bg1"/>
+              </a:solidFill>
+              <a:effectLst>
+                <a:outerShdw blurRad="50800" dist="38100" dir="16200000" rotWithShape="0">
+                  <a:prstClr val="black">
+                    <a:alpha val="40000"/>
+                  </a:prstClr>
+                </a:outerShdw>
+              </a:effectLst>
+              <a:latin typeface="Anton" pitchFamily="2" charset="0"/>
+            </a:endParaRPr>
+          </a:p>
+        </p:txBody>
+      </p:sp>
+    </p:spTree>
+    <p:extLst>
+      <p:ext uri="{BB962C8B-B14F-4D97-AF65-F5344CB8AC3E}">
+        <p14:creationId xmlns:p14="http://schemas.microsoft.com/office/powerpoint/2010/main" val="3781063070"/>
       </p:ext>
     </p:extLst>
   </p:cSld>

</xml_diff>

<commit_message>
Most of the issues are now fixed
</commit_message>
<xml_diff>
--- a/Assets/Textures/TextureIcons.pptx
+++ b/Assets/Textures/TextureIcons.pptx
@@ -7,42 +7,43 @@
   <p:sldIdLst>
     <p:sldId id="256" r:id="rId2"/>
     <p:sldId id="294" r:id="rId3"/>
-    <p:sldId id="257" r:id="rId4"/>
-    <p:sldId id="258" r:id="rId5"/>
-    <p:sldId id="295" r:id="rId6"/>
-    <p:sldId id="260" r:id="rId7"/>
-    <p:sldId id="292" r:id="rId8"/>
-    <p:sldId id="293" r:id="rId9"/>
-    <p:sldId id="262" r:id="rId10"/>
-    <p:sldId id="263" r:id="rId11"/>
-    <p:sldId id="264" r:id="rId12"/>
-    <p:sldId id="265" r:id="rId13"/>
-    <p:sldId id="266" r:id="rId14"/>
-    <p:sldId id="267" r:id="rId15"/>
-    <p:sldId id="268" r:id="rId16"/>
-    <p:sldId id="269" r:id="rId17"/>
-    <p:sldId id="270" r:id="rId18"/>
-    <p:sldId id="271" r:id="rId19"/>
-    <p:sldId id="272" r:id="rId20"/>
-    <p:sldId id="273" r:id="rId21"/>
-    <p:sldId id="274" r:id="rId22"/>
-    <p:sldId id="275" r:id="rId23"/>
-    <p:sldId id="276" r:id="rId24"/>
-    <p:sldId id="277" r:id="rId25"/>
-    <p:sldId id="278" r:id="rId26"/>
-    <p:sldId id="279" r:id="rId27"/>
-    <p:sldId id="280" r:id="rId28"/>
-    <p:sldId id="281" r:id="rId29"/>
-    <p:sldId id="282" r:id="rId30"/>
-    <p:sldId id="283" r:id="rId31"/>
-    <p:sldId id="284" r:id="rId32"/>
-    <p:sldId id="285" r:id="rId33"/>
-    <p:sldId id="286" r:id="rId34"/>
-    <p:sldId id="287" r:id="rId35"/>
-    <p:sldId id="288" r:id="rId36"/>
-    <p:sldId id="289" r:id="rId37"/>
-    <p:sldId id="290" r:id="rId38"/>
-    <p:sldId id="291" r:id="rId39"/>
+    <p:sldId id="296" r:id="rId4"/>
+    <p:sldId id="257" r:id="rId5"/>
+    <p:sldId id="258" r:id="rId6"/>
+    <p:sldId id="295" r:id="rId7"/>
+    <p:sldId id="260" r:id="rId8"/>
+    <p:sldId id="292" r:id="rId9"/>
+    <p:sldId id="293" r:id="rId10"/>
+    <p:sldId id="262" r:id="rId11"/>
+    <p:sldId id="263" r:id="rId12"/>
+    <p:sldId id="264" r:id="rId13"/>
+    <p:sldId id="265" r:id="rId14"/>
+    <p:sldId id="266" r:id="rId15"/>
+    <p:sldId id="267" r:id="rId16"/>
+    <p:sldId id="268" r:id="rId17"/>
+    <p:sldId id="269" r:id="rId18"/>
+    <p:sldId id="270" r:id="rId19"/>
+    <p:sldId id="271" r:id="rId20"/>
+    <p:sldId id="272" r:id="rId21"/>
+    <p:sldId id="273" r:id="rId22"/>
+    <p:sldId id="274" r:id="rId23"/>
+    <p:sldId id="275" r:id="rId24"/>
+    <p:sldId id="276" r:id="rId25"/>
+    <p:sldId id="277" r:id="rId26"/>
+    <p:sldId id="278" r:id="rId27"/>
+    <p:sldId id="279" r:id="rId28"/>
+    <p:sldId id="280" r:id="rId29"/>
+    <p:sldId id="281" r:id="rId30"/>
+    <p:sldId id="282" r:id="rId31"/>
+    <p:sldId id="283" r:id="rId32"/>
+    <p:sldId id="284" r:id="rId33"/>
+    <p:sldId id="285" r:id="rId34"/>
+    <p:sldId id="286" r:id="rId35"/>
+    <p:sldId id="287" r:id="rId36"/>
+    <p:sldId id="288" r:id="rId37"/>
+    <p:sldId id="289" r:id="rId38"/>
+    <p:sldId id="290" r:id="rId39"/>
+    <p:sldId id="291" r:id="rId40"/>
   </p:sldIdLst>
   <p:sldSz cx="9144000" cy="6858000" type="screen4x3"/>
   <p:notesSz cx="6858000" cy="9144000"/>
@@ -325,7 +326,7 @@
           <a:p>
             <a:fld id="{02BB6FDC-F2C4-464B-9BAC-FAE7AFB0E257}" type="datetimeFigureOut">
               <a:rPr lang="en-IN" smtClean="0"/>
-              <a:t>27-04-2021</a:t>
+              <a:t>29-04-2021</a:t>
             </a:fld>
             <a:endParaRPr lang="en-IN"/>
           </a:p>
@@ -495,7 +496,7 @@
           <a:p>
             <a:fld id="{02BB6FDC-F2C4-464B-9BAC-FAE7AFB0E257}" type="datetimeFigureOut">
               <a:rPr lang="en-IN" smtClean="0"/>
-              <a:t>27-04-2021</a:t>
+              <a:t>29-04-2021</a:t>
             </a:fld>
             <a:endParaRPr lang="en-IN"/>
           </a:p>
@@ -675,7 +676,7 @@
           <a:p>
             <a:fld id="{02BB6FDC-F2C4-464B-9BAC-FAE7AFB0E257}" type="datetimeFigureOut">
               <a:rPr lang="en-IN" smtClean="0"/>
-              <a:t>27-04-2021</a:t>
+              <a:t>29-04-2021</a:t>
             </a:fld>
             <a:endParaRPr lang="en-IN"/>
           </a:p>
@@ -845,7 +846,7 @@
           <a:p>
             <a:fld id="{02BB6FDC-F2C4-464B-9BAC-FAE7AFB0E257}" type="datetimeFigureOut">
               <a:rPr lang="en-IN" smtClean="0"/>
-              <a:t>27-04-2021</a:t>
+              <a:t>29-04-2021</a:t>
             </a:fld>
             <a:endParaRPr lang="en-IN"/>
           </a:p>
@@ -1091,7 +1092,7 @@
           <a:p>
             <a:fld id="{02BB6FDC-F2C4-464B-9BAC-FAE7AFB0E257}" type="datetimeFigureOut">
               <a:rPr lang="en-IN" smtClean="0"/>
-              <a:t>27-04-2021</a:t>
+              <a:t>29-04-2021</a:t>
             </a:fld>
             <a:endParaRPr lang="en-IN"/>
           </a:p>
@@ -1379,7 +1380,7 @@
           <a:p>
             <a:fld id="{02BB6FDC-F2C4-464B-9BAC-FAE7AFB0E257}" type="datetimeFigureOut">
               <a:rPr lang="en-IN" smtClean="0"/>
-              <a:t>27-04-2021</a:t>
+              <a:t>29-04-2021</a:t>
             </a:fld>
             <a:endParaRPr lang="en-IN"/>
           </a:p>
@@ -1801,7 +1802,7 @@
           <a:p>
             <a:fld id="{02BB6FDC-F2C4-464B-9BAC-FAE7AFB0E257}" type="datetimeFigureOut">
               <a:rPr lang="en-IN" smtClean="0"/>
-              <a:t>27-04-2021</a:t>
+              <a:t>29-04-2021</a:t>
             </a:fld>
             <a:endParaRPr lang="en-IN"/>
           </a:p>
@@ -1919,7 +1920,7 @@
           <a:p>
             <a:fld id="{02BB6FDC-F2C4-464B-9BAC-FAE7AFB0E257}" type="datetimeFigureOut">
               <a:rPr lang="en-IN" smtClean="0"/>
-              <a:t>27-04-2021</a:t>
+              <a:t>29-04-2021</a:t>
             </a:fld>
             <a:endParaRPr lang="en-IN"/>
           </a:p>
@@ -2014,7 +2015,7 @@
           <a:p>
             <a:fld id="{02BB6FDC-F2C4-464B-9BAC-FAE7AFB0E257}" type="datetimeFigureOut">
               <a:rPr lang="en-IN" smtClean="0"/>
-              <a:t>27-04-2021</a:t>
+              <a:t>29-04-2021</a:t>
             </a:fld>
             <a:endParaRPr lang="en-IN"/>
           </a:p>
@@ -2291,7 +2292,7 @@
           <a:p>
             <a:fld id="{02BB6FDC-F2C4-464B-9BAC-FAE7AFB0E257}" type="datetimeFigureOut">
               <a:rPr lang="en-IN" smtClean="0"/>
-              <a:t>27-04-2021</a:t>
+              <a:t>29-04-2021</a:t>
             </a:fld>
             <a:endParaRPr lang="en-IN"/>
           </a:p>
@@ -2544,7 +2545,7 @@
           <a:p>
             <a:fld id="{02BB6FDC-F2C4-464B-9BAC-FAE7AFB0E257}" type="datetimeFigureOut">
               <a:rPr lang="en-IN" smtClean="0"/>
-              <a:t>27-04-2021</a:t>
+              <a:t>29-04-2021</a:t>
             </a:fld>
             <a:endParaRPr lang="en-IN"/>
           </a:p>
@@ -2762,7 +2763,7 @@
           <a:p>
             <a:fld id="{02BB6FDC-F2C4-464B-9BAC-FAE7AFB0E257}" type="datetimeFigureOut">
               <a:rPr lang="en-IN" smtClean="0"/>
-              <a:t>27-04-2021</a:t>
+              <a:t>29-04-2021</a:t>
             </a:fld>
             <a:endParaRPr lang="en-IN"/>
           </a:p>
@@ -3183,6 +3184,143 @@
           </a:p>
         </p:txBody>
       </p:sp>
+      <p:sp>
+        <p:nvSpPr>
+          <p:cNvPr id="3" name="Rectangle 2"/>
+          <p:cNvSpPr/>
+          <p:nvPr/>
+        </p:nvSpPr>
+        <p:spPr>
+          <a:xfrm>
+            <a:off x="275208" y="2212759"/>
+            <a:ext cx="2432482" cy="2432482"/>
+          </a:xfrm>
+          <a:prstGeom prst="rect">
+            <a:avLst/>
+          </a:prstGeom>
+          <a:noFill/>
+          <a:ln w="190500" cap="sq">
+            <a:solidFill>
+              <a:schemeClr val="bg1"/>
+            </a:solidFill>
+            <a:miter lim="800000"/>
+          </a:ln>
+        </p:spPr>
+        <p:style>
+          <a:lnRef idx="2">
+            <a:schemeClr val="accent1">
+              <a:shade val="50000"/>
+            </a:schemeClr>
+          </a:lnRef>
+          <a:fillRef idx="1">
+            <a:schemeClr val="accent1"/>
+          </a:fillRef>
+          <a:effectRef idx="0">
+            <a:schemeClr val="accent1"/>
+          </a:effectRef>
+          <a:fontRef idx="minor">
+            <a:schemeClr val="lt1"/>
+          </a:fontRef>
+        </p:style>
+        <p:txBody>
+          <a:bodyPr rtlCol="0" anchor="ctr"/>
+          <a:lstStyle/>
+          <a:p>
+            <a:pPr algn="ctr"/>
+            <a:endParaRPr lang="en-IN"/>
+          </a:p>
+        </p:txBody>
+      </p:sp>
+      <p:pic>
+        <p:nvPicPr>
+          <p:cNvPr id="1028" name="Picture 4" descr="C:\Repos\SlideAway\Assets\Resources\FloorIcons\ad0.png"/>
+          <p:cNvPicPr>
+            <a:picLocks noChangeAspect="1" noChangeArrowheads="1"/>
+          </p:cNvPicPr>
+          <p:nvPr/>
+        </p:nvPicPr>
+        <p:blipFill>
+          <a:blip r:embed="rId2">
+            <a:extLst>
+              <a:ext uri="{28A0092B-C50C-407E-A947-70E740481C1C}">
+                <a14:useLocalDpi xmlns:a14="http://schemas.microsoft.com/office/drawing/2010/main" val="0"/>
+              </a:ext>
+            </a:extLst>
+          </a:blip>
+          <a:srcRect/>
+          <a:stretch>
+            <a:fillRect/>
+          </a:stretch>
+        </p:blipFill>
+        <p:spPr bwMode="auto">
+          <a:xfrm>
+            <a:off x="6356412" y="1957182"/>
+            <a:ext cx="2438740" cy="2943636"/>
+          </a:xfrm>
+          <a:prstGeom prst="rect">
+            <a:avLst/>
+          </a:prstGeom>
+          <a:noFill/>
+          <a:extLst>
+            <a:ext uri="{909E8E84-426E-40DD-AFC4-6F175D3DCCD1}">
+              <a14:hiddenFill xmlns:a14="http://schemas.microsoft.com/office/drawing/2010/main">
+                <a:solidFill>
+                  <a:srgbClr val="FFFFFF"/>
+                </a:solidFill>
+              </a14:hiddenFill>
+            </a:ext>
+          </a:extLst>
+        </p:spPr>
+      </p:pic>
+      <p:sp>
+        <p:nvSpPr>
+          <p:cNvPr id="5" name="Hexagon 4"/>
+          <p:cNvSpPr/>
+          <p:nvPr/>
+        </p:nvSpPr>
+        <p:spPr>
+          <a:xfrm rot="5400000">
+            <a:off x="6100835" y="2212761"/>
+            <a:ext cx="2943633" cy="2432482"/>
+          </a:xfrm>
+          <a:prstGeom prst="hexagon">
+            <a:avLst>
+              <a:gd name="adj" fmla="val 35219"/>
+              <a:gd name="vf" fmla="val 115470"/>
+            </a:avLst>
+          </a:prstGeom>
+          <a:noFill/>
+          <a:ln w="190500">
+            <a:solidFill>
+              <a:schemeClr val="bg1"/>
+            </a:solidFill>
+          </a:ln>
+        </p:spPr>
+        <p:style>
+          <a:lnRef idx="2">
+            <a:schemeClr val="accent1">
+              <a:shade val="50000"/>
+            </a:schemeClr>
+          </a:lnRef>
+          <a:fillRef idx="1">
+            <a:schemeClr val="accent1"/>
+          </a:fillRef>
+          <a:effectRef idx="0">
+            <a:schemeClr val="accent1"/>
+          </a:effectRef>
+          <a:fontRef idx="minor">
+            <a:schemeClr val="lt1"/>
+          </a:fontRef>
+        </p:style>
+        <p:txBody>
+          <a:bodyPr rtlCol="0" anchor="ctr"/>
+          <a:lstStyle/>
+          <a:p>
+            <a:pPr algn="ctr"/>
+            <a:endParaRPr lang="en-IN"/>
+          </a:p>
+        </p:txBody>
+      </p:sp>
     </p:spTree>
     <p:extLst>
       <p:ext uri="{BB962C8B-B14F-4D97-AF65-F5344CB8AC3E}">
@@ -3204,6 +3342,99 @@
 </file>
 
 <file path=ppt/slides/slide10.xml><?xml version="1.0" encoding="utf-8"?>
+<p:sld xmlns:a="http://schemas.openxmlformats.org/drawingml/2006/main" xmlns:r="http://schemas.openxmlformats.org/officeDocument/2006/relationships" xmlns:p="http://schemas.openxmlformats.org/presentationml/2006/main">
+  <p:cSld>
+    <p:spTree>
+      <p:nvGrpSpPr>
+        <p:cNvPr id="1" name=""/>
+        <p:cNvGrpSpPr/>
+        <p:nvPr/>
+      </p:nvGrpSpPr>
+      <p:grpSpPr>
+        <a:xfrm>
+          <a:off x="0" y="0"/>
+          <a:ext cx="0" cy="0"/>
+          <a:chOff x="0" y="0"/>
+          <a:chExt cx="0" cy="0"/>
+        </a:xfrm>
+      </p:grpSpPr>
+      <p:sp>
+        <p:nvSpPr>
+          <p:cNvPr id="3" name="Rectangle: Rounded Corners 2">
+            <a:extLst>
+              <a:ext uri="{FF2B5EF4-FFF2-40B4-BE49-F238E27FC236}">
+                <a16:creationId xmlns="" xmlns:a16="http://schemas.microsoft.com/office/drawing/2014/main" id="{59DB4196-0687-4E82-A4C2-1855B40742C9}"/>
+              </a:ext>
+            </a:extLst>
+          </p:cNvPr>
+          <p:cNvSpPr/>
+          <p:nvPr/>
+        </p:nvSpPr>
+        <p:spPr>
+          <a:xfrm>
+            <a:off x="3813175" y="2673350"/>
+            <a:ext cx="1517650" cy="1511300"/>
+          </a:xfrm>
+          <a:prstGeom prst="roundRect">
+            <a:avLst/>
+          </a:prstGeom>
+          <a:solidFill>
+            <a:schemeClr val="bg1"/>
+          </a:solidFill>
+          <a:ln>
+            <a:noFill/>
+          </a:ln>
+          <a:scene3d>
+            <a:camera prst="orthographicFront"/>
+            <a:lightRig rig="threePt" dir="t"/>
+          </a:scene3d>
+          <a:sp3d>
+            <a:bevelT/>
+          </a:sp3d>
+        </p:spPr>
+        <p:style>
+          <a:lnRef idx="2">
+            <a:schemeClr val="accent1">
+              <a:shade val="50000"/>
+            </a:schemeClr>
+          </a:lnRef>
+          <a:fillRef idx="1">
+            <a:schemeClr val="accent1"/>
+          </a:fillRef>
+          <a:effectRef idx="0">
+            <a:schemeClr val="accent1"/>
+          </a:effectRef>
+          <a:fontRef idx="minor">
+            <a:schemeClr val="lt1"/>
+          </a:fontRef>
+        </p:style>
+        <p:txBody>
+          <a:bodyPr rtlCol="0" anchor="ctr">
+            <a:sp3d extrusionH="57150">
+              <a:bevelT w="38100" h="38100" prst="relaxedInset"/>
+            </a:sp3d>
+          </a:bodyPr>
+          <a:lstStyle/>
+          <a:p>
+            <a:pPr algn="ctr"/>
+            <a:endParaRPr lang="en-IN"/>
+          </a:p>
+        </p:txBody>
+      </p:sp>
+    </p:spTree>
+    <p:extLst>
+      <p:ext uri="{BB962C8B-B14F-4D97-AF65-F5344CB8AC3E}">
+        <p14:creationId xmlns:p14="http://schemas.microsoft.com/office/powerpoint/2010/main" val="4248716233"/>
+      </p:ext>
+    </p:extLst>
+  </p:cSld>
+  <p:clrMapOvr>
+    <a:masterClrMapping/>
+  </p:clrMapOvr>
+</p:sld>
+</file>
+
+<file path=ppt/slides/slide11.xml><?xml version="1.0" encoding="utf-8"?>
 <p:sld xmlns:a="http://schemas.openxmlformats.org/drawingml/2006/main" xmlns:r="http://schemas.openxmlformats.org/officeDocument/2006/relationships" xmlns:p="http://schemas.openxmlformats.org/presentationml/2006/main">
   <p:cSld>
     <p:spTree>
@@ -3388,7 +3619,7 @@
 </p:sld>
 </file>
 
-<file path=ppt/slides/slide11.xml><?xml version="1.0" encoding="utf-8"?>
+<file path=ppt/slides/slide12.xml><?xml version="1.0" encoding="utf-8"?>
 <p:sld xmlns:a="http://schemas.openxmlformats.org/drawingml/2006/main" xmlns:r="http://schemas.openxmlformats.org/officeDocument/2006/relationships" xmlns:p="http://schemas.openxmlformats.org/presentationml/2006/main">
   <p:cSld>
     <p:spTree>
@@ -3524,7 +3755,7 @@
 </p:sld>
 </file>
 
-<file path=ppt/slides/slide12.xml><?xml version="1.0" encoding="utf-8"?>
+<file path=ppt/slides/slide13.xml><?xml version="1.0" encoding="utf-8"?>
 <p:sld xmlns:a="http://schemas.openxmlformats.org/drawingml/2006/main" xmlns:r="http://schemas.openxmlformats.org/officeDocument/2006/relationships" xmlns:p="http://schemas.openxmlformats.org/presentationml/2006/main">
   <p:cSld>
     <p:spTree>
@@ -3920,7 +4151,7 @@
 </p:sld>
 </file>
 
-<file path=ppt/slides/slide13.xml><?xml version="1.0" encoding="utf-8"?>
+<file path=ppt/slides/slide14.xml><?xml version="1.0" encoding="utf-8"?>
 <p:sld xmlns:a="http://schemas.openxmlformats.org/drawingml/2006/main" xmlns:r="http://schemas.openxmlformats.org/officeDocument/2006/relationships" xmlns:p="http://schemas.openxmlformats.org/presentationml/2006/main">
   <p:cSld>
     <p:spTree>
@@ -4803,7 +5034,7 @@
 </p:sld>
 </file>
 
-<file path=ppt/slides/slide14.xml><?xml version="1.0" encoding="utf-8"?>
+<file path=ppt/slides/slide15.xml><?xml version="1.0" encoding="utf-8"?>
 <p:sld xmlns:a="http://schemas.openxmlformats.org/drawingml/2006/main" xmlns:r="http://schemas.openxmlformats.org/officeDocument/2006/relationships" xmlns:p="http://schemas.openxmlformats.org/presentationml/2006/main">
   <p:cSld>
     <p:spTree>
@@ -4888,7 +5119,7 @@
 </p:sld>
 </file>
 
-<file path=ppt/slides/slide15.xml><?xml version="1.0" encoding="utf-8"?>
+<file path=ppt/slides/slide16.xml><?xml version="1.0" encoding="utf-8"?>
 <p:sld xmlns:a="http://schemas.openxmlformats.org/drawingml/2006/main" xmlns:r="http://schemas.openxmlformats.org/officeDocument/2006/relationships" xmlns:p="http://schemas.openxmlformats.org/presentationml/2006/main">
   <p:cSld>
     <p:spTree>
@@ -5030,7 +5261,7 @@
 </p:sld>
 </file>
 
-<file path=ppt/slides/slide16.xml><?xml version="1.0" encoding="utf-8"?>
+<file path=ppt/slides/slide17.xml><?xml version="1.0" encoding="utf-8"?>
 <p:sld xmlns:a="http://schemas.openxmlformats.org/drawingml/2006/main" xmlns:r="http://schemas.openxmlformats.org/officeDocument/2006/relationships" xmlns:p="http://schemas.openxmlformats.org/presentationml/2006/main">
   <p:cSld>
     <p:spTree>
@@ -5159,7 +5390,7 @@
 </p:sld>
 </file>
 
-<file path=ppt/slides/slide17.xml><?xml version="1.0" encoding="utf-8"?>
+<file path=ppt/slides/slide18.xml><?xml version="1.0" encoding="utf-8"?>
 <p:sld xmlns:a="http://schemas.openxmlformats.org/drawingml/2006/main" xmlns:r="http://schemas.openxmlformats.org/officeDocument/2006/relationships" xmlns:p="http://schemas.openxmlformats.org/presentationml/2006/main">
   <p:cSld>
     <p:spTree>
@@ -5241,7 +5472,7 @@
 </p:sld>
 </file>
 
-<file path=ppt/slides/slide18.xml><?xml version="1.0" encoding="utf-8"?>
+<file path=ppt/slides/slide19.xml><?xml version="1.0" encoding="utf-8"?>
 <p:sld xmlns:a="http://schemas.openxmlformats.org/drawingml/2006/main" xmlns:r="http://schemas.openxmlformats.org/officeDocument/2006/relationships" xmlns:p="http://schemas.openxmlformats.org/presentationml/2006/main">
   <p:cSld>
     <p:spTree>
@@ -5326,7 +5557,90 @@
 </p:sld>
 </file>
 
-<file path=ppt/slides/slide19.xml><?xml version="1.0" encoding="utf-8"?>
+<file path=ppt/slides/slide2.xml><?xml version="1.0" encoding="utf-8"?>
+<p:sld xmlns:a="http://schemas.openxmlformats.org/drawingml/2006/main" xmlns:r="http://schemas.openxmlformats.org/officeDocument/2006/relationships" xmlns:p="http://schemas.openxmlformats.org/presentationml/2006/main">
+  <p:cSld>
+    <p:spTree>
+      <p:nvGrpSpPr>
+        <p:cNvPr id="1" name=""/>
+        <p:cNvGrpSpPr/>
+        <p:nvPr/>
+      </p:nvGrpSpPr>
+      <p:grpSpPr>
+        <a:xfrm>
+          <a:off x="0" y="0"/>
+          <a:ext cx="0" cy="0"/>
+          <a:chOff x="0" y="0"/>
+          <a:chExt cx="0" cy="0"/>
+        </a:xfrm>
+      </p:grpSpPr>
+      <p:sp>
+        <p:nvSpPr>
+          <p:cNvPr id="2" name="Rectangle 1"/>
+          <p:cNvSpPr/>
+          <p:nvPr/>
+        </p:nvSpPr>
+        <p:spPr>
+          <a:xfrm rot="18900000">
+            <a:off x="4438835" y="1957526"/>
+            <a:ext cx="266330" cy="2942948"/>
+          </a:xfrm>
+          <a:prstGeom prst="rect">
+            <a:avLst/>
+          </a:prstGeom>
+          <a:solidFill>
+            <a:schemeClr val="bg1"/>
+          </a:solidFill>
+          <a:ln>
+            <a:noFill/>
+          </a:ln>
+        </p:spPr>
+        <p:style>
+          <a:lnRef idx="2">
+            <a:schemeClr val="accent1">
+              <a:shade val="50000"/>
+            </a:schemeClr>
+          </a:lnRef>
+          <a:fillRef idx="1">
+            <a:schemeClr val="accent1"/>
+          </a:fillRef>
+          <a:effectRef idx="0">
+            <a:schemeClr val="accent1"/>
+          </a:effectRef>
+          <a:fontRef idx="minor">
+            <a:schemeClr val="lt1"/>
+          </a:fontRef>
+        </p:style>
+        <p:txBody>
+          <a:bodyPr rtlCol="0" anchor="ctr"/>
+          <a:lstStyle/>
+          <a:p>
+            <a:pPr algn="ctr"/>
+            <a:endParaRPr lang="en-IN"/>
+          </a:p>
+        </p:txBody>
+      </p:sp>
+    </p:spTree>
+    <p:extLst>
+      <p:ext uri="{BB962C8B-B14F-4D97-AF65-F5344CB8AC3E}">
+        <p14:creationId xmlns:p14="http://schemas.microsoft.com/office/powerpoint/2010/main" val="3332374155"/>
+      </p:ext>
+    </p:extLst>
+  </p:cSld>
+  <p:clrMapOvr>
+    <a:masterClrMapping/>
+  </p:clrMapOvr>
+  <p:timing>
+    <p:tnLst>
+      <p:par>
+        <p:cTn id="1" dur="indefinite" restart="never" nodeType="tmRoot"/>
+      </p:par>
+    </p:tnLst>
+  </p:timing>
+</p:sld>
+</file>
+
+<file path=ppt/slides/slide20.xml><?xml version="1.0" encoding="utf-8"?>
 <p:sld xmlns:a="http://schemas.openxmlformats.org/drawingml/2006/main" xmlns:r="http://schemas.openxmlformats.org/officeDocument/2006/relationships" xmlns:p="http://schemas.openxmlformats.org/presentationml/2006/main">
   <p:cSld>
     <p:spTree>
@@ -5588,90 +5902,7 @@
 </p:sld>
 </file>
 
-<file path=ppt/slides/slide2.xml><?xml version="1.0" encoding="utf-8"?>
-<p:sld xmlns:a="http://schemas.openxmlformats.org/drawingml/2006/main" xmlns:r="http://schemas.openxmlformats.org/officeDocument/2006/relationships" xmlns:p="http://schemas.openxmlformats.org/presentationml/2006/main">
-  <p:cSld>
-    <p:spTree>
-      <p:nvGrpSpPr>
-        <p:cNvPr id="1" name=""/>
-        <p:cNvGrpSpPr/>
-        <p:nvPr/>
-      </p:nvGrpSpPr>
-      <p:grpSpPr>
-        <a:xfrm>
-          <a:off x="0" y="0"/>
-          <a:ext cx="0" cy="0"/>
-          <a:chOff x="0" y="0"/>
-          <a:chExt cx="0" cy="0"/>
-        </a:xfrm>
-      </p:grpSpPr>
-      <p:sp>
-        <p:nvSpPr>
-          <p:cNvPr id="2" name="Rectangle 1"/>
-          <p:cNvSpPr/>
-          <p:nvPr/>
-        </p:nvSpPr>
-        <p:spPr>
-          <a:xfrm rot="18900000">
-            <a:off x="4438835" y="1957526"/>
-            <a:ext cx="266330" cy="2942948"/>
-          </a:xfrm>
-          <a:prstGeom prst="rect">
-            <a:avLst/>
-          </a:prstGeom>
-          <a:solidFill>
-            <a:schemeClr val="bg1"/>
-          </a:solidFill>
-          <a:ln>
-            <a:noFill/>
-          </a:ln>
-        </p:spPr>
-        <p:style>
-          <a:lnRef idx="2">
-            <a:schemeClr val="accent1">
-              <a:shade val="50000"/>
-            </a:schemeClr>
-          </a:lnRef>
-          <a:fillRef idx="1">
-            <a:schemeClr val="accent1"/>
-          </a:fillRef>
-          <a:effectRef idx="0">
-            <a:schemeClr val="accent1"/>
-          </a:effectRef>
-          <a:fontRef idx="minor">
-            <a:schemeClr val="lt1"/>
-          </a:fontRef>
-        </p:style>
-        <p:txBody>
-          <a:bodyPr rtlCol="0" anchor="ctr"/>
-          <a:lstStyle/>
-          <a:p>
-            <a:pPr algn="ctr"/>
-            <a:endParaRPr lang="en-IN"/>
-          </a:p>
-        </p:txBody>
-      </p:sp>
-    </p:spTree>
-    <p:extLst>
-      <p:ext uri="{BB962C8B-B14F-4D97-AF65-F5344CB8AC3E}">
-        <p14:creationId xmlns:p14="http://schemas.microsoft.com/office/powerpoint/2010/main" val="3332374155"/>
-      </p:ext>
-    </p:extLst>
-  </p:cSld>
-  <p:clrMapOvr>
-    <a:masterClrMapping/>
-  </p:clrMapOvr>
-  <p:timing>
-    <p:tnLst>
-      <p:par>
-        <p:cTn id="1" dur="indefinite" restart="never" nodeType="tmRoot"/>
-      </p:par>
-    </p:tnLst>
-  </p:timing>
-</p:sld>
-</file>
-
-<file path=ppt/slides/slide20.xml><?xml version="1.0" encoding="utf-8"?>
+<file path=ppt/slides/slide21.xml><?xml version="1.0" encoding="utf-8"?>
 <p:sld xmlns:a="http://schemas.openxmlformats.org/drawingml/2006/main" xmlns:r="http://schemas.openxmlformats.org/officeDocument/2006/relationships" xmlns:p="http://schemas.openxmlformats.org/presentationml/2006/main">
   <p:cSld>
     <p:spTree>
@@ -7289,7 +7520,7 @@
 </p:sld>
 </file>
 
-<file path=ppt/slides/slide21.xml><?xml version="1.0" encoding="utf-8"?>
+<file path=ppt/slides/slide22.xml><?xml version="1.0" encoding="utf-8"?>
 <p:sld xmlns:a="http://schemas.openxmlformats.org/drawingml/2006/main" xmlns:r="http://schemas.openxmlformats.org/officeDocument/2006/relationships" xmlns:p="http://schemas.openxmlformats.org/presentationml/2006/main">
   <p:cSld>
     <p:spTree>
@@ -7374,7 +7605,7 @@
 </p:sld>
 </file>
 
-<file path=ppt/slides/slide22.xml><?xml version="1.0" encoding="utf-8"?>
+<file path=ppt/slides/slide23.xml><?xml version="1.0" encoding="utf-8"?>
 <p:sld xmlns:a="http://schemas.openxmlformats.org/drawingml/2006/main" xmlns:r="http://schemas.openxmlformats.org/officeDocument/2006/relationships" xmlns:p="http://schemas.openxmlformats.org/presentationml/2006/main">
   <p:cSld>
     <p:spTree>
@@ -7456,7 +7687,7 @@
 </p:sld>
 </file>
 
-<file path=ppt/slides/slide23.xml><?xml version="1.0" encoding="utf-8"?>
+<file path=ppt/slides/slide24.xml><?xml version="1.0" encoding="utf-8"?>
 <p:sld xmlns:a="http://schemas.openxmlformats.org/drawingml/2006/main" xmlns:r="http://schemas.openxmlformats.org/officeDocument/2006/relationships" xmlns:p="http://schemas.openxmlformats.org/presentationml/2006/main">
   <p:cSld>
     <p:spTree>
@@ -7678,7 +7909,7 @@
 </p:sld>
 </file>
 
-<file path=ppt/slides/slide24.xml><?xml version="1.0" encoding="utf-8"?>
+<file path=ppt/slides/slide25.xml><?xml version="1.0" encoding="utf-8"?>
 <p:sld xmlns:a="http://schemas.openxmlformats.org/drawingml/2006/main" xmlns:r="http://schemas.openxmlformats.org/officeDocument/2006/relationships" xmlns:p="http://schemas.openxmlformats.org/presentationml/2006/main">
   <p:cSld>
     <p:spTree>
@@ -7852,7 +8083,7 @@
 </p:sld>
 </file>
 
-<file path=ppt/slides/slide25.xml><?xml version="1.0" encoding="utf-8"?>
+<file path=ppt/slides/slide26.xml><?xml version="1.0" encoding="utf-8"?>
 <p:sld xmlns:a="http://schemas.openxmlformats.org/drawingml/2006/main" xmlns:r="http://schemas.openxmlformats.org/officeDocument/2006/relationships" xmlns:p="http://schemas.openxmlformats.org/presentationml/2006/main">
   <p:cSld>
     <p:spTree>
@@ -7947,7 +8178,7 @@
 </p:sld>
 </file>
 
-<file path=ppt/slides/slide26.xml><?xml version="1.0" encoding="utf-8"?>
+<file path=ppt/slides/slide27.xml><?xml version="1.0" encoding="utf-8"?>
 <p:sld xmlns:a="http://schemas.openxmlformats.org/drawingml/2006/main" xmlns:r="http://schemas.openxmlformats.org/officeDocument/2006/relationships" xmlns:p="http://schemas.openxmlformats.org/presentationml/2006/main">
   <p:cSld>
     <p:spTree>
@@ -8213,7 +8444,7 @@
 </p:sld>
 </file>
 
-<file path=ppt/slides/slide27.xml><?xml version="1.0" encoding="utf-8"?>
+<file path=ppt/slides/slide28.xml><?xml version="1.0" encoding="utf-8"?>
 <p:sld xmlns:a="http://schemas.openxmlformats.org/drawingml/2006/main" xmlns:r="http://schemas.openxmlformats.org/officeDocument/2006/relationships" xmlns:p="http://schemas.openxmlformats.org/presentationml/2006/main">
   <p:cSld>
     <p:spTree>
@@ -8586,7 +8817,7 @@
 </p:sld>
 </file>
 
-<file path=ppt/slides/slide28.xml><?xml version="1.0" encoding="utf-8"?>
+<file path=ppt/slides/slide29.xml><?xml version="1.0" encoding="utf-8"?>
 <p:sld xmlns:a="http://schemas.openxmlformats.org/drawingml/2006/main" xmlns:r="http://schemas.openxmlformats.org/officeDocument/2006/relationships" xmlns:p="http://schemas.openxmlformats.org/presentationml/2006/main">
   <p:cSld>
     <p:spTree>
@@ -8886,7 +9117,637 @@
 </p:sld>
 </file>
 
-<file path=ppt/slides/slide29.xml><?xml version="1.0" encoding="utf-8"?>
+<file path=ppt/slides/slide3.xml><?xml version="1.0" encoding="utf-8"?>
+<p:sld xmlns:a="http://schemas.openxmlformats.org/drawingml/2006/main" xmlns:r="http://schemas.openxmlformats.org/officeDocument/2006/relationships" xmlns:p="http://schemas.openxmlformats.org/presentationml/2006/main">
+  <p:cSld>
+    <p:spTree>
+      <p:nvGrpSpPr>
+        <p:cNvPr id="1" name=""/>
+        <p:cNvGrpSpPr/>
+        <p:nvPr/>
+      </p:nvGrpSpPr>
+      <p:grpSpPr>
+        <a:xfrm>
+          <a:off x="0" y="0"/>
+          <a:ext cx="0" cy="0"/>
+          <a:chOff x="0" y="0"/>
+          <a:chExt cx="0" cy="0"/>
+        </a:xfrm>
+      </p:grpSpPr>
+      <p:sp>
+        <p:nvSpPr>
+          <p:cNvPr id="6" name="Rounded Rectangle 5"/>
+          <p:cNvSpPr/>
+          <p:nvPr/>
+        </p:nvSpPr>
+        <p:spPr>
+          <a:xfrm>
+            <a:off x="4031931" y="3518024"/>
+            <a:ext cx="1080136" cy="2804637"/>
+          </a:xfrm>
+          <a:custGeom>
+            <a:avLst/>
+            <a:gdLst>
+              <a:gd name="connsiteX0" fmla="*/ 0 w 1080135"/>
+              <a:gd name="connsiteY0" fmla="*/ 540068 h 2796540"/>
+              <a:gd name="connsiteX1" fmla="*/ 540068 w 1080135"/>
+              <a:gd name="connsiteY1" fmla="*/ 0 h 2796540"/>
+              <a:gd name="connsiteX2" fmla="*/ 540068 w 1080135"/>
+              <a:gd name="connsiteY2" fmla="*/ 0 h 2796540"/>
+              <a:gd name="connsiteX3" fmla="*/ 1080136 w 1080135"/>
+              <a:gd name="connsiteY3" fmla="*/ 540068 h 2796540"/>
+              <a:gd name="connsiteX4" fmla="*/ 1080135 w 1080135"/>
+              <a:gd name="connsiteY4" fmla="*/ 2256473 h 2796540"/>
+              <a:gd name="connsiteX5" fmla="*/ 540067 w 1080135"/>
+              <a:gd name="connsiteY5" fmla="*/ 2796541 h 2796540"/>
+              <a:gd name="connsiteX6" fmla="*/ 540068 w 1080135"/>
+              <a:gd name="connsiteY6" fmla="*/ 2796540 h 2796540"/>
+              <a:gd name="connsiteX7" fmla="*/ 0 w 1080135"/>
+              <a:gd name="connsiteY7" fmla="*/ 2256472 h 2796540"/>
+              <a:gd name="connsiteX8" fmla="*/ 0 w 1080135"/>
+              <a:gd name="connsiteY8" fmla="*/ 540068 h 2796540"/>
+              <a:gd name="connsiteX0" fmla="*/ 540068 w 1080136"/>
+              <a:gd name="connsiteY0" fmla="*/ 2796540 h 2887980"/>
+              <a:gd name="connsiteX1" fmla="*/ 0 w 1080136"/>
+              <a:gd name="connsiteY1" fmla="*/ 2256472 h 2887980"/>
+              <a:gd name="connsiteX2" fmla="*/ 0 w 1080136"/>
+              <a:gd name="connsiteY2" fmla="*/ 540068 h 2887980"/>
+              <a:gd name="connsiteX3" fmla="*/ 540068 w 1080136"/>
+              <a:gd name="connsiteY3" fmla="*/ 0 h 2887980"/>
+              <a:gd name="connsiteX4" fmla="*/ 540068 w 1080136"/>
+              <a:gd name="connsiteY4" fmla="*/ 0 h 2887980"/>
+              <a:gd name="connsiteX5" fmla="*/ 1080136 w 1080136"/>
+              <a:gd name="connsiteY5" fmla="*/ 540068 h 2887980"/>
+              <a:gd name="connsiteX6" fmla="*/ 1080135 w 1080136"/>
+              <a:gd name="connsiteY6" fmla="*/ 2256473 h 2887980"/>
+              <a:gd name="connsiteX7" fmla="*/ 540067 w 1080136"/>
+              <a:gd name="connsiteY7" fmla="*/ 2796541 h 2887980"/>
+              <a:gd name="connsiteX8" fmla="*/ 631508 w 1080136"/>
+              <a:gd name="connsiteY8" fmla="*/ 2887980 h 2887980"/>
+              <a:gd name="connsiteX0" fmla="*/ 540068 w 1080136"/>
+              <a:gd name="connsiteY0" fmla="*/ 2796540 h 2796541"/>
+              <a:gd name="connsiteX1" fmla="*/ 0 w 1080136"/>
+              <a:gd name="connsiteY1" fmla="*/ 2256472 h 2796541"/>
+              <a:gd name="connsiteX2" fmla="*/ 0 w 1080136"/>
+              <a:gd name="connsiteY2" fmla="*/ 540068 h 2796541"/>
+              <a:gd name="connsiteX3" fmla="*/ 540068 w 1080136"/>
+              <a:gd name="connsiteY3" fmla="*/ 0 h 2796541"/>
+              <a:gd name="connsiteX4" fmla="*/ 540068 w 1080136"/>
+              <a:gd name="connsiteY4" fmla="*/ 0 h 2796541"/>
+              <a:gd name="connsiteX5" fmla="*/ 1080136 w 1080136"/>
+              <a:gd name="connsiteY5" fmla="*/ 540068 h 2796541"/>
+              <a:gd name="connsiteX6" fmla="*/ 1080135 w 1080136"/>
+              <a:gd name="connsiteY6" fmla="*/ 2256473 h 2796541"/>
+              <a:gd name="connsiteX7" fmla="*/ 540067 w 1080136"/>
+              <a:gd name="connsiteY7" fmla="*/ 2796541 h 2796541"/>
+              <a:gd name="connsiteX0" fmla="*/ 540068 w 1080136"/>
+              <a:gd name="connsiteY0" fmla="*/ 2796540 h 2796540"/>
+              <a:gd name="connsiteX1" fmla="*/ 0 w 1080136"/>
+              <a:gd name="connsiteY1" fmla="*/ 2256472 h 2796540"/>
+              <a:gd name="connsiteX2" fmla="*/ 0 w 1080136"/>
+              <a:gd name="connsiteY2" fmla="*/ 540068 h 2796540"/>
+              <a:gd name="connsiteX3" fmla="*/ 540068 w 1080136"/>
+              <a:gd name="connsiteY3" fmla="*/ 0 h 2796540"/>
+              <a:gd name="connsiteX4" fmla="*/ 540068 w 1080136"/>
+              <a:gd name="connsiteY4" fmla="*/ 0 h 2796540"/>
+              <a:gd name="connsiteX5" fmla="*/ 1080136 w 1080136"/>
+              <a:gd name="connsiteY5" fmla="*/ 540068 h 2796540"/>
+              <a:gd name="connsiteX6" fmla="*/ 1080135 w 1080136"/>
+              <a:gd name="connsiteY6" fmla="*/ 2256473 h 2796540"/>
+              <a:gd name="connsiteX0" fmla="*/ 0 w 1080136"/>
+              <a:gd name="connsiteY0" fmla="*/ 2256472 h 2256473"/>
+              <a:gd name="connsiteX1" fmla="*/ 0 w 1080136"/>
+              <a:gd name="connsiteY1" fmla="*/ 540068 h 2256473"/>
+              <a:gd name="connsiteX2" fmla="*/ 540068 w 1080136"/>
+              <a:gd name="connsiteY2" fmla="*/ 0 h 2256473"/>
+              <a:gd name="connsiteX3" fmla="*/ 540068 w 1080136"/>
+              <a:gd name="connsiteY3" fmla="*/ 0 h 2256473"/>
+              <a:gd name="connsiteX4" fmla="*/ 1080136 w 1080136"/>
+              <a:gd name="connsiteY4" fmla="*/ 540068 h 2256473"/>
+              <a:gd name="connsiteX5" fmla="*/ 1080135 w 1080136"/>
+              <a:gd name="connsiteY5" fmla="*/ 2256473 h 2256473"/>
+              <a:gd name="connsiteX0" fmla="*/ 0 w 1080136"/>
+              <a:gd name="connsiteY0" fmla="*/ 2487949 h 2487949"/>
+              <a:gd name="connsiteX1" fmla="*/ 0 w 1080136"/>
+              <a:gd name="connsiteY1" fmla="*/ 540068 h 2487949"/>
+              <a:gd name="connsiteX2" fmla="*/ 540068 w 1080136"/>
+              <a:gd name="connsiteY2" fmla="*/ 0 h 2487949"/>
+              <a:gd name="connsiteX3" fmla="*/ 540068 w 1080136"/>
+              <a:gd name="connsiteY3" fmla="*/ 0 h 2487949"/>
+              <a:gd name="connsiteX4" fmla="*/ 1080136 w 1080136"/>
+              <a:gd name="connsiteY4" fmla="*/ 540068 h 2487949"/>
+              <a:gd name="connsiteX5" fmla="*/ 1080135 w 1080136"/>
+              <a:gd name="connsiteY5" fmla="*/ 2256473 h 2487949"/>
+              <a:gd name="connsiteX0" fmla="*/ 0 w 1080136"/>
+              <a:gd name="connsiteY0" fmla="*/ 2487949 h 2493596"/>
+              <a:gd name="connsiteX1" fmla="*/ 0 w 1080136"/>
+              <a:gd name="connsiteY1" fmla="*/ 540068 h 2493596"/>
+              <a:gd name="connsiteX2" fmla="*/ 540068 w 1080136"/>
+              <a:gd name="connsiteY2" fmla="*/ 0 h 2493596"/>
+              <a:gd name="connsiteX3" fmla="*/ 540068 w 1080136"/>
+              <a:gd name="connsiteY3" fmla="*/ 0 h 2493596"/>
+              <a:gd name="connsiteX4" fmla="*/ 1080136 w 1080136"/>
+              <a:gd name="connsiteY4" fmla="*/ 540068 h 2493596"/>
+              <a:gd name="connsiteX5" fmla="*/ 1076960 w 1080136"/>
+              <a:gd name="connsiteY5" fmla="*/ 2493596 h 2493596"/>
+            </a:gdLst>
+            <a:ahLst/>
+            <a:cxnLst>
+              <a:cxn ang="0">
+                <a:pos x="connsiteX0" y="connsiteY0"/>
+              </a:cxn>
+              <a:cxn ang="0">
+                <a:pos x="connsiteX1" y="connsiteY1"/>
+              </a:cxn>
+              <a:cxn ang="0">
+                <a:pos x="connsiteX2" y="connsiteY2"/>
+              </a:cxn>
+              <a:cxn ang="0">
+                <a:pos x="connsiteX3" y="connsiteY3"/>
+              </a:cxn>
+              <a:cxn ang="0">
+                <a:pos x="connsiteX4" y="connsiteY4"/>
+              </a:cxn>
+              <a:cxn ang="0">
+                <a:pos x="connsiteX5" y="connsiteY5"/>
+              </a:cxn>
+            </a:cxnLst>
+            <a:rect l="l" t="t" r="r" b="b"/>
+            <a:pathLst>
+              <a:path w="1080136" h="2493596">
+                <a:moveTo>
+                  <a:pt x="0" y="2487949"/>
+                </a:moveTo>
+                <a:lnTo>
+                  <a:pt x="0" y="540068"/>
+                </a:lnTo>
+                <a:cubicBezTo>
+                  <a:pt x="0" y="241797"/>
+                  <a:pt x="241797" y="0"/>
+                  <a:pt x="540068" y="0"/>
+                </a:cubicBezTo>
+                <a:lnTo>
+                  <a:pt x="540068" y="0"/>
+                </a:lnTo>
+                <a:cubicBezTo>
+                  <a:pt x="838339" y="0"/>
+                  <a:pt x="1080136" y="241797"/>
+                  <a:pt x="1080136" y="540068"/>
+                </a:cubicBezTo>
+                <a:cubicBezTo>
+                  <a:pt x="1080136" y="1112203"/>
+                  <a:pt x="1076960" y="1921461"/>
+                  <a:pt x="1076960" y="2493596"/>
+                </a:cubicBezTo>
+              </a:path>
+            </a:pathLst>
+          </a:custGeom>
+          <a:noFill/>
+          <a:ln w="190500">
+            <a:solidFill>
+              <a:schemeClr val="bg1"/>
+            </a:solidFill>
+          </a:ln>
+        </p:spPr>
+        <p:style>
+          <a:lnRef idx="2">
+            <a:schemeClr val="accent1">
+              <a:shade val="50000"/>
+            </a:schemeClr>
+          </a:lnRef>
+          <a:fillRef idx="1">
+            <a:schemeClr val="accent1"/>
+          </a:fillRef>
+          <a:effectRef idx="0">
+            <a:schemeClr val="accent1"/>
+          </a:effectRef>
+          <a:fontRef idx="minor">
+            <a:schemeClr val="lt1"/>
+          </a:fontRef>
+        </p:style>
+        <p:txBody>
+          <a:bodyPr rtlCol="0" anchor="ctr"/>
+          <a:lstStyle/>
+          <a:p>
+            <a:pPr algn="ctr"/>
+            <a:endParaRPr lang="en-IN"/>
+          </a:p>
+        </p:txBody>
+      </p:sp>
+      <p:sp>
+        <p:nvSpPr>
+          <p:cNvPr id="7" name="Rounded Rectangle 6"/>
+          <p:cNvSpPr/>
+          <p:nvPr/>
+        </p:nvSpPr>
+        <p:spPr>
+          <a:xfrm>
+            <a:off x="4251324" y="3763609"/>
+            <a:ext cx="641350" cy="612775"/>
+          </a:xfrm>
+          <a:custGeom>
+            <a:avLst/>
+            <a:gdLst>
+              <a:gd name="connsiteX0" fmla="*/ 0 w 641350"/>
+              <a:gd name="connsiteY0" fmla="*/ 320675 h 933450"/>
+              <a:gd name="connsiteX1" fmla="*/ 320675 w 641350"/>
+              <a:gd name="connsiteY1" fmla="*/ 0 h 933450"/>
+              <a:gd name="connsiteX2" fmla="*/ 320675 w 641350"/>
+              <a:gd name="connsiteY2" fmla="*/ 0 h 933450"/>
+              <a:gd name="connsiteX3" fmla="*/ 641350 w 641350"/>
+              <a:gd name="connsiteY3" fmla="*/ 320675 h 933450"/>
+              <a:gd name="connsiteX4" fmla="*/ 641350 w 641350"/>
+              <a:gd name="connsiteY4" fmla="*/ 612775 h 933450"/>
+              <a:gd name="connsiteX5" fmla="*/ 320675 w 641350"/>
+              <a:gd name="connsiteY5" fmla="*/ 933450 h 933450"/>
+              <a:gd name="connsiteX6" fmla="*/ 320675 w 641350"/>
+              <a:gd name="connsiteY6" fmla="*/ 933450 h 933450"/>
+              <a:gd name="connsiteX7" fmla="*/ 0 w 641350"/>
+              <a:gd name="connsiteY7" fmla="*/ 612775 h 933450"/>
+              <a:gd name="connsiteX8" fmla="*/ 0 w 641350"/>
+              <a:gd name="connsiteY8" fmla="*/ 320675 h 933450"/>
+              <a:gd name="connsiteX0" fmla="*/ 0 w 641350"/>
+              <a:gd name="connsiteY0" fmla="*/ 320675 h 933450"/>
+              <a:gd name="connsiteX1" fmla="*/ 320675 w 641350"/>
+              <a:gd name="connsiteY1" fmla="*/ 0 h 933450"/>
+              <a:gd name="connsiteX2" fmla="*/ 320675 w 641350"/>
+              <a:gd name="connsiteY2" fmla="*/ 0 h 933450"/>
+              <a:gd name="connsiteX3" fmla="*/ 641350 w 641350"/>
+              <a:gd name="connsiteY3" fmla="*/ 320675 h 933450"/>
+              <a:gd name="connsiteX4" fmla="*/ 641350 w 641350"/>
+              <a:gd name="connsiteY4" fmla="*/ 612775 h 933450"/>
+              <a:gd name="connsiteX5" fmla="*/ 320675 w 641350"/>
+              <a:gd name="connsiteY5" fmla="*/ 933450 h 933450"/>
+              <a:gd name="connsiteX6" fmla="*/ 0 w 641350"/>
+              <a:gd name="connsiteY6" fmla="*/ 612775 h 933450"/>
+              <a:gd name="connsiteX7" fmla="*/ 0 w 641350"/>
+              <a:gd name="connsiteY7" fmla="*/ 320675 h 933450"/>
+              <a:gd name="connsiteX0" fmla="*/ 0 w 641350"/>
+              <a:gd name="connsiteY0" fmla="*/ 320675 h 612775"/>
+              <a:gd name="connsiteX1" fmla="*/ 320675 w 641350"/>
+              <a:gd name="connsiteY1" fmla="*/ 0 h 612775"/>
+              <a:gd name="connsiteX2" fmla="*/ 320675 w 641350"/>
+              <a:gd name="connsiteY2" fmla="*/ 0 h 612775"/>
+              <a:gd name="connsiteX3" fmla="*/ 641350 w 641350"/>
+              <a:gd name="connsiteY3" fmla="*/ 320675 h 612775"/>
+              <a:gd name="connsiteX4" fmla="*/ 641350 w 641350"/>
+              <a:gd name="connsiteY4" fmla="*/ 612775 h 612775"/>
+              <a:gd name="connsiteX5" fmla="*/ 0 w 641350"/>
+              <a:gd name="connsiteY5" fmla="*/ 612775 h 612775"/>
+              <a:gd name="connsiteX6" fmla="*/ 0 w 641350"/>
+              <a:gd name="connsiteY6" fmla="*/ 320675 h 612775"/>
+            </a:gdLst>
+            <a:ahLst/>
+            <a:cxnLst>
+              <a:cxn ang="0">
+                <a:pos x="connsiteX0" y="connsiteY0"/>
+              </a:cxn>
+              <a:cxn ang="0">
+                <a:pos x="connsiteX1" y="connsiteY1"/>
+              </a:cxn>
+              <a:cxn ang="0">
+                <a:pos x="connsiteX2" y="connsiteY2"/>
+              </a:cxn>
+              <a:cxn ang="0">
+                <a:pos x="connsiteX3" y="connsiteY3"/>
+              </a:cxn>
+              <a:cxn ang="0">
+                <a:pos x="connsiteX4" y="connsiteY4"/>
+              </a:cxn>
+              <a:cxn ang="0">
+                <a:pos x="connsiteX5" y="connsiteY5"/>
+              </a:cxn>
+              <a:cxn ang="0">
+                <a:pos x="connsiteX6" y="connsiteY6"/>
+              </a:cxn>
+            </a:cxnLst>
+            <a:rect l="l" t="t" r="r" b="b"/>
+            <a:pathLst>
+              <a:path w="641350" h="612775">
+                <a:moveTo>
+                  <a:pt x="0" y="320675"/>
+                </a:moveTo>
+                <a:cubicBezTo>
+                  <a:pt x="0" y="143571"/>
+                  <a:pt x="143571" y="0"/>
+                  <a:pt x="320675" y="0"/>
+                </a:cubicBezTo>
+                <a:lnTo>
+                  <a:pt x="320675" y="0"/>
+                </a:lnTo>
+                <a:cubicBezTo>
+                  <a:pt x="497779" y="0"/>
+                  <a:pt x="641350" y="143571"/>
+                  <a:pt x="641350" y="320675"/>
+                </a:cubicBezTo>
+                <a:lnTo>
+                  <a:pt x="641350" y="612775"/>
+                </a:lnTo>
+                <a:cubicBezTo>
+                  <a:pt x="534458" y="661458"/>
+                  <a:pt x="106892" y="661458"/>
+                  <a:pt x="0" y="612775"/>
+                </a:cubicBezTo>
+                <a:lnTo>
+                  <a:pt x="0" y="320675"/>
+                </a:lnTo>
+                <a:close/>
+              </a:path>
+            </a:pathLst>
+          </a:custGeom>
+          <a:noFill/>
+          <a:ln w="76200">
+            <a:solidFill>
+              <a:schemeClr val="bg1"/>
+            </a:solidFill>
+          </a:ln>
+        </p:spPr>
+        <p:style>
+          <a:lnRef idx="2">
+            <a:schemeClr val="accent1">
+              <a:shade val="50000"/>
+            </a:schemeClr>
+          </a:lnRef>
+          <a:fillRef idx="1">
+            <a:schemeClr val="accent1"/>
+          </a:fillRef>
+          <a:effectRef idx="0">
+            <a:schemeClr val="accent1"/>
+          </a:effectRef>
+          <a:fontRef idx="minor">
+            <a:schemeClr val="lt1"/>
+          </a:fontRef>
+        </p:style>
+        <p:txBody>
+          <a:bodyPr rtlCol="0" anchor="ctr"/>
+          <a:lstStyle/>
+          <a:p>
+            <a:pPr algn="ctr"/>
+            <a:endParaRPr lang="en-IN"/>
+          </a:p>
+        </p:txBody>
+      </p:sp>
+      <p:sp>
+        <p:nvSpPr>
+          <p:cNvPr id="8" name="Rounded Rectangle 7"/>
+          <p:cNvSpPr/>
+          <p:nvPr/>
+        </p:nvSpPr>
+        <p:spPr>
+          <a:xfrm>
+            <a:off x="4445185" y="1310223"/>
+            <a:ext cx="266330" cy="1264928"/>
+          </a:xfrm>
+          <a:prstGeom prst="roundRect">
+            <a:avLst>
+              <a:gd name="adj" fmla="val 50000"/>
+            </a:avLst>
+          </a:prstGeom>
+          <a:solidFill>
+            <a:schemeClr val="bg1"/>
+          </a:solidFill>
+          <a:ln>
+            <a:noFill/>
+          </a:ln>
+        </p:spPr>
+        <p:style>
+          <a:lnRef idx="2">
+            <a:schemeClr val="accent1">
+              <a:shade val="50000"/>
+            </a:schemeClr>
+          </a:lnRef>
+          <a:fillRef idx="1">
+            <a:schemeClr val="accent1"/>
+          </a:fillRef>
+          <a:effectRef idx="0">
+            <a:schemeClr val="accent1"/>
+          </a:effectRef>
+          <a:fontRef idx="minor">
+            <a:schemeClr val="lt1"/>
+          </a:fontRef>
+        </p:style>
+        <p:txBody>
+          <a:bodyPr rtlCol="0" anchor="ctr"/>
+          <a:lstStyle/>
+          <a:p>
+            <a:pPr algn="ctr"/>
+            <a:endParaRPr lang="en-IN"/>
+          </a:p>
+        </p:txBody>
+      </p:sp>
+      <p:sp>
+        <p:nvSpPr>
+          <p:cNvPr id="9" name="Rounded Rectangle 8"/>
+          <p:cNvSpPr/>
+          <p:nvPr/>
+        </p:nvSpPr>
+        <p:spPr>
+          <a:xfrm rot="5400000">
+            <a:off x="5892985" y="2662085"/>
+            <a:ext cx="266330" cy="1264928"/>
+          </a:xfrm>
+          <a:prstGeom prst="roundRect">
+            <a:avLst>
+              <a:gd name="adj" fmla="val 50000"/>
+            </a:avLst>
+          </a:prstGeom>
+          <a:solidFill>
+            <a:schemeClr val="bg1"/>
+          </a:solidFill>
+          <a:ln>
+            <a:noFill/>
+          </a:ln>
+        </p:spPr>
+        <p:style>
+          <a:lnRef idx="2">
+            <a:schemeClr val="accent1">
+              <a:shade val="50000"/>
+            </a:schemeClr>
+          </a:lnRef>
+          <a:fillRef idx="1">
+            <a:schemeClr val="accent1"/>
+          </a:fillRef>
+          <a:effectRef idx="0">
+            <a:schemeClr val="accent1"/>
+          </a:effectRef>
+          <a:fontRef idx="minor">
+            <a:schemeClr val="lt1"/>
+          </a:fontRef>
+        </p:style>
+        <p:txBody>
+          <a:bodyPr rtlCol="0" anchor="ctr"/>
+          <a:lstStyle/>
+          <a:p>
+            <a:pPr algn="ctr"/>
+            <a:endParaRPr lang="en-IN"/>
+          </a:p>
+        </p:txBody>
+      </p:sp>
+      <p:sp>
+        <p:nvSpPr>
+          <p:cNvPr id="10" name="Rounded Rectangle 9"/>
+          <p:cNvSpPr/>
+          <p:nvPr/>
+        </p:nvSpPr>
+        <p:spPr>
+          <a:xfrm rot="16200000">
+            <a:off x="2984685" y="2660799"/>
+            <a:ext cx="266330" cy="1264928"/>
+          </a:xfrm>
+          <a:prstGeom prst="roundRect">
+            <a:avLst>
+              <a:gd name="adj" fmla="val 50000"/>
+            </a:avLst>
+          </a:prstGeom>
+          <a:solidFill>
+            <a:schemeClr val="bg1"/>
+          </a:solidFill>
+          <a:ln>
+            <a:noFill/>
+          </a:ln>
+        </p:spPr>
+        <p:style>
+          <a:lnRef idx="2">
+            <a:schemeClr val="accent1">
+              <a:shade val="50000"/>
+            </a:schemeClr>
+          </a:lnRef>
+          <a:fillRef idx="1">
+            <a:schemeClr val="accent1"/>
+          </a:fillRef>
+          <a:effectRef idx="0">
+            <a:schemeClr val="accent1"/>
+          </a:effectRef>
+          <a:fontRef idx="minor">
+            <a:schemeClr val="lt1"/>
+          </a:fontRef>
+        </p:style>
+        <p:txBody>
+          <a:bodyPr rtlCol="0" anchor="ctr"/>
+          <a:lstStyle/>
+          <a:p>
+            <a:pPr algn="ctr"/>
+            <a:endParaRPr lang="en-IN"/>
+          </a:p>
+        </p:txBody>
+      </p:sp>
+      <p:sp>
+        <p:nvSpPr>
+          <p:cNvPr id="11" name="Rounded Rectangle 10"/>
+          <p:cNvSpPr/>
+          <p:nvPr/>
+        </p:nvSpPr>
+        <p:spPr>
+          <a:xfrm rot="18900000">
+            <a:off x="3357386" y="1802987"/>
+            <a:ext cx="266330" cy="1264928"/>
+          </a:xfrm>
+          <a:prstGeom prst="roundRect">
+            <a:avLst>
+              <a:gd name="adj" fmla="val 50000"/>
+            </a:avLst>
+          </a:prstGeom>
+          <a:solidFill>
+            <a:schemeClr val="bg1"/>
+          </a:solidFill>
+          <a:ln>
+            <a:noFill/>
+          </a:ln>
+        </p:spPr>
+        <p:style>
+          <a:lnRef idx="2">
+            <a:schemeClr val="accent1">
+              <a:shade val="50000"/>
+            </a:schemeClr>
+          </a:lnRef>
+          <a:fillRef idx="1">
+            <a:schemeClr val="accent1"/>
+          </a:fillRef>
+          <a:effectRef idx="0">
+            <a:schemeClr val="accent1"/>
+          </a:effectRef>
+          <a:fontRef idx="minor">
+            <a:schemeClr val="lt1"/>
+          </a:fontRef>
+        </p:style>
+        <p:txBody>
+          <a:bodyPr rtlCol="0" anchor="ctr"/>
+          <a:lstStyle/>
+          <a:p>
+            <a:pPr algn="ctr"/>
+            <a:endParaRPr lang="en-IN"/>
+          </a:p>
+        </p:txBody>
+      </p:sp>
+      <p:sp>
+        <p:nvSpPr>
+          <p:cNvPr id="12" name="Rounded Rectangle 11"/>
+          <p:cNvSpPr/>
+          <p:nvPr/>
+        </p:nvSpPr>
+        <p:spPr>
+          <a:xfrm rot="2700000">
+            <a:off x="5520284" y="1802987"/>
+            <a:ext cx="266330" cy="1264928"/>
+          </a:xfrm>
+          <a:prstGeom prst="roundRect">
+            <a:avLst>
+              <a:gd name="adj" fmla="val 50000"/>
+            </a:avLst>
+          </a:prstGeom>
+          <a:solidFill>
+            <a:schemeClr val="bg1"/>
+          </a:solidFill>
+          <a:ln>
+            <a:noFill/>
+          </a:ln>
+        </p:spPr>
+        <p:style>
+          <a:lnRef idx="2">
+            <a:schemeClr val="accent1">
+              <a:shade val="50000"/>
+            </a:schemeClr>
+          </a:lnRef>
+          <a:fillRef idx="1">
+            <a:schemeClr val="accent1"/>
+          </a:fillRef>
+          <a:effectRef idx="0">
+            <a:schemeClr val="accent1"/>
+          </a:effectRef>
+          <a:fontRef idx="minor">
+            <a:schemeClr val="lt1"/>
+          </a:fontRef>
+        </p:style>
+        <p:txBody>
+          <a:bodyPr rtlCol="0" anchor="ctr"/>
+          <a:lstStyle/>
+          <a:p>
+            <a:pPr algn="ctr"/>
+            <a:endParaRPr lang="en-IN"/>
+          </a:p>
+        </p:txBody>
+      </p:sp>
+    </p:spTree>
+    <p:extLst>
+      <p:ext uri="{BB962C8B-B14F-4D97-AF65-F5344CB8AC3E}">
+        <p14:creationId xmlns:p14="http://schemas.microsoft.com/office/powerpoint/2010/main" val="2579385104"/>
+      </p:ext>
+    </p:extLst>
+  </p:cSld>
+  <p:clrMapOvr>
+    <a:masterClrMapping/>
+  </p:clrMapOvr>
+  <p:timing>
+    <p:tnLst>
+      <p:par>
+        <p:cTn id="1" dur="indefinite" restart="never" nodeType="tmRoot"/>
+      </p:par>
+    </p:tnLst>
+  </p:timing>
+</p:sld>
+</file>
+
+<file path=ppt/slides/slide30.xml><?xml version="1.0" encoding="utf-8"?>
 <p:sld xmlns:a="http://schemas.openxmlformats.org/drawingml/2006/main" xmlns:r="http://schemas.openxmlformats.org/officeDocument/2006/relationships" xmlns:p="http://schemas.openxmlformats.org/presentationml/2006/main">
   <p:cSld>
     <p:spTree>
@@ -9201,463 +10062,7 @@
 </p:sld>
 </file>
 
-<file path=ppt/slides/slide3.xml><?xml version="1.0" encoding="utf-8"?>
-<p:sld xmlns:a="http://schemas.openxmlformats.org/drawingml/2006/main" xmlns:r="http://schemas.openxmlformats.org/officeDocument/2006/relationships" xmlns:p="http://schemas.openxmlformats.org/presentationml/2006/main">
-  <p:cSld>
-    <p:spTree>
-      <p:nvGrpSpPr>
-        <p:cNvPr id="1" name=""/>
-        <p:cNvGrpSpPr/>
-        <p:nvPr/>
-      </p:nvGrpSpPr>
-      <p:grpSpPr>
-        <a:xfrm>
-          <a:off x="0" y="0"/>
-          <a:ext cx="0" cy="0"/>
-          <a:chOff x="0" y="0"/>
-          <a:chExt cx="0" cy="0"/>
-        </a:xfrm>
-      </p:grpSpPr>
-      <p:pic>
-        <p:nvPicPr>
-          <p:cNvPr id="1026" name="Picture 2"/>
-          <p:cNvPicPr>
-            <a:picLocks noChangeAspect="1" noChangeArrowheads="1"/>
-          </p:cNvPicPr>
-          <p:nvPr/>
-        </p:nvPicPr>
-        <p:blipFill>
-          <a:blip r:embed="rId2">
-            <a:extLst>
-              <a:ext uri="{28A0092B-C50C-407E-A947-70E740481C1C}">
-                <a14:useLocalDpi xmlns:a14="http://schemas.microsoft.com/office/drawing/2010/main" val="0"/>
-              </a:ext>
-            </a:extLst>
-          </a:blip>
-          <a:srcRect/>
-          <a:stretch>
-            <a:fillRect/>
-          </a:stretch>
-        </p:blipFill>
-        <p:spPr bwMode="auto">
-          <a:xfrm rot="10800000">
-            <a:off x="393700" y="2209800"/>
-            <a:ext cx="2438400" cy="2438400"/>
-          </a:xfrm>
-          <a:prstGeom prst="rect">
-            <a:avLst/>
-          </a:prstGeom>
-          <a:noFill/>
-          <a:ln>
-            <a:noFill/>
-          </a:ln>
-          <a:effectLst/>
-          <a:extLst>
-            <a:ext uri="{909E8E84-426E-40DD-AFC4-6F175D3DCCD1}">
-              <a14:hiddenFill xmlns:a14="http://schemas.microsoft.com/office/drawing/2010/main">
-                <a:solidFill>
-                  <a:schemeClr val="accent1"/>
-                </a:solidFill>
-              </a14:hiddenFill>
-            </a:ext>
-            <a:ext uri="{91240B29-F687-4F45-9708-019B960494DF}">
-              <a14:hiddenLine xmlns:a14="http://schemas.microsoft.com/office/drawing/2010/main" w="9525">
-                <a:solidFill>
-                  <a:schemeClr val="tx1"/>
-                </a:solidFill>
-                <a:miter lim="800000"/>
-                <a:headEnd/>
-                <a:tailEnd/>
-              </a14:hiddenLine>
-            </a:ext>
-            <a:ext uri="{AF507438-7753-43E0-B8FC-AC1667EBCBE1}">
-              <a14:hiddenEffects xmlns:a14="http://schemas.microsoft.com/office/drawing/2010/main">
-                <a:effectLst>
-                  <a:outerShdw dist="35921" dir="2700000" algn="ctr" rotWithShape="0">
-                    <a:schemeClr val="bg2"/>
-                  </a:outerShdw>
-                </a:effectLst>
-              </a14:hiddenEffects>
-            </a:ext>
-          </a:extLst>
-        </p:spPr>
-      </p:pic>
-      <p:grpSp>
-        <p:nvGrpSpPr>
-          <p:cNvPr id="11" name="Group 10"/>
-          <p:cNvGrpSpPr/>
-          <p:nvPr/>
-        </p:nvGrpSpPr>
-        <p:grpSpPr>
-          <a:xfrm>
-            <a:off x="323339" y="176190"/>
-            <a:ext cx="3132779" cy="3123763"/>
-            <a:chOff x="3009389" y="1862115"/>
-            <a:chExt cx="3132779" cy="3123763"/>
-          </a:xfrm>
-        </p:grpSpPr>
-        <p:sp>
-          <p:nvSpPr>
-            <p:cNvPr id="2" name="Diamond 1"/>
-            <p:cNvSpPr/>
-            <p:nvPr/>
-          </p:nvSpPr>
-          <p:spPr>
-            <a:xfrm>
-              <a:off x="3127754" y="1988819"/>
-              <a:ext cx="2888492" cy="2880362"/>
-            </a:xfrm>
-            <a:prstGeom prst="diamond">
-              <a:avLst/>
-            </a:prstGeom>
-            <a:solidFill>
-              <a:srgbClr val="17F541"/>
-            </a:solidFill>
-            <a:ln w="415925">
-              <a:solidFill>
-                <a:schemeClr val="tx1"/>
-              </a:solidFill>
-            </a:ln>
-          </p:spPr>
-          <p:style>
-            <a:lnRef idx="2">
-              <a:schemeClr val="accent1">
-                <a:shade val="50000"/>
-              </a:schemeClr>
-            </a:lnRef>
-            <a:fillRef idx="1">
-              <a:schemeClr val="accent1"/>
-            </a:fillRef>
-            <a:effectRef idx="0">
-              <a:schemeClr val="accent1"/>
-            </a:effectRef>
-            <a:fontRef idx="minor">
-              <a:schemeClr val="lt1"/>
-            </a:fontRef>
-          </p:style>
-          <p:txBody>
-            <a:bodyPr rtlCol="0" anchor="ctr"/>
-            <a:lstStyle/>
-            <a:p>
-              <a:pPr algn="ctr"/>
-              <a:endParaRPr lang="en-IN"/>
-            </a:p>
-          </p:txBody>
-        </p:sp>
-        <p:sp>
-          <p:nvSpPr>
-            <p:cNvPr id="3" name="Trapezoid 2"/>
-            <p:cNvSpPr/>
-            <p:nvPr/>
-          </p:nvSpPr>
-          <p:spPr>
-            <a:xfrm rot="8100000">
-              <a:off x="3009389" y="2634254"/>
-              <a:ext cx="2033615" cy="502281"/>
-            </a:xfrm>
-            <a:prstGeom prst="trapezoid">
-              <a:avLst>
-                <a:gd name="adj" fmla="val 97488"/>
-              </a:avLst>
-            </a:prstGeom>
-            <a:solidFill>
-              <a:srgbClr val="17F541"/>
-            </a:solidFill>
-            <a:ln w="127000">
-              <a:solidFill>
-                <a:schemeClr val="bg1"/>
-              </a:solidFill>
-            </a:ln>
-          </p:spPr>
-          <p:style>
-            <a:lnRef idx="2">
-              <a:schemeClr val="accent1">
-                <a:shade val="50000"/>
-              </a:schemeClr>
-            </a:lnRef>
-            <a:fillRef idx="1">
-              <a:schemeClr val="accent1"/>
-            </a:fillRef>
-            <a:effectRef idx="0">
-              <a:schemeClr val="accent1"/>
-            </a:effectRef>
-            <a:fontRef idx="minor">
-              <a:schemeClr val="lt1"/>
-            </a:fontRef>
-          </p:style>
-          <p:txBody>
-            <a:bodyPr rtlCol="0" anchor="ctr"/>
-            <a:lstStyle/>
-            <a:p>
-              <a:pPr algn="ctr"/>
-              <a:endParaRPr lang="en-IN"/>
-            </a:p>
-          </p:txBody>
-        </p:sp>
-        <p:sp>
-          <p:nvSpPr>
-            <p:cNvPr id="8" name="Trapezoid 7"/>
-            <p:cNvSpPr/>
-            <p:nvPr/>
-          </p:nvSpPr>
-          <p:spPr>
-            <a:xfrm rot="13500000">
-              <a:off x="4109335" y="2636936"/>
-              <a:ext cx="2033615" cy="483973"/>
-            </a:xfrm>
-            <a:prstGeom prst="trapezoid">
-              <a:avLst>
-                <a:gd name="adj" fmla="val 97488"/>
-              </a:avLst>
-            </a:prstGeom>
-            <a:solidFill>
-              <a:srgbClr val="0AE434"/>
-            </a:solidFill>
-            <a:ln w="127000">
-              <a:solidFill>
-                <a:schemeClr val="bg1"/>
-              </a:solidFill>
-            </a:ln>
-          </p:spPr>
-          <p:style>
-            <a:lnRef idx="2">
-              <a:schemeClr val="accent1">
-                <a:shade val="50000"/>
-              </a:schemeClr>
-            </a:lnRef>
-            <a:fillRef idx="1">
-              <a:schemeClr val="accent1"/>
-            </a:fillRef>
-            <a:effectRef idx="0">
-              <a:schemeClr val="accent1"/>
-            </a:effectRef>
-            <a:fontRef idx="minor">
-              <a:schemeClr val="lt1"/>
-            </a:fontRef>
-          </p:style>
-          <p:txBody>
-            <a:bodyPr rtlCol="0" anchor="ctr"/>
-            <a:lstStyle/>
-            <a:p>
-              <a:pPr algn="ctr"/>
-              <a:endParaRPr lang="en-IN"/>
-            </a:p>
-          </p:txBody>
-        </p:sp>
-        <p:sp>
-          <p:nvSpPr>
-            <p:cNvPr id="9" name="Trapezoid 8"/>
-            <p:cNvSpPr/>
-            <p:nvPr/>
-          </p:nvSpPr>
-          <p:spPr>
-            <a:xfrm rot="18900000">
-              <a:off x="4108553" y="3730694"/>
-              <a:ext cx="2033615" cy="486187"/>
-            </a:xfrm>
-            <a:prstGeom prst="trapezoid">
-              <a:avLst>
-                <a:gd name="adj" fmla="val 97488"/>
-              </a:avLst>
-            </a:prstGeom>
-            <a:solidFill>
-              <a:srgbClr val="08BC2A"/>
-            </a:solidFill>
-            <a:ln w="127000">
-              <a:solidFill>
-                <a:schemeClr val="bg1"/>
-              </a:solidFill>
-            </a:ln>
-          </p:spPr>
-          <p:style>
-            <a:lnRef idx="2">
-              <a:schemeClr val="accent1">
-                <a:shade val="50000"/>
-              </a:schemeClr>
-            </a:lnRef>
-            <a:fillRef idx="1">
-              <a:schemeClr val="accent1"/>
-            </a:fillRef>
-            <a:effectRef idx="0">
-              <a:schemeClr val="accent1"/>
-            </a:effectRef>
-            <a:fontRef idx="minor">
-              <a:schemeClr val="lt1"/>
-            </a:fontRef>
-          </p:style>
-          <p:txBody>
-            <a:bodyPr rtlCol="0" anchor="ctr"/>
-            <a:lstStyle/>
-            <a:p>
-              <a:pPr algn="ctr"/>
-              <a:endParaRPr lang="en-IN"/>
-            </a:p>
-          </p:txBody>
-        </p:sp>
-        <p:sp>
-          <p:nvSpPr>
-            <p:cNvPr id="10" name="Trapezoid 9"/>
-            <p:cNvSpPr/>
-            <p:nvPr/>
-          </p:nvSpPr>
-          <p:spPr>
-            <a:xfrm rot="2700000">
-              <a:off x="3008418" y="3719308"/>
-              <a:ext cx="2033615" cy="499525"/>
-            </a:xfrm>
-            <a:prstGeom prst="trapezoid">
-              <a:avLst>
-                <a:gd name="adj" fmla="val 97488"/>
-              </a:avLst>
-            </a:prstGeom>
-            <a:solidFill>
-              <a:srgbClr val="0AE434"/>
-            </a:solidFill>
-            <a:ln w="127000">
-              <a:solidFill>
-                <a:schemeClr val="bg1"/>
-              </a:solidFill>
-            </a:ln>
-          </p:spPr>
-          <p:style>
-            <a:lnRef idx="2">
-              <a:schemeClr val="accent1">
-                <a:shade val="50000"/>
-              </a:schemeClr>
-            </a:lnRef>
-            <a:fillRef idx="1">
-              <a:schemeClr val="accent1"/>
-            </a:fillRef>
-            <a:effectRef idx="0">
-              <a:schemeClr val="accent1"/>
-            </a:effectRef>
-            <a:fontRef idx="minor">
-              <a:schemeClr val="lt1"/>
-            </a:fontRef>
-          </p:style>
-          <p:txBody>
-            <a:bodyPr rtlCol="0" anchor="ctr"/>
-            <a:lstStyle/>
-            <a:p>
-              <a:pPr algn="ctr"/>
-              <a:endParaRPr lang="en-IN"/>
-            </a:p>
-          </p:txBody>
-        </p:sp>
-      </p:grpSp>
-      <p:sp>
-        <p:nvSpPr>
-          <p:cNvPr id="4" name="Hexagon 3"/>
-          <p:cNvSpPr/>
-          <p:nvPr/>
-        </p:nvSpPr>
-        <p:spPr>
-          <a:xfrm rot="5400000">
-            <a:off x="3131820" y="2187466"/>
-            <a:ext cx="2880360" cy="2483068"/>
-          </a:xfrm>
-          <a:prstGeom prst="hexagon">
-            <a:avLst/>
-          </a:prstGeom>
-          <a:solidFill>
-            <a:schemeClr val="bg1"/>
-          </a:solidFill>
-          <a:ln>
-            <a:noFill/>
-          </a:ln>
-        </p:spPr>
-        <p:style>
-          <a:lnRef idx="2">
-            <a:schemeClr val="accent1">
-              <a:shade val="50000"/>
-            </a:schemeClr>
-          </a:lnRef>
-          <a:fillRef idx="1">
-            <a:schemeClr val="accent1"/>
-          </a:fillRef>
-          <a:effectRef idx="0">
-            <a:schemeClr val="accent1"/>
-          </a:effectRef>
-          <a:fontRef idx="minor">
-            <a:schemeClr val="lt1"/>
-          </a:fontRef>
-        </p:style>
-        <p:txBody>
-          <a:bodyPr rtlCol="0" anchor="ctr"/>
-          <a:lstStyle/>
-          <a:p>
-            <a:pPr algn="ctr"/>
-            <a:endParaRPr lang="en-IN"/>
-          </a:p>
-        </p:txBody>
-      </p:sp>
-      <p:sp>
-        <p:nvSpPr>
-          <p:cNvPr id="12" name="Hexagon 11"/>
-          <p:cNvSpPr/>
-          <p:nvPr/>
-        </p:nvSpPr>
-        <p:spPr>
-          <a:xfrm rot="5400000">
-            <a:off x="4836333" y="2187466"/>
-            <a:ext cx="2880360" cy="2483068"/>
-          </a:xfrm>
-          <a:prstGeom prst="hexagon">
-            <a:avLst/>
-          </a:prstGeom>
-          <a:solidFill>
-            <a:schemeClr val="bg1"/>
-          </a:solidFill>
-          <a:ln>
-            <a:noFill/>
-          </a:ln>
-        </p:spPr>
-        <p:style>
-          <a:lnRef idx="2">
-            <a:schemeClr val="accent1">
-              <a:shade val="50000"/>
-            </a:schemeClr>
-          </a:lnRef>
-          <a:fillRef idx="1">
-            <a:schemeClr val="accent1"/>
-          </a:fillRef>
-          <a:effectRef idx="0">
-            <a:schemeClr val="accent1"/>
-          </a:effectRef>
-          <a:fontRef idx="minor">
-            <a:schemeClr val="lt1"/>
-          </a:fontRef>
-        </p:style>
-        <p:txBody>
-          <a:bodyPr rtlCol="0" anchor="ctr"/>
-          <a:lstStyle/>
-          <a:p>
-            <a:pPr algn="ctr"/>
-            <a:endParaRPr lang="en-IN"/>
-          </a:p>
-        </p:txBody>
-      </p:sp>
-    </p:spTree>
-    <p:extLst>
-      <p:ext uri="{BB962C8B-B14F-4D97-AF65-F5344CB8AC3E}">
-        <p14:creationId xmlns:p14="http://schemas.microsoft.com/office/powerpoint/2010/main" val="786505832"/>
-      </p:ext>
-    </p:extLst>
-  </p:cSld>
-  <p:clrMapOvr>
-    <a:masterClrMapping/>
-  </p:clrMapOvr>
-  <p:timing>
-    <p:tnLst>
-      <p:par>
-        <p:cTn id="1" dur="indefinite" restart="never" nodeType="tmRoot"/>
-      </p:par>
-    </p:tnLst>
-  </p:timing>
-</p:sld>
-</file>
-
-<file path=ppt/slides/slide30.xml><?xml version="1.0" encoding="utf-8"?>
+<file path=ppt/slides/slide31.xml><?xml version="1.0" encoding="utf-8"?>
 <p:sld xmlns:a="http://schemas.openxmlformats.org/drawingml/2006/main" xmlns:r="http://schemas.openxmlformats.org/officeDocument/2006/relationships" xmlns:p="http://schemas.openxmlformats.org/presentationml/2006/main">
   <p:cSld>
     <p:spTree>
@@ -10018,7 +10423,7 @@
 </p:sld>
 </file>
 
-<file path=ppt/slides/slide31.xml><?xml version="1.0" encoding="utf-8"?>
+<file path=ppt/slides/slide32.xml><?xml version="1.0" encoding="utf-8"?>
 <p:sld xmlns:a="http://schemas.openxmlformats.org/drawingml/2006/main" xmlns:r="http://schemas.openxmlformats.org/officeDocument/2006/relationships" xmlns:p="http://schemas.openxmlformats.org/presentationml/2006/main">
   <p:cSld>
     <p:spTree>
@@ -11618,7 +12023,7 @@
 </p:sld>
 </file>
 
-<file path=ppt/slides/slide32.xml><?xml version="1.0" encoding="utf-8"?>
+<file path=ppt/slides/slide33.xml><?xml version="1.0" encoding="utf-8"?>
 <p:sld xmlns:a="http://schemas.openxmlformats.org/drawingml/2006/main" xmlns:r="http://schemas.openxmlformats.org/officeDocument/2006/relationships" xmlns:p="http://schemas.openxmlformats.org/presentationml/2006/main">
   <p:cSld>
     <p:spTree>
@@ -11775,7 +12180,7 @@
 </p:sld>
 </file>
 
-<file path=ppt/slides/slide33.xml><?xml version="1.0" encoding="utf-8"?>
+<file path=ppt/slides/slide34.xml><?xml version="1.0" encoding="utf-8"?>
 <p:sld xmlns:a="http://schemas.openxmlformats.org/drawingml/2006/main" xmlns:r="http://schemas.openxmlformats.org/officeDocument/2006/relationships" xmlns:p="http://schemas.openxmlformats.org/presentationml/2006/main">
   <p:cSld>
     <p:spTree>
@@ -12917,7 +13322,7 @@
 </p:sld>
 </file>
 
-<file path=ppt/slides/slide34.xml><?xml version="1.0" encoding="utf-8"?>
+<file path=ppt/slides/slide35.xml><?xml version="1.0" encoding="utf-8"?>
 <p:sld xmlns:a="http://schemas.openxmlformats.org/drawingml/2006/main" xmlns:r="http://schemas.openxmlformats.org/officeDocument/2006/relationships" xmlns:p="http://schemas.openxmlformats.org/presentationml/2006/main">
   <p:cSld>
     <p:spTree>
@@ -13003,7 +13408,7 @@
 </p:sld>
 </file>
 
-<file path=ppt/slides/slide35.xml><?xml version="1.0" encoding="utf-8"?>
+<file path=ppt/slides/slide36.xml><?xml version="1.0" encoding="utf-8"?>
 <p:sld xmlns:a="http://schemas.openxmlformats.org/drawingml/2006/main" xmlns:r="http://schemas.openxmlformats.org/officeDocument/2006/relationships" xmlns:p="http://schemas.openxmlformats.org/presentationml/2006/main">
   <p:cSld>
     <p:spTree>
@@ -13180,7 +13585,7 @@
 </p:sld>
 </file>
 
-<file path=ppt/slides/slide36.xml><?xml version="1.0" encoding="utf-8"?>
+<file path=ppt/slides/slide37.xml><?xml version="1.0" encoding="utf-8"?>
 <p:sld xmlns:a="http://schemas.openxmlformats.org/drawingml/2006/main" xmlns:r="http://schemas.openxmlformats.org/officeDocument/2006/relationships" xmlns:p="http://schemas.openxmlformats.org/presentationml/2006/main">
   <p:cSld>
     <p:spTree>
@@ -13429,7 +13834,7 @@
 </p:sld>
 </file>
 
-<file path=ppt/slides/slide37.xml><?xml version="1.0" encoding="utf-8"?>
+<file path=ppt/slides/slide38.xml><?xml version="1.0" encoding="utf-8"?>
 <p:sld xmlns:a="http://schemas.openxmlformats.org/drawingml/2006/main" xmlns:r="http://schemas.openxmlformats.org/officeDocument/2006/relationships" xmlns:p="http://schemas.openxmlformats.org/presentationml/2006/main">
   <p:cSld>
     <p:spTree>
@@ -13522,7 +13927,7 @@
 </p:sld>
 </file>
 
-<file path=ppt/slides/slide38.xml><?xml version="1.0" encoding="utf-8"?>
+<file path=ppt/slides/slide39.xml><?xml version="1.0" encoding="utf-8"?>
 <p:sld xmlns:a="http://schemas.openxmlformats.org/drawingml/2006/main" xmlns:r="http://schemas.openxmlformats.org/officeDocument/2006/relationships" xmlns:p="http://schemas.openxmlformats.org/presentationml/2006/main">
   <p:cSld>
     <p:spTree>
@@ -13999,6 +14404,462 @@
           <a:chExt cx="0" cy="0"/>
         </a:xfrm>
       </p:grpSpPr>
+      <p:pic>
+        <p:nvPicPr>
+          <p:cNvPr id="1026" name="Picture 2"/>
+          <p:cNvPicPr>
+            <a:picLocks noChangeAspect="1" noChangeArrowheads="1"/>
+          </p:cNvPicPr>
+          <p:nvPr/>
+        </p:nvPicPr>
+        <p:blipFill>
+          <a:blip r:embed="rId2">
+            <a:extLst>
+              <a:ext uri="{28A0092B-C50C-407E-A947-70E740481C1C}">
+                <a14:useLocalDpi xmlns:a14="http://schemas.microsoft.com/office/drawing/2010/main" val="0"/>
+              </a:ext>
+            </a:extLst>
+          </a:blip>
+          <a:srcRect/>
+          <a:stretch>
+            <a:fillRect/>
+          </a:stretch>
+        </p:blipFill>
+        <p:spPr bwMode="auto">
+          <a:xfrm rot="10800000">
+            <a:off x="393700" y="2209800"/>
+            <a:ext cx="2438400" cy="2438400"/>
+          </a:xfrm>
+          <a:prstGeom prst="rect">
+            <a:avLst/>
+          </a:prstGeom>
+          <a:noFill/>
+          <a:ln>
+            <a:noFill/>
+          </a:ln>
+          <a:effectLst/>
+          <a:extLst>
+            <a:ext uri="{909E8E84-426E-40DD-AFC4-6F175D3DCCD1}">
+              <a14:hiddenFill xmlns:a14="http://schemas.microsoft.com/office/drawing/2010/main">
+                <a:solidFill>
+                  <a:schemeClr val="accent1"/>
+                </a:solidFill>
+              </a14:hiddenFill>
+            </a:ext>
+            <a:ext uri="{91240B29-F687-4F45-9708-019B960494DF}">
+              <a14:hiddenLine xmlns:a14="http://schemas.microsoft.com/office/drawing/2010/main" w="9525">
+                <a:solidFill>
+                  <a:schemeClr val="tx1"/>
+                </a:solidFill>
+                <a:miter lim="800000"/>
+                <a:headEnd/>
+                <a:tailEnd/>
+              </a14:hiddenLine>
+            </a:ext>
+            <a:ext uri="{AF507438-7753-43E0-B8FC-AC1667EBCBE1}">
+              <a14:hiddenEffects xmlns:a14="http://schemas.microsoft.com/office/drawing/2010/main">
+                <a:effectLst>
+                  <a:outerShdw dist="35921" dir="2700000" algn="ctr" rotWithShape="0">
+                    <a:schemeClr val="bg2"/>
+                  </a:outerShdw>
+                </a:effectLst>
+              </a14:hiddenEffects>
+            </a:ext>
+          </a:extLst>
+        </p:spPr>
+      </p:pic>
+      <p:grpSp>
+        <p:nvGrpSpPr>
+          <p:cNvPr id="11" name="Group 10"/>
+          <p:cNvGrpSpPr/>
+          <p:nvPr/>
+        </p:nvGrpSpPr>
+        <p:grpSpPr>
+          <a:xfrm>
+            <a:off x="323339" y="176190"/>
+            <a:ext cx="3132779" cy="3123763"/>
+            <a:chOff x="3009389" y="1862115"/>
+            <a:chExt cx="3132779" cy="3123763"/>
+          </a:xfrm>
+        </p:grpSpPr>
+        <p:sp>
+          <p:nvSpPr>
+            <p:cNvPr id="2" name="Diamond 1"/>
+            <p:cNvSpPr/>
+            <p:nvPr/>
+          </p:nvSpPr>
+          <p:spPr>
+            <a:xfrm>
+              <a:off x="3127754" y="1988819"/>
+              <a:ext cx="2888492" cy="2880362"/>
+            </a:xfrm>
+            <a:prstGeom prst="diamond">
+              <a:avLst/>
+            </a:prstGeom>
+            <a:solidFill>
+              <a:srgbClr val="17F541"/>
+            </a:solidFill>
+            <a:ln w="415925">
+              <a:solidFill>
+                <a:schemeClr val="tx1"/>
+              </a:solidFill>
+            </a:ln>
+          </p:spPr>
+          <p:style>
+            <a:lnRef idx="2">
+              <a:schemeClr val="accent1">
+                <a:shade val="50000"/>
+              </a:schemeClr>
+            </a:lnRef>
+            <a:fillRef idx="1">
+              <a:schemeClr val="accent1"/>
+            </a:fillRef>
+            <a:effectRef idx="0">
+              <a:schemeClr val="accent1"/>
+            </a:effectRef>
+            <a:fontRef idx="minor">
+              <a:schemeClr val="lt1"/>
+            </a:fontRef>
+          </p:style>
+          <p:txBody>
+            <a:bodyPr rtlCol="0" anchor="ctr"/>
+            <a:lstStyle/>
+            <a:p>
+              <a:pPr algn="ctr"/>
+              <a:endParaRPr lang="en-IN"/>
+            </a:p>
+          </p:txBody>
+        </p:sp>
+        <p:sp>
+          <p:nvSpPr>
+            <p:cNvPr id="3" name="Trapezoid 2"/>
+            <p:cNvSpPr/>
+            <p:nvPr/>
+          </p:nvSpPr>
+          <p:spPr>
+            <a:xfrm rot="8100000">
+              <a:off x="3009389" y="2634254"/>
+              <a:ext cx="2033615" cy="502281"/>
+            </a:xfrm>
+            <a:prstGeom prst="trapezoid">
+              <a:avLst>
+                <a:gd name="adj" fmla="val 97488"/>
+              </a:avLst>
+            </a:prstGeom>
+            <a:solidFill>
+              <a:srgbClr val="17F541"/>
+            </a:solidFill>
+            <a:ln w="127000">
+              <a:solidFill>
+                <a:schemeClr val="bg1"/>
+              </a:solidFill>
+            </a:ln>
+          </p:spPr>
+          <p:style>
+            <a:lnRef idx="2">
+              <a:schemeClr val="accent1">
+                <a:shade val="50000"/>
+              </a:schemeClr>
+            </a:lnRef>
+            <a:fillRef idx="1">
+              <a:schemeClr val="accent1"/>
+            </a:fillRef>
+            <a:effectRef idx="0">
+              <a:schemeClr val="accent1"/>
+            </a:effectRef>
+            <a:fontRef idx="minor">
+              <a:schemeClr val="lt1"/>
+            </a:fontRef>
+          </p:style>
+          <p:txBody>
+            <a:bodyPr rtlCol="0" anchor="ctr"/>
+            <a:lstStyle/>
+            <a:p>
+              <a:pPr algn="ctr"/>
+              <a:endParaRPr lang="en-IN"/>
+            </a:p>
+          </p:txBody>
+        </p:sp>
+        <p:sp>
+          <p:nvSpPr>
+            <p:cNvPr id="8" name="Trapezoid 7"/>
+            <p:cNvSpPr/>
+            <p:nvPr/>
+          </p:nvSpPr>
+          <p:spPr>
+            <a:xfrm rot="13500000">
+              <a:off x="4109335" y="2636936"/>
+              <a:ext cx="2033615" cy="483973"/>
+            </a:xfrm>
+            <a:prstGeom prst="trapezoid">
+              <a:avLst>
+                <a:gd name="adj" fmla="val 97488"/>
+              </a:avLst>
+            </a:prstGeom>
+            <a:solidFill>
+              <a:srgbClr val="0AE434"/>
+            </a:solidFill>
+            <a:ln w="127000">
+              <a:solidFill>
+                <a:schemeClr val="bg1"/>
+              </a:solidFill>
+            </a:ln>
+          </p:spPr>
+          <p:style>
+            <a:lnRef idx="2">
+              <a:schemeClr val="accent1">
+                <a:shade val="50000"/>
+              </a:schemeClr>
+            </a:lnRef>
+            <a:fillRef idx="1">
+              <a:schemeClr val="accent1"/>
+            </a:fillRef>
+            <a:effectRef idx="0">
+              <a:schemeClr val="accent1"/>
+            </a:effectRef>
+            <a:fontRef idx="minor">
+              <a:schemeClr val="lt1"/>
+            </a:fontRef>
+          </p:style>
+          <p:txBody>
+            <a:bodyPr rtlCol="0" anchor="ctr"/>
+            <a:lstStyle/>
+            <a:p>
+              <a:pPr algn="ctr"/>
+              <a:endParaRPr lang="en-IN"/>
+            </a:p>
+          </p:txBody>
+        </p:sp>
+        <p:sp>
+          <p:nvSpPr>
+            <p:cNvPr id="9" name="Trapezoid 8"/>
+            <p:cNvSpPr/>
+            <p:nvPr/>
+          </p:nvSpPr>
+          <p:spPr>
+            <a:xfrm rot="18900000">
+              <a:off x="4108553" y="3730694"/>
+              <a:ext cx="2033615" cy="486187"/>
+            </a:xfrm>
+            <a:prstGeom prst="trapezoid">
+              <a:avLst>
+                <a:gd name="adj" fmla="val 97488"/>
+              </a:avLst>
+            </a:prstGeom>
+            <a:solidFill>
+              <a:srgbClr val="08BC2A"/>
+            </a:solidFill>
+            <a:ln w="127000">
+              <a:solidFill>
+                <a:schemeClr val="bg1"/>
+              </a:solidFill>
+            </a:ln>
+          </p:spPr>
+          <p:style>
+            <a:lnRef idx="2">
+              <a:schemeClr val="accent1">
+                <a:shade val="50000"/>
+              </a:schemeClr>
+            </a:lnRef>
+            <a:fillRef idx="1">
+              <a:schemeClr val="accent1"/>
+            </a:fillRef>
+            <a:effectRef idx="0">
+              <a:schemeClr val="accent1"/>
+            </a:effectRef>
+            <a:fontRef idx="minor">
+              <a:schemeClr val="lt1"/>
+            </a:fontRef>
+          </p:style>
+          <p:txBody>
+            <a:bodyPr rtlCol="0" anchor="ctr"/>
+            <a:lstStyle/>
+            <a:p>
+              <a:pPr algn="ctr"/>
+              <a:endParaRPr lang="en-IN"/>
+            </a:p>
+          </p:txBody>
+        </p:sp>
+        <p:sp>
+          <p:nvSpPr>
+            <p:cNvPr id="10" name="Trapezoid 9"/>
+            <p:cNvSpPr/>
+            <p:nvPr/>
+          </p:nvSpPr>
+          <p:spPr>
+            <a:xfrm rot="2700000">
+              <a:off x="3008418" y="3719308"/>
+              <a:ext cx="2033615" cy="499525"/>
+            </a:xfrm>
+            <a:prstGeom prst="trapezoid">
+              <a:avLst>
+                <a:gd name="adj" fmla="val 97488"/>
+              </a:avLst>
+            </a:prstGeom>
+            <a:solidFill>
+              <a:srgbClr val="0AE434"/>
+            </a:solidFill>
+            <a:ln w="127000">
+              <a:solidFill>
+                <a:schemeClr val="bg1"/>
+              </a:solidFill>
+            </a:ln>
+          </p:spPr>
+          <p:style>
+            <a:lnRef idx="2">
+              <a:schemeClr val="accent1">
+                <a:shade val="50000"/>
+              </a:schemeClr>
+            </a:lnRef>
+            <a:fillRef idx="1">
+              <a:schemeClr val="accent1"/>
+            </a:fillRef>
+            <a:effectRef idx="0">
+              <a:schemeClr val="accent1"/>
+            </a:effectRef>
+            <a:fontRef idx="minor">
+              <a:schemeClr val="lt1"/>
+            </a:fontRef>
+          </p:style>
+          <p:txBody>
+            <a:bodyPr rtlCol="0" anchor="ctr"/>
+            <a:lstStyle/>
+            <a:p>
+              <a:pPr algn="ctr"/>
+              <a:endParaRPr lang="en-IN"/>
+            </a:p>
+          </p:txBody>
+        </p:sp>
+      </p:grpSp>
+      <p:sp>
+        <p:nvSpPr>
+          <p:cNvPr id="4" name="Hexagon 3"/>
+          <p:cNvSpPr/>
+          <p:nvPr/>
+        </p:nvSpPr>
+        <p:spPr>
+          <a:xfrm rot="5400000">
+            <a:off x="3131820" y="2187466"/>
+            <a:ext cx="2880360" cy="2483068"/>
+          </a:xfrm>
+          <a:prstGeom prst="hexagon">
+            <a:avLst/>
+          </a:prstGeom>
+          <a:solidFill>
+            <a:schemeClr val="bg1"/>
+          </a:solidFill>
+          <a:ln>
+            <a:noFill/>
+          </a:ln>
+        </p:spPr>
+        <p:style>
+          <a:lnRef idx="2">
+            <a:schemeClr val="accent1">
+              <a:shade val="50000"/>
+            </a:schemeClr>
+          </a:lnRef>
+          <a:fillRef idx="1">
+            <a:schemeClr val="accent1"/>
+          </a:fillRef>
+          <a:effectRef idx="0">
+            <a:schemeClr val="accent1"/>
+          </a:effectRef>
+          <a:fontRef idx="minor">
+            <a:schemeClr val="lt1"/>
+          </a:fontRef>
+        </p:style>
+        <p:txBody>
+          <a:bodyPr rtlCol="0" anchor="ctr"/>
+          <a:lstStyle/>
+          <a:p>
+            <a:pPr algn="ctr"/>
+            <a:endParaRPr lang="en-IN"/>
+          </a:p>
+        </p:txBody>
+      </p:sp>
+      <p:sp>
+        <p:nvSpPr>
+          <p:cNvPr id="12" name="Hexagon 11"/>
+          <p:cNvSpPr/>
+          <p:nvPr/>
+        </p:nvSpPr>
+        <p:spPr>
+          <a:xfrm rot="5400000">
+            <a:off x="4836333" y="2187466"/>
+            <a:ext cx="2880360" cy="2483068"/>
+          </a:xfrm>
+          <a:prstGeom prst="hexagon">
+            <a:avLst/>
+          </a:prstGeom>
+          <a:solidFill>
+            <a:schemeClr val="bg1"/>
+          </a:solidFill>
+          <a:ln>
+            <a:noFill/>
+          </a:ln>
+        </p:spPr>
+        <p:style>
+          <a:lnRef idx="2">
+            <a:schemeClr val="accent1">
+              <a:shade val="50000"/>
+            </a:schemeClr>
+          </a:lnRef>
+          <a:fillRef idx="1">
+            <a:schemeClr val="accent1"/>
+          </a:fillRef>
+          <a:effectRef idx="0">
+            <a:schemeClr val="accent1"/>
+          </a:effectRef>
+          <a:fontRef idx="minor">
+            <a:schemeClr val="lt1"/>
+          </a:fontRef>
+        </p:style>
+        <p:txBody>
+          <a:bodyPr rtlCol="0" anchor="ctr"/>
+          <a:lstStyle/>
+          <a:p>
+            <a:pPr algn="ctr"/>
+            <a:endParaRPr lang="en-IN"/>
+          </a:p>
+        </p:txBody>
+      </p:sp>
+    </p:spTree>
+    <p:extLst>
+      <p:ext uri="{BB962C8B-B14F-4D97-AF65-F5344CB8AC3E}">
+        <p14:creationId xmlns:p14="http://schemas.microsoft.com/office/powerpoint/2010/main" val="786505832"/>
+      </p:ext>
+    </p:extLst>
+  </p:cSld>
+  <p:clrMapOvr>
+    <a:masterClrMapping/>
+  </p:clrMapOvr>
+  <p:timing>
+    <p:tnLst>
+      <p:par>
+        <p:cTn id="1" dur="indefinite" restart="never" nodeType="tmRoot"/>
+      </p:par>
+    </p:tnLst>
+  </p:timing>
+</p:sld>
+</file>
+
+<file path=ppt/slides/slide5.xml><?xml version="1.0" encoding="utf-8"?>
+<p:sld xmlns:a="http://schemas.openxmlformats.org/drawingml/2006/main" xmlns:r="http://schemas.openxmlformats.org/officeDocument/2006/relationships" xmlns:p="http://schemas.openxmlformats.org/presentationml/2006/main">
+  <p:cSld>
+    <p:spTree>
+      <p:nvGrpSpPr>
+        <p:cNvPr id="1" name=""/>
+        <p:cNvGrpSpPr/>
+        <p:nvPr/>
+      </p:nvGrpSpPr>
+      <p:grpSpPr>
+        <a:xfrm>
+          <a:off x="0" y="0"/>
+          <a:ext cx="0" cy="0"/>
+          <a:chOff x="0" y="0"/>
+          <a:chExt cx="0" cy="0"/>
+        </a:xfrm>
+      </p:grpSpPr>
       <p:sp>
         <p:nvSpPr>
           <p:cNvPr id="4" name="TextBox 3"/>
@@ -14145,7 +15006,7 @@
 </p:sld>
 </file>
 
-<file path=ppt/slides/slide5.xml><?xml version="1.0" encoding="utf-8"?>
+<file path=ppt/slides/slide6.xml><?xml version="1.0" encoding="utf-8"?>
 <p:sld xmlns:a="http://schemas.openxmlformats.org/drawingml/2006/main" xmlns:r="http://schemas.openxmlformats.org/officeDocument/2006/relationships" xmlns:p="http://schemas.openxmlformats.org/presentationml/2006/main">
   <p:cSld>
     <p:spTree>
@@ -14350,7 +15211,7 @@
 </p:sld>
 </file>
 
-<file path=ppt/slides/slide6.xml><?xml version="1.0" encoding="utf-8"?>
+<file path=ppt/slides/slide7.xml><?xml version="1.0" encoding="utf-8"?>
 <p:sld xmlns:a="http://schemas.openxmlformats.org/drawingml/2006/main" xmlns:r="http://schemas.openxmlformats.org/officeDocument/2006/relationships" xmlns:p="http://schemas.openxmlformats.org/presentationml/2006/main">
   <p:cSld>
     <p:spTree>
@@ -14494,7 +15355,7 @@
 </p:sld>
 </file>
 
-<file path=ppt/slides/slide7.xml><?xml version="1.0" encoding="utf-8"?>
+<file path=ppt/slides/slide8.xml><?xml version="1.0" encoding="utf-8"?>
 <p:sld xmlns:a="http://schemas.openxmlformats.org/drawingml/2006/main" xmlns:r="http://schemas.openxmlformats.org/officeDocument/2006/relationships" xmlns:p="http://schemas.openxmlformats.org/presentationml/2006/main">
   <p:cSld>
     <p:spTree>
@@ -14722,7 +15583,7 @@
 </p:sld>
 </file>
 
-<file path=ppt/slides/slide8.xml><?xml version="1.0" encoding="utf-8"?>
+<file path=ppt/slides/slide9.xml><?xml version="1.0" encoding="utf-8"?>
 <p:sld xmlns:a="http://schemas.openxmlformats.org/drawingml/2006/main" xmlns:r="http://schemas.openxmlformats.org/officeDocument/2006/relationships" xmlns:p="http://schemas.openxmlformats.org/presentationml/2006/main">
   <p:cSld>
     <p:spTree>
@@ -14791,99 +15652,6 @@
     <p:extLst>
       <p:ext uri="{BB962C8B-B14F-4D97-AF65-F5344CB8AC3E}">
         <p14:creationId xmlns:p14="http://schemas.microsoft.com/office/powerpoint/2010/main" val="1672338292"/>
-      </p:ext>
-    </p:extLst>
-  </p:cSld>
-  <p:clrMapOvr>
-    <a:masterClrMapping/>
-  </p:clrMapOvr>
-</p:sld>
-</file>
-
-<file path=ppt/slides/slide9.xml><?xml version="1.0" encoding="utf-8"?>
-<p:sld xmlns:a="http://schemas.openxmlformats.org/drawingml/2006/main" xmlns:r="http://schemas.openxmlformats.org/officeDocument/2006/relationships" xmlns:p="http://schemas.openxmlformats.org/presentationml/2006/main">
-  <p:cSld>
-    <p:spTree>
-      <p:nvGrpSpPr>
-        <p:cNvPr id="1" name=""/>
-        <p:cNvGrpSpPr/>
-        <p:nvPr/>
-      </p:nvGrpSpPr>
-      <p:grpSpPr>
-        <a:xfrm>
-          <a:off x="0" y="0"/>
-          <a:ext cx="0" cy="0"/>
-          <a:chOff x="0" y="0"/>
-          <a:chExt cx="0" cy="0"/>
-        </a:xfrm>
-      </p:grpSpPr>
-      <p:sp>
-        <p:nvSpPr>
-          <p:cNvPr id="3" name="Rectangle: Rounded Corners 2">
-            <a:extLst>
-              <a:ext uri="{FF2B5EF4-FFF2-40B4-BE49-F238E27FC236}">
-                <a16:creationId xmlns="" xmlns:a16="http://schemas.microsoft.com/office/drawing/2014/main" id="{59DB4196-0687-4E82-A4C2-1855B40742C9}"/>
-              </a:ext>
-            </a:extLst>
-          </p:cNvPr>
-          <p:cNvSpPr/>
-          <p:nvPr/>
-        </p:nvSpPr>
-        <p:spPr>
-          <a:xfrm>
-            <a:off x="3813175" y="2673350"/>
-            <a:ext cx="1517650" cy="1511300"/>
-          </a:xfrm>
-          <a:prstGeom prst="roundRect">
-            <a:avLst/>
-          </a:prstGeom>
-          <a:solidFill>
-            <a:schemeClr val="bg1"/>
-          </a:solidFill>
-          <a:ln>
-            <a:noFill/>
-          </a:ln>
-          <a:scene3d>
-            <a:camera prst="orthographicFront"/>
-            <a:lightRig rig="threePt" dir="t"/>
-          </a:scene3d>
-          <a:sp3d>
-            <a:bevelT/>
-          </a:sp3d>
-        </p:spPr>
-        <p:style>
-          <a:lnRef idx="2">
-            <a:schemeClr val="accent1">
-              <a:shade val="50000"/>
-            </a:schemeClr>
-          </a:lnRef>
-          <a:fillRef idx="1">
-            <a:schemeClr val="accent1"/>
-          </a:fillRef>
-          <a:effectRef idx="0">
-            <a:schemeClr val="accent1"/>
-          </a:effectRef>
-          <a:fontRef idx="minor">
-            <a:schemeClr val="lt1"/>
-          </a:fontRef>
-        </p:style>
-        <p:txBody>
-          <a:bodyPr rtlCol="0" anchor="ctr">
-            <a:sp3d extrusionH="57150">
-              <a:bevelT w="38100" h="38100" prst="relaxedInset"/>
-            </a:sp3d>
-          </a:bodyPr>
-          <a:lstStyle/>
-          <a:p>
-            <a:pPr algn="ctr"/>
-            <a:endParaRPr lang="en-IN"/>
-          </a:p>
-        </p:txBody>
-      </p:sp>
-    </p:spTree>
-    <p:extLst>
-      <p:ext uri="{BB962C8B-B14F-4D97-AF65-F5344CB8AC3E}">
-        <p14:creationId xmlns:p14="http://schemas.microsoft.com/office/powerpoint/2010/main" val="4248716233"/>
       </p:ext>
     </p:extLst>
   </p:cSld>

</xml_diff>

<commit_message>
About to change the shop items structure, backup commit
</commit_message>
<xml_diff>
--- a/Assets/Textures/TextureIcons.pptx
+++ b/Assets/Textures/TextureIcons.pptx
@@ -7,43 +7,44 @@
   <p:sldIdLst>
     <p:sldId id="256" r:id="rId2"/>
     <p:sldId id="294" r:id="rId3"/>
-    <p:sldId id="296" r:id="rId4"/>
-    <p:sldId id="257" r:id="rId5"/>
-    <p:sldId id="258" r:id="rId6"/>
-    <p:sldId id="295" r:id="rId7"/>
-    <p:sldId id="260" r:id="rId8"/>
-    <p:sldId id="292" r:id="rId9"/>
-    <p:sldId id="293" r:id="rId10"/>
-    <p:sldId id="262" r:id="rId11"/>
-    <p:sldId id="263" r:id="rId12"/>
-    <p:sldId id="264" r:id="rId13"/>
-    <p:sldId id="265" r:id="rId14"/>
-    <p:sldId id="266" r:id="rId15"/>
-    <p:sldId id="267" r:id="rId16"/>
-    <p:sldId id="268" r:id="rId17"/>
-    <p:sldId id="269" r:id="rId18"/>
-    <p:sldId id="270" r:id="rId19"/>
-    <p:sldId id="271" r:id="rId20"/>
-    <p:sldId id="272" r:id="rId21"/>
-    <p:sldId id="273" r:id="rId22"/>
-    <p:sldId id="274" r:id="rId23"/>
-    <p:sldId id="275" r:id="rId24"/>
-    <p:sldId id="276" r:id="rId25"/>
-    <p:sldId id="277" r:id="rId26"/>
-    <p:sldId id="278" r:id="rId27"/>
-    <p:sldId id="279" r:id="rId28"/>
-    <p:sldId id="280" r:id="rId29"/>
-    <p:sldId id="281" r:id="rId30"/>
-    <p:sldId id="282" r:id="rId31"/>
-    <p:sldId id="283" r:id="rId32"/>
-    <p:sldId id="284" r:id="rId33"/>
-    <p:sldId id="285" r:id="rId34"/>
-    <p:sldId id="286" r:id="rId35"/>
-    <p:sldId id="287" r:id="rId36"/>
-    <p:sldId id="288" r:id="rId37"/>
-    <p:sldId id="289" r:id="rId38"/>
-    <p:sldId id="290" r:id="rId39"/>
-    <p:sldId id="291" r:id="rId40"/>
+    <p:sldId id="297" r:id="rId4"/>
+    <p:sldId id="296" r:id="rId5"/>
+    <p:sldId id="257" r:id="rId6"/>
+    <p:sldId id="258" r:id="rId7"/>
+    <p:sldId id="295" r:id="rId8"/>
+    <p:sldId id="260" r:id="rId9"/>
+    <p:sldId id="292" r:id="rId10"/>
+    <p:sldId id="293" r:id="rId11"/>
+    <p:sldId id="262" r:id="rId12"/>
+    <p:sldId id="263" r:id="rId13"/>
+    <p:sldId id="264" r:id="rId14"/>
+    <p:sldId id="265" r:id="rId15"/>
+    <p:sldId id="266" r:id="rId16"/>
+    <p:sldId id="267" r:id="rId17"/>
+    <p:sldId id="268" r:id="rId18"/>
+    <p:sldId id="269" r:id="rId19"/>
+    <p:sldId id="270" r:id="rId20"/>
+    <p:sldId id="271" r:id="rId21"/>
+    <p:sldId id="272" r:id="rId22"/>
+    <p:sldId id="273" r:id="rId23"/>
+    <p:sldId id="274" r:id="rId24"/>
+    <p:sldId id="275" r:id="rId25"/>
+    <p:sldId id="276" r:id="rId26"/>
+    <p:sldId id="277" r:id="rId27"/>
+    <p:sldId id="278" r:id="rId28"/>
+    <p:sldId id="279" r:id="rId29"/>
+    <p:sldId id="280" r:id="rId30"/>
+    <p:sldId id="281" r:id="rId31"/>
+    <p:sldId id="282" r:id="rId32"/>
+    <p:sldId id="283" r:id="rId33"/>
+    <p:sldId id="284" r:id="rId34"/>
+    <p:sldId id="285" r:id="rId35"/>
+    <p:sldId id="286" r:id="rId36"/>
+    <p:sldId id="287" r:id="rId37"/>
+    <p:sldId id="288" r:id="rId38"/>
+    <p:sldId id="289" r:id="rId39"/>
+    <p:sldId id="290" r:id="rId40"/>
+    <p:sldId id="291" r:id="rId41"/>
   </p:sldIdLst>
   <p:sldSz cx="9144000" cy="6858000" type="screen4x3"/>
   <p:notesSz cx="6858000" cy="9144000"/>
@@ -3360,10 +3361,88 @@
       </p:grpSpPr>
       <p:sp>
         <p:nvSpPr>
+          <p:cNvPr id="6" name="Oval 5"/>
+          <p:cNvSpPr/>
+          <p:nvPr/>
+        </p:nvSpPr>
+        <p:spPr>
+          <a:xfrm>
+            <a:off x="3851910" y="2708910"/>
+            <a:ext cx="1440180" cy="1440180"/>
+          </a:xfrm>
+          <a:prstGeom prst="ellipse">
+            <a:avLst/>
+          </a:prstGeom>
+          <a:solidFill>
+            <a:srgbClr val="FF0000"/>
+          </a:solidFill>
+          <a:ln w="254000">
+            <a:solidFill>
+              <a:schemeClr val="bg1"/>
+            </a:solidFill>
+          </a:ln>
+        </p:spPr>
+        <p:style>
+          <a:lnRef idx="2">
+            <a:schemeClr val="accent1">
+              <a:shade val="50000"/>
+            </a:schemeClr>
+          </a:lnRef>
+          <a:fillRef idx="1">
+            <a:schemeClr val="accent1"/>
+          </a:fillRef>
+          <a:effectRef idx="0">
+            <a:schemeClr val="accent1"/>
+          </a:effectRef>
+          <a:fontRef idx="minor">
+            <a:schemeClr val="lt1"/>
+          </a:fontRef>
+        </p:style>
+        <p:txBody>
+          <a:bodyPr rtlCol="0" anchor="ctr"/>
+          <a:lstStyle/>
+          <a:p>
+            <a:pPr algn="ctr"/>
+            <a:endParaRPr lang="en-IN"/>
+          </a:p>
+        </p:txBody>
+      </p:sp>
+    </p:spTree>
+    <p:extLst>
+      <p:ext uri="{BB962C8B-B14F-4D97-AF65-F5344CB8AC3E}">
+        <p14:creationId xmlns:p14="http://schemas.microsoft.com/office/powerpoint/2010/main" val="1672338292"/>
+      </p:ext>
+    </p:extLst>
+  </p:cSld>
+  <p:clrMapOvr>
+    <a:masterClrMapping/>
+  </p:clrMapOvr>
+</p:sld>
+</file>
+
+<file path=ppt/slides/slide11.xml><?xml version="1.0" encoding="utf-8"?>
+<p:sld xmlns:a="http://schemas.openxmlformats.org/drawingml/2006/main" xmlns:r="http://schemas.openxmlformats.org/officeDocument/2006/relationships" xmlns:p="http://schemas.openxmlformats.org/presentationml/2006/main">
+  <p:cSld>
+    <p:spTree>
+      <p:nvGrpSpPr>
+        <p:cNvPr id="1" name=""/>
+        <p:cNvGrpSpPr/>
+        <p:nvPr/>
+      </p:nvGrpSpPr>
+      <p:grpSpPr>
+        <a:xfrm>
+          <a:off x="0" y="0"/>
+          <a:ext cx="0" cy="0"/>
+          <a:chOff x="0" y="0"/>
+          <a:chExt cx="0" cy="0"/>
+        </a:xfrm>
+      </p:grpSpPr>
+      <p:sp>
+        <p:nvSpPr>
           <p:cNvPr id="3" name="Rectangle: Rounded Corners 2">
             <a:extLst>
               <a:ext uri="{FF2B5EF4-FFF2-40B4-BE49-F238E27FC236}">
-                <a16:creationId xmlns="" xmlns:a16="http://schemas.microsoft.com/office/drawing/2014/main" id="{59DB4196-0687-4E82-A4C2-1855B40742C9}"/>
+                <a16:creationId xmlns:a16="http://schemas.microsoft.com/office/drawing/2014/main" xmlns="" id="{59DB4196-0687-4E82-A4C2-1855B40742C9}"/>
               </a:ext>
             </a:extLst>
           </p:cNvPr>
@@ -3434,7 +3513,7 @@
 </p:sld>
 </file>
 
-<file path=ppt/slides/slide11.xml><?xml version="1.0" encoding="utf-8"?>
+<file path=ppt/slides/slide12.xml><?xml version="1.0" encoding="utf-8"?>
 <p:sld xmlns:a="http://schemas.openxmlformats.org/drawingml/2006/main" xmlns:r="http://schemas.openxmlformats.org/officeDocument/2006/relationships" xmlns:p="http://schemas.openxmlformats.org/presentationml/2006/main">
   <p:cSld>
     <p:spTree>
@@ -3456,7 +3535,7 @@
           <p:cNvPr id="1028" name="Picture 4" descr="Breakfast, dinner, eat, eatery, eating, food, fork, kitchen, mall, menu,  restaurant, spoon icon">
             <a:extLst>
               <a:ext uri="{FF2B5EF4-FFF2-40B4-BE49-F238E27FC236}">
-                <a16:creationId xmlns="" xmlns:a16="http://schemas.microsoft.com/office/drawing/2014/main" id="{134BC9E7-1648-4284-8F8B-F48D3A77279E}"/>
+                <a16:creationId xmlns:a16="http://schemas.microsoft.com/office/drawing/2014/main" xmlns="" id="{134BC9E7-1648-4284-8F8B-F48D3A77279E}"/>
               </a:ext>
             </a:extLst>
           </p:cNvPr>
@@ -3503,7 +3582,7 @@
           <p:cNvPr id="17" name="Rectangle: Rounded Corners 16">
             <a:extLst>
               <a:ext uri="{FF2B5EF4-FFF2-40B4-BE49-F238E27FC236}">
-                <a16:creationId xmlns="" xmlns:a16="http://schemas.microsoft.com/office/drawing/2014/main" id="{8FF52E4B-F4AD-49B2-ADC5-256CFA6FC62C}"/>
+                <a16:creationId xmlns:a16="http://schemas.microsoft.com/office/drawing/2014/main" xmlns="" id="{8FF52E4B-F4AD-49B2-ADC5-256CFA6FC62C}"/>
               </a:ext>
             </a:extLst>
           </p:cNvPr>
@@ -3557,7 +3636,7 @@
           <p:cNvPr id="21" name="Rectangle: Rounded Corners 20">
             <a:extLst>
               <a:ext uri="{FF2B5EF4-FFF2-40B4-BE49-F238E27FC236}">
-                <a16:creationId xmlns="" xmlns:a16="http://schemas.microsoft.com/office/drawing/2014/main" id="{7A457185-7D9B-4F78-8A69-D2072A09BBEE}"/>
+                <a16:creationId xmlns:a16="http://schemas.microsoft.com/office/drawing/2014/main" xmlns="" id="{7A457185-7D9B-4F78-8A69-D2072A09BBEE}"/>
               </a:ext>
             </a:extLst>
           </p:cNvPr>
@@ -3619,7 +3698,7 @@
 </p:sld>
 </file>
 
-<file path=ppt/slides/slide12.xml><?xml version="1.0" encoding="utf-8"?>
+<file path=ppt/slides/slide13.xml><?xml version="1.0" encoding="utf-8"?>
 <p:sld xmlns:a="http://schemas.openxmlformats.org/drawingml/2006/main" xmlns:r="http://schemas.openxmlformats.org/officeDocument/2006/relationships" xmlns:p="http://schemas.openxmlformats.org/presentationml/2006/main">
   <p:cSld>
     <p:spTree>
@@ -3641,7 +3720,7 @@
           <p:cNvPr id="2050" name="Picture 2" descr="trash can,garbage can,rubbish bin icon - Buy this stock vector and explore  similar vectors at Adobe Stock | Adobe Stock">
             <a:extLst>
               <a:ext uri="{FF2B5EF4-FFF2-40B4-BE49-F238E27FC236}">
-                <a16:creationId xmlns="" xmlns:a16="http://schemas.microsoft.com/office/drawing/2014/main" id="{6AC0D9C4-4466-472E-B18A-1B3485F670A7}"/>
+                <a16:creationId xmlns:a16="http://schemas.microsoft.com/office/drawing/2014/main" xmlns="" id="{6AC0D9C4-4466-472E-B18A-1B3485F670A7}"/>
               </a:ext>
             </a:extLst>
           </p:cNvPr>
@@ -3688,7 +3767,7 @@
           <p:cNvPr id="2" name="Rectangle: Rounded Corners 1">
             <a:extLst>
               <a:ext uri="{FF2B5EF4-FFF2-40B4-BE49-F238E27FC236}">
-                <a16:creationId xmlns="" xmlns:a16="http://schemas.microsoft.com/office/drawing/2014/main" id="{C90FD948-D8A7-44C8-B812-1049E19BDCCC}"/>
+                <a16:creationId xmlns:a16="http://schemas.microsoft.com/office/drawing/2014/main" xmlns="" id="{C90FD948-D8A7-44C8-B812-1049E19BDCCC}"/>
               </a:ext>
             </a:extLst>
           </p:cNvPr>
@@ -3755,7 +3834,7 @@
 </p:sld>
 </file>
 
-<file path=ppt/slides/slide13.xml><?xml version="1.0" encoding="utf-8"?>
+<file path=ppt/slides/slide14.xml><?xml version="1.0" encoding="utf-8"?>
 <p:sld xmlns:a="http://schemas.openxmlformats.org/drawingml/2006/main" xmlns:r="http://schemas.openxmlformats.org/officeDocument/2006/relationships" xmlns:p="http://schemas.openxmlformats.org/presentationml/2006/main">
   <p:cSld>
     <p:spTree>
@@ -3777,7 +3856,7 @@
           <p:cNvPr id="16" name="Group 15">
             <a:extLst>
               <a:ext uri="{FF2B5EF4-FFF2-40B4-BE49-F238E27FC236}">
-                <a16:creationId xmlns="" xmlns:a16="http://schemas.microsoft.com/office/drawing/2014/main" id="{FBB9A665-68B6-4A50-A463-D808E77EBC3A}"/>
+                <a16:creationId xmlns:a16="http://schemas.microsoft.com/office/drawing/2014/main" xmlns="" id="{FBB9A665-68B6-4A50-A463-D808E77EBC3A}"/>
               </a:ext>
             </a:extLst>
           </p:cNvPr>
@@ -3797,7 +3876,7 @@
             <p:cNvPr id="3" name="Rectangle: Rounded Corners 2">
               <a:extLst>
                 <a:ext uri="{FF2B5EF4-FFF2-40B4-BE49-F238E27FC236}">
-                  <a16:creationId xmlns="" xmlns:a16="http://schemas.microsoft.com/office/drawing/2014/main" id="{83DB1C8D-34C1-4F43-9AEF-3E14743EEFF9}"/>
+                  <a16:creationId xmlns:a16="http://schemas.microsoft.com/office/drawing/2014/main" xmlns="" id="{83DB1C8D-34C1-4F43-9AEF-3E14743EEFF9}"/>
                 </a:ext>
               </a:extLst>
             </p:cNvPr>
@@ -3851,7 +3930,7 @@
             <p:cNvPr id="13" name="Rectangle: Rounded Corners 12">
               <a:extLst>
                 <a:ext uri="{FF2B5EF4-FFF2-40B4-BE49-F238E27FC236}">
-                  <a16:creationId xmlns="" xmlns:a16="http://schemas.microsoft.com/office/drawing/2014/main" id="{DB98CEC5-767D-492A-A315-5BB4560B0615}"/>
+                  <a16:creationId xmlns:a16="http://schemas.microsoft.com/office/drawing/2014/main" xmlns="" id="{DB98CEC5-767D-492A-A315-5BB4560B0615}"/>
                 </a:ext>
               </a:extLst>
             </p:cNvPr>
@@ -3905,7 +3984,7 @@
             <p:cNvPr id="14" name="Rectangle: Rounded Corners 13">
               <a:extLst>
                 <a:ext uri="{FF2B5EF4-FFF2-40B4-BE49-F238E27FC236}">
-                  <a16:creationId xmlns="" xmlns:a16="http://schemas.microsoft.com/office/drawing/2014/main" id="{3EB5E80A-68F6-4147-BCFF-F74DA3DB3E46}"/>
+                  <a16:creationId xmlns:a16="http://schemas.microsoft.com/office/drawing/2014/main" xmlns="" id="{3EB5E80A-68F6-4147-BCFF-F74DA3DB3E46}"/>
                 </a:ext>
               </a:extLst>
             </p:cNvPr>
@@ -3959,7 +4038,7 @@
             <p:cNvPr id="4" name="Group 3">
               <a:extLst>
                 <a:ext uri="{FF2B5EF4-FFF2-40B4-BE49-F238E27FC236}">
-                  <a16:creationId xmlns="" xmlns:a16="http://schemas.microsoft.com/office/drawing/2014/main" id="{C09CA0B7-DD08-4A0C-8031-8221863EB4B6}"/>
+                  <a16:creationId xmlns:a16="http://schemas.microsoft.com/office/drawing/2014/main" xmlns="" id="{C09CA0B7-DD08-4A0C-8031-8221863EB4B6}"/>
                 </a:ext>
               </a:extLst>
             </p:cNvPr>
@@ -3979,7 +4058,7 @@
               <p:cNvPr id="7" name="Rectangle: Rounded Corners 6">
                 <a:extLst>
                   <a:ext uri="{FF2B5EF4-FFF2-40B4-BE49-F238E27FC236}">
-                    <a16:creationId xmlns="" xmlns:a16="http://schemas.microsoft.com/office/drawing/2014/main" id="{176F5D69-CC78-4939-AFF5-F034C6E99C75}"/>
+                    <a16:creationId xmlns:a16="http://schemas.microsoft.com/office/drawing/2014/main" xmlns="" id="{176F5D69-CC78-4939-AFF5-F034C6E99C75}"/>
                   </a:ext>
                 </a:extLst>
               </p:cNvPr>
@@ -4033,7 +4112,7 @@
               <p:cNvPr id="10" name="Rectangle: Rounded Corners 9">
                 <a:extLst>
                   <a:ext uri="{FF2B5EF4-FFF2-40B4-BE49-F238E27FC236}">
-                    <a16:creationId xmlns="" xmlns:a16="http://schemas.microsoft.com/office/drawing/2014/main" id="{1E96A16F-B596-4FBA-B592-5FC334CF80DF}"/>
+                    <a16:creationId xmlns:a16="http://schemas.microsoft.com/office/drawing/2014/main" xmlns="" id="{1E96A16F-B596-4FBA-B592-5FC334CF80DF}"/>
                   </a:ext>
                 </a:extLst>
               </p:cNvPr>
@@ -4087,7 +4166,7 @@
               <p:cNvPr id="15" name="Rectangle: Rounded Corners 14">
                 <a:extLst>
                   <a:ext uri="{FF2B5EF4-FFF2-40B4-BE49-F238E27FC236}">
-                    <a16:creationId xmlns="" xmlns:a16="http://schemas.microsoft.com/office/drawing/2014/main" id="{7EDBA7E2-0AE8-47A3-92EA-137D8F358368}"/>
+                    <a16:creationId xmlns:a16="http://schemas.microsoft.com/office/drawing/2014/main" xmlns="" id="{7EDBA7E2-0AE8-47A3-92EA-137D8F358368}"/>
                   </a:ext>
                 </a:extLst>
               </p:cNvPr>
@@ -4151,7 +4230,7 @@
 </p:sld>
 </file>
 
-<file path=ppt/slides/slide14.xml><?xml version="1.0" encoding="utf-8"?>
+<file path=ppt/slides/slide15.xml><?xml version="1.0" encoding="utf-8"?>
 <p:sld xmlns:a="http://schemas.openxmlformats.org/drawingml/2006/main" xmlns:r="http://schemas.openxmlformats.org/officeDocument/2006/relationships" xmlns:p="http://schemas.openxmlformats.org/presentationml/2006/main">
   <p:cSld>
     <p:spTree>
@@ -4173,7 +4252,7 @@
           <p:cNvPr id="4" name="Picture 3">
             <a:extLst>
               <a:ext uri="{FF2B5EF4-FFF2-40B4-BE49-F238E27FC236}">
-                <a16:creationId xmlns="" xmlns:a16="http://schemas.microsoft.com/office/drawing/2014/main" id="{893C1B8B-E02B-4818-96B2-9BF08A7E2397}"/>
+                <a16:creationId xmlns:a16="http://schemas.microsoft.com/office/drawing/2014/main" xmlns="" id="{893C1B8B-E02B-4818-96B2-9BF08A7E2397}"/>
               </a:ext>
             </a:extLst>
           </p:cNvPr>
@@ -4209,7 +4288,7 @@
           <p:cNvPr id="6" name="Rectangle: Rounded Corners 5">
             <a:extLst>
               <a:ext uri="{FF2B5EF4-FFF2-40B4-BE49-F238E27FC236}">
-                <a16:creationId xmlns="" xmlns:a16="http://schemas.microsoft.com/office/drawing/2014/main" id="{B678A86C-6BC7-45F6-8B5A-F11EAEB83302}"/>
+                <a16:creationId xmlns:a16="http://schemas.microsoft.com/office/drawing/2014/main" xmlns="" id="{B678A86C-6BC7-45F6-8B5A-F11EAEB83302}"/>
               </a:ext>
             </a:extLst>
           </p:cNvPr>
@@ -4265,7 +4344,7 @@
           <p:cNvPr id="8" name="Group 7">
             <a:extLst>
               <a:ext uri="{FF2B5EF4-FFF2-40B4-BE49-F238E27FC236}">
-                <a16:creationId xmlns="" xmlns:a16="http://schemas.microsoft.com/office/drawing/2014/main" id="{41D584BE-0950-4B76-BAF0-054E324A1ECE}"/>
+                <a16:creationId xmlns:a16="http://schemas.microsoft.com/office/drawing/2014/main" xmlns="" id="{41D584BE-0950-4B76-BAF0-054E324A1ECE}"/>
               </a:ext>
             </a:extLst>
           </p:cNvPr>
@@ -4292,7 +4371,7 @@
             <p:cNvPr id="9" name="Rectangle: Rounded Corners 8">
               <a:extLst>
                 <a:ext uri="{FF2B5EF4-FFF2-40B4-BE49-F238E27FC236}">
-                  <a16:creationId xmlns="" xmlns:a16="http://schemas.microsoft.com/office/drawing/2014/main" id="{7CF64681-4B56-48E5-8473-9C2EEF5315A1}"/>
+                  <a16:creationId xmlns:a16="http://schemas.microsoft.com/office/drawing/2014/main" xmlns="" id="{7CF64681-4B56-48E5-8473-9C2EEF5315A1}"/>
                 </a:ext>
               </a:extLst>
             </p:cNvPr>
@@ -4344,7 +4423,7 @@
             <p:cNvPr id="10" name="Rectangle: Rounded Corners 9">
               <a:extLst>
                 <a:ext uri="{FF2B5EF4-FFF2-40B4-BE49-F238E27FC236}">
-                  <a16:creationId xmlns="" xmlns:a16="http://schemas.microsoft.com/office/drawing/2014/main" id="{FEC3FF94-A7BD-49A1-9D72-854FC6DF720B}"/>
+                  <a16:creationId xmlns:a16="http://schemas.microsoft.com/office/drawing/2014/main" xmlns="" id="{FEC3FF94-A7BD-49A1-9D72-854FC6DF720B}"/>
                 </a:ext>
               </a:extLst>
             </p:cNvPr>
@@ -4401,7 +4480,7 @@
           <p:cNvPr id="11" name="Rectangle: Rounded Corners 10">
             <a:extLst>
               <a:ext uri="{FF2B5EF4-FFF2-40B4-BE49-F238E27FC236}">
-                <a16:creationId xmlns="" xmlns:a16="http://schemas.microsoft.com/office/drawing/2014/main" id="{39E6E6C5-8ECD-4AC2-9314-A0D9C7964A9D}"/>
+                <a16:creationId xmlns:a16="http://schemas.microsoft.com/office/drawing/2014/main" xmlns="" id="{39E6E6C5-8ECD-4AC2-9314-A0D9C7964A9D}"/>
               </a:ext>
             </a:extLst>
           </p:cNvPr>
@@ -4455,7 +4534,7 @@
           <p:cNvPr id="5" name="Group 4">
             <a:extLst>
               <a:ext uri="{FF2B5EF4-FFF2-40B4-BE49-F238E27FC236}">
-                <a16:creationId xmlns="" xmlns:a16="http://schemas.microsoft.com/office/drawing/2014/main" id="{00607648-5214-4A6A-9269-7EE828B6459D}"/>
+                <a16:creationId xmlns:a16="http://schemas.microsoft.com/office/drawing/2014/main" xmlns="" id="{00607648-5214-4A6A-9269-7EE828B6459D}"/>
               </a:ext>
             </a:extLst>
           </p:cNvPr>
@@ -4475,7 +4554,7 @@
             <p:cNvPr id="2" name="Flowchart: Off-page Connector 1">
               <a:extLst>
                 <a:ext uri="{FF2B5EF4-FFF2-40B4-BE49-F238E27FC236}">
-                  <a16:creationId xmlns="" xmlns:a16="http://schemas.microsoft.com/office/drawing/2014/main" id="{022A41D4-8D7D-4F11-AE22-07A76C42B5C5}"/>
+                  <a16:creationId xmlns:a16="http://schemas.microsoft.com/office/drawing/2014/main" xmlns="" id="{022A41D4-8D7D-4F11-AE22-07A76C42B5C5}"/>
                 </a:ext>
               </a:extLst>
             </p:cNvPr>
@@ -4529,7 +4608,7 @@
             <p:cNvPr id="12" name="Flowchart: Off-page Connector 11">
               <a:extLst>
                 <a:ext uri="{FF2B5EF4-FFF2-40B4-BE49-F238E27FC236}">
-                  <a16:creationId xmlns="" xmlns:a16="http://schemas.microsoft.com/office/drawing/2014/main" id="{BC8BA1D5-5BDD-451B-8FE5-5776D661984E}"/>
+                  <a16:creationId xmlns:a16="http://schemas.microsoft.com/office/drawing/2014/main" xmlns="" id="{BC8BA1D5-5BDD-451B-8FE5-5776D661984E}"/>
                 </a:ext>
               </a:extLst>
             </p:cNvPr>
@@ -4582,7 +4661,7 @@
             <p:cNvPr id="14" name="Flowchart: Off-page Connector 13">
               <a:extLst>
                 <a:ext uri="{FF2B5EF4-FFF2-40B4-BE49-F238E27FC236}">
-                  <a16:creationId xmlns="" xmlns:a16="http://schemas.microsoft.com/office/drawing/2014/main" id="{8EF4A54E-54C3-4523-AEA9-926E131C3E87}"/>
+                  <a16:creationId xmlns:a16="http://schemas.microsoft.com/office/drawing/2014/main" xmlns="" id="{8EF4A54E-54C3-4523-AEA9-926E131C3E87}"/>
                 </a:ext>
               </a:extLst>
             </p:cNvPr>
@@ -4635,7 +4714,7 @@
           <p:cNvPr id="17" name="Flowchart: Off-page Connector 16">
             <a:extLst>
               <a:ext uri="{FF2B5EF4-FFF2-40B4-BE49-F238E27FC236}">
-                <a16:creationId xmlns="" xmlns:a16="http://schemas.microsoft.com/office/drawing/2014/main" id="{135B49B5-57F3-46FC-A1B0-9359315003EB}"/>
+                <a16:creationId xmlns:a16="http://schemas.microsoft.com/office/drawing/2014/main" xmlns="" id="{135B49B5-57F3-46FC-A1B0-9359315003EB}"/>
               </a:ext>
             </a:extLst>
           </p:cNvPr>
@@ -4764,7 +4843,7 @@
           <p:cNvPr id="18" name="Flowchart: Off-page Connector 17">
             <a:extLst>
               <a:ext uri="{FF2B5EF4-FFF2-40B4-BE49-F238E27FC236}">
-                <a16:creationId xmlns="" xmlns:a16="http://schemas.microsoft.com/office/drawing/2014/main" id="{E737D2D3-78EF-4E68-B92A-064A22C23820}"/>
+                <a16:creationId xmlns:a16="http://schemas.microsoft.com/office/drawing/2014/main" xmlns="" id="{E737D2D3-78EF-4E68-B92A-064A22C23820}"/>
               </a:ext>
             </a:extLst>
           </p:cNvPr>
@@ -4892,7 +4971,7 @@
           <p:cNvPr id="19" name="Flowchart: Off-page Connector 18">
             <a:extLst>
               <a:ext uri="{FF2B5EF4-FFF2-40B4-BE49-F238E27FC236}">
-                <a16:creationId xmlns="" xmlns:a16="http://schemas.microsoft.com/office/drawing/2014/main" id="{6F2D6C6C-F6B2-4AD6-A355-88D152E7ABBE}"/>
+                <a16:creationId xmlns:a16="http://schemas.microsoft.com/office/drawing/2014/main" xmlns="" id="{6F2D6C6C-F6B2-4AD6-A355-88D152E7ABBE}"/>
               </a:ext>
             </a:extLst>
           </p:cNvPr>
@@ -5034,7 +5113,7 @@
 </p:sld>
 </file>
 
-<file path=ppt/slides/slide15.xml><?xml version="1.0" encoding="utf-8"?>
+<file path=ppt/slides/slide16.xml><?xml version="1.0" encoding="utf-8"?>
 <p:sld xmlns:a="http://schemas.openxmlformats.org/drawingml/2006/main" xmlns:r="http://schemas.openxmlformats.org/officeDocument/2006/relationships" xmlns:p="http://schemas.openxmlformats.org/presentationml/2006/main">
   <p:cSld>
     <p:spTree>
@@ -5056,7 +5135,7 @@
           <p:cNvPr id="3" name="Speech Bubble: Oval 2">
             <a:extLst>
               <a:ext uri="{FF2B5EF4-FFF2-40B4-BE49-F238E27FC236}">
-                <a16:creationId xmlns="" xmlns:a16="http://schemas.microsoft.com/office/drawing/2014/main" id="{79F1B147-DA1D-4AF8-951E-F8176B89679F}"/>
+                <a16:creationId xmlns:a16="http://schemas.microsoft.com/office/drawing/2014/main" xmlns="" id="{79F1B147-DA1D-4AF8-951E-F8176B89679F}"/>
               </a:ext>
             </a:extLst>
           </p:cNvPr>
@@ -5119,7 +5198,7 @@
 </p:sld>
 </file>
 
-<file path=ppt/slides/slide16.xml><?xml version="1.0" encoding="utf-8"?>
+<file path=ppt/slides/slide17.xml><?xml version="1.0" encoding="utf-8"?>
 <p:sld xmlns:a="http://schemas.openxmlformats.org/drawingml/2006/main" xmlns:r="http://schemas.openxmlformats.org/officeDocument/2006/relationships" xmlns:p="http://schemas.openxmlformats.org/presentationml/2006/main">
   <p:cSld>
     <p:spTree>
@@ -5141,7 +5220,7 @@
           <p:cNvPr id="4" name="Rectangle: Rounded Corners 3">
             <a:extLst>
               <a:ext uri="{FF2B5EF4-FFF2-40B4-BE49-F238E27FC236}">
-                <a16:creationId xmlns="" xmlns:a16="http://schemas.microsoft.com/office/drawing/2014/main" id="{532DB011-E88D-4B95-B5E6-96CC2D277837}"/>
+                <a16:creationId xmlns:a16="http://schemas.microsoft.com/office/drawing/2014/main" xmlns="" id="{532DB011-E88D-4B95-B5E6-96CC2D277837}"/>
               </a:ext>
             </a:extLst>
           </p:cNvPr>
@@ -5197,7 +5276,7 @@
           <p:cNvPr id="5" name="Rectangle: Rounded Corners 4">
             <a:extLst>
               <a:ext uri="{FF2B5EF4-FFF2-40B4-BE49-F238E27FC236}">
-                <a16:creationId xmlns="" xmlns:a16="http://schemas.microsoft.com/office/drawing/2014/main" id="{90B2765F-ADB7-44D8-940A-CB41C96B4176}"/>
+                <a16:creationId xmlns:a16="http://schemas.microsoft.com/office/drawing/2014/main" xmlns="" id="{90B2765F-ADB7-44D8-940A-CB41C96B4176}"/>
               </a:ext>
             </a:extLst>
           </p:cNvPr>
@@ -5261,7 +5340,7 @@
 </p:sld>
 </file>
 
-<file path=ppt/slides/slide17.xml><?xml version="1.0" encoding="utf-8"?>
+<file path=ppt/slides/slide18.xml><?xml version="1.0" encoding="utf-8"?>
 <p:sld xmlns:a="http://schemas.openxmlformats.org/drawingml/2006/main" xmlns:r="http://schemas.openxmlformats.org/officeDocument/2006/relationships" xmlns:p="http://schemas.openxmlformats.org/presentationml/2006/main">
   <p:cSld>
     <p:spTree>
@@ -5283,7 +5362,7 @@
           <p:cNvPr id="4" name="Picture 3">
             <a:extLst>
               <a:ext uri="{FF2B5EF4-FFF2-40B4-BE49-F238E27FC236}">
-                <a16:creationId xmlns="" xmlns:a16="http://schemas.microsoft.com/office/drawing/2014/main" id="{29C3914B-9583-47E8-B98E-4081628F9CF2}"/>
+                <a16:creationId xmlns:a16="http://schemas.microsoft.com/office/drawing/2014/main" xmlns="" id="{29C3914B-9583-47E8-B98E-4081628F9CF2}"/>
               </a:ext>
             </a:extLst>
           </p:cNvPr>
@@ -5319,7 +5398,7 @@
           <p:cNvPr id="5" name="Heart 4">
             <a:extLst>
               <a:ext uri="{FF2B5EF4-FFF2-40B4-BE49-F238E27FC236}">
-                <a16:creationId xmlns="" xmlns:a16="http://schemas.microsoft.com/office/drawing/2014/main" id="{A9CB7D6B-1111-45B7-9BE6-9F6A4DE67728}"/>
+                <a16:creationId xmlns:a16="http://schemas.microsoft.com/office/drawing/2014/main" xmlns="" id="{A9CB7D6B-1111-45B7-9BE6-9F6A4DE67728}"/>
               </a:ext>
             </a:extLst>
           </p:cNvPr>
@@ -5390,7 +5469,7 @@
 </p:sld>
 </file>
 
-<file path=ppt/slides/slide18.xml><?xml version="1.0" encoding="utf-8"?>
+<file path=ppt/slides/slide19.xml><?xml version="1.0" encoding="utf-8"?>
 <p:sld xmlns:a="http://schemas.openxmlformats.org/drawingml/2006/main" xmlns:r="http://schemas.openxmlformats.org/officeDocument/2006/relationships" xmlns:p="http://schemas.openxmlformats.org/presentationml/2006/main">
   <p:cSld>
     <p:spTree>
@@ -5412,7 +5491,7 @@
           <p:cNvPr id="2" name="Rectangle 1">
             <a:extLst>
               <a:ext uri="{FF2B5EF4-FFF2-40B4-BE49-F238E27FC236}">
-                <a16:creationId xmlns="" xmlns:a16="http://schemas.microsoft.com/office/drawing/2014/main" id="{32C61CE2-8423-40A5-BD57-CB60A710678F}"/>
+                <a16:creationId xmlns:a16="http://schemas.microsoft.com/office/drawing/2014/main" xmlns="" id="{32C61CE2-8423-40A5-BD57-CB60A710678F}"/>
               </a:ext>
             </a:extLst>
           </p:cNvPr>
@@ -5463,91 +5542,6 @@
     <p:extLst>
       <p:ext uri="{BB962C8B-B14F-4D97-AF65-F5344CB8AC3E}">
         <p14:creationId xmlns:p14="http://schemas.microsoft.com/office/powerpoint/2010/main" val="802502135"/>
-      </p:ext>
-    </p:extLst>
-  </p:cSld>
-  <p:clrMapOvr>
-    <a:masterClrMapping/>
-  </p:clrMapOvr>
-</p:sld>
-</file>
-
-<file path=ppt/slides/slide19.xml><?xml version="1.0" encoding="utf-8"?>
-<p:sld xmlns:a="http://schemas.openxmlformats.org/drawingml/2006/main" xmlns:r="http://schemas.openxmlformats.org/officeDocument/2006/relationships" xmlns:p="http://schemas.openxmlformats.org/presentationml/2006/main">
-  <p:cSld>
-    <p:spTree>
-      <p:nvGrpSpPr>
-        <p:cNvPr id="1" name=""/>
-        <p:cNvGrpSpPr/>
-        <p:nvPr/>
-      </p:nvGrpSpPr>
-      <p:grpSpPr>
-        <a:xfrm>
-          <a:off x="0" y="0"/>
-          <a:ext cx="0" cy="0"/>
-          <a:chOff x="0" y="0"/>
-          <a:chExt cx="0" cy="0"/>
-        </a:xfrm>
-      </p:grpSpPr>
-      <p:sp>
-        <p:nvSpPr>
-          <p:cNvPr id="3" name="Rectangle 2">
-            <a:extLst>
-              <a:ext uri="{FF2B5EF4-FFF2-40B4-BE49-F238E27FC236}">
-                <a16:creationId xmlns="" xmlns:a16="http://schemas.microsoft.com/office/drawing/2014/main" id="{207AF6DD-ECCA-43F6-9535-AE4D31B9762C}"/>
-              </a:ext>
-            </a:extLst>
-          </p:cNvPr>
-          <p:cNvSpPr/>
-          <p:nvPr/>
-        </p:nvSpPr>
-        <p:spPr>
-          <a:xfrm>
-            <a:off x="3816350" y="2673350"/>
-            <a:ext cx="1511300" cy="1511300"/>
-          </a:xfrm>
-          <a:prstGeom prst="rect">
-            <a:avLst/>
-          </a:prstGeom>
-          <a:solidFill>
-            <a:schemeClr val="bg1"/>
-          </a:solidFill>
-          <a:ln>
-            <a:noFill/>
-          </a:ln>
-          <a:effectLst>
-            <a:softEdge rad="317500"/>
-          </a:effectLst>
-        </p:spPr>
-        <p:style>
-          <a:lnRef idx="2">
-            <a:schemeClr val="accent1">
-              <a:shade val="50000"/>
-            </a:schemeClr>
-          </a:lnRef>
-          <a:fillRef idx="1">
-            <a:schemeClr val="accent1"/>
-          </a:fillRef>
-          <a:effectRef idx="0">
-            <a:schemeClr val="accent1"/>
-          </a:effectRef>
-          <a:fontRef idx="minor">
-            <a:schemeClr val="lt1"/>
-          </a:fontRef>
-        </p:style>
-        <p:txBody>
-          <a:bodyPr rtlCol="0" anchor="ctr"/>
-          <a:lstStyle/>
-          <a:p>
-            <a:pPr algn="ctr"/>
-            <a:endParaRPr lang="en-IN"/>
-          </a:p>
-        </p:txBody>
-      </p:sp>
-    </p:spTree>
-    <p:extLst>
-      <p:ext uri="{BB962C8B-B14F-4D97-AF65-F5344CB8AC3E}">
-        <p14:creationId xmlns:p14="http://schemas.microsoft.com/office/powerpoint/2010/main" val="1560987979"/>
       </p:ext>
     </p:extLst>
   </p:cSld>
@@ -5657,12 +5651,97 @@
           <a:chExt cx="0" cy="0"/>
         </a:xfrm>
       </p:grpSpPr>
+      <p:sp>
+        <p:nvSpPr>
+          <p:cNvPr id="3" name="Rectangle 2">
+            <a:extLst>
+              <a:ext uri="{FF2B5EF4-FFF2-40B4-BE49-F238E27FC236}">
+                <a16:creationId xmlns:a16="http://schemas.microsoft.com/office/drawing/2014/main" xmlns="" id="{207AF6DD-ECCA-43F6-9535-AE4D31B9762C}"/>
+              </a:ext>
+            </a:extLst>
+          </p:cNvPr>
+          <p:cNvSpPr/>
+          <p:nvPr/>
+        </p:nvSpPr>
+        <p:spPr>
+          <a:xfrm>
+            <a:off x="3816350" y="2673350"/>
+            <a:ext cx="1511300" cy="1511300"/>
+          </a:xfrm>
+          <a:prstGeom prst="rect">
+            <a:avLst/>
+          </a:prstGeom>
+          <a:solidFill>
+            <a:schemeClr val="bg1"/>
+          </a:solidFill>
+          <a:ln>
+            <a:noFill/>
+          </a:ln>
+          <a:effectLst>
+            <a:softEdge rad="317500"/>
+          </a:effectLst>
+        </p:spPr>
+        <p:style>
+          <a:lnRef idx="2">
+            <a:schemeClr val="accent1">
+              <a:shade val="50000"/>
+            </a:schemeClr>
+          </a:lnRef>
+          <a:fillRef idx="1">
+            <a:schemeClr val="accent1"/>
+          </a:fillRef>
+          <a:effectRef idx="0">
+            <a:schemeClr val="accent1"/>
+          </a:effectRef>
+          <a:fontRef idx="minor">
+            <a:schemeClr val="lt1"/>
+          </a:fontRef>
+        </p:style>
+        <p:txBody>
+          <a:bodyPr rtlCol="0" anchor="ctr"/>
+          <a:lstStyle/>
+          <a:p>
+            <a:pPr algn="ctr"/>
+            <a:endParaRPr lang="en-IN"/>
+          </a:p>
+        </p:txBody>
+      </p:sp>
+    </p:spTree>
+    <p:extLst>
+      <p:ext uri="{BB962C8B-B14F-4D97-AF65-F5344CB8AC3E}">
+        <p14:creationId xmlns:p14="http://schemas.microsoft.com/office/powerpoint/2010/main" val="1560987979"/>
+      </p:ext>
+    </p:extLst>
+  </p:cSld>
+  <p:clrMapOvr>
+    <a:masterClrMapping/>
+  </p:clrMapOvr>
+</p:sld>
+</file>
+
+<file path=ppt/slides/slide21.xml><?xml version="1.0" encoding="utf-8"?>
+<p:sld xmlns:a="http://schemas.openxmlformats.org/drawingml/2006/main" xmlns:r="http://schemas.openxmlformats.org/officeDocument/2006/relationships" xmlns:p="http://schemas.openxmlformats.org/presentationml/2006/main">
+  <p:cSld>
+    <p:spTree>
+      <p:nvGrpSpPr>
+        <p:cNvPr id="1" name=""/>
+        <p:cNvGrpSpPr/>
+        <p:nvPr/>
+      </p:nvGrpSpPr>
+      <p:grpSpPr>
+        <a:xfrm>
+          <a:off x="0" y="0"/>
+          <a:ext cx="0" cy="0"/>
+          <a:chOff x="0" y="0"/>
+          <a:chExt cx="0" cy="0"/>
+        </a:xfrm>
+      </p:grpSpPr>
       <p:grpSp>
         <p:nvGrpSpPr>
           <p:cNvPr id="18" name="Group 17">
             <a:extLst>
               <a:ext uri="{FF2B5EF4-FFF2-40B4-BE49-F238E27FC236}">
-                <a16:creationId xmlns="" xmlns:a16="http://schemas.microsoft.com/office/drawing/2014/main" id="{296FEBEB-E6C9-45D8-BED5-B963E50B6C8B}"/>
+                <a16:creationId xmlns:a16="http://schemas.microsoft.com/office/drawing/2014/main" xmlns="" id="{296FEBEB-E6C9-45D8-BED5-B963E50B6C8B}"/>
               </a:ext>
             </a:extLst>
           </p:cNvPr>
@@ -5682,7 +5761,7 @@
             <p:cNvPr id="2" name="Rectangle 1">
               <a:extLst>
                 <a:ext uri="{FF2B5EF4-FFF2-40B4-BE49-F238E27FC236}">
-                  <a16:creationId xmlns="" xmlns:a16="http://schemas.microsoft.com/office/drawing/2014/main" id="{6DC95FA6-49F0-43A7-9EB3-6B599F68F848}"/>
+                  <a16:creationId xmlns:a16="http://schemas.microsoft.com/office/drawing/2014/main" xmlns="" id="{6DC95FA6-49F0-43A7-9EB3-6B599F68F848}"/>
                 </a:ext>
               </a:extLst>
             </p:cNvPr>
@@ -5734,7 +5813,7 @@
             <p:cNvPr id="12" name="Rectangle 11">
               <a:extLst>
                 <a:ext uri="{FF2B5EF4-FFF2-40B4-BE49-F238E27FC236}">
-                  <a16:creationId xmlns="" xmlns:a16="http://schemas.microsoft.com/office/drawing/2014/main" id="{8C5E4EE9-8293-4139-8CF5-CC0A34FDBB41}"/>
+                  <a16:creationId xmlns:a16="http://schemas.microsoft.com/office/drawing/2014/main" xmlns="" id="{8C5E4EE9-8293-4139-8CF5-CC0A34FDBB41}"/>
                 </a:ext>
               </a:extLst>
             </p:cNvPr>
@@ -5788,7 +5867,7 @@
             <p:cNvPr id="13" name="Rectangle 12">
               <a:extLst>
                 <a:ext uri="{FF2B5EF4-FFF2-40B4-BE49-F238E27FC236}">
-                  <a16:creationId xmlns="" xmlns:a16="http://schemas.microsoft.com/office/drawing/2014/main" id="{D9ECCF58-240B-4FB2-A3F5-76942C811B28}"/>
+                  <a16:creationId xmlns:a16="http://schemas.microsoft.com/office/drawing/2014/main" xmlns="" id="{D9ECCF58-240B-4FB2-A3F5-76942C811B28}"/>
                 </a:ext>
               </a:extLst>
             </p:cNvPr>
@@ -5843,7 +5922,7 @@
           <p:cNvPr id="17" name="Rectangle: Rounded Corners 16">
             <a:extLst>
               <a:ext uri="{FF2B5EF4-FFF2-40B4-BE49-F238E27FC236}">
-                <a16:creationId xmlns="" xmlns:a16="http://schemas.microsoft.com/office/drawing/2014/main" id="{2A96BEB6-F9B6-4ADC-B384-0DBA22CE4EAA}"/>
+                <a16:creationId xmlns:a16="http://schemas.microsoft.com/office/drawing/2014/main" xmlns="" id="{2A96BEB6-F9B6-4ADC-B384-0DBA22CE4EAA}"/>
               </a:ext>
             </a:extLst>
           </p:cNvPr>
@@ -5902,7 +5981,7 @@
 </p:sld>
 </file>
 
-<file path=ppt/slides/slide21.xml><?xml version="1.0" encoding="utf-8"?>
+<file path=ppt/slides/slide22.xml><?xml version="1.0" encoding="utf-8"?>
 <p:sld xmlns:a="http://schemas.openxmlformats.org/drawingml/2006/main" xmlns:r="http://schemas.openxmlformats.org/officeDocument/2006/relationships" xmlns:p="http://schemas.openxmlformats.org/presentationml/2006/main">
   <p:cSld>
     <p:spTree>
@@ -5924,7 +6003,7 @@
           <p:cNvPr id="1026" name="Picture 2" descr="Fishing Reel Icon. Vector &amp; Photo (Free Trial) | Bigstock">
             <a:extLst>
               <a:ext uri="{FF2B5EF4-FFF2-40B4-BE49-F238E27FC236}">
-                <a16:creationId xmlns="" xmlns:a16="http://schemas.microsoft.com/office/drawing/2014/main" id="{42CD2598-1884-4198-8449-C9CBD1CEF439}"/>
+                <a16:creationId xmlns:a16="http://schemas.microsoft.com/office/drawing/2014/main" xmlns="" id="{42CD2598-1884-4198-8449-C9CBD1CEF439}"/>
               </a:ext>
             </a:extLst>
           </p:cNvPr>
@@ -5971,7 +6050,7 @@
           <p:cNvPr id="1028" name="Picture 4" descr="Fishing reel - Free sports icons">
             <a:extLst>
               <a:ext uri="{FF2B5EF4-FFF2-40B4-BE49-F238E27FC236}">
-                <a16:creationId xmlns="" xmlns:a16="http://schemas.microsoft.com/office/drawing/2014/main" id="{C3AFD24C-99DA-4921-A1CD-37620D1DFB48}"/>
+                <a16:creationId xmlns:a16="http://schemas.microsoft.com/office/drawing/2014/main" xmlns="" id="{C3AFD24C-99DA-4921-A1CD-37620D1DFB48}"/>
               </a:ext>
             </a:extLst>
           </p:cNvPr>
@@ -6018,7 +6097,7 @@
           <p:cNvPr id="36" name="Freeform: Shape 35">
             <a:extLst>
               <a:ext uri="{FF2B5EF4-FFF2-40B4-BE49-F238E27FC236}">
-                <a16:creationId xmlns="" xmlns:a16="http://schemas.microsoft.com/office/drawing/2014/main" id="{7C0A1675-41AB-4473-A1B1-DA52410A6636}"/>
+                <a16:creationId xmlns:a16="http://schemas.microsoft.com/office/drawing/2014/main" xmlns="" id="{7C0A1675-41AB-4473-A1B1-DA52410A6636}"/>
               </a:ext>
             </a:extLst>
           </p:cNvPr>
@@ -6612,7 +6691,7 @@
           <p:cNvPr id="21" name="Group 20">
             <a:extLst>
               <a:ext uri="{FF2B5EF4-FFF2-40B4-BE49-F238E27FC236}">
-                <a16:creationId xmlns="" xmlns:a16="http://schemas.microsoft.com/office/drawing/2014/main" id="{63EDE57A-D111-45CB-BB58-A3E574C2A061}"/>
+                <a16:creationId xmlns:a16="http://schemas.microsoft.com/office/drawing/2014/main" xmlns="" id="{63EDE57A-D111-45CB-BB58-A3E574C2A061}"/>
               </a:ext>
             </a:extLst>
           </p:cNvPr>
@@ -6632,7 +6711,7 @@
             <p:cNvPr id="22" name="Oval 21">
               <a:extLst>
                 <a:ext uri="{FF2B5EF4-FFF2-40B4-BE49-F238E27FC236}">
-                  <a16:creationId xmlns="" xmlns:a16="http://schemas.microsoft.com/office/drawing/2014/main" id="{36CD6310-BC74-420A-A87A-6967BD1377E2}"/>
+                  <a16:creationId xmlns:a16="http://schemas.microsoft.com/office/drawing/2014/main" xmlns="" id="{36CD6310-BC74-420A-A87A-6967BD1377E2}"/>
                 </a:ext>
               </a:extLst>
             </p:cNvPr>
@@ -6681,7 +6760,7 @@
             <p:cNvPr id="23" name="Oval 22">
               <a:extLst>
                 <a:ext uri="{FF2B5EF4-FFF2-40B4-BE49-F238E27FC236}">
-                  <a16:creationId xmlns="" xmlns:a16="http://schemas.microsoft.com/office/drawing/2014/main" id="{6E067BED-B36A-4BB9-8BAA-2F725D363FC9}"/>
+                  <a16:creationId xmlns:a16="http://schemas.microsoft.com/office/drawing/2014/main" xmlns="" id="{6E067BED-B36A-4BB9-8BAA-2F725D363FC9}"/>
                 </a:ext>
               </a:extLst>
             </p:cNvPr>
@@ -6733,7 +6812,7 @@
             <p:cNvPr id="24" name="Oval 23">
               <a:extLst>
                 <a:ext uri="{FF2B5EF4-FFF2-40B4-BE49-F238E27FC236}">
-                  <a16:creationId xmlns="" xmlns:a16="http://schemas.microsoft.com/office/drawing/2014/main" id="{5C9C3BAD-3123-4F35-A610-EEE18C0973B0}"/>
+                  <a16:creationId xmlns:a16="http://schemas.microsoft.com/office/drawing/2014/main" xmlns="" id="{5C9C3BAD-3123-4F35-A610-EEE18C0973B0}"/>
                 </a:ext>
               </a:extLst>
             </p:cNvPr>
@@ -6785,7 +6864,7 @@
             <p:cNvPr id="25" name="Group 24">
               <a:extLst>
                 <a:ext uri="{FF2B5EF4-FFF2-40B4-BE49-F238E27FC236}">
-                  <a16:creationId xmlns="" xmlns:a16="http://schemas.microsoft.com/office/drawing/2014/main" id="{3133B8AA-2578-44F2-B68A-D88D0EF5B419}"/>
+                  <a16:creationId xmlns:a16="http://schemas.microsoft.com/office/drawing/2014/main" xmlns="" id="{3133B8AA-2578-44F2-B68A-D88D0EF5B419}"/>
                 </a:ext>
               </a:extLst>
             </p:cNvPr>
@@ -6805,7 +6884,7 @@
               <p:cNvPr id="33" name="Oval 32">
                 <a:extLst>
                   <a:ext uri="{FF2B5EF4-FFF2-40B4-BE49-F238E27FC236}">
-                    <a16:creationId xmlns="" xmlns:a16="http://schemas.microsoft.com/office/drawing/2014/main" id="{D26644F3-46C9-4D4B-99EF-32026CDED056}"/>
+                    <a16:creationId xmlns:a16="http://schemas.microsoft.com/office/drawing/2014/main" xmlns="" id="{D26644F3-46C9-4D4B-99EF-32026CDED056}"/>
                   </a:ext>
                 </a:extLst>
               </p:cNvPr>
@@ -6857,7 +6936,7 @@
               <p:cNvPr id="34" name="Oval 33">
                 <a:extLst>
                   <a:ext uri="{FF2B5EF4-FFF2-40B4-BE49-F238E27FC236}">
-                    <a16:creationId xmlns="" xmlns:a16="http://schemas.microsoft.com/office/drawing/2014/main" id="{2FCEDCED-0E11-401D-A06A-3A0EA08BEC29}"/>
+                    <a16:creationId xmlns:a16="http://schemas.microsoft.com/office/drawing/2014/main" xmlns="" id="{2FCEDCED-0E11-401D-A06A-3A0EA08BEC29}"/>
                   </a:ext>
                 </a:extLst>
               </p:cNvPr>
@@ -6910,7 +6989,7 @@
             <p:cNvPr id="26" name="Group 25">
               <a:extLst>
                 <a:ext uri="{FF2B5EF4-FFF2-40B4-BE49-F238E27FC236}">
-                  <a16:creationId xmlns="" xmlns:a16="http://schemas.microsoft.com/office/drawing/2014/main" id="{B1BA5735-B8DF-43F1-BE41-AEC36D9B4D0D}"/>
+                  <a16:creationId xmlns:a16="http://schemas.microsoft.com/office/drawing/2014/main" xmlns="" id="{B1BA5735-B8DF-43F1-BE41-AEC36D9B4D0D}"/>
                 </a:ext>
               </a:extLst>
             </p:cNvPr>
@@ -6930,7 +7009,7 @@
               <p:cNvPr id="31" name="Oval 30">
                 <a:extLst>
                   <a:ext uri="{FF2B5EF4-FFF2-40B4-BE49-F238E27FC236}">
-                    <a16:creationId xmlns="" xmlns:a16="http://schemas.microsoft.com/office/drawing/2014/main" id="{DD9E0A75-9B49-44EB-A74D-64748A2C950E}"/>
+                    <a16:creationId xmlns:a16="http://schemas.microsoft.com/office/drawing/2014/main" xmlns="" id="{DD9E0A75-9B49-44EB-A74D-64748A2C950E}"/>
                   </a:ext>
                 </a:extLst>
               </p:cNvPr>
@@ -6982,7 +7061,7 @@
               <p:cNvPr id="32" name="Oval 31">
                 <a:extLst>
                   <a:ext uri="{FF2B5EF4-FFF2-40B4-BE49-F238E27FC236}">
-                    <a16:creationId xmlns="" xmlns:a16="http://schemas.microsoft.com/office/drawing/2014/main" id="{6F6267FB-6D55-4BBF-AE56-A4889852ADC3}"/>
+                    <a16:creationId xmlns:a16="http://schemas.microsoft.com/office/drawing/2014/main" xmlns="" id="{6F6267FB-6D55-4BBF-AE56-A4889852ADC3}"/>
                   </a:ext>
                 </a:extLst>
               </p:cNvPr>
@@ -7035,7 +7114,7 @@
             <p:cNvPr id="27" name="Group 26">
               <a:extLst>
                 <a:ext uri="{FF2B5EF4-FFF2-40B4-BE49-F238E27FC236}">
-                  <a16:creationId xmlns="" xmlns:a16="http://schemas.microsoft.com/office/drawing/2014/main" id="{3938A498-AD65-4C70-A0C4-3E9C1E8383E5}"/>
+                  <a16:creationId xmlns:a16="http://schemas.microsoft.com/office/drawing/2014/main" xmlns="" id="{3938A498-AD65-4C70-A0C4-3E9C1E8383E5}"/>
                 </a:ext>
               </a:extLst>
             </p:cNvPr>
@@ -7055,7 +7134,7 @@
               <p:cNvPr id="29" name="Oval 28">
                 <a:extLst>
                   <a:ext uri="{FF2B5EF4-FFF2-40B4-BE49-F238E27FC236}">
-                    <a16:creationId xmlns="" xmlns:a16="http://schemas.microsoft.com/office/drawing/2014/main" id="{CF878B12-6270-4B6A-896C-613922D70B91}"/>
+                    <a16:creationId xmlns:a16="http://schemas.microsoft.com/office/drawing/2014/main" xmlns="" id="{CF878B12-6270-4B6A-896C-613922D70B91}"/>
                   </a:ext>
                 </a:extLst>
               </p:cNvPr>
@@ -7107,7 +7186,7 @@
               <p:cNvPr id="30" name="Oval 29">
                 <a:extLst>
                   <a:ext uri="{FF2B5EF4-FFF2-40B4-BE49-F238E27FC236}">
-                    <a16:creationId xmlns="" xmlns:a16="http://schemas.microsoft.com/office/drawing/2014/main" id="{541E30A1-911C-4CB6-965A-4794CC47891A}"/>
+                    <a16:creationId xmlns:a16="http://schemas.microsoft.com/office/drawing/2014/main" xmlns="" id="{541E30A1-911C-4CB6-965A-4794CC47891A}"/>
                   </a:ext>
                 </a:extLst>
               </p:cNvPr>
@@ -7160,7 +7239,7 @@
             <p:cNvPr id="28" name="Oval 27">
               <a:extLst>
                 <a:ext uri="{FF2B5EF4-FFF2-40B4-BE49-F238E27FC236}">
-                  <a16:creationId xmlns="" xmlns:a16="http://schemas.microsoft.com/office/drawing/2014/main" id="{87BF42C7-7805-4F6A-88A5-7B6FE49F1749}"/>
+                  <a16:creationId xmlns:a16="http://schemas.microsoft.com/office/drawing/2014/main" xmlns="" id="{87BF42C7-7805-4F6A-88A5-7B6FE49F1749}"/>
                 </a:ext>
               </a:extLst>
             </p:cNvPr>
@@ -7213,7 +7292,7 @@
           <p:cNvPr id="37" name="Group 36">
             <a:extLst>
               <a:ext uri="{FF2B5EF4-FFF2-40B4-BE49-F238E27FC236}">
-                <a16:creationId xmlns="" xmlns:a16="http://schemas.microsoft.com/office/drawing/2014/main" id="{CC1A29CF-1719-4074-BBFD-580735A086D4}"/>
+                <a16:creationId xmlns:a16="http://schemas.microsoft.com/office/drawing/2014/main" xmlns="" id="{CC1A29CF-1719-4074-BBFD-580735A086D4}"/>
               </a:ext>
             </a:extLst>
           </p:cNvPr>
@@ -7236,7 +7315,7 @@
             <p:cNvPr id="19" name="Rectangle: Top Corners Rounded 18">
               <a:extLst>
                 <a:ext uri="{FF2B5EF4-FFF2-40B4-BE49-F238E27FC236}">
-                  <a16:creationId xmlns="" xmlns:a16="http://schemas.microsoft.com/office/drawing/2014/main" id="{94F72908-535E-4D89-8109-9F2A06ED09CE}"/>
+                  <a16:creationId xmlns:a16="http://schemas.microsoft.com/office/drawing/2014/main" xmlns="" id="{94F72908-535E-4D89-8109-9F2A06ED09CE}"/>
                 </a:ext>
               </a:extLst>
             </p:cNvPr>
@@ -7293,7 +7372,7 @@
             <p:cNvPr id="20" name="Oval 19">
               <a:extLst>
                 <a:ext uri="{FF2B5EF4-FFF2-40B4-BE49-F238E27FC236}">
-                  <a16:creationId xmlns="" xmlns:a16="http://schemas.microsoft.com/office/drawing/2014/main" id="{3225F8AE-768E-4B74-94DE-39957BD55381}"/>
+                  <a16:creationId xmlns:a16="http://schemas.microsoft.com/office/drawing/2014/main" xmlns="" id="{3225F8AE-768E-4B74-94DE-39957BD55381}"/>
                 </a:ext>
               </a:extLst>
             </p:cNvPr>
@@ -7348,7 +7427,7 @@
           <p:cNvPr id="39" name="Rectangle 38">
             <a:extLst>
               <a:ext uri="{FF2B5EF4-FFF2-40B4-BE49-F238E27FC236}">
-                <a16:creationId xmlns="" xmlns:a16="http://schemas.microsoft.com/office/drawing/2014/main" id="{4B52A79A-AB1B-41B3-9A6F-0A7F93BA70F8}"/>
+                <a16:creationId xmlns:a16="http://schemas.microsoft.com/office/drawing/2014/main" xmlns="" id="{4B52A79A-AB1B-41B3-9A6F-0A7F93BA70F8}"/>
               </a:ext>
             </a:extLst>
           </p:cNvPr>
@@ -7402,7 +7481,7 @@
           <p:cNvPr id="38" name="Rectangle: Rounded Corners 37">
             <a:extLst>
               <a:ext uri="{FF2B5EF4-FFF2-40B4-BE49-F238E27FC236}">
-                <a16:creationId xmlns="" xmlns:a16="http://schemas.microsoft.com/office/drawing/2014/main" id="{01DBCCA9-6713-48A8-A2EF-4BB8B8CBDA08}"/>
+                <a16:creationId xmlns:a16="http://schemas.microsoft.com/office/drawing/2014/main" xmlns="" id="{01DBCCA9-6713-48A8-A2EF-4BB8B8CBDA08}"/>
               </a:ext>
             </a:extLst>
           </p:cNvPr>
@@ -7458,7 +7537,7 @@
           <p:cNvPr id="42" name="Rectangle 41">
             <a:extLst>
               <a:ext uri="{FF2B5EF4-FFF2-40B4-BE49-F238E27FC236}">
-                <a16:creationId xmlns="" xmlns:a16="http://schemas.microsoft.com/office/drawing/2014/main" id="{2D3041F9-6C27-45E6-89FA-71A8C9AA6C57}"/>
+                <a16:creationId xmlns:a16="http://schemas.microsoft.com/office/drawing/2014/main" xmlns="" id="{2D3041F9-6C27-45E6-89FA-71A8C9AA6C57}"/>
               </a:ext>
             </a:extLst>
           </p:cNvPr>
@@ -7520,7 +7599,7 @@
 </p:sld>
 </file>
 
-<file path=ppt/slides/slide22.xml><?xml version="1.0" encoding="utf-8"?>
+<file path=ppt/slides/slide23.xml><?xml version="1.0" encoding="utf-8"?>
 <p:sld xmlns:a="http://schemas.openxmlformats.org/drawingml/2006/main" xmlns:r="http://schemas.openxmlformats.org/officeDocument/2006/relationships" xmlns:p="http://schemas.openxmlformats.org/presentationml/2006/main">
   <p:cSld>
     <p:spTree>
@@ -7542,7 +7621,7 @@
           <p:cNvPr id="2" name="Oval 1">
             <a:extLst>
               <a:ext uri="{FF2B5EF4-FFF2-40B4-BE49-F238E27FC236}">
-                <a16:creationId xmlns="" xmlns:a16="http://schemas.microsoft.com/office/drawing/2014/main" id="{BB94812E-CB64-4BF8-8336-2BB82264598F}"/>
+                <a16:creationId xmlns:a16="http://schemas.microsoft.com/office/drawing/2014/main" xmlns="" id="{BB94812E-CB64-4BF8-8336-2BB82264598F}"/>
               </a:ext>
             </a:extLst>
           </p:cNvPr>
@@ -7605,7 +7684,7 @@
 </p:sld>
 </file>
 
-<file path=ppt/slides/slide23.xml><?xml version="1.0" encoding="utf-8"?>
+<file path=ppt/slides/slide24.xml><?xml version="1.0" encoding="utf-8"?>
 <p:sld xmlns:a="http://schemas.openxmlformats.org/drawingml/2006/main" xmlns:r="http://schemas.openxmlformats.org/officeDocument/2006/relationships" xmlns:p="http://schemas.openxmlformats.org/presentationml/2006/main">
   <p:cSld>
     <p:spTree>
@@ -7627,7 +7706,7 @@
           <p:cNvPr id="2" name="Oval 1">
             <a:extLst>
               <a:ext uri="{FF2B5EF4-FFF2-40B4-BE49-F238E27FC236}">
-                <a16:creationId xmlns="" xmlns:a16="http://schemas.microsoft.com/office/drawing/2014/main" id="{BB94812E-CB64-4BF8-8336-2BB82264598F}"/>
+                <a16:creationId xmlns:a16="http://schemas.microsoft.com/office/drawing/2014/main" xmlns="" id="{BB94812E-CB64-4BF8-8336-2BB82264598F}"/>
               </a:ext>
             </a:extLst>
           </p:cNvPr>
@@ -7687,7 +7766,7 @@
 </p:sld>
 </file>
 
-<file path=ppt/slides/slide24.xml><?xml version="1.0" encoding="utf-8"?>
+<file path=ppt/slides/slide25.xml><?xml version="1.0" encoding="utf-8"?>
 <p:sld xmlns:a="http://schemas.openxmlformats.org/drawingml/2006/main" xmlns:r="http://schemas.openxmlformats.org/officeDocument/2006/relationships" xmlns:p="http://schemas.openxmlformats.org/presentationml/2006/main">
   <p:cSld>
     <p:spTree>
@@ -7709,7 +7788,7 @@
           <p:cNvPr id="8" name="Group 7">
             <a:extLst>
               <a:ext uri="{FF2B5EF4-FFF2-40B4-BE49-F238E27FC236}">
-                <a16:creationId xmlns="" xmlns:a16="http://schemas.microsoft.com/office/drawing/2014/main" id="{2C8FE924-E2A9-4FCF-AB10-4849252056CE}"/>
+                <a16:creationId xmlns:a16="http://schemas.microsoft.com/office/drawing/2014/main" xmlns="" id="{2C8FE924-E2A9-4FCF-AB10-4849252056CE}"/>
               </a:ext>
             </a:extLst>
           </p:cNvPr>
@@ -7729,7 +7808,7 @@
             <p:cNvPr id="2" name="Rectangle: Rounded Corners 1">
               <a:extLst>
                 <a:ext uri="{FF2B5EF4-FFF2-40B4-BE49-F238E27FC236}">
-                  <a16:creationId xmlns="" xmlns:a16="http://schemas.microsoft.com/office/drawing/2014/main" id="{41D21A81-62EB-45C0-959F-1C72D436A1ED}"/>
+                  <a16:creationId xmlns:a16="http://schemas.microsoft.com/office/drawing/2014/main" xmlns="" id="{41D21A81-62EB-45C0-959F-1C72D436A1ED}"/>
                 </a:ext>
               </a:extLst>
             </p:cNvPr>
@@ -7790,7 +7869,7 @@
             <p:cNvPr id="5" name="Rectangle: Top Corners Rounded 4">
               <a:extLst>
                 <a:ext uri="{FF2B5EF4-FFF2-40B4-BE49-F238E27FC236}">
-                  <a16:creationId xmlns="" xmlns:a16="http://schemas.microsoft.com/office/drawing/2014/main" id="{69AF57CF-2B55-4711-9CF7-242A6509C0C2}"/>
+                  <a16:creationId xmlns:a16="http://schemas.microsoft.com/office/drawing/2014/main" xmlns="" id="{69AF57CF-2B55-4711-9CF7-242A6509C0C2}"/>
                 </a:ext>
               </a:extLst>
             </p:cNvPr>
@@ -7845,7 +7924,7 @@
             <p:cNvPr id="6" name="Rectangle: Top Corners Rounded 5">
               <a:extLst>
                 <a:ext uri="{FF2B5EF4-FFF2-40B4-BE49-F238E27FC236}">
-                  <a16:creationId xmlns="" xmlns:a16="http://schemas.microsoft.com/office/drawing/2014/main" id="{5F370DD8-8227-4CDB-BA60-B8D18EEF3950}"/>
+                  <a16:creationId xmlns:a16="http://schemas.microsoft.com/office/drawing/2014/main" xmlns="" id="{5F370DD8-8227-4CDB-BA60-B8D18EEF3950}"/>
                 </a:ext>
               </a:extLst>
             </p:cNvPr>
@@ -7909,7 +7988,7 @@
 </p:sld>
 </file>
 
-<file path=ppt/slides/slide25.xml><?xml version="1.0" encoding="utf-8"?>
+<file path=ppt/slides/slide26.xml><?xml version="1.0" encoding="utf-8"?>
 <p:sld xmlns:a="http://schemas.openxmlformats.org/drawingml/2006/main" xmlns:r="http://schemas.openxmlformats.org/officeDocument/2006/relationships" xmlns:p="http://schemas.openxmlformats.org/presentationml/2006/main">
   <p:cSld>
     <p:spTree>
@@ -7931,7 +8010,7 @@
           <p:cNvPr id="8" name="Group 7">
             <a:extLst>
               <a:ext uri="{FF2B5EF4-FFF2-40B4-BE49-F238E27FC236}">
-                <a16:creationId xmlns="" xmlns:a16="http://schemas.microsoft.com/office/drawing/2014/main" id="{2C8FE924-E2A9-4FCF-AB10-4849252056CE}"/>
+                <a16:creationId xmlns:a16="http://schemas.microsoft.com/office/drawing/2014/main" xmlns="" id="{2C8FE924-E2A9-4FCF-AB10-4849252056CE}"/>
               </a:ext>
             </a:extLst>
           </p:cNvPr>
@@ -7951,7 +8030,7 @@
             <p:cNvPr id="2" name="Rectangle: Rounded Corners 1">
               <a:extLst>
                 <a:ext uri="{FF2B5EF4-FFF2-40B4-BE49-F238E27FC236}">
-                  <a16:creationId xmlns="" xmlns:a16="http://schemas.microsoft.com/office/drawing/2014/main" id="{41D21A81-62EB-45C0-959F-1C72D436A1ED}"/>
+                  <a16:creationId xmlns:a16="http://schemas.microsoft.com/office/drawing/2014/main" xmlns="" id="{41D21A81-62EB-45C0-959F-1C72D436A1ED}"/>
                 </a:ext>
               </a:extLst>
             </p:cNvPr>
@@ -8012,7 +8091,7 @@
             <p:cNvPr id="5" name="Rectangle: Top Corners Rounded 4">
               <a:extLst>
                 <a:ext uri="{FF2B5EF4-FFF2-40B4-BE49-F238E27FC236}">
-                  <a16:creationId xmlns="" xmlns:a16="http://schemas.microsoft.com/office/drawing/2014/main" id="{69AF57CF-2B55-4711-9CF7-242A6509C0C2}"/>
+                  <a16:creationId xmlns:a16="http://schemas.microsoft.com/office/drawing/2014/main" xmlns="" id="{69AF57CF-2B55-4711-9CF7-242A6509C0C2}"/>
                 </a:ext>
               </a:extLst>
             </p:cNvPr>
@@ -8083,7 +8162,7 @@
 </p:sld>
 </file>
 
-<file path=ppt/slides/slide26.xml><?xml version="1.0" encoding="utf-8"?>
+<file path=ppt/slides/slide27.xml><?xml version="1.0" encoding="utf-8"?>
 <p:sld xmlns:a="http://schemas.openxmlformats.org/drawingml/2006/main" xmlns:r="http://schemas.openxmlformats.org/officeDocument/2006/relationships" xmlns:p="http://schemas.openxmlformats.org/presentationml/2006/main">
   <p:cSld>
     <p:spTree>
@@ -8105,7 +8184,7 @@
           <p:cNvPr id="3" name="&quot;Not Allowed&quot; Symbol 2">
             <a:extLst>
               <a:ext uri="{FF2B5EF4-FFF2-40B4-BE49-F238E27FC236}">
-                <a16:creationId xmlns="" xmlns:a16="http://schemas.microsoft.com/office/drawing/2014/main" id="{364F1BE9-BD04-4A76-AFFF-4454208BA134}"/>
+                <a16:creationId xmlns:a16="http://schemas.microsoft.com/office/drawing/2014/main" xmlns="" id="{364F1BE9-BD04-4A76-AFFF-4454208BA134}"/>
               </a:ext>
             </a:extLst>
           </p:cNvPr>
@@ -8178,7 +8257,7 @@
 </p:sld>
 </file>
 
-<file path=ppt/slides/slide27.xml><?xml version="1.0" encoding="utf-8"?>
+<file path=ppt/slides/slide28.xml><?xml version="1.0" encoding="utf-8"?>
 <p:sld xmlns:a="http://schemas.openxmlformats.org/drawingml/2006/main" xmlns:r="http://schemas.openxmlformats.org/officeDocument/2006/relationships" xmlns:p="http://schemas.openxmlformats.org/presentationml/2006/main">
   <p:cSld>
     <p:spTree>
@@ -8200,7 +8279,7 @@
           <p:cNvPr id="3" name="L-Shape 2">
             <a:extLst>
               <a:ext uri="{FF2B5EF4-FFF2-40B4-BE49-F238E27FC236}">
-                <a16:creationId xmlns="" xmlns:a16="http://schemas.microsoft.com/office/drawing/2014/main" id="{4B6D5B79-FD53-4056-ADE3-1F8B0D882ECD}"/>
+                <a16:creationId xmlns:a16="http://schemas.microsoft.com/office/drawing/2014/main" xmlns="" id="{4B6D5B79-FD53-4056-ADE3-1F8B0D882ECD}"/>
               </a:ext>
             </a:extLst>
           </p:cNvPr>
@@ -8259,7 +8338,7 @@
           <p:cNvPr id="6" name="L-Shape 5">
             <a:extLst>
               <a:ext uri="{FF2B5EF4-FFF2-40B4-BE49-F238E27FC236}">
-                <a16:creationId xmlns="" xmlns:a16="http://schemas.microsoft.com/office/drawing/2014/main" id="{3F952716-7333-4F4A-A914-00948134503E}"/>
+                <a16:creationId xmlns:a16="http://schemas.microsoft.com/office/drawing/2014/main" xmlns="" id="{3F952716-7333-4F4A-A914-00948134503E}"/>
               </a:ext>
             </a:extLst>
           </p:cNvPr>
@@ -8318,7 +8397,7 @@
           <p:cNvPr id="7" name="L-Shape 6">
             <a:extLst>
               <a:ext uri="{FF2B5EF4-FFF2-40B4-BE49-F238E27FC236}">
-                <a16:creationId xmlns="" xmlns:a16="http://schemas.microsoft.com/office/drawing/2014/main" id="{887C30F7-ED54-41BA-9C34-79A1112E22C6}"/>
+                <a16:creationId xmlns:a16="http://schemas.microsoft.com/office/drawing/2014/main" xmlns="" id="{887C30F7-ED54-41BA-9C34-79A1112E22C6}"/>
               </a:ext>
             </a:extLst>
           </p:cNvPr>
@@ -8377,7 +8456,7 @@
           <p:cNvPr id="8" name="L-Shape 7">
             <a:extLst>
               <a:ext uri="{FF2B5EF4-FFF2-40B4-BE49-F238E27FC236}">
-                <a16:creationId xmlns="" xmlns:a16="http://schemas.microsoft.com/office/drawing/2014/main" id="{A18D6D78-3055-4CF7-A993-4219F0F334C4}"/>
+                <a16:creationId xmlns:a16="http://schemas.microsoft.com/office/drawing/2014/main" xmlns="" id="{A18D6D78-3055-4CF7-A993-4219F0F334C4}"/>
               </a:ext>
             </a:extLst>
           </p:cNvPr>
@@ -8444,7 +8523,7 @@
 </p:sld>
 </file>
 
-<file path=ppt/slides/slide28.xml><?xml version="1.0" encoding="utf-8"?>
+<file path=ppt/slides/slide29.xml><?xml version="1.0" encoding="utf-8"?>
 <p:sld xmlns:a="http://schemas.openxmlformats.org/drawingml/2006/main" xmlns:r="http://schemas.openxmlformats.org/officeDocument/2006/relationships" xmlns:p="http://schemas.openxmlformats.org/presentationml/2006/main">
   <p:cSld>
     <p:spTree>
@@ -8466,7 +8545,7 @@
           <p:cNvPr id="8" name="Group 7">
             <a:extLst>
               <a:ext uri="{FF2B5EF4-FFF2-40B4-BE49-F238E27FC236}">
-                <a16:creationId xmlns="" xmlns:a16="http://schemas.microsoft.com/office/drawing/2014/main" id="{2C8FE924-E2A9-4FCF-AB10-4849252056CE}"/>
+                <a16:creationId xmlns:a16="http://schemas.microsoft.com/office/drawing/2014/main" xmlns="" id="{2C8FE924-E2A9-4FCF-AB10-4849252056CE}"/>
               </a:ext>
             </a:extLst>
           </p:cNvPr>
@@ -8486,7 +8565,7 @@
             <p:cNvPr id="2" name="Rectangle: Rounded Corners 1">
               <a:extLst>
                 <a:ext uri="{FF2B5EF4-FFF2-40B4-BE49-F238E27FC236}">
-                  <a16:creationId xmlns="" xmlns:a16="http://schemas.microsoft.com/office/drawing/2014/main" id="{41D21A81-62EB-45C0-959F-1C72D436A1ED}"/>
+                  <a16:creationId xmlns:a16="http://schemas.microsoft.com/office/drawing/2014/main" xmlns="" id="{41D21A81-62EB-45C0-959F-1C72D436A1ED}"/>
                 </a:ext>
               </a:extLst>
             </p:cNvPr>
@@ -8549,7 +8628,7 @@
             <p:cNvPr id="5" name="Rectangle: Top Corners Rounded 4">
               <a:extLst>
                 <a:ext uri="{FF2B5EF4-FFF2-40B4-BE49-F238E27FC236}">
-                  <a16:creationId xmlns="" xmlns:a16="http://schemas.microsoft.com/office/drawing/2014/main" id="{69AF57CF-2B55-4711-9CF7-242A6509C0C2}"/>
+                  <a16:creationId xmlns:a16="http://schemas.microsoft.com/office/drawing/2014/main" xmlns="" id="{69AF57CF-2B55-4711-9CF7-242A6509C0C2}"/>
                 </a:ext>
               </a:extLst>
             </p:cNvPr>
@@ -8604,7 +8683,7 @@
             <p:cNvPr id="6" name="Rectangle: Top Corners Rounded 5">
               <a:extLst>
                 <a:ext uri="{FF2B5EF4-FFF2-40B4-BE49-F238E27FC236}">
-                  <a16:creationId xmlns="" xmlns:a16="http://schemas.microsoft.com/office/drawing/2014/main" id="{5F370DD8-8227-4CDB-BA60-B8D18EEF3950}"/>
+                  <a16:creationId xmlns:a16="http://schemas.microsoft.com/office/drawing/2014/main" xmlns="" id="{5F370DD8-8227-4CDB-BA60-B8D18EEF3950}"/>
                 </a:ext>
               </a:extLst>
             </p:cNvPr>
@@ -8663,7 +8742,7 @@
           <p:cNvPr id="7" name="Group 6">
             <a:extLst>
               <a:ext uri="{FF2B5EF4-FFF2-40B4-BE49-F238E27FC236}">
-                <a16:creationId xmlns="" xmlns:a16="http://schemas.microsoft.com/office/drawing/2014/main" id="{AC3B8550-1AC4-4F80-8A05-11713579488F}"/>
+                <a16:creationId xmlns:a16="http://schemas.microsoft.com/office/drawing/2014/main" xmlns="" id="{AC3B8550-1AC4-4F80-8A05-11713579488F}"/>
               </a:ext>
             </a:extLst>
           </p:cNvPr>
@@ -8683,7 +8762,7 @@
             <p:cNvPr id="9" name="Rectangle: Rounded Corners 8">
               <a:extLst>
                 <a:ext uri="{FF2B5EF4-FFF2-40B4-BE49-F238E27FC236}">
-                  <a16:creationId xmlns="" xmlns:a16="http://schemas.microsoft.com/office/drawing/2014/main" id="{6FB75456-3298-444E-AC32-7AB754F66F90}"/>
+                  <a16:creationId xmlns:a16="http://schemas.microsoft.com/office/drawing/2014/main" xmlns="" id="{6FB75456-3298-444E-AC32-7AB754F66F90}"/>
                 </a:ext>
               </a:extLst>
             </p:cNvPr>
@@ -8746,7 +8825,7 @@
             <p:cNvPr id="10" name="Rectangle: Top Corners Rounded 9">
               <a:extLst>
                 <a:ext uri="{FF2B5EF4-FFF2-40B4-BE49-F238E27FC236}">
-                  <a16:creationId xmlns="" xmlns:a16="http://schemas.microsoft.com/office/drawing/2014/main" id="{7F5F5DFB-946A-440C-8D40-96AB03B69404}"/>
+                  <a16:creationId xmlns:a16="http://schemas.microsoft.com/office/drawing/2014/main" xmlns="" id="{7F5F5DFB-946A-440C-8D40-96AB03B69404}"/>
                 </a:ext>
               </a:extLst>
             </p:cNvPr>
@@ -8817,7 +8896,99 @@
 </p:sld>
 </file>
 
-<file path=ppt/slides/slide29.xml><?xml version="1.0" encoding="utf-8"?>
+<file path=ppt/slides/slide3.xml><?xml version="1.0" encoding="utf-8"?>
+<p:sld xmlns:a="http://schemas.openxmlformats.org/drawingml/2006/main" xmlns:r="http://schemas.openxmlformats.org/officeDocument/2006/relationships" xmlns:p="http://schemas.openxmlformats.org/presentationml/2006/main">
+  <p:cSld>
+    <p:spTree>
+      <p:nvGrpSpPr>
+        <p:cNvPr id="1" name=""/>
+        <p:cNvGrpSpPr/>
+        <p:nvPr/>
+      </p:nvGrpSpPr>
+      <p:grpSpPr>
+        <a:xfrm>
+          <a:off x="0" y="0"/>
+          <a:ext cx="0" cy="0"/>
+          <a:chOff x="0" y="0"/>
+          <a:chExt cx="0" cy="0"/>
+        </a:xfrm>
+      </p:grpSpPr>
+      <p:sp>
+        <p:nvSpPr>
+          <p:cNvPr id="3" name="Rounded Rectangle 2"/>
+          <p:cNvSpPr/>
+          <p:nvPr/>
+        </p:nvSpPr>
+        <p:spPr>
+          <a:xfrm>
+            <a:off x="3851910" y="2708910"/>
+            <a:ext cx="1440180" cy="1440180"/>
+          </a:xfrm>
+          <a:prstGeom prst="roundRect">
+            <a:avLst>
+              <a:gd name="adj" fmla="val 47189"/>
+            </a:avLst>
+          </a:prstGeom>
+          <a:solidFill>
+            <a:schemeClr val="bg1"/>
+          </a:solidFill>
+          <a:ln>
+            <a:noFill/>
+          </a:ln>
+          <a:effectLst>
+            <a:outerShdw blurRad="50800" dist="38100" dir="5400000" algn="t" rotWithShape="0">
+              <a:prstClr val="black">
+                <a:alpha val="40000"/>
+              </a:prstClr>
+            </a:outerShdw>
+          </a:effectLst>
+        </p:spPr>
+        <p:style>
+          <a:lnRef idx="2">
+            <a:schemeClr val="accent1">
+              <a:shade val="50000"/>
+            </a:schemeClr>
+          </a:lnRef>
+          <a:fillRef idx="1">
+            <a:schemeClr val="accent1"/>
+          </a:fillRef>
+          <a:effectRef idx="0">
+            <a:schemeClr val="accent1"/>
+          </a:effectRef>
+          <a:fontRef idx="minor">
+            <a:schemeClr val="lt1"/>
+          </a:fontRef>
+        </p:style>
+        <p:txBody>
+          <a:bodyPr rtlCol="0" anchor="ctr"/>
+          <a:lstStyle/>
+          <a:p>
+            <a:pPr algn="ctr"/>
+            <a:endParaRPr lang="en-IN"/>
+          </a:p>
+        </p:txBody>
+      </p:sp>
+    </p:spTree>
+    <p:extLst>
+      <p:ext uri="{BB962C8B-B14F-4D97-AF65-F5344CB8AC3E}">
+        <p14:creationId xmlns:p14="http://schemas.microsoft.com/office/powerpoint/2010/main" val="265401467"/>
+      </p:ext>
+    </p:extLst>
+  </p:cSld>
+  <p:clrMapOvr>
+    <a:masterClrMapping/>
+  </p:clrMapOvr>
+  <p:timing>
+    <p:tnLst>
+      <p:par>
+        <p:cTn id="1" dur="indefinite" restart="never" nodeType="tmRoot"/>
+      </p:par>
+    </p:tnLst>
+  </p:timing>
+</p:sld>
+</file>
+
+<file path=ppt/slides/slide30.xml><?xml version="1.0" encoding="utf-8"?>
 <p:sld xmlns:a="http://schemas.openxmlformats.org/drawingml/2006/main" xmlns:r="http://schemas.openxmlformats.org/officeDocument/2006/relationships" xmlns:p="http://schemas.openxmlformats.org/presentationml/2006/main">
   <p:cSld>
     <p:spTree>
@@ -8839,7 +9010,7 @@
           <p:cNvPr id="5" name="Oval 4">
             <a:extLst>
               <a:ext uri="{FF2B5EF4-FFF2-40B4-BE49-F238E27FC236}">
-                <a16:creationId xmlns="" xmlns:a16="http://schemas.microsoft.com/office/drawing/2014/main" id="{5CE85C29-C9E0-4DC2-9692-A83A4E8ECB26}"/>
+                <a16:creationId xmlns:a16="http://schemas.microsoft.com/office/drawing/2014/main" xmlns="" id="{5CE85C29-C9E0-4DC2-9692-A83A4E8ECB26}"/>
               </a:ext>
             </a:extLst>
           </p:cNvPr>
@@ -8908,7 +9079,7 @@
           <p:cNvPr id="3" name="Block Arc 2">
             <a:extLst>
               <a:ext uri="{FF2B5EF4-FFF2-40B4-BE49-F238E27FC236}">
-                <a16:creationId xmlns="" xmlns:a16="http://schemas.microsoft.com/office/drawing/2014/main" id="{55727453-48C0-4248-AC8F-2458A300A257}"/>
+                <a16:creationId xmlns:a16="http://schemas.microsoft.com/office/drawing/2014/main" xmlns="" id="{55727453-48C0-4248-AC8F-2458A300A257}"/>
               </a:ext>
             </a:extLst>
           </p:cNvPr>
@@ -8975,7 +9146,7 @@
           <p:cNvPr id="10" name="Block Arc 9">
             <a:extLst>
               <a:ext uri="{FF2B5EF4-FFF2-40B4-BE49-F238E27FC236}">
-                <a16:creationId xmlns="" xmlns:a16="http://schemas.microsoft.com/office/drawing/2014/main" id="{22EF910F-387C-4573-AA1C-23739886E288}"/>
+                <a16:creationId xmlns:a16="http://schemas.microsoft.com/office/drawing/2014/main" xmlns="" id="{22EF910F-387C-4573-AA1C-23739886E288}"/>
               </a:ext>
             </a:extLst>
           </p:cNvPr>
@@ -9042,7 +9213,7 @@
           <p:cNvPr id="11" name="Block Arc 10">
             <a:extLst>
               <a:ext uri="{FF2B5EF4-FFF2-40B4-BE49-F238E27FC236}">
-                <a16:creationId xmlns="" xmlns:a16="http://schemas.microsoft.com/office/drawing/2014/main" id="{FCECEC34-98B0-40FE-913A-5B8191258157}"/>
+                <a16:creationId xmlns:a16="http://schemas.microsoft.com/office/drawing/2014/main" xmlns="" id="{FCECEC34-98B0-40FE-913A-5B8191258157}"/>
               </a:ext>
             </a:extLst>
           </p:cNvPr>
@@ -9117,637 +9288,7 @@
 </p:sld>
 </file>
 
-<file path=ppt/slides/slide3.xml><?xml version="1.0" encoding="utf-8"?>
-<p:sld xmlns:a="http://schemas.openxmlformats.org/drawingml/2006/main" xmlns:r="http://schemas.openxmlformats.org/officeDocument/2006/relationships" xmlns:p="http://schemas.openxmlformats.org/presentationml/2006/main">
-  <p:cSld>
-    <p:spTree>
-      <p:nvGrpSpPr>
-        <p:cNvPr id="1" name=""/>
-        <p:cNvGrpSpPr/>
-        <p:nvPr/>
-      </p:nvGrpSpPr>
-      <p:grpSpPr>
-        <a:xfrm>
-          <a:off x="0" y="0"/>
-          <a:ext cx="0" cy="0"/>
-          <a:chOff x="0" y="0"/>
-          <a:chExt cx="0" cy="0"/>
-        </a:xfrm>
-      </p:grpSpPr>
-      <p:sp>
-        <p:nvSpPr>
-          <p:cNvPr id="6" name="Rounded Rectangle 5"/>
-          <p:cNvSpPr/>
-          <p:nvPr/>
-        </p:nvSpPr>
-        <p:spPr>
-          <a:xfrm>
-            <a:off x="4031931" y="3518024"/>
-            <a:ext cx="1080136" cy="2804637"/>
-          </a:xfrm>
-          <a:custGeom>
-            <a:avLst/>
-            <a:gdLst>
-              <a:gd name="connsiteX0" fmla="*/ 0 w 1080135"/>
-              <a:gd name="connsiteY0" fmla="*/ 540068 h 2796540"/>
-              <a:gd name="connsiteX1" fmla="*/ 540068 w 1080135"/>
-              <a:gd name="connsiteY1" fmla="*/ 0 h 2796540"/>
-              <a:gd name="connsiteX2" fmla="*/ 540068 w 1080135"/>
-              <a:gd name="connsiteY2" fmla="*/ 0 h 2796540"/>
-              <a:gd name="connsiteX3" fmla="*/ 1080136 w 1080135"/>
-              <a:gd name="connsiteY3" fmla="*/ 540068 h 2796540"/>
-              <a:gd name="connsiteX4" fmla="*/ 1080135 w 1080135"/>
-              <a:gd name="connsiteY4" fmla="*/ 2256473 h 2796540"/>
-              <a:gd name="connsiteX5" fmla="*/ 540067 w 1080135"/>
-              <a:gd name="connsiteY5" fmla="*/ 2796541 h 2796540"/>
-              <a:gd name="connsiteX6" fmla="*/ 540068 w 1080135"/>
-              <a:gd name="connsiteY6" fmla="*/ 2796540 h 2796540"/>
-              <a:gd name="connsiteX7" fmla="*/ 0 w 1080135"/>
-              <a:gd name="connsiteY7" fmla="*/ 2256472 h 2796540"/>
-              <a:gd name="connsiteX8" fmla="*/ 0 w 1080135"/>
-              <a:gd name="connsiteY8" fmla="*/ 540068 h 2796540"/>
-              <a:gd name="connsiteX0" fmla="*/ 540068 w 1080136"/>
-              <a:gd name="connsiteY0" fmla="*/ 2796540 h 2887980"/>
-              <a:gd name="connsiteX1" fmla="*/ 0 w 1080136"/>
-              <a:gd name="connsiteY1" fmla="*/ 2256472 h 2887980"/>
-              <a:gd name="connsiteX2" fmla="*/ 0 w 1080136"/>
-              <a:gd name="connsiteY2" fmla="*/ 540068 h 2887980"/>
-              <a:gd name="connsiteX3" fmla="*/ 540068 w 1080136"/>
-              <a:gd name="connsiteY3" fmla="*/ 0 h 2887980"/>
-              <a:gd name="connsiteX4" fmla="*/ 540068 w 1080136"/>
-              <a:gd name="connsiteY4" fmla="*/ 0 h 2887980"/>
-              <a:gd name="connsiteX5" fmla="*/ 1080136 w 1080136"/>
-              <a:gd name="connsiteY5" fmla="*/ 540068 h 2887980"/>
-              <a:gd name="connsiteX6" fmla="*/ 1080135 w 1080136"/>
-              <a:gd name="connsiteY6" fmla="*/ 2256473 h 2887980"/>
-              <a:gd name="connsiteX7" fmla="*/ 540067 w 1080136"/>
-              <a:gd name="connsiteY7" fmla="*/ 2796541 h 2887980"/>
-              <a:gd name="connsiteX8" fmla="*/ 631508 w 1080136"/>
-              <a:gd name="connsiteY8" fmla="*/ 2887980 h 2887980"/>
-              <a:gd name="connsiteX0" fmla="*/ 540068 w 1080136"/>
-              <a:gd name="connsiteY0" fmla="*/ 2796540 h 2796541"/>
-              <a:gd name="connsiteX1" fmla="*/ 0 w 1080136"/>
-              <a:gd name="connsiteY1" fmla="*/ 2256472 h 2796541"/>
-              <a:gd name="connsiteX2" fmla="*/ 0 w 1080136"/>
-              <a:gd name="connsiteY2" fmla="*/ 540068 h 2796541"/>
-              <a:gd name="connsiteX3" fmla="*/ 540068 w 1080136"/>
-              <a:gd name="connsiteY3" fmla="*/ 0 h 2796541"/>
-              <a:gd name="connsiteX4" fmla="*/ 540068 w 1080136"/>
-              <a:gd name="connsiteY4" fmla="*/ 0 h 2796541"/>
-              <a:gd name="connsiteX5" fmla="*/ 1080136 w 1080136"/>
-              <a:gd name="connsiteY5" fmla="*/ 540068 h 2796541"/>
-              <a:gd name="connsiteX6" fmla="*/ 1080135 w 1080136"/>
-              <a:gd name="connsiteY6" fmla="*/ 2256473 h 2796541"/>
-              <a:gd name="connsiteX7" fmla="*/ 540067 w 1080136"/>
-              <a:gd name="connsiteY7" fmla="*/ 2796541 h 2796541"/>
-              <a:gd name="connsiteX0" fmla="*/ 540068 w 1080136"/>
-              <a:gd name="connsiteY0" fmla="*/ 2796540 h 2796540"/>
-              <a:gd name="connsiteX1" fmla="*/ 0 w 1080136"/>
-              <a:gd name="connsiteY1" fmla="*/ 2256472 h 2796540"/>
-              <a:gd name="connsiteX2" fmla="*/ 0 w 1080136"/>
-              <a:gd name="connsiteY2" fmla="*/ 540068 h 2796540"/>
-              <a:gd name="connsiteX3" fmla="*/ 540068 w 1080136"/>
-              <a:gd name="connsiteY3" fmla="*/ 0 h 2796540"/>
-              <a:gd name="connsiteX4" fmla="*/ 540068 w 1080136"/>
-              <a:gd name="connsiteY4" fmla="*/ 0 h 2796540"/>
-              <a:gd name="connsiteX5" fmla="*/ 1080136 w 1080136"/>
-              <a:gd name="connsiteY5" fmla="*/ 540068 h 2796540"/>
-              <a:gd name="connsiteX6" fmla="*/ 1080135 w 1080136"/>
-              <a:gd name="connsiteY6" fmla="*/ 2256473 h 2796540"/>
-              <a:gd name="connsiteX0" fmla="*/ 0 w 1080136"/>
-              <a:gd name="connsiteY0" fmla="*/ 2256472 h 2256473"/>
-              <a:gd name="connsiteX1" fmla="*/ 0 w 1080136"/>
-              <a:gd name="connsiteY1" fmla="*/ 540068 h 2256473"/>
-              <a:gd name="connsiteX2" fmla="*/ 540068 w 1080136"/>
-              <a:gd name="connsiteY2" fmla="*/ 0 h 2256473"/>
-              <a:gd name="connsiteX3" fmla="*/ 540068 w 1080136"/>
-              <a:gd name="connsiteY3" fmla="*/ 0 h 2256473"/>
-              <a:gd name="connsiteX4" fmla="*/ 1080136 w 1080136"/>
-              <a:gd name="connsiteY4" fmla="*/ 540068 h 2256473"/>
-              <a:gd name="connsiteX5" fmla="*/ 1080135 w 1080136"/>
-              <a:gd name="connsiteY5" fmla="*/ 2256473 h 2256473"/>
-              <a:gd name="connsiteX0" fmla="*/ 0 w 1080136"/>
-              <a:gd name="connsiteY0" fmla="*/ 2487949 h 2487949"/>
-              <a:gd name="connsiteX1" fmla="*/ 0 w 1080136"/>
-              <a:gd name="connsiteY1" fmla="*/ 540068 h 2487949"/>
-              <a:gd name="connsiteX2" fmla="*/ 540068 w 1080136"/>
-              <a:gd name="connsiteY2" fmla="*/ 0 h 2487949"/>
-              <a:gd name="connsiteX3" fmla="*/ 540068 w 1080136"/>
-              <a:gd name="connsiteY3" fmla="*/ 0 h 2487949"/>
-              <a:gd name="connsiteX4" fmla="*/ 1080136 w 1080136"/>
-              <a:gd name="connsiteY4" fmla="*/ 540068 h 2487949"/>
-              <a:gd name="connsiteX5" fmla="*/ 1080135 w 1080136"/>
-              <a:gd name="connsiteY5" fmla="*/ 2256473 h 2487949"/>
-              <a:gd name="connsiteX0" fmla="*/ 0 w 1080136"/>
-              <a:gd name="connsiteY0" fmla="*/ 2487949 h 2493596"/>
-              <a:gd name="connsiteX1" fmla="*/ 0 w 1080136"/>
-              <a:gd name="connsiteY1" fmla="*/ 540068 h 2493596"/>
-              <a:gd name="connsiteX2" fmla="*/ 540068 w 1080136"/>
-              <a:gd name="connsiteY2" fmla="*/ 0 h 2493596"/>
-              <a:gd name="connsiteX3" fmla="*/ 540068 w 1080136"/>
-              <a:gd name="connsiteY3" fmla="*/ 0 h 2493596"/>
-              <a:gd name="connsiteX4" fmla="*/ 1080136 w 1080136"/>
-              <a:gd name="connsiteY4" fmla="*/ 540068 h 2493596"/>
-              <a:gd name="connsiteX5" fmla="*/ 1076960 w 1080136"/>
-              <a:gd name="connsiteY5" fmla="*/ 2493596 h 2493596"/>
-            </a:gdLst>
-            <a:ahLst/>
-            <a:cxnLst>
-              <a:cxn ang="0">
-                <a:pos x="connsiteX0" y="connsiteY0"/>
-              </a:cxn>
-              <a:cxn ang="0">
-                <a:pos x="connsiteX1" y="connsiteY1"/>
-              </a:cxn>
-              <a:cxn ang="0">
-                <a:pos x="connsiteX2" y="connsiteY2"/>
-              </a:cxn>
-              <a:cxn ang="0">
-                <a:pos x="connsiteX3" y="connsiteY3"/>
-              </a:cxn>
-              <a:cxn ang="0">
-                <a:pos x="connsiteX4" y="connsiteY4"/>
-              </a:cxn>
-              <a:cxn ang="0">
-                <a:pos x="connsiteX5" y="connsiteY5"/>
-              </a:cxn>
-            </a:cxnLst>
-            <a:rect l="l" t="t" r="r" b="b"/>
-            <a:pathLst>
-              <a:path w="1080136" h="2493596">
-                <a:moveTo>
-                  <a:pt x="0" y="2487949"/>
-                </a:moveTo>
-                <a:lnTo>
-                  <a:pt x="0" y="540068"/>
-                </a:lnTo>
-                <a:cubicBezTo>
-                  <a:pt x="0" y="241797"/>
-                  <a:pt x="241797" y="0"/>
-                  <a:pt x="540068" y="0"/>
-                </a:cubicBezTo>
-                <a:lnTo>
-                  <a:pt x="540068" y="0"/>
-                </a:lnTo>
-                <a:cubicBezTo>
-                  <a:pt x="838339" y="0"/>
-                  <a:pt x="1080136" y="241797"/>
-                  <a:pt x="1080136" y="540068"/>
-                </a:cubicBezTo>
-                <a:cubicBezTo>
-                  <a:pt x="1080136" y="1112203"/>
-                  <a:pt x="1076960" y="1921461"/>
-                  <a:pt x="1076960" y="2493596"/>
-                </a:cubicBezTo>
-              </a:path>
-            </a:pathLst>
-          </a:custGeom>
-          <a:noFill/>
-          <a:ln w="190500">
-            <a:solidFill>
-              <a:schemeClr val="bg1"/>
-            </a:solidFill>
-          </a:ln>
-        </p:spPr>
-        <p:style>
-          <a:lnRef idx="2">
-            <a:schemeClr val="accent1">
-              <a:shade val="50000"/>
-            </a:schemeClr>
-          </a:lnRef>
-          <a:fillRef idx="1">
-            <a:schemeClr val="accent1"/>
-          </a:fillRef>
-          <a:effectRef idx="0">
-            <a:schemeClr val="accent1"/>
-          </a:effectRef>
-          <a:fontRef idx="minor">
-            <a:schemeClr val="lt1"/>
-          </a:fontRef>
-        </p:style>
-        <p:txBody>
-          <a:bodyPr rtlCol="0" anchor="ctr"/>
-          <a:lstStyle/>
-          <a:p>
-            <a:pPr algn="ctr"/>
-            <a:endParaRPr lang="en-IN"/>
-          </a:p>
-        </p:txBody>
-      </p:sp>
-      <p:sp>
-        <p:nvSpPr>
-          <p:cNvPr id="7" name="Rounded Rectangle 6"/>
-          <p:cNvSpPr/>
-          <p:nvPr/>
-        </p:nvSpPr>
-        <p:spPr>
-          <a:xfrm>
-            <a:off x="4251324" y="3763609"/>
-            <a:ext cx="641350" cy="612775"/>
-          </a:xfrm>
-          <a:custGeom>
-            <a:avLst/>
-            <a:gdLst>
-              <a:gd name="connsiteX0" fmla="*/ 0 w 641350"/>
-              <a:gd name="connsiteY0" fmla="*/ 320675 h 933450"/>
-              <a:gd name="connsiteX1" fmla="*/ 320675 w 641350"/>
-              <a:gd name="connsiteY1" fmla="*/ 0 h 933450"/>
-              <a:gd name="connsiteX2" fmla="*/ 320675 w 641350"/>
-              <a:gd name="connsiteY2" fmla="*/ 0 h 933450"/>
-              <a:gd name="connsiteX3" fmla="*/ 641350 w 641350"/>
-              <a:gd name="connsiteY3" fmla="*/ 320675 h 933450"/>
-              <a:gd name="connsiteX4" fmla="*/ 641350 w 641350"/>
-              <a:gd name="connsiteY4" fmla="*/ 612775 h 933450"/>
-              <a:gd name="connsiteX5" fmla="*/ 320675 w 641350"/>
-              <a:gd name="connsiteY5" fmla="*/ 933450 h 933450"/>
-              <a:gd name="connsiteX6" fmla="*/ 320675 w 641350"/>
-              <a:gd name="connsiteY6" fmla="*/ 933450 h 933450"/>
-              <a:gd name="connsiteX7" fmla="*/ 0 w 641350"/>
-              <a:gd name="connsiteY7" fmla="*/ 612775 h 933450"/>
-              <a:gd name="connsiteX8" fmla="*/ 0 w 641350"/>
-              <a:gd name="connsiteY8" fmla="*/ 320675 h 933450"/>
-              <a:gd name="connsiteX0" fmla="*/ 0 w 641350"/>
-              <a:gd name="connsiteY0" fmla="*/ 320675 h 933450"/>
-              <a:gd name="connsiteX1" fmla="*/ 320675 w 641350"/>
-              <a:gd name="connsiteY1" fmla="*/ 0 h 933450"/>
-              <a:gd name="connsiteX2" fmla="*/ 320675 w 641350"/>
-              <a:gd name="connsiteY2" fmla="*/ 0 h 933450"/>
-              <a:gd name="connsiteX3" fmla="*/ 641350 w 641350"/>
-              <a:gd name="connsiteY3" fmla="*/ 320675 h 933450"/>
-              <a:gd name="connsiteX4" fmla="*/ 641350 w 641350"/>
-              <a:gd name="connsiteY4" fmla="*/ 612775 h 933450"/>
-              <a:gd name="connsiteX5" fmla="*/ 320675 w 641350"/>
-              <a:gd name="connsiteY5" fmla="*/ 933450 h 933450"/>
-              <a:gd name="connsiteX6" fmla="*/ 0 w 641350"/>
-              <a:gd name="connsiteY6" fmla="*/ 612775 h 933450"/>
-              <a:gd name="connsiteX7" fmla="*/ 0 w 641350"/>
-              <a:gd name="connsiteY7" fmla="*/ 320675 h 933450"/>
-              <a:gd name="connsiteX0" fmla="*/ 0 w 641350"/>
-              <a:gd name="connsiteY0" fmla="*/ 320675 h 612775"/>
-              <a:gd name="connsiteX1" fmla="*/ 320675 w 641350"/>
-              <a:gd name="connsiteY1" fmla="*/ 0 h 612775"/>
-              <a:gd name="connsiteX2" fmla="*/ 320675 w 641350"/>
-              <a:gd name="connsiteY2" fmla="*/ 0 h 612775"/>
-              <a:gd name="connsiteX3" fmla="*/ 641350 w 641350"/>
-              <a:gd name="connsiteY3" fmla="*/ 320675 h 612775"/>
-              <a:gd name="connsiteX4" fmla="*/ 641350 w 641350"/>
-              <a:gd name="connsiteY4" fmla="*/ 612775 h 612775"/>
-              <a:gd name="connsiteX5" fmla="*/ 0 w 641350"/>
-              <a:gd name="connsiteY5" fmla="*/ 612775 h 612775"/>
-              <a:gd name="connsiteX6" fmla="*/ 0 w 641350"/>
-              <a:gd name="connsiteY6" fmla="*/ 320675 h 612775"/>
-            </a:gdLst>
-            <a:ahLst/>
-            <a:cxnLst>
-              <a:cxn ang="0">
-                <a:pos x="connsiteX0" y="connsiteY0"/>
-              </a:cxn>
-              <a:cxn ang="0">
-                <a:pos x="connsiteX1" y="connsiteY1"/>
-              </a:cxn>
-              <a:cxn ang="0">
-                <a:pos x="connsiteX2" y="connsiteY2"/>
-              </a:cxn>
-              <a:cxn ang="0">
-                <a:pos x="connsiteX3" y="connsiteY3"/>
-              </a:cxn>
-              <a:cxn ang="0">
-                <a:pos x="connsiteX4" y="connsiteY4"/>
-              </a:cxn>
-              <a:cxn ang="0">
-                <a:pos x="connsiteX5" y="connsiteY5"/>
-              </a:cxn>
-              <a:cxn ang="0">
-                <a:pos x="connsiteX6" y="connsiteY6"/>
-              </a:cxn>
-            </a:cxnLst>
-            <a:rect l="l" t="t" r="r" b="b"/>
-            <a:pathLst>
-              <a:path w="641350" h="612775">
-                <a:moveTo>
-                  <a:pt x="0" y="320675"/>
-                </a:moveTo>
-                <a:cubicBezTo>
-                  <a:pt x="0" y="143571"/>
-                  <a:pt x="143571" y="0"/>
-                  <a:pt x="320675" y="0"/>
-                </a:cubicBezTo>
-                <a:lnTo>
-                  <a:pt x="320675" y="0"/>
-                </a:lnTo>
-                <a:cubicBezTo>
-                  <a:pt x="497779" y="0"/>
-                  <a:pt x="641350" y="143571"/>
-                  <a:pt x="641350" y="320675"/>
-                </a:cubicBezTo>
-                <a:lnTo>
-                  <a:pt x="641350" y="612775"/>
-                </a:lnTo>
-                <a:cubicBezTo>
-                  <a:pt x="534458" y="661458"/>
-                  <a:pt x="106892" y="661458"/>
-                  <a:pt x="0" y="612775"/>
-                </a:cubicBezTo>
-                <a:lnTo>
-                  <a:pt x="0" y="320675"/>
-                </a:lnTo>
-                <a:close/>
-              </a:path>
-            </a:pathLst>
-          </a:custGeom>
-          <a:noFill/>
-          <a:ln w="76200">
-            <a:solidFill>
-              <a:schemeClr val="bg1"/>
-            </a:solidFill>
-          </a:ln>
-        </p:spPr>
-        <p:style>
-          <a:lnRef idx="2">
-            <a:schemeClr val="accent1">
-              <a:shade val="50000"/>
-            </a:schemeClr>
-          </a:lnRef>
-          <a:fillRef idx="1">
-            <a:schemeClr val="accent1"/>
-          </a:fillRef>
-          <a:effectRef idx="0">
-            <a:schemeClr val="accent1"/>
-          </a:effectRef>
-          <a:fontRef idx="minor">
-            <a:schemeClr val="lt1"/>
-          </a:fontRef>
-        </p:style>
-        <p:txBody>
-          <a:bodyPr rtlCol="0" anchor="ctr"/>
-          <a:lstStyle/>
-          <a:p>
-            <a:pPr algn="ctr"/>
-            <a:endParaRPr lang="en-IN"/>
-          </a:p>
-        </p:txBody>
-      </p:sp>
-      <p:sp>
-        <p:nvSpPr>
-          <p:cNvPr id="8" name="Rounded Rectangle 7"/>
-          <p:cNvSpPr/>
-          <p:nvPr/>
-        </p:nvSpPr>
-        <p:spPr>
-          <a:xfrm>
-            <a:off x="4445185" y="1310223"/>
-            <a:ext cx="266330" cy="1264928"/>
-          </a:xfrm>
-          <a:prstGeom prst="roundRect">
-            <a:avLst>
-              <a:gd name="adj" fmla="val 50000"/>
-            </a:avLst>
-          </a:prstGeom>
-          <a:solidFill>
-            <a:schemeClr val="bg1"/>
-          </a:solidFill>
-          <a:ln>
-            <a:noFill/>
-          </a:ln>
-        </p:spPr>
-        <p:style>
-          <a:lnRef idx="2">
-            <a:schemeClr val="accent1">
-              <a:shade val="50000"/>
-            </a:schemeClr>
-          </a:lnRef>
-          <a:fillRef idx="1">
-            <a:schemeClr val="accent1"/>
-          </a:fillRef>
-          <a:effectRef idx="0">
-            <a:schemeClr val="accent1"/>
-          </a:effectRef>
-          <a:fontRef idx="minor">
-            <a:schemeClr val="lt1"/>
-          </a:fontRef>
-        </p:style>
-        <p:txBody>
-          <a:bodyPr rtlCol="0" anchor="ctr"/>
-          <a:lstStyle/>
-          <a:p>
-            <a:pPr algn="ctr"/>
-            <a:endParaRPr lang="en-IN"/>
-          </a:p>
-        </p:txBody>
-      </p:sp>
-      <p:sp>
-        <p:nvSpPr>
-          <p:cNvPr id="9" name="Rounded Rectangle 8"/>
-          <p:cNvSpPr/>
-          <p:nvPr/>
-        </p:nvSpPr>
-        <p:spPr>
-          <a:xfrm rot="5400000">
-            <a:off x="5892985" y="2662085"/>
-            <a:ext cx="266330" cy="1264928"/>
-          </a:xfrm>
-          <a:prstGeom prst="roundRect">
-            <a:avLst>
-              <a:gd name="adj" fmla="val 50000"/>
-            </a:avLst>
-          </a:prstGeom>
-          <a:solidFill>
-            <a:schemeClr val="bg1"/>
-          </a:solidFill>
-          <a:ln>
-            <a:noFill/>
-          </a:ln>
-        </p:spPr>
-        <p:style>
-          <a:lnRef idx="2">
-            <a:schemeClr val="accent1">
-              <a:shade val="50000"/>
-            </a:schemeClr>
-          </a:lnRef>
-          <a:fillRef idx="1">
-            <a:schemeClr val="accent1"/>
-          </a:fillRef>
-          <a:effectRef idx="0">
-            <a:schemeClr val="accent1"/>
-          </a:effectRef>
-          <a:fontRef idx="minor">
-            <a:schemeClr val="lt1"/>
-          </a:fontRef>
-        </p:style>
-        <p:txBody>
-          <a:bodyPr rtlCol="0" anchor="ctr"/>
-          <a:lstStyle/>
-          <a:p>
-            <a:pPr algn="ctr"/>
-            <a:endParaRPr lang="en-IN"/>
-          </a:p>
-        </p:txBody>
-      </p:sp>
-      <p:sp>
-        <p:nvSpPr>
-          <p:cNvPr id="10" name="Rounded Rectangle 9"/>
-          <p:cNvSpPr/>
-          <p:nvPr/>
-        </p:nvSpPr>
-        <p:spPr>
-          <a:xfrm rot="16200000">
-            <a:off x="2984685" y="2660799"/>
-            <a:ext cx="266330" cy="1264928"/>
-          </a:xfrm>
-          <a:prstGeom prst="roundRect">
-            <a:avLst>
-              <a:gd name="adj" fmla="val 50000"/>
-            </a:avLst>
-          </a:prstGeom>
-          <a:solidFill>
-            <a:schemeClr val="bg1"/>
-          </a:solidFill>
-          <a:ln>
-            <a:noFill/>
-          </a:ln>
-        </p:spPr>
-        <p:style>
-          <a:lnRef idx="2">
-            <a:schemeClr val="accent1">
-              <a:shade val="50000"/>
-            </a:schemeClr>
-          </a:lnRef>
-          <a:fillRef idx="1">
-            <a:schemeClr val="accent1"/>
-          </a:fillRef>
-          <a:effectRef idx="0">
-            <a:schemeClr val="accent1"/>
-          </a:effectRef>
-          <a:fontRef idx="minor">
-            <a:schemeClr val="lt1"/>
-          </a:fontRef>
-        </p:style>
-        <p:txBody>
-          <a:bodyPr rtlCol="0" anchor="ctr"/>
-          <a:lstStyle/>
-          <a:p>
-            <a:pPr algn="ctr"/>
-            <a:endParaRPr lang="en-IN"/>
-          </a:p>
-        </p:txBody>
-      </p:sp>
-      <p:sp>
-        <p:nvSpPr>
-          <p:cNvPr id="11" name="Rounded Rectangle 10"/>
-          <p:cNvSpPr/>
-          <p:nvPr/>
-        </p:nvSpPr>
-        <p:spPr>
-          <a:xfrm rot="18900000">
-            <a:off x="3357386" y="1802987"/>
-            <a:ext cx="266330" cy="1264928"/>
-          </a:xfrm>
-          <a:prstGeom prst="roundRect">
-            <a:avLst>
-              <a:gd name="adj" fmla="val 50000"/>
-            </a:avLst>
-          </a:prstGeom>
-          <a:solidFill>
-            <a:schemeClr val="bg1"/>
-          </a:solidFill>
-          <a:ln>
-            <a:noFill/>
-          </a:ln>
-        </p:spPr>
-        <p:style>
-          <a:lnRef idx="2">
-            <a:schemeClr val="accent1">
-              <a:shade val="50000"/>
-            </a:schemeClr>
-          </a:lnRef>
-          <a:fillRef idx="1">
-            <a:schemeClr val="accent1"/>
-          </a:fillRef>
-          <a:effectRef idx="0">
-            <a:schemeClr val="accent1"/>
-          </a:effectRef>
-          <a:fontRef idx="minor">
-            <a:schemeClr val="lt1"/>
-          </a:fontRef>
-        </p:style>
-        <p:txBody>
-          <a:bodyPr rtlCol="0" anchor="ctr"/>
-          <a:lstStyle/>
-          <a:p>
-            <a:pPr algn="ctr"/>
-            <a:endParaRPr lang="en-IN"/>
-          </a:p>
-        </p:txBody>
-      </p:sp>
-      <p:sp>
-        <p:nvSpPr>
-          <p:cNvPr id="12" name="Rounded Rectangle 11"/>
-          <p:cNvSpPr/>
-          <p:nvPr/>
-        </p:nvSpPr>
-        <p:spPr>
-          <a:xfrm rot="2700000">
-            <a:off x="5520284" y="1802987"/>
-            <a:ext cx="266330" cy="1264928"/>
-          </a:xfrm>
-          <a:prstGeom prst="roundRect">
-            <a:avLst>
-              <a:gd name="adj" fmla="val 50000"/>
-            </a:avLst>
-          </a:prstGeom>
-          <a:solidFill>
-            <a:schemeClr val="bg1"/>
-          </a:solidFill>
-          <a:ln>
-            <a:noFill/>
-          </a:ln>
-        </p:spPr>
-        <p:style>
-          <a:lnRef idx="2">
-            <a:schemeClr val="accent1">
-              <a:shade val="50000"/>
-            </a:schemeClr>
-          </a:lnRef>
-          <a:fillRef idx="1">
-            <a:schemeClr val="accent1"/>
-          </a:fillRef>
-          <a:effectRef idx="0">
-            <a:schemeClr val="accent1"/>
-          </a:effectRef>
-          <a:fontRef idx="minor">
-            <a:schemeClr val="lt1"/>
-          </a:fontRef>
-        </p:style>
-        <p:txBody>
-          <a:bodyPr rtlCol="0" anchor="ctr"/>
-          <a:lstStyle/>
-          <a:p>
-            <a:pPr algn="ctr"/>
-            <a:endParaRPr lang="en-IN"/>
-          </a:p>
-        </p:txBody>
-      </p:sp>
-    </p:spTree>
-    <p:extLst>
-      <p:ext uri="{BB962C8B-B14F-4D97-AF65-F5344CB8AC3E}">
-        <p14:creationId xmlns:p14="http://schemas.microsoft.com/office/powerpoint/2010/main" val="2579385104"/>
-      </p:ext>
-    </p:extLst>
-  </p:cSld>
-  <p:clrMapOvr>
-    <a:masterClrMapping/>
-  </p:clrMapOvr>
-  <p:timing>
-    <p:tnLst>
-      <p:par>
-        <p:cTn id="1" dur="indefinite" restart="never" nodeType="tmRoot"/>
-      </p:par>
-    </p:tnLst>
-  </p:timing>
-</p:sld>
-</file>
-
-<file path=ppt/slides/slide30.xml><?xml version="1.0" encoding="utf-8"?>
+<file path=ppt/slides/slide31.xml><?xml version="1.0" encoding="utf-8"?>
 <p:sld xmlns:a="http://schemas.openxmlformats.org/drawingml/2006/main" xmlns:r="http://schemas.openxmlformats.org/officeDocument/2006/relationships" xmlns:p="http://schemas.openxmlformats.org/presentationml/2006/main">
   <p:cSld>
     <p:spTree>
@@ -9769,7 +9310,7 @@
           <p:cNvPr id="7" name="Freeform: Shape 6">
             <a:extLst>
               <a:ext uri="{FF2B5EF4-FFF2-40B4-BE49-F238E27FC236}">
-                <a16:creationId xmlns="" xmlns:a16="http://schemas.microsoft.com/office/drawing/2014/main" id="{F165FF3A-79F0-4681-9C5F-D7BF753A653E}"/>
+                <a16:creationId xmlns:a16="http://schemas.microsoft.com/office/drawing/2014/main" xmlns="" id="{F165FF3A-79F0-4681-9C5F-D7BF753A653E}"/>
               </a:ext>
             </a:extLst>
           </p:cNvPr>
@@ -10062,7 +9603,7 @@
 </p:sld>
 </file>
 
-<file path=ppt/slides/slide31.xml><?xml version="1.0" encoding="utf-8"?>
+<file path=ppt/slides/slide32.xml><?xml version="1.0" encoding="utf-8"?>
 <p:sld xmlns:a="http://schemas.openxmlformats.org/drawingml/2006/main" xmlns:r="http://schemas.openxmlformats.org/officeDocument/2006/relationships" xmlns:p="http://schemas.openxmlformats.org/presentationml/2006/main">
   <p:cSld>
     <p:spTree>
@@ -10184,7 +9725,7 @@
           <p:cNvPr id="6" name="Rounded Rectangle 4">
             <a:extLst>
               <a:ext uri="{FF2B5EF4-FFF2-40B4-BE49-F238E27FC236}">
-                <a16:creationId xmlns="" xmlns:a16="http://schemas.microsoft.com/office/drawing/2014/main" id="{3485F0AD-70A9-404F-AE9D-6C3E9DA3D32F}"/>
+                <a16:creationId xmlns:a16="http://schemas.microsoft.com/office/drawing/2014/main" xmlns="" id="{3485F0AD-70A9-404F-AE9D-6C3E9DA3D32F}"/>
               </a:ext>
             </a:extLst>
           </p:cNvPr>
@@ -10238,7 +9779,7 @@
           <p:cNvPr id="7" name="Rounded Rectangle 3">
             <a:extLst>
               <a:ext uri="{FF2B5EF4-FFF2-40B4-BE49-F238E27FC236}">
-                <a16:creationId xmlns="" xmlns:a16="http://schemas.microsoft.com/office/drawing/2014/main" id="{BDDDC232-1895-4BA3-83DE-722E22507136}"/>
+                <a16:creationId xmlns:a16="http://schemas.microsoft.com/office/drawing/2014/main" xmlns="" id="{BDDDC232-1895-4BA3-83DE-722E22507136}"/>
               </a:ext>
             </a:extLst>
           </p:cNvPr>
@@ -10294,7 +9835,7 @@
           <p:cNvPr id="21" name="Group 20">
             <a:extLst>
               <a:ext uri="{FF2B5EF4-FFF2-40B4-BE49-F238E27FC236}">
-                <a16:creationId xmlns="" xmlns:a16="http://schemas.microsoft.com/office/drawing/2014/main" id="{43F10BE4-CCDE-4CAE-9B8E-7DEDF81FFAF2}"/>
+                <a16:creationId xmlns:a16="http://schemas.microsoft.com/office/drawing/2014/main" xmlns="" id="{43F10BE4-CCDE-4CAE-9B8E-7DEDF81FFAF2}"/>
               </a:ext>
             </a:extLst>
           </p:cNvPr>
@@ -10314,7 +9855,7 @@
             <p:cNvPr id="8" name="Rounded Rectangle 4">
               <a:extLst>
                 <a:ext uri="{FF2B5EF4-FFF2-40B4-BE49-F238E27FC236}">
-                  <a16:creationId xmlns="" xmlns:a16="http://schemas.microsoft.com/office/drawing/2014/main" id="{8209D2B2-9E54-41E4-BD79-1C8E09E5C52B}"/>
+                  <a16:creationId xmlns:a16="http://schemas.microsoft.com/office/drawing/2014/main" xmlns="" id="{8209D2B2-9E54-41E4-BD79-1C8E09E5C52B}"/>
                 </a:ext>
               </a:extLst>
             </p:cNvPr>
@@ -10368,7 +9909,7 @@
             <p:cNvPr id="18" name="Straight Connector 17">
               <a:extLst>
                 <a:ext uri="{FF2B5EF4-FFF2-40B4-BE49-F238E27FC236}">
-                  <a16:creationId xmlns="" xmlns:a16="http://schemas.microsoft.com/office/drawing/2014/main" id="{C17E63B2-3BC5-4E63-9740-4B53F50FA06D}"/>
+                  <a16:creationId xmlns:a16="http://schemas.microsoft.com/office/drawing/2014/main" xmlns="" id="{C17E63B2-3BC5-4E63-9740-4B53F50FA06D}"/>
                 </a:ext>
               </a:extLst>
             </p:cNvPr>
@@ -10423,7 +9964,7 @@
 </p:sld>
 </file>
 
-<file path=ppt/slides/slide32.xml><?xml version="1.0" encoding="utf-8"?>
+<file path=ppt/slides/slide33.xml><?xml version="1.0" encoding="utf-8"?>
 <p:sld xmlns:a="http://schemas.openxmlformats.org/drawingml/2006/main" xmlns:r="http://schemas.openxmlformats.org/officeDocument/2006/relationships" xmlns:p="http://schemas.openxmlformats.org/presentationml/2006/main">
   <p:cSld>
     <p:spTree>
@@ -10445,7 +9986,7 @@
           <p:cNvPr id="10" name="Group 9">
             <a:extLst>
               <a:ext uri="{FF2B5EF4-FFF2-40B4-BE49-F238E27FC236}">
-                <a16:creationId xmlns="" xmlns:a16="http://schemas.microsoft.com/office/drawing/2014/main" id="{A6205789-EF0B-4BA0-889A-5DD5304B2384}"/>
+                <a16:creationId xmlns:a16="http://schemas.microsoft.com/office/drawing/2014/main" xmlns="" id="{A6205789-EF0B-4BA0-889A-5DD5304B2384}"/>
               </a:ext>
             </a:extLst>
           </p:cNvPr>
@@ -10465,7 +10006,7 @@
             <p:cNvPr id="11" name="Rounded Rectangle 4">
               <a:extLst>
                 <a:ext uri="{FF2B5EF4-FFF2-40B4-BE49-F238E27FC236}">
-                  <a16:creationId xmlns="" xmlns:a16="http://schemas.microsoft.com/office/drawing/2014/main" id="{A1F57A30-623F-47FF-A411-608120B64C66}"/>
+                  <a16:creationId xmlns:a16="http://schemas.microsoft.com/office/drawing/2014/main" xmlns="" id="{A1F57A30-623F-47FF-A411-608120B64C66}"/>
                 </a:ext>
               </a:extLst>
             </p:cNvPr>
@@ -10519,7 +10060,7 @@
             <p:cNvPr id="12" name="Rounded Rectangle 4">
               <a:extLst>
                 <a:ext uri="{FF2B5EF4-FFF2-40B4-BE49-F238E27FC236}">
-                  <a16:creationId xmlns="" xmlns:a16="http://schemas.microsoft.com/office/drawing/2014/main" id="{5BCCC17E-7791-4171-BBBA-BBA6021C4B61}"/>
+                  <a16:creationId xmlns:a16="http://schemas.microsoft.com/office/drawing/2014/main" xmlns="" id="{5BCCC17E-7791-4171-BBBA-BBA6021C4B61}"/>
                 </a:ext>
               </a:extLst>
             </p:cNvPr>
@@ -10573,7 +10114,7 @@
             <p:cNvPr id="13" name="Rounded Rectangle 4">
               <a:extLst>
                 <a:ext uri="{FF2B5EF4-FFF2-40B4-BE49-F238E27FC236}">
-                  <a16:creationId xmlns="" xmlns:a16="http://schemas.microsoft.com/office/drawing/2014/main" id="{17116BF3-B4E5-4B9D-94C3-E847D7ADFA01}"/>
+                  <a16:creationId xmlns:a16="http://schemas.microsoft.com/office/drawing/2014/main" xmlns="" id="{17116BF3-B4E5-4B9D-94C3-E847D7ADFA01}"/>
                 </a:ext>
               </a:extLst>
             </p:cNvPr>
@@ -10627,7 +10168,7 @@
             <p:cNvPr id="14" name="Rounded Rectangle 4">
               <a:extLst>
                 <a:ext uri="{FF2B5EF4-FFF2-40B4-BE49-F238E27FC236}">
-                  <a16:creationId xmlns="" xmlns:a16="http://schemas.microsoft.com/office/drawing/2014/main" id="{9895E51C-C8F7-4BC3-B592-ACFA71345B40}"/>
+                  <a16:creationId xmlns:a16="http://schemas.microsoft.com/office/drawing/2014/main" xmlns="" id="{9895E51C-C8F7-4BC3-B592-ACFA71345B40}"/>
                 </a:ext>
               </a:extLst>
             </p:cNvPr>
@@ -10682,7 +10223,7 @@
           <p:cNvPr id="3" name="Group 2">
             <a:extLst>
               <a:ext uri="{FF2B5EF4-FFF2-40B4-BE49-F238E27FC236}">
-                <a16:creationId xmlns="" xmlns:a16="http://schemas.microsoft.com/office/drawing/2014/main" id="{E9FD4DCC-E1DF-48D8-A766-EBEB4BB31844}"/>
+                <a16:creationId xmlns:a16="http://schemas.microsoft.com/office/drawing/2014/main" xmlns="" id="{E9FD4DCC-E1DF-48D8-A766-EBEB4BB31844}"/>
               </a:ext>
             </a:extLst>
           </p:cNvPr>
@@ -10702,7 +10243,7 @@
             <p:cNvPr id="6" name="Rounded Rectangle 4">
               <a:extLst>
                 <a:ext uri="{FF2B5EF4-FFF2-40B4-BE49-F238E27FC236}">
-                  <a16:creationId xmlns="" xmlns:a16="http://schemas.microsoft.com/office/drawing/2014/main" id="{3485F0AD-70A9-404F-AE9D-6C3E9DA3D32F}"/>
+                  <a16:creationId xmlns:a16="http://schemas.microsoft.com/office/drawing/2014/main" xmlns="" id="{3485F0AD-70A9-404F-AE9D-6C3E9DA3D32F}"/>
                 </a:ext>
               </a:extLst>
             </p:cNvPr>
@@ -10756,7 +10297,7 @@
             <p:cNvPr id="7" name="Rounded Rectangle 4">
               <a:extLst>
                 <a:ext uri="{FF2B5EF4-FFF2-40B4-BE49-F238E27FC236}">
-                  <a16:creationId xmlns="" xmlns:a16="http://schemas.microsoft.com/office/drawing/2014/main" id="{C69A883F-4E84-4667-9CC2-CA7D225BB107}"/>
+                  <a16:creationId xmlns:a16="http://schemas.microsoft.com/office/drawing/2014/main" xmlns="" id="{C69A883F-4E84-4667-9CC2-CA7D225BB107}"/>
                 </a:ext>
               </a:extLst>
             </p:cNvPr>
@@ -10810,7 +10351,7 @@
             <p:cNvPr id="8" name="Rounded Rectangle 4">
               <a:extLst>
                 <a:ext uri="{FF2B5EF4-FFF2-40B4-BE49-F238E27FC236}">
-                  <a16:creationId xmlns="" xmlns:a16="http://schemas.microsoft.com/office/drawing/2014/main" id="{E2D36C2A-DFFD-4786-AD4B-60FC9FA14482}"/>
+                  <a16:creationId xmlns:a16="http://schemas.microsoft.com/office/drawing/2014/main" xmlns="" id="{E2D36C2A-DFFD-4786-AD4B-60FC9FA14482}"/>
                 </a:ext>
               </a:extLst>
             </p:cNvPr>
@@ -10864,7 +10405,7 @@
             <p:cNvPr id="9" name="Rounded Rectangle 4">
               <a:extLst>
                 <a:ext uri="{FF2B5EF4-FFF2-40B4-BE49-F238E27FC236}">
-                  <a16:creationId xmlns="" xmlns:a16="http://schemas.microsoft.com/office/drawing/2014/main" id="{126B3AA7-02E3-40F1-8546-7B3D97D2302D}"/>
+                  <a16:creationId xmlns:a16="http://schemas.microsoft.com/office/drawing/2014/main" xmlns="" id="{126B3AA7-02E3-40F1-8546-7B3D97D2302D}"/>
                 </a:ext>
               </a:extLst>
             </p:cNvPr>
@@ -10918,7 +10459,7 @@
             <p:cNvPr id="15" name="Rounded Rectangle 4">
               <a:extLst>
                 <a:ext uri="{FF2B5EF4-FFF2-40B4-BE49-F238E27FC236}">
-                  <a16:creationId xmlns="" xmlns:a16="http://schemas.microsoft.com/office/drawing/2014/main" id="{0CE60671-8D6D-4730-88BD-8B0FBE849613}"/>
+                  <a16:creationId xmlns:a16="http://schemas.microsoft.com/office/drawing/2014/main" xmlns="" id="{0CE60671-8D6D-4730-88BD-8B0FBE849613}"/>
                 </a:ext>
               </a:extLst>
             </p:cNvPr>
@@ -10972,7 +10513,7 @@
             <p:cNvPr id="16" name="Rounded Rectangle 4">
               <a:extLst>
                 <a:ext uri="{FF2B5EF4-FFF2-40B4-BE49-F238E27FC236}">
-                  <a16:creationId xmlns="" xmlns:a16="http://schemas.microsoft.com/office/drawing/2014/main" id="{8ABCDF2C-78C8-4B1B-A079-5C7CC0EDB793}"/>
+                  <a16:creationId xmlns:a16="http://schemas.microsoft.com/office/drawing/2014/main" xmlns="" id="{8ABCDF2C-78C8-4B1B-A079-5C7CC0EDB793}"/>
                 </a:ext>
               </a:extLst>
             </p:cNvPr>
@@ -11026,7 +10567,7 @@
             <p:cNvPr id="17" name="Rounded Rectangle 4">
               <a:extLst>
                 <a:ext uri="{FF2B5EF4-FFF2-40B4-BE49-F238E27FC236}">
-                  <a16:creationId xmlns="" xmlns:a16="http://schemas.microsoft.com/office/drawing/2014/main" id="{472041CA-791D-459C-A8CE-BCA958F85B3E}"/>
+                  <a16:creationId xmlns:a16="http://schemas.microsoft.com/office/drawing/2014/main" xmlns="" id="{472041CA-791D-459C-A8CE-BCA958F85B3E}"/>
                 </a:ext>
               </a:extLst>
             </p:cNvPr>
@@ -11080,7 +10621,7 @@
             <p:cNvPr id="18" name="Rounded Rectangle 4">
               <a:extLst>
                 <a:ext uri="{FF2B5EF4-FFF2-40B4-BE49-F238E27FC236}">
-                  <a16:creationId xmlns="" xmlns:a16="http://schemas.microsoft.com/office/drawing/2014/main" id="{EBC185CD-743E-4274-AFD6-440CF0AF24CD}"/>
+                  <a16:creationId xmlns:a16="http://schemas.microsoft.com/office/drawing/2014/main" xmlns="" id="{EBC185CD-743E-4274-AFD6-440CF0AF24CD}"/>
                 </a:ext>
               </a:extLst>
             </p:cNvPr>
@@ -11134,7 +10675,7 @@
             <p:cNvPr id="19" name="Rounded Rectangle 4">
               <a:extLst>
                 <a:ext uri="{FF2B5EF4-FFF2-40B4-BE49-F238E27FC236}">
-                  <a16:creationId xmlns="" xmlns:a16="http://schemas.microsoft.com/office/drawing/2014/main" id="{7C4773C1-5291-40ED-9E24-F9439EE920AC}"/>
+                  <a16:creationId xmlns:a16="http://schemas.microsoft.com/office/drawing/2014/main" xmlns="" id="{7C4773C1-5291-40ED-9E24-F9439EE920AC}"/>
                 </a:ext>
               </a:extLst>
             </p:cNvPr>
@@ -11189,7 +10730,7 @@
           <p:cNvPr id="20" name="Rectangle 19">
             <a:extLst>
               <a:ext uri="{FF2B5EF4-FFF2-40B4-BE49-F238E27FC236}">
-                <a16:creationId xmlns="" xmlns:a16="http://schemas.microsoft.com/office/drawing/2014/main" id="{9C90FE5E-16CA-40BA-A45A-7E5C4821922C}"/>
+                <a16:creationId xmlns:a16="http://schemas.microsoft.com/office/drawing/2014/main" xmlns="" id="{9C90FE5E-16CA-40BA-A45A-7E5C4821922C}"/>
               </a:ext>
             </a:extLst>
           </p:cNvPr>
@@ -11241,7 +10782,7 @@
           <p:cNvPr id="29" name="Group 28">
             <a:extLst>
               <a:ext uri="{FF2B5EF4-FFF2-40B4-BE49-F238E27FC236}">
-                <a16:creationId xmlns="" xmlns:a16="http://schemas.microsoft.com/office/drawing/2014/main" id="{494DB6CB-F438-4692-9109-14408BA9056B}"/>
+                <a16:creationId xmlns:a16="http://schemas.microsoft.com/office/drawing/2014/main" xmlns="" id="{494DB6CB-F438-4692-9109-14408BA9056B}"/>
               </a:ext>
             </a:extLst>
           </p:cNvPr>
@@ -11261,7 +10802,7 @@
             <p:cNvPr id="21" name="Rectangle 20">
               <a:extLst>
                 <a:ext uri="{FF2B5EF4-FFF2-40B4-BE49-F238E27FC236}">
-                  <a16:creationId xmlns="" xmlns:a16="http://schemas.microsoft.com/office/drawing/2014/main" id="{E4886657-7DE2-45D3-B9EE-F0CED45D1134}"/>
+                  <a16:creationId xmlns:a16="http://schemas.microsoft.com/office/drawing/2014/main" xmlns="" id="{E4886657-7DE2-45D3-B9EE-F0CED45D1134}"/>
                 </a:ext>
               </a:extLst>
             </p:cNvPr>
@@ -11313,7 +10854,7 @@
             <p:cNvPr id="24" name="Rectangle 23">
               <a:extLst>
                 <a:ext uri="{FF2B5EF4-FFF2-40B4-BE49-F238E27FC236}">
-                  <a16:creationId xmlns="" xmlns:a16="http://schemas.microsoft.com/office/drawing/2014/main" id="{BB0BA0DE-CFE9-49EA-A200-BDB2DA019A6C}"/>
+                  <a16:creationId xmlns:a16="http://schemas.microsoft.com/office/drawing/2014/main" xmlns="" id="{BB0BA0DE-CFE9-49EA-A200-BDB2DA019A6C}"/>
                 </a:ext>
               </a:extLst>
             </p:cNvPr>
@@ -11365,7 +10906,7 @@
             <p:cNvPr id="26" name="Rectangle 25">
               <a:extLst>
                 <a:ext uri="{FF2B5EF4-FFF2-40B4-BE49-F238E27FC236}">
-                  <a16:creationId xmlns="" xmlns:a16="http://schemas.microsoft.com/office/drawing/2014/main" id="{8B0CF26A-6751-40B7-AA2C-E5C19E5AFA6F}"/>
+                  <a16:creationId xmlns:a16="http://schemas.microsoft.com/office/drawing/2014/main" xmlns="" id="{8B0CF26A-6751-40B7-AA2C-E5C19E5AFA6F}"/>
                 </a:ext>
               </a:extLst>
             </p:cNvPr>
@@ -11417,7 +10958,7 @@
             <p:cNvPr id="28" name="Rectangle 27">
               <a:extLst>
                 <a:ext uri="{FF2B5EF4-FFF2-40B4-BE49-F238E27FC236}">
-                  <a16:creationId xmlns="" xmlns:a16="http://schemas.microsoft.com/office/drawing/2014/main" id="{45E130DE-DB96-4CBE-8A53-C12B423CDE0A}"/>
+                  <a16:creationId xmlns:a16="http://schemas.microsoft.com/office/drawing/2014/main" xmlns="" id="{45E130DE-DB96-4CBE-8A53-C12B423CDE0A}"/>
                 </a:ext>
               </a:extLst>
             </p:cNvPr>
@@ -11470,7 +11011,7 @@
           <p:cNvPr id="45" name="Group 44">
             <a:extLst>
               <a:ext uri="{FF2B5EF4-FFF2-40B4-BE49-F238E27FC236}">
-                <a16:creationId xmlns="" xmlns:a16="http://schemas.microsoft.com/office/drawing/2014/main" id="{ED89DBB8-00E6-4567-978D-A5C062E551E1}"/>
+                <a16:creationId xmlns:a16="http://schemas.microsoft.com/office/drawing/2014/main" xmlns="" id="{ED89DBB8-00E6-4567-978D-A5C062E551E1}"/>
               </a:ext>
             </a:extLst>
           </p:cNvPr>
@@ -11490,7 +11031,7 @@
             <p:cNvPr id="31" name="Rectangle 30">
               <a:extLst>
                 <a:ext uri="{FF2B5EF4-FFF2-40B4-BE49-F238E27FC236}">
-                  <a16:creationId xmlns="" xmlns:a16="http://schemas.microsoft.com/office/drawing/2014/main" id="{B95E63B7-D48A-4E03-A98A-01FFB0C48EFC}"/>
+                  <a16:creationId xmlns:a16="http://schemas.microsoft.com/office/drawing/2014/main" xmlns="" id="{B95E63B7-D48A-4E03-A98A-01FFB0C48EFC}"/>
                 </a:ext>
               </a:extLst>
             </p:cNvPr>
@@ -11542,7 +11083,7 @@
             <p:cNvPr id="32" name="Rectangle 31">
               <a:extLst>
                 <a:ext uri="{FF2B5EF4-FFF2-40B4-BE49-F238E27FC236}">
-                  <a16:creationId xmlns="" xmlns:a16="http://schemas.microsoft.com/office/drawing/2014/main" id="{D809C39E-05E3-4BC3-B534-A304E14181E5}"/>
+                  <a16:creationId xmlns:a16="http://schemas.microsoft.com/office/drawing/2014/main" xmlns="" id="{D809C39E-05E3-4BC3-B534-A304E14181E5}"/>
                 </a:ext>
               </a:extLst>
             </p:cNvPr>
@@ -11594,7 +11135,7 @@
             <p:cNvPr id="33" name="Rectangle 32">
               <a:extLst>
                 <a:ext uri="{FF2B5EF4-FFF2-40B4-BE49-F238E27FC236}">
-                  <a16:creationId xmlns="" xmlns:a16="http://schemas.microsoft.com/office/drawing/2014/main" id="{57513C37-D87F-4867-BB1C-AB0265DE8504}"/>
+                  <a16:creationId xmlns:a16="http://schemas.microsoft.com/office/drawing/2014/main" xmlns="" id="{57513C37-D87F-4867-BB1C-AB0265DE8504}"/>
                 </a:ext>
               </a:extLst>
             </p:cNvPr>
@@ -11646,7 +11187,7 @@
             <p:cNvPr id="34" name="Rectangle 33">
               <a:extLst>
                 <a:ext uri="{FF2B5EF4-FFF2-40B4-BE49-F238E27FC236}">
-                  <a16:creationId xmlns="" xmlns:a16="http://schemas.microsoft.com/office/drawing/2014/main" id="{7F88305E-9A19-4CD1-AFE9-AD5A63AE6250}"/>
+                  <a16:creationId xmlns:a16="http://schemas.microsoft.com/office/drawing/2014/main" xmlns="" id="{7F88305E-9A19-4CD1-AFE9-AD5A63AE6250}"/>
                 </a:ext>
               </a:extLst>
             </p:cNvPr>
@@ -11698,7 +11239,7 @@
             <p:cNvPr id="36" name="Rectangle 35">
               <a:extLst>
                 <a:ext uri="{FF2B5EF4-FFF2-40B4-BE49-F238E27FC236}">
-                  <a16:creationId xmlns="" xmlns:a16="http://schemas.microsoft.com/office/drawing/2014/main" id="{27AB44A4-567E-4F77-A380-FBB1E27BB3CC}"/>
+                  <a16:creationId xmlns:a16="http://schemas.microsoft.com/office/drawing/2014/main" xmlns="" id="{27AB44A4-567E-4F77-A380-FBB1E27BB3CC}"/>
                 </a:ext>
               </a:extLst>
             </p:cNvPr>
@@ -11750,7 +11291,7 @@
             <p:cNvPr id="38" name="Rectangle 37">
               <a:extLst>
                 <a:ext uri="{FF2B5EF4-FFF2-40B4-BE49-F238E27FC236}">
-                  <a16:creationId xmlns="" xmlns:a16="http://schemas.microsoft.com/office/drawing/2014/main" id="{2794DD45-3E32-4A33-BF6C-A5F3F0519A3F}"/>
+                  <a16:creationId xmlns:a16="http://schemas.microsoft.com/office/drawing/2014/main" xmlns="" id="{2794DD45-3E32-4A33-BF6C-A5F3F0519A3F}"/>
                 </a:ext>
               </a:extLst>
             </p:cNvPr>
@@ -11802,7 +11343,7 @@
             <p:cNvPr id="40" name="Rectangle 39">
               <a:extLst>
                 <a:ext uri="{FF2B5EF4-FFF2-40B4-BE49-F238E27FC236}">
-                  <a16:creationId xmlns="" xmlns:a16="http://schemas.microsoft.com/office/drawing/2014/main" id="{041B4176-C024-4F3A-AABA-B63D7C0C66CE}"/>
+                  <a16:creationId xmlns:a16="http://schemas.microsoft.com/office/drawing/2014/main" xmlns="" id="{041B4176-C024-4F3A-AABA-B63D7C0C66CE}"/>
                 </a:ext>
               </a:extLst>
             </p:cNvPr>
@@ -11854,7 +11395,7 @@
             <p:cNvPr id="42" name="Rectangle 41">
               <a:extLst>
                 <a:ext uri="{FF2B5EF4-FFF2-40B4-BE49-F238E27FC236}">
-                  <a16:creationId xmlns="" xmlns:a16="http://schemas.microsoft.com/office/drawing/2014/main" id="{7872883E-7751-48EC-A872-1D4934847CD2}"/>
+                  <a16:creationId xmlns:a16="http://schemas.microsoft.com/office/drawing/2014/main" xmlns="" id="{7872883E-7751-48EC-A872-1D4934847CD2}"/>
                 </a:ext>
               </a:extLst>
             </p:cNvPr>
@@ -11906,7 +11447,7 @@
             <p:cNvPr id="44" name="Rectangle 43">
               <a:extLst>
                 <a:ext uri="{FF2B5EF4-FFF2-40B4-BE49-F238E27FC236}">
-                  <a16:creationId xmlns="" xmlns:a16="http://schemas.microsoft.com/office/drawing/2014/main" id="{F8E36C9E-67D9-4E49-B1A5-6E5CEA56A90F}"/>
+                  <a16:creationId xmlns:a16="http://schemas.microsoft.com/office/drawing/2014/main" xmlns="" id="{F8E36C9E-67D9-4E49-B1A5-6E5CEA56A90F}"/>
                 </a:ext>
               </a:extLst>
             </p:cNvPr>
@@ -11959,7 +11500,7 @@
           <p:cNvPr id="2" name="Rectangle 1">
             <a:extLst>
               <a:ext uri="{FF2B5EF4-FFF2-40B4-BE49-F238E27FC236}">
-                <a16:creationId xmlns="" xmlns:a16="http://schemas.microsoft.com/office/drawing/2014/main" id="{FE5D35B2-2233-49B7-899A-3326D707F4CB}"/>
+                <a16:creationId xmlns:a16="http://schemas.microsoft.com/office/drawing/2014/main" xmlns="" id="{FE5D35B2-2233-49B7-899A-3326D707F4CB}"/>
               </a:ext>
             </a:extLst>
           </p:cNvPr>
@@ -12023,7 +11564,7 @@
 </p:sld>
 </file>
 
-<file path=ppt/slides/slide33.xml><?xml version="1.0" encoding="utf-8"?>
+<file path=ppt/slides/slide34.xml><?xml version="1.0" encoding="utf-8"?>
 <p:sld xmlns:a="http://schemas.openxmlformats.org/drawingml/2006/main" xmlns:r="http://schemas.openxmlformats.org/officeDocument/2006/relationships" xmlns:p="http://schemas.openxmlformats.org/presentationml/2006/main">
   <p:cSld>
     <p:spTree>
@@ -12045,7 +11586,7 @@
           <p:cNvPr id="5" name="Oval 4">
             <a:extLst>
               <a:ext uri="{FF2B5EF4-FFF2-40B4-BE49-F238E27FC236}">
-                <a16:creationId xmlns="" xmlns:a16="http://schemas.microsoft.com/office/drawing/2014/main" id="{5CE85C29-C9E0-4DC2-9692-A83A4E8ECB26}"/>
+                <a16:creationId xmlns:a16="http://schemas.microsoft.com/office/drawing/2014/main" xmlns="" id="{5CE85C29-C9E0-4DC2-9692-A83A4E8ECB26}"/>
               </a:ext>
             </a:extLst>
           </p:cNvPr>
@@ -12116,7 +11657,7 @@
           <p:cNvPr id="8" name="Oval 7">
             <a:extLst>
               <a:ext uri="{FF2B5EF4-FFF2-40B4-BE49-F238E27FC236}">
-                <a16:creationId xmlns="" xmlns:a16="http://schemas.microsoft.com/office/drawing/2014/main" id="{5725AE3B-260D-4152-B42C-402374412E31}"/>
+                <a16:creationId xmlns:a16="http://schemas.microsoft.com/office/drawing/2014/main" xmlns="" id="{5725AE3B-260D-4152-B42C-402374412E31}"/>
               </a:ext>
             </a:extLst>
           </p:cNvPr>
@@ -12180,7 +11721,7 @@
 </p:sld>
 </file>
 
-<file path=ppt/slides/slide34.xml><?xml version="1.0" encoding="utf-8"?>
+<file path=ppt/slides/slide35.xml><?xml version="1.0" encoding="utf-8"?>
 <p:sld xmlns:a="http://schemas.openxmlformats.org/drawingml/2006/main" xmlns:r="http://schemas.openxmlformats.org/officeDocument/2006/relationships" xmlns:p="http://schemas.openxmlformats.org/presentationml/2006/main">
   <p:cSld>
     <p:spTree>
@@ -12202,7 +11743,7 @@
           <p:cNvPr id="1026" name="Picture 2" descr="Archero 1.4.3 APK Download">
             <a:extLst>
               <a:ext uri="{FF2B5EF4-FFF2-40B4-BE49-F238E27FC236}">
-                <a16:creationId xmlns="" xmlns:a16="http://schemas.microsoft.com/office/drawing/2014/main" id="{6B6FC3BB-24B5-40E9-8988-16CDA19AEE96}"/>
+                <a16:creationId xmlns:a16="http://schemas.microsoft.com/office/drawing/2014/main" xmlns="" id="{6B6FC3BB-24B5-40E9-8988-16CDA19AEE96}"/>
               </a:ext>
             </a:extLst>
           </p:cNvPr>
@@ -12247,7 +11788,7 @@
           <p:cNvPr id="2" name="Circle: Hollow 1">
             <a:extLst>
               <a:ext uri="{FF2B5EF4-FFF2-40B4-BE49-F238E27FC236}">
-                <a16:creationId xmlns="" xmlns:a16="http://schemas.microsoft.com/office/drawing/2014/main" id="{62C64EB0-7A2B-4828-BDBB-E82B485700F5}"/>
+                <a16:creationId xmlns:a16="http://schemas.microsoft.com/office/drawing/2014/main" xmlns="" id="{62C64EB0-7A2B-4828-BDBB-E82B485700F5}"/>
               </a:ext>
             </a:extLst>
           </p:cNvPr>
@@ -12307,7 +11848,7 @@
           <p:cNvPr id="17" name="Freeform: Shape 16">
             <a:extLst>
               <a:ext uri="{FF2B5EF4-FFF2-40B4-BE49-F238E27FC236}">
-                <a16:creationId xmlns="" xmlns:a16="http://schemas.microsoft.com/office/drawing/2014/main" id="{013B213B-B3A8-46BD-8505-858079DC669A}"/>
+                <a16:creationId xmlns:a16="http://schemas.microsoft.com/office/drawing/2014/main" xmlns="" id="{013B213B-B3A8-46BD-8505-858079DC669A}"/>
               </a:ext>
             </a:extLst>
           </p:cNvPr>
@@ -12636,7 +12177,7 @@
           <p:cNvPr id="8" name="Oval 7">
             <a:extLst>
               <a:ext uri="{FF2B5EF4-FFF2-40B4-BE49-F238E27FC236}">
-                <a16:creationId xmlns="" xmlns:a16="http://schemas.microsoft.com/office/drawing/2014/main" id="{B448E0E3-14DE-4BDF-8127-E194DBC3C114}"/>
+                <a16:creationId xmlns:a16="http://schemas.microsoft.com/office/drawing/2014/main" xmlns="" id="{B448E0E3-14DE-4BDF-8127-E194DBC3C114}"/>
               </a:ext>
             </a:extLst>
           </p:cNvPr>
@@ -12692,7 +12233,7 @@
           <p:cNvPr id="15" name="Group 14">
             <a:extLst>
               <a:ext uri="{FF2B5EF4-FFF2-40B4-BE49-F238E27FC236}">
-                <a16:creationId xmlns="" xmlns:a16="http://schemas.microsoft.com/office/drawing/2014/main" id="{F309C236-CAAB-4873-A3E4-4857862B0035}"/>
+                <a16:creationId xmlns:a16="http://schemas.microsoft.com/office/drawing/2014/main" xmlns="" id="{F309C236-CAAB-4873-A3E4-4857862B0035}"/>
               </a:ext>
             </a:extLst>
           </p:cNvPr>
@@ -12712,7 +12253,7 @@
             <p:cNvPr id="18" name="Circle: Hollow 17">
               <a:extLst>
                 <a:ext uri="{FF2B5EF4-FFF2-40B4-BE49-F238E27FC236}">
-                  <a16:creationId xmlns="" xmlns:a16="http://schemas.microsoft.com/office/drawing/2014/main" id="{905502AC-2C95-493E-ABD8-7A5C23B0AB55}"/>
+                  <a16:creationId xmlns:a16="http://schemas.microsoft.com/office/drawing/2014/main" xmlns="" id="{905502AC-2C95-493E-ABD8-7A5C23B0AB55}"/>
                 </a:ext>
               </a:extLst>
             </p:cNvPr>
@@ -12770,7 +12311,7 @@
             <p:cNvPr id="19" name="Freeform: Shape 18">
               <a:extLst>
                 <a:ext uri="{FF2B5EF4-FFF2-40B4-BE49-F238E27FC236}">
-                  <a16:creationId xmlns="" xmlns:a16="http://schemas.microsoft.com/office/drawing/2014/main" id="{EC397DD4-E1BB-4644-B9D4-DE223BCA64E3}"/>
+                  <a16:creationId xmlns:a16="http://schemas.microsoft.com/office/drawing/2014/main" xmlns="" id="{EC397DD4-E1BB-4644-B9D4-DE223BCA64E3}"/>
                 </a:ext>
               </a:extLst>
             </p:cNvPr>
@@ -13084,7 +12625,7 @@
           <p:cNvPr id="28" name="Straight Connector 27">
             <a:extLst>
               <a:ext uri="{FF2B5EF4-FFF2-40B4-BE49-F238E27FC236}">
-                <a16:creationId xmlns="" xmlns:a16="http://schemas.microsoft.com/office/drawing/2014/main" id="{A8CDF03B-7684-4F8C-B314-5B341086EF9E}"/>
+                <a16:creationId xmlns:a16="http://schemas.microsoft.com/office/drawing/2014/main" xmlns="" id="{A8CDF03B-7684-4F8C-B314-5B341086EF9E}"/>
               </a:ext>
             </a:extLst>
           </p:cNvPr>
@@ -13120,7 +12661,7 @@
           <p:cNvPr id="3" name="Arc 2">
             <a:extLst>
               <a:ext uri="{FF2B5EF4-FFF2-40B4-BE49-F238E27FC236}">
-                <a16:creationId xmlns="" xmlns:a16="http://schemas.microsoft.com/office/drawing/2014/main" id="{F1DE6C16-66BA-4944-BAFA-DE19BAB319DB}"/>
+                <a16:creationId xmlns:a16="http://schemas.microsoft.com/office/drawing/2014/main" xmlns="" id="{F1DE6C16-66BA-4944-BAFA-DE19BAB319DB}"/>
               </a:ext>
             </a:extLst>
           </p:cNvPr>
@@ -13179,7 +12720,7 @@
           <p:cNvPr id="16" name="Arc 15">
             <a:extLst>
               <a:ext uri="{FF2B5EF4-FFF2-40B4-BE49-F238E27FC236}">
-                <a16:creationId xmlns="" xmlns:a16="http://schemas.microsoft.com/office/drawing/2014/main" id="{5C7BA855-062D-41FB-B829-A92492BC8D43}"/>
+                <a16:creationId xmlns:a16="http://schemas.microsoft.com/office/drawing/2014/main" xmlns="" id="{5C7BA855-062D-41FB-B829-A92492BC8D43}"/>
               </a:ext>
             </a:extLst>
           </p:cNvPr>
@@ -13238,7 +12779,7 @@
           <p:cNvPr id="12" name="Oval 11">
             <a:extLst>
               <a:ext uri="{FF2B5EF4-FFF2-40B4-BE49-F238E27FC236}">
-                <a16:creationId xmlns="" xmlns:a16="http://schemas.microsoft.com/office/drawing/2014/main" id="{FB0565F6-8DBF-4B85-88AD-5148B2CA8C2F}"/>
+                <a16:creationId xmlns:a16="http://schemas.microsoft.com/office/drawing/2014/main" xmlns="" id="{FB0565F6-8DBF-4B85-88AD-5148B2CA8C2F}"/>
               </a:ext>
             </a:extLst>
           </p:cNvPr>
@@ -13322,7 +12863,7 @@
 </p:sld>
 </file>
 
-<file path=ppt/slides/slide35.xml><?xml version="1.0" encoding="utf-8"?>
+<file path=ppt/slides/slide36.xml><?xml version="1.0" encoding="utf-8"?>
 <p:sld xmlns:a="http://schemas.openxmlformats.org/drawingml/2006/main" xmlns:r="http://schemas.openxmlformats.org/officeDocument/2006/relationships" xmlns:p="http://schemas.openxmlformats.org/presentationml/2006/main">
   <p:cSld>
     <p:spTree>
@@ -13408,7 +12949,7 @@
 </p:sld>
 </file>
 
-<file path=ppt/slides/slide36.xml><?xml version="1.0" encoding="utf-8"?>
+<file path=ppt/slides/slide37.xml><?xml version="1.0" encoding="utf-8"?>
 <p:sld xmlns:a="http://schemas.openxmlformats.org/drawingml/2006/main" xmlns:r="http://schemas.openxmlformats.org/officeDocument/2006/relationships" xmlns:p="http://schemas.openxmlformats.org/presentationml/2006/main">
   <p:cSld>
     <p:spTree>
@@ -13430,7 +12971,7 @@
           <p:cNvPr id="2" name="Oval 1">
             <a:extLst>
               <a:ext uri="{FF2B5EF4-FFF2-40B4-BE49-F238E27FC236}">
-                <a16:creationId xmlns="" xmlns:a16="http://schemas.microsoft.com/office/drawing/2014/main" id="{BB9FA810-2B32-4230-AFB2-CDCBF6192A9E}"/>
+                <a16:creationId xmlns:a16="http://schemas.microsoft.com/office/drawing/2014/main" xmlns="" id="{BB9FA810-2B32-4230-AFB2-CDCBF6192A9E}"/>
               </a:ext>
             </a:extLst>
           </p:cNvPr>
@@ -13501,7 +13042,7 @@
           <p:cNvPr id="3" name="Oval 2">
             <a:extLst>
               <a:ext uri="{FF2B5EF4-FFF2-40B4-BE49-F238E27FC236}">
-                <a16:creationId xmlns="" xmlns:a16="http://schemas.microsoft.com/office/drawing/2014/main" id="{1FAA4FC1-4D62-4338-8A62-D903A26423EE}"/>
+                <a16:creationId xmlns:a16="http://schemas.microsoft.com/office/drawing/2014/main" xmlns="" id="{1FAA4FC1-4D62-4338-8A62-D903A26423EE}"/>
               </a:ext>
             </a:extLst>
           </p:cNvPr>
@@ -13585,7 +13126,7 @@
 </p:sld>
 </file>
 
-<file path=ppt/slides/slide37.xml><?xml version="1.0" encoding="utf-8"?>
+<file path=ppt/slides/slide38.xml><?xml version="1.0" encoding="utf-8"?>
 <p:sld xmlns:a="http://schemas.openxmlformats.org/drawingml/2006/main" xmlns:r="http://schemas.openxmlformats.org/officeDocument/2006/relationships" xmlns:p="http://schemas.openxmlformats.org/presentationml/2006/main">
   <p:cSld>
     <p:spTree>
@@ -13607,7 +13148,7 @@
           <p:cNvPr id="7" name="Freeform: Shape 6">
             <a:extLst>
               <a:ext uri="{FF2B5EF4-FFF2-40B4-BE49-F238E27FC236}">
-                <a16:creationId xmlns="" xmlns:a16="http://schemas.microsoft.com/office/drawing/2014/main" id="{6F8E5CDA-EFCE-44B8-BC67-987C59E77E33}"/>
+                <a16:creationId xmlns:a16="http://schemas.microsoft.com/office/drawing/2014/main" xmlns="" id="{6F8E5CDA-EFCE-44B8-BC67-987C59E77E33}"/>
               </a:ext>
             </a:extLst>
           </p:cNvPr>
@@ -13834,7 +13375,7 @@
 </p:sld>
 </file>
 
-<file path=ppt/slides/slide38.xml><?xml version="1.0" encoding="utf-8"?>
+<file path=ppt/slides/slide39.xml><?xml version="1.0" encoding="utf-8"?>
 <p:sld xmlns:a="http://schemas.openxmlformats.org/drawingml/2006/main" xmlns:r="http://schemas.openxmlformats.org/officeDocument/2006/relationships" xmlns:p="http://schemas.openxmlformats.org/presentationml/2006/main">
   <p:cSld>
     <p:spTree>
@@ -13856,7 +13397,7 @@
           <p:cNvPr id="4" name="Rectangle: Rounded Corners 3">
             <a:extLst>
               <a:ext uri="{FF2B5EF4-FFF2-40B4-BE49-F238E27FC236}">
-                <a16:creationId xmlns="" xmlns:a16="http://schemas.microsoft.com/office/drawing/2014/main" id="{FE6125FE-148F-4C48-AA05-7BC4E92676FA}"/>
+                <a16:creationId xmlns:a16="http://schemas.microsoft.com/office/drawing/2014/main" xmlns="" id="{FE6125FE-148F-4C48-AA05-7BC4E92676FA}"/>
               </a:ext>
             </a:extLst>
           </p:cNvPr>
@@ -13927,7 +13468,637 @@
 </p:sld>
 </file>
 
-<file path=ppt/slides/slide39.xml><?xml version="1.0" encoding="utf-8"?>
+<file path=ppt/slides/slide4.xml><?xml version="1.0" encoding="utf-8"?>
+<p:sld xmlns:a="http://schemas.openxmlformats.org/drawingml/2006/main" xmlns:r="http://schemas.openxmlformats.org/officeDocument/2006/relationships" xmlns:p="http://schemas.openxmlformats.org/presentationml/2006/main">
+  <p:cSld>
+    <p:spTree>
+      <p:nvGrpSpPr>
+        <p:cNvPr id="1" name=""/>
+        <p:cNvGrpSpPr/>
+        <p:nvPr/>
+      </p:nvGrpSpPr>
+      <p:grpSpPr>
+        <a:xfrm>
+          <a:off x="0" y="0"/>
+          <a:ext cx="0" cy="0"/>
+          <a:chOff x="0" y="0"/>
+          <a:chExt cx="0" cy="0"/>
+        </a:xfrm>
+      </p:grpSpPr>
+      <p:sp>
+        <p:nvSpPr>
+          <p:cNvPr id="6" name="Rounded Rectangle 5"/>
+          <p:cNvSpPr/>
+          <p:nvPr/>
+        </p:nvSpPr>
+        <p:spPr>
+          <a:xfrm>
+            <a:off x="4031931" y="3518024"/>
+            <a:ext cx="1080136" cy="2804637"/>
+          </a:xfrm>
+          <a:custGeom>
+            <a:avLst/>
+            <a:gdLst>
+              <a:gd name="connsiteX0" fmla="*/ 0 w 1080135"/>
+              <a:gd name="connsiteY0" fmla="*/ 540068 h 2796540"/>
+              <a:gd name="connsiteX1" fmla="*/ 540068 w 1080135"/>
+              <a:gd name="connsiteY1" fmla="*/ 0 h 2796540"/>
+              <a:gd name="connsiteX2" fmla="*/ 540068 w 1080135"/>
+              <a:gd name="connsiteY2" fmla="*/ 0 h 2796540"/>
+              <a:gd name="connsiteX3" fmla="*/ 1080136 w 1080135"/>
+              <a:gd name="connsiteY3" fmla="*/ 540068 h 2796540"/>
+              <a:gd name="connsiteX4" fmla="*/ 1080135 w 1080135"/>
+              <a:gd name="connsiteY4" fmla="*/ 2256473 h 2796540"/>
+              <a:gd name="connsiteX5" fmla="*/ 540067 w 1080135"/>
+              <a:gd name="connsiteY5" fmla="*/ 2796541 h 2796540"/>
+              <a:gd name="connsiteX6" fmla="*/ 540068 w 1080135"/>
+              <a:gd name="connsiteY6" fmla="*/ 2796540 h 2796540"/>
+              <a:gd name="connsiteX7" fmla="*/ 0 w 1080135"/>
+              <a:gd name="connsiteY7" fmla="*/ 2256472 h 2796540"/>
+              <a:gd name="connsiteX8" fmla="*/ 0 w 1080135"/>
+              <a:gd name="connsiteY8" fmla="*/ 540068 h 2796540"/>
+              <a:gd name="connsiteX0" fmla="*/ 540068 w 1080136"/>
+              <a:gd name="connsiteY0" fmla="*/ 2796540 h 2887980"/>
+              <a:gd name="connsiteX1" fmla="*/ 0 w 1080136"/>
+              <a:gd name="connsiteY1" fmla="*/ 2256472 h 2887980"/>
+              <a:gd name="connsiteX2" fmla="*/ 0 w 1080136"/>
+              <a:gd name="connsiteY2" fmla="*/ 540068 h 2887980"/>
+              <a:gd name="connsiteX3" fmla="*/ 540068 w 1080136"/>
+              <a:gd name="connsiteY3" fmla="*/ 0 h 2887980"/>
+              <a:gd name="connsiteX4" fmla="*/ 540068 w 1080136"/>
+              <a:gd name="connsiteY4" fmla="*/ 0 h 2887980"/>
+              <a:gd name="connsiteX5" fmla="*/ 1080136 w 1080136"/>
+              <a:gd name="connsiteY5" fmla="*/ 540068 h 2887980"/>
+              <a:gd name="connsiteX6" fmla="*/ 1080135 w 1080136"/>
+              <a:gd name="connsiteY6" fmla="*/ 2256473 h 2887980"/>
+              <a:gd name="connsiteX7" fmla="*/ 540067 w 1080136"/>
+              <a:gd name="connsiteY7" fmla="*/ 2796541 h 2887980"/>
+              <a:gd name="connsiteX8" fmla="*/ 631508 w 1080136"/>
+              <a:gd name="connsiteY8" fmla="*/ 2887980 h 2887980"/>
+              <a:gd name="connsiteX0" fmla="*/ 540068 w 1080136"/>
+              <a:gd name="connsiteY0" fmla="*/ 2796540 h 2796541"/>
+              <a:gd name="connsiteX1" fmla="*/ 0 w 1080136"/>
+              <a:gd name="connsiteY1" fmla="*/ 2256472 h 2796541"/>
+              <a:gd name="connsiteX2" fmla="*/ 0 w 1080136"/>
+              <a:gd name="connsiteY2" fmla="*/ 540068 h 2796541"/>
+              <a:gd name="connsiteX3" fmla="*/ 540068 w 1080136"/>
+              <a:gd name="connsiteY3" fmla="*/ 0 h 2796541"/>
+              <a:gd name="connsiteX4" fmla="*/ 540068 w 1080136"/>
+              <a:gd name="connsiteY4" fmla="*/ 0 h 2796541"/>
+              <a:gd name="connsiteX5" fmla="*/ 1080136 w 1080136"/>
+              <a:gd name="connsiteY5" fmla="*/ 540068 h 2796541"/>
+              <a:gd name="connsiteX6" fmla="*/ 1080135 w 1080136"/>
+              <a:gd name="connsiteY6" fmla="*/ 2256473 h 2796541"/>
+              <a:gd name="connsiteX7" fmla="*/ 540067 w 1080136"/>
+              <a:gd name="connsiteY7" fmla="*/ 2796541 h 2796541"/>
+              <a:gd name="connsiteX0" fmla="*/ 540068 w 1080136"/>
+              <a:gd name="connsiteY0" fmla="*/ 2796540 h 2796540"/>
+              <a:gd name="connsiteX1" fmla="*/ 0 w 1080136"/>
+              <a:gd name="connsiteY1" fmla="*/ 2256472 h 2796540"/>
+              <a:gd name="connsiteX2" fmla="*/ 0 w 1080136"/>
+              <a:gd name="connsiteY2" fmla="*/ 540068 h 2796540"/>
+              <a:gd name="connsiteX3" fmla="*/ 540068 w 1080136"/>
+              <a:gd name="connsiteY3" fmla="*/ 0 h 2796540"/>
+              <a:gd name="connsiteX4" fmla="*/ 540068 w 1080136"/>
+              <a:gd name="connsiteY4" fmla="*/ 0 h 2796540"/>
+              <a:gd name="connsiteX5" fmla="*/ 1080136 w 1080136"/>
+              <a:gd name="connsiteY5" fmla="*/ 540068 h 2796540"/>
+              <a:gd name="connsiteX6" fmla="*/ 1080135 w 1080136"/>
+              <a:gd name="connsiteY6" fmla="*/ 2256473 h 2796540"/>
+              <a:gd name="connsiteX0" fmla="*/ 0 w 1080136"/>
+              <a:gd name="connsiteY0" fmla="*/ 2256472 h 2256473"/>
+              <a:gd name="connsiteX1" fmla="*/ 0 w 1080136"/>
+              <a:gd name="connsiteY1" fmla="*/ 540068 h 2256473"/>
+              <a:gd name="connsiteX2" fmla="*/ 540068 w 1080136"/>
+              <a:gd name="connsiteY2" fmla="*/ 0 h 2256473"/>
+              <a:gd name="connsiteX3" fmla="*/ 540068 w 1080136"/>
+              <a:gd name="connsiteY3" fmla="*/ 0 h 2256473"/>
+              <a:gd name="connsiteX4" fmla="*/ 1080136 w 1080136"/>
+              <a:gd name="connsiteY4" fmla="*/ 540068 h 2256473"/>
+              <a:gd name="connsiteX5" fmla="*/ 1080135 w 1080136"/>
+              <a:gd name="connsiteY5" fmla="*/ 2256473 h 2256473"/>
+              <a:gd name="connsiteX0" fmla="*/ 0 w 1080136"/>
+              <a:gd name="connsiteY0" fmla="*/ 2487949 h 2487949"/>
+              <a:gd name="connsiteX1" fmla="*/ 0 w 1080136"/>
+              <a:gd name="connsiteY1" fmla="*/ 540068 h 2487949"/>
+              <a:gd name="connsiteX2" fmla="*/ 540068 w 1080136"/>
+              <a:gd name="connsiteY2" fmla="*/ 0 h 2487949"/>
+              <a:gd name="connsiteX3" fmla="*/ 540068 w 1080136"/>
+              <a:gd name="connsiteY3" fmla="*/ 0 h 2487949"/>
+              <a:gd name="connsiteX4" fmla="*/ 1080136 w 1080136"/>
+              <a:gd name="connsiteY4" fmla="*/ 540068 h 2487949"/>
+              <a:gd name="connsiteX5" fmla="*/ 1080135 w 1080136"/>
+              <a:gd name="connsiteY5" fmla="*/ 2256473 h 2487949"/>
+              <a:gd name="connsiteX0" fmla="*/ 0 w 1080136"/>
+              <a:gd name="connsiteY0" fmla="*/ 2487949 h 2493596"/>
+              <a:gd name="connsiteX1" fmla="*/ 0 w 1080136"/>
+              <a:gd name="connsiteY1" fmla="*/ 540068 h 2493596"/>
+              <a:gd name="connsiteX2" fmla="*/ 540068 w 1080136"/>
+              <a:gd name="connsiteY2" fmla="*/ 0 h 2493596"/>
+              <a:gd name="connsiteX3" fmla="*/ 540068 w 1080136"/>
+              <a:gd name="connsiteY3" fmla="*/ 0 h 2493596"/>
+              <a:gd name="connsiteX4" fmla="*/ 1080136 w 1080136"/>
+              <a:gd name="connsiteY4" fmla="*/ 540068 h 2493596"/>
+              <a:gd name="connsiteX5" fmla="*/ 1076960 w 1080136"/>
+              <a:gd name="connsiteY5" fmla="*/ 2493596 h 2493596"/>
+            </a:gdLst>
+            <a:ahLst/>
+            <a:cxnLst>
+              <a:cxn ang="0">
+                <a:pos x="connsiteX0" y="connsiteY0"/>
+              </a:cxn>
+              <a:cxn ang="0">
+                <a:pos x="connsiteX1" y="connsiteY1"/>
+              </a:cxn>
+              <a:cxn ang="0">
+                <a:pos x="connsiteX2" y="connsiteY2"/>
+              </a:cxn>
+              <a:cxn ang="0">
+                <a:pos x="connsiteX3" y="connsiteY3"/>
+              </a:cxn>
+              <a:cxn ang="0">
+                <a:pos x="connsiteX4" y="connsiteY4"/>
+              </a:cxn>
+              <a:cxn ang="0">
+                <a:pos x="connsiteX5" y="connsiteY5"/>
+              </a:cxn>
+            </a:cxnLst>
+            <a:rect l="l" t="t" r="r" b="b"/>
+            <a:pathLst>
+              <a:path w="1080136" h="2493596">
+                <a:moveTo>
+                  <a:pt x="0" y="2487949"/>
+                </a:moveTo>
+                <a:lnTo>
+                  <a:pt x="0" y="540068"/>
+                </a:lnTo>
+                <a:cubicBezTo>
+                  <a:pt x="0" y="241797"/>
+                  <a:pt x="241797" y="0"/>
+                  <a:pt x="540068" y="0"/>
+                </a:cubicBezTo>
+                <a:lnTo>
+                  <a:pt x="540068" y="0"/>
+                </a:lnTo>
+                <a:cubicBezTo>
+                  <a:pt x="838339" y="0"/>
+                  <a:pt x="1080136" y="241797"/>
+                  <a:pt x="1080136" y="540068"/>
+                </a:cubicBezTo>
+                <a:cubicBezTo>
+                  <a:pt x="1080136" y="1112203"/>
+                  <a:pt x="1076960" y="1921461"/>
+                  <a:pt x="1076960" y="2493596"/>
+                </a:cubicBezTo>
+              </a:path>
+            </a:pathLst>
+          </a:custGeom>
+          <a:noFill/>
+          <a:ln w="190500">
+            <a:solidFill>
+              <a:schemeClr val="bg1"/>
+            </a:solidFill>
+          </a:ln>
+        </p:spPr>
+        <p:style>
+          <a:lnRef idx="2">
+            <a:schemeClr val="accent1">
+              <a:shade val="50000"/>
+            </a:schemeClr>
+          </a:lnRef>
+          <a:fillRef idx="1">
+            <a:schemeClr val="accent1"/>
+          </a:fillRef>
+          <a:effectRef idx="0">
+            <a:schemeClr val="accent1"/>
+          </a:effectRef>
+          <a:fontRef idx="minor">
+            <a:schemeClr val="lt1"/>
+          </a:fontRef>
+        </p:style>
+        <p:txBody>
+          <a:bodyPr rtlCol="0" anchor="ctr"/>
+          <a:lstStyle/>
+          <a:p>
+            <a:pPr algn="ctr"/>
+            <a:endParaRPr lang="en-IN"/>
+          </a:p>
+        </p:txBody>
+      </p:sp>
+      <p:sp>
+        <p:nvSpPr>
+          <p:cNvPr id="7" name="Rounded Rectangle 6"/>
+          <p:cNvSpPr/>
+          <p:nvPr/>
+        </p:nvSpPr>
+        <p:spPr>
+          <a:xfrm>
+            <a:off x="4251324" y="3763609"/>
+            <a:ext cx="641350" cy="612775"/>
+          </a:xfrm>
+          <a:custGeom>
+            <a:avLst/>
+            <a:gdLst>
+              <a:gd name="connsiteX0" fmla="*/ 0 w 641350"/>
+              <a:gd name="connsiteY0" fmla="*/ 320675 h 933450"/>
+              <a:gd name="connsiteX1" fmla="*/ 320675 w 641350"/>
+              <a:gd name="connsiteY1" fmla="*/ 0 h 933450"/>
+              <a:gd name="connsiteX2" fmla="*/ 320675 w 641350"/>
+              <a:gd name="connsiteY2" fmla="*/ 0 h 933450"/>
+              <a:gd name="connsiteX3" fmla="*/ 641350 w 641350"/>
+              <a:gd name="connsiteY3" fmla="*/ 320675 h 933450"/>
+              <a:gd name="connsiteX4" fmla="*/ 641350 w 641350"/>
+              <a:gd name="connsiteY4" fmla="*/ 612775 h 933450"/>
+              <a:gd name="connsiteX5" fmla="*/ 320675 w 641350"/>
+              <a:gd name="connsiteY5" fmla="*/ 933450 h 933450"/>
+              <a:gd name="connsiteX6" fmla="*/ 320675 w 641350"/>
+              <a:gd name="connsiteY6" fmla="*/ 933450 h 933450"/>
+              <a:gd name="connsiteX7" fmla="*/ 0 w 641350"/>
+              <a:gd name="connsiteY7" fmla="*/ 612775 h 933450"/>
+              <a:gd name="connsiteX8" fmla="*/ 0 w 641350"/>
+              <a:gd name="connsiteY8" fmla="*/ 320675 h 933450"/>
+              <a:gd name="connsiteX0" fmla="*/ 0 w 641350"/>
+              <a:gd name="connsiteY0" fmla="*/ 320675 h 933450"/>
+              <a:gd name="connsiteX1" fmla="*/ 320675 w 641350"/>
+              <a:gd name="connsiteY1" fmla="*/ 0 h 933450"/>
+              <a:gd name="connsiteX2" fmla="*/ 320675 w 641350"/>
+              <a:gd name="connsiteY2" fmla="*/ 0 h 933450"/>
+              <a:gd name="connsiteX3" fmla="*/ 641350 w 641350"/>
+              <a:gd name="connsiteY3" fmla="*/ 320675 h 933450"/>
+              <a:gd name="connsiteX4" fmla="*/ 641350 w 641350"/>
+              <a:gd name="connsiteY4" fmla="*/ 612775 h 933450"/>
+              <a:gd name="connsiteX5" fmla="*/ 320675 w 641350"/>
+              <a:gd name="connsiteY5" fmla="*/ 933450 h 933450"/>
+              <a:gd name="connsiteX6" fmla="*/ 0 w 641350"/>
+              <a:gd name="connsiteY6" fmla="*/ 612775 h 933450"/>
+              <a:gd name="connsiteX7" fmla="*/ 0 w 641350"/>
+              <a:gd name="connsiteY7" fmla="*/ 320675 h 933450"/>
+              <a:gd name="connsiteX0" fmla="*/ 0 w 641350"/>
+              <a:gd name="connsiteY0" fmla="*/ 320675 h 612775"/>
+              <a:gd name="connsiteX1" fmla="*/ 320675 w 641350"/>
+              <a:gd name="connsiteY1" fmla="*/ 0 h 612775"/>
+              <a:gd name="connsiteX2" fmla="*/ 320675 w 641350"/>
+              <a:gd name="connsiteY2" fmla="*/ 0 h 612775"/>
+              <a:gd name="connsiteX3" fmla="*/ 641350 w 641350"/>
+              <a:gd name="connsiteY3" fmla="*/ 320675 h 612775"/>
+              <a:gd name="connsiteX4" fmla="*/ 641350 w 641350"/>
+              <a:gd name="connsiteY4" fmla="*/ 612775 h 612775"/>
+              <a:gd name="connsiteX5" fmla="*/ 0 w 641350"/>
+              <a:gd name="connsiteY5" fmla="*/ 612775 h 612775"/>
+              <a:gd name="connsiteX6" fmla="*/ 0 w 641350"/>
+              <a:gd name="connsiteY6" fmla="*/ 320675 h 612775"/>
+            </a:gdLst>
+            <a:ahLst/>
+            <a:cxnLst>
+              <a:cxn ang="0">
+                <a:pos x="connsiteX0" y="connsiteY0"/>
+              </a:cxn>
+              <a:cxn ang="0">
+                <a:pos x="connsiteX1" y="connsiteY1"/>
+              </a:cxn>
+              <a:cxn ang="0">
+                <a:pos x="connsiteX2" y="connsiteY2"/>
+              </a:cxn>
+              <a:cxn ang="0">
+                <a:pos x="connsiteX3" y="connsiteY3"/>
+              </a:cxn>
+              <a:cxn ang="0">
+                <a:pos x="connsiteX4" y="connsiteY4"/>
+              </a:cxn>
+              <a:cxn ang="0">
+                <a:pos x="connsiteX5" y="connsiteY5"/>
+              </a:cxn>
+              <a:cxn ang="0">
+                <a:pos x="connsiteX6" y="connsiteY6"/>
+              </a:cxn>
+            </a:cxnLst>
+            <a:rect l="l" t="t" r="r" b="b"/>
+            <a:pathLst>
+              <a:path w="641350" h="612775">
+                <a:moveTo>
+                  <a:pt x="0" y="320675"/>
+                </a:moveTo>
+                <a:cubicBezTo>
+                  <a:pt x="0" y="143571"/>
+                  <a:pt x="143571" y="0"/>
+                  <a:pt x="320675" y="0"/>
+                </a:cubicBezTo>
+                <a:lnTo>
+                  <a:pt x="320675" y="0"/>
+                </a:lnTo>
+                <a:cubicBezTo>
+                  <a:pt x="497779" y="0"/>
+                  <a:pt x="641350" y="143571"/>
+                  <a:pt x="641350" y="320675"/>
+                </a:cubicBezTo>
+                <a:lnTo>
+                  <a:pt x="641350" y="612775"/>
+                </a:lnTo>
+                <a:cubicBezTo>
+                  <a:pt x="534458" y="661458"/>
+                  <a:pt x="106892" y="661458"/>
+                  <a:pt x="0" y="612775"/>
+                </a:cubicBezTo>
+                <a:lnTo>
+                  <a:pt x="0" y="320675"/>
+                </a:lnTo>
+                <a:close/>
+              </a:path>
+            </a:pathLst>
+          </a:custGeom>
+          <a:noFill/>
+          <a:ln w="76200">
+            <a:solidFill>
+              <a:schemeClr val="bg1"/>
+            </a:solidFill>
+          </a:ln>
+        </p:spPr>
+        <p:style>
+          <a:lnRef idx="2">
+            <a:schemeClr val="accent1">
+              <a:shade val="50000"/>
+            </a:schemeClr>
+          </a:lnRef>
+          <a:fillRef idx="1">
+            <a:schemeClr val="accent1"/>
+          </a:fillRef>
+          <a:effectRef idx="0">
+            <a:schemeClr val="accent1"/>
+          </a:effectRef>
+          <a:fontRef idx="minor">
+            <a:schemeClr val="lt1"/>
+          </a:fontRef>
+        </p:style>
+        <p:txBody>
+          <a:bodyPr rtlCol="0" anchor="ctr"/>
+          <a:lstStyle/>
+          <a:p>
+            <a:pPr algn="ctr"/>
+            <a:endParaRPr lang="en-IN"/>
+          </a:p>
+        </p:txBody>
+      </p:sp>
+      <p:sp>
+        <p:nvSpPr>
+          <p:cNvPr id="8" name="Rounded Rectangle 7"/>
+          <p:cNvSpPr/>
+          <p:nvPr/>
+        </p:nvSpPr>
+        <p:spPr>
+          <a:xfrm>
+            <a:off x="4445185" y="1310223"/>
+            <a:ext cx="266330" cy="1264928"/>
+          </a:xfrm>
+          <a:prstGeom prst="roundRect">
+            <a:avLst>
+              <a:gd name="adj" fmla="val 50000"/>
+            </a:avLst>
+          </a:prstGeom>
+          <a:solidFill>
+            <a:schemeClr val="bg1"/>
+          </a:solidFill>
+          <a:ln>
+            <a:noFill/>
+          </a:ln>
+        </p:spPr>
+        <p:style>
+          <a:lnRef idx="2">
+            <a:schemeClr val="accent1">
+              <a:shade val="50000"/>
+            </a:schemeClr>
+          </a:lnRef>
+          <a:fillRef idx="1">
+            <a:schemeClr val="accent1"/>
+          </a:fillRef>
+          <a:effectRef idx="0">
+            <a:schemeClr val="accent1"/>
+          </a:effectRef>
+          <a:fontRef idx="minor">
+            <a:schemeClr val="lt1"/>
+          </a:fontRef>
+        </p:style>
+        <p:txBody>
+          <a:bodyPr rtlCol="0" anchor="ctr"/>
+          <a:lstStyle/>
+          <a:p>
+            <a:pPr algn="ctr"/>
+            <a:endParaRPr lang="en-IN"/>
+          </a:p>
+        </p:txBody>
+      </p:sp>
+      <p:sp>
+        <p:nvSpPr>
+          <p:cNvPr id="9" name="Rounded Rectangle 8"/>
+          <p:cNvSpPr/>
+          <p:nvPr/>
+        </p:nvSpPr>
+        <p:spPr>
+          <a:xfrm rot="5400000">
+            <a:off x="5892985" y="2662085"/>
+            <a:ext cx="266330" cy="1264928"/>
+          </a:xfrm>
+          <a:prstGeom prst="roundRect">
+            <a:avLst>
+              <a:gd name="adj" fmla="val 50000"/>
+            </a:avLst>
+          </a:prstGeom>
+          <a:solidFill>
+            <a:schemeClr val="bg1"/>
+          </a:solidFill>
+          <a:ln>
+            <a:noFill/>
+          </a:ln>
+        </p:spPr>
+        <p:style>
+          <a:lnRef idx="2">
+            <a:schemeClr val="accent1">
+              <a:shade val="50000"/>
+            </a:schemeClr>
+          </a:lnRef>
+          <a:fillRef idx="1">
+            <a:schemeClr val="accent1"/>
+          </a:fillRef>
+          <a:effectRef idx="0">
+            <a:schemeClr val="accent1"/>
+          </a:effectRef>
+          <a:fontRef idx="minor">
+            <a:schemeClr val="lt1"/>
+          </a:fontRef>
+        </p:style>
+        <p:txBody>
+          <a:bodyPr rtlCol="0" anchor="ctr"/>
+          <a:lstStyle/>
+          <a:p>
+            <a:pPr algn="ctr"/>
+            <a:endParaRPr lang="en-IN"/>
+          </a:p>
+        </p:txBody>
+      </p:sp>
+      <p:sp>
+        <p:nvSpPr>
+          <p:cNvPr id="10" name="Rounded Rectangle 9"/>
+          <p:cNvSpPr/>
+          <p:nvPr/>
+        </p:nvSpPr>
+        <p:spPr>
+          <a:xfrm rot="16200000">
+            <a:off x="2984685" y="2660799"/>
+            <a:ext cx="266330" cy="1264928"/>
+          </a:xfrm>
+          <a:prstGeom prst="roundRect">
+            <a:avLst>
+              <a:gd name="adj" fmla="val 50000"/>
+            </a:avLst>
+          </a:prstGeom>
+          <a:solidFill>
+            <a:schemeClr val="bg1"/>
+          </a:solidFill>
+          <a:ln>
+            <a:noFill/>
+          </a:ln>
+        </p:spPr>
+        <p:style>
+          <a:lnRef idx="2">
+            <a:schemeClr val="accent1">
+              <a:shade val="50000"/>
+            </a:schemeClr>
+          </a:lnRef>
+          <a:fillRef idx="1">
+            <a:schemeClr val="accent1"/>
+          </a:fillRef>
+          <a:effectRef idx="0">
+            <a:schemeClr val="accent1"/>
+          </a:effectRef>
+          <a:fontRef idx="minor">
+            <a:schemeClr val="lt1"/>
+          </a:fontRef>
+        </p:style>
+        <p:txBody>
+          <a:bodyPr rtlCol="0" anchor="ctr"/>
+          <a:lstStyle/>
+          <a:p>
+            <a:pPr algn="ctr"/>
+            <a:endParaRPr lang="en-IN"/>
+          </a:p>
+        </p:txBody>
+      </p:sp>
+      <p:sp>
+        <p:nvSpPr>
+          <p:cNvPr id="11" name="Rounded Rectangle 10"/>
+          <p:cNvSpPr/>
+          <p:nvPr/>
+        </p:nvSpPr>
+        <p:spPr>
+          <a:xfrm rot="18900000">
+            <a:off x="3357386" y="1802987"/>
+            <a:ext cx="266330" cy="1264928"/>
+          </a:xfrm>
+          <a:prstGeom prst="roundRect">
+            <a:avLst>
+              <a:gd name="adj" fmla="val 50000"/>
+            </a:avLst>
+          </a:prstGeom>
+          <a:solidFill>
+            <a:schemeClr val="bg1"/>
+          </a:solidFill>
+          <a:ln>
+            <a:noFill/>
+          </a:ln>
+        </p:spPr>
+        <p:style>
+          <a:lnRef idx="2">
+            <a:schemeClr val="accent1">
+              <a:shade val="50000"/>
+            </a:schemeClr>
+          </a:lnRef>
+          <a:fillRef idx="1">
+            <a:schemeClr val="accent1"/>
+          </a:fillRef>
+          <a:effectRef idx="0">
+            <a:schemeClr val="accent1"/>
+          </a:effectRef>
+          <a:fontRef idx="minor">
+            <a:schemeClr val="lt1"/>
+          </a:fontRef>
+        </p:style>
+        <p:txBody>
+          <a:bodyPr rtlCol="0" anchor="ctr"/>
+          <a:lstStyle/>
+          <a:p>
+            <a:pPr algn="ctr"/>
+            <a:endParaRPr lang="en-IN"/>
+          </a:p>
+        </p:txBody>
+      </p:sp>
+      <p:sp>
+        <p:nvSpPr>
+          <p:cNvPr id="12" name="Rounded Rectangle 11"/>
+          <p:cNvSpPr/>
+          <p:nvPr/>
+        </p:nvSpPr>
+        <p:spPr>
+          <a:xfrm rot="2700000">
+            <a:off x="5520284" y="1802987"/>
+            <a:ext cx="266330" cy="1264928"/>
+          </a:xfrm>
+          <a:prstGeom prst="roundRect">
+            <a:avLst>
+              <a:gd name="adj" fmla="val 50000"/>
+            </a:avLst>
+          </a:prstGeom>
+          <a:solidFill>
+            <a:schemeClr val="bg1"/>
+          </a:solidFill>
+          <a:ln>
+            <a:noFill/>
+          </a:ln>
+        </p:spPr>
+        <p:style>
+          <a:lnRef idx="2">
+            <a:schemeClr val="accent1">
+              <a:shade val="50000"/>
+            </a:schemeClr>
+          </a:lnRef>
+          <a:fillRef idx="1">
+            <a:schemeClr val="accent1"/>
+          </a:fillRef>
+          <a:effectRef idx="0">
+            <a:schemeClr val="accent1"/>
+          </a:effectRef>
+          <a:fontRef idx="minor">
+            <a:schemeClr val="lt1"/>
+          </a:fontRef>
+        </p:style>
+        <p:txBody>
+          <a:bodyPr rtlCol="0" anchor="ctr"/>
+          <a:lstStyle/>
+          <a:p>
+            <a:pPr algn="ctr"/>
+            <a:endParaRPr lang="en-IN"/>
+          </a:p>
+        </p:txBody>
+      </p:sp>
+    </p:spTree>
+    <p:extLst>
+      <p:ext uri="{BB962C8B-B14F-4D97-AF65-F5344CB8AC3E}">
+        <p14:creationId xmlns:p14="http://schemas.microsoft.com/office/powerpoint/2010/main" val="2579385104"/>
+      </p:ext>
+    </p:extLst>
+  </p:cSld>
+  <p:clrMapOvr>
+    <a:masterClrMapping/>
+  </p:clrMapOvr>
+  <p:timing>
+    <p:tnLst>
+      <p:par>
+        <p:cTn id="1" dur="indefinite" restart="never" nodeType="tmRoot"/>
+      </p:par>
+    </p:tnLst>
+  </p:timing>
+</p:sld>
+</file>
+
+<file path=ppt/slides/slide40.xml><?xml version="1.0" encoding="utf-8"?>
 <p:sld xmlns:a="http://schemas.openxmlformats.org/drawingml/2006/main" xmlns:r="http://schemas.openxmlformats.org/officeDocument/2006/relationships" xmlns:p="http://schemas.openxmlformats.org/presentationml/2006/main">
   <p:cSld>
     <p:spTree>
@@ -13949,7 +14120,7 @@
           <p:cNvPr id="12" name="Oval 11">
             <a:extLst>
               <a:ext uri="{FF2B5EF4-FFF2-40B4-BE49-F238E27FC236}">
-                <a16:creationId xmlns="" xmlns:a16="http://schemas.microsoft.com/office/drawing/2014/main" id="{1A059B5F-1408-40FB-BD3A-59B1FF9E11A3}"/>
+                <a16:creationId xmlns:a16="http://schemas.microsoft.com/office/drawing/2014/main" xmlns="" id="{1A059B5F-1408-40FB-BD3A-59B1FF9E11A3}"/>
               </a:ext>
             </a:extLst>
           </p:cNvPr>
@@ -14004,7 +14175,7 @@
           <p:cNvPr id="6" name="Oval 5">
             <a:extLst>
               <a:ext uri="{FF2B5EF4-FFF2-40B4-BE49-F238E27FC236}">
-                <a16:creationId xmlns="" xmlns:a16="http://schemas.microsoft.com/office/drawing/2014/main" id="{B3780517-6320-40FB-9E67-BC059FDA6F3C}"/>
+                <a16:creationId xmlns:a16="http://schemas.microsoft.com/office/drawing/2014/main" xmlns="" id="{B3780517-6320-40FB-9E67-BC059FDA6F3C}"/>
               </a:ext>
             </a:extLst>
           </p:cNvPr>
@@ -14059,7 +14230,7 @@
           <p:cNvPr id="7" name="Freeform: Shape 6">
             <a:extLst>
               <a:ext uri="{FF2B5EF4-FFF2-40B4-BE49-F238E27FC236}">
-                <a16:creationId xmlns="" xmlns:a16="http://schemas.microsoft.com/office/drawing/2014/main" id="{AECFE025-7D33-4E00-BA80-F948E98F4107}"/>
+                <a16:creationId xmlns:a16="http://schemas.microsoft.com/office/drawing/2014/main" xmlns="" id="{AECFE025-7D33-4E00-BA80-F948E98F4107}"/>
               </a:ext>
             </a:extLst>
           </p:cNvPr>
@@ -14204,7 +14375,7 @@
           <p:cNvPr id="9" name="Freeform: Shape 8">
             <a:extLst>
               <a:ext uri="{FF2B5EF4-FFF2-40B4-BE49-F238E27FC236}">
-                <a16:creationId xmlns="" xmlns:a16="http://schemas.microsoft.com/office/drawing/2014/main" id="{B3A41357-7409-4936-82F9-F5D0CFB8DA54}"/>
+                <a16:creationId xmlns:a16="http://schemas.microsoft.com/office/drawing/2014/main" xmlns="" id="{B3A41357-7409-4936-82F9-F5D0CFB8DA54}"/>
               </a:ext>
             </a:extLst>
           </p:cNvPr>
@@ -14349,7 +14520,7 @@
           <p:cNvPr id="8" name="Picture 7">
             <a:extLst>
               <a:ext uri="{FF2B5EF4-FFF2-40B4-BE49-F238E27FC236}">
-                <a16:creationId xmlns="" xmlns:a16="http://schemas.microsoft.com/office/drawing/2014/main" id="{8F1CB0A6-96B4-4825-9109-5803C657C1FB}"/>
+                <a16:creationId xmlns:a16="http://schemas.microsoft.com/office/drawing/2014/main" xmlns="" id="{8F1CB0A6-96B4-4825-9109-5803C657C1FB}"/>
               </a:ext>
             </a:extLst>
           </p:cNvPr>
@@ -14387,7 +14558,7 @@
 </p:sld>
 </file>
 
-<file path=ppt/slides/slide4.xml><?xml version="1.0" encoding="utf-8"?>
+<file path=ppt/slides/slide5.xml><?xml version="1.0" encoding="utf-8"?>
 <p:sld xmlns:a="http://schemas.openxmlformats.org/drawingml/2006/main" xmlns:r="http://schemas.openxmlformats.org/officeDocument/2006/relationships" xmlns:p="http://schemas.openxmlformats.org/presentationml/2006/main">
   <p:cSld>
     <p:spTree>
@@ -14843,7 +15014,7 @@
 </p:sld>
 </file>
 
-<file path=ppt/slides/slide5.xml><?xml version="1.0" encoding="utf-8"?>
+<file path=ppt/slides/slide6.xml><?xml version="1.0" encoding="utf-8"?>
 <p:sld xmlns:a="http://schemas.openxmlformats.org/drawingml/2006/main" xmlns:r="http://schemas.openxmlformats.org/officeDocument/2006/relationships" xmlns:p="http://schemas.openxmlformats.org/presentationml/2006/main">
   <p:cSld>
     <p:spTree>
@@ -15006,7 +15177,7 @@
 </p:sld>
 </file>
 
-<file path=ppt/slides/slide6.xml><?xml version="1.0" encoding="utf-8"?>
+<file path=ppt/slides/slide7.xml><?xml version="1.0" encoding="utf-8"?>
 <p:sld xmlns:a="http://schemas.openxmlformats.org/drawingml/2006/main" xmlns:r="http://schemas.openxmlformats.org/officeDocument/2006/relationships" xmlns:p="http://schemas.openxmlformats.org/presentationml/2006/main">
   <p:cSld>
     <p:spTree>
@@ -15211,7 +15382,7 @@
 </p:sld>
 </file>
 
-<file path=ppt/slides/slide7.xml><?xml version="1.0" encoding="utf-8"?>
+<file path=ppt/slides/slide8.xml><?xml version="1.0" encoding="utf-8"?>
 <p:sld xmlns:a="http://schemas.openxmlformats.org/drawingml/2006/main" xmlns:r="http://schemas.openxmlformats.org/officeDocument/2006/relationships" xmlns:p="http://schemas.openxmlformats.org/presentationml/2006/main">
   <p:cSld>
     <p:spTree>
@@ -15355,7 +15526,7 @@
 </p:sld>
 </file>
 
-<file path=ppt/slides/slide8.xml><?xml version="1.0" encoding="utf-8"?>
+<file path=ppt/slides/slide9.xml><?xml version="1.0" encoding="utf-8"?>
 <p:sld xmlns:a="http://schemas.openxmlformats.org/drawingml/2006/main" xmlns:r="http://schemas.openxmlformats.org/officeDocument/2006/relationships" xmlns:p="http://schemas.openxmlformats.org/presentationml/2006/main">
   <p:cSld>
     <p:spTree>
@@ -15377,7 +15548,7 @@
           <p:cNvPr id="2" name="Block Arc 1">
             <a:extLst>
               <a:ext uri="{FF2B5EF4-FFF2-40B4-BE49-F238E27FC236}">
-                <a16:creationId xmlns="" xmlns:a16="http://schemas.microsoft.com/office/drawing/2014/main" id="{50F54194-7244-4A73-A53A-5DF7B86F498D}"/>
+                <a16:creationId xmlns:a16="http://schemas.microsoft.com/office/drawing/2014/main" xmlns="" id="{50F54194-7244-4A73-A53A-5DF7B86F498D}"/>
               </a:ext>
             </a:extLst>
           </p:cNvPr>
@@ -15574,84 +15745,6 @@
     <p:extLst>
       <p:ext uri="{BB962C8B-B14F-4D97-AF65-F5344CB8AC3E}">
         <p14:creationId xmlns:p14="http://schemas.microsoft.com/office/powerpoint/2010/main" val="745623334"/>
-      </p:ext>
-    </p:extLst>
-  </p:cSld>
-  <p:clrMapOvr>
-    <a:masterClrMapping/>
-  </p:clrMapOvr>
-</p:sld>
-</file>
-
-<file path=ppt/slides/slide9.xml><?xml version="1.0" encoding="utf-8"?>
-<p:sld xmlns:a="http://schemas.openxmlformats.org/drawingml/2006/main" xmlns:r="http://schemas.openxmlformats.org/officeDocument/2006/relationships" xmlns:p="http://schemas.openxmlformats.org/presentationml/2006/main">
-  <p:cSld>
-    <p:spTree>
-      <p:nvGrpSpPr>
-        <p:cNvPr id="1" name=""/>
-        <p:cNvGrpSpPr/>
-        <p:nvPr/>
-      </p:nvGrpSpPr>
-      <p:grpSpPr>
-        <a:xfrm>
-          <a:off x="0" y="0"/>
-          <a:ext cx="0" cy="0"/>
-          <a:chOff x="0" y="0"/>
-          <a:chExt cx="0" cy="0"/>
-        </a:xfrm>
-      </p:grpSpPr>
-      <p:sp>
-        <p:nvSpPr>
-          <p:cNvPr id="6" name="Oval 5"/>
-          <p:cNvSpPr/>
-          <p:nvPr/>
-        </p:nvSpPr>
-        <p:spPr>
-          <a:xfrm>
-            <a:off x="3851910" y="2708910"/>
-            <a:ext cx="1440180" cy="1440180"/>
-          </a:xfrm>
-          <a:prstGeom prst="ellipse">
-            <a:avLst/>
-          </a:prstGeom>
-          <a:solidFill>
-            <a:srgbClr val="FF0000"/>
-          </a:solidFill>
-          <a:ln w="254000">
-            <a:solidFill>
-              <a:schemeClr val="bg1"/>
-            </a:solidFill>
-          </a:ln>
-        </p:spPr>
-        <p:style>
-          <a:lnRef idx="2">
-            <a:schemeClr val="accent1">
-              <a:shade val="50000"/>
-            </a:schemeClr>
-          </a:lnRef>
-          <a:fillRef idx="1">
-            <a:schemeClr val="accent1"/>
-          </a:fillRef>
-          <a:effectRef idx="0">
-            <a:schemeClr val="accent1"/>
-          </a:effectRef>
-          <a:fontRef idx="minor">
-            <a:schemeClr val="lt1"/>
-          </a:fontRef>
-        </p:style>
-        <p:txBody>
-          <a:bodyPr rtlCol="0" anchor="ctr"/>
-          <a:lstStyle/>
-          <a:p>
-            <a:pPr algn="ctr"/>
-            <a:endParaRPr lang="en-IN"/>
-          </a:p>
-        </p:txBody>
-      </p:sp>
-    </p:spTree>
-    <p:extLst>
-      <p:ext uri="{BB962C8B-B14F-4D97-AF65-F5344CB8AC3E}">
-        <p14:creationId xmlns:p14="http://schemas.microsoft.com/office/powerpoint/2010/main" val="1672338292"/>
       </p:ext>
     </p:extLst>
   </p:cSld>

</xml_diff>

<commit_message>
This the first major update which as gone live today Current Version 1.5.5
</commit_message>
<xml_diff>
--- a/Assets/Textures/TextureIcons.pptx
+++ b/Assets/Textures/TextureIcons.pptx
@@ -6,45 +6,46 @@
   </p:sldMasterIdLst>
   <p:sldIdLst>
     <p:sldId id="256" r:id="rId2"/>
-    <p:sldId id="294" r:id="rId3"/>
-    <p:sldId id="297" r:id="rId4"/>
-    <p:sldId id="296" r:id="rId5"/>
-    <p:sldId id="257" r:id="rId6"/>
-    <p:sldId id="258" r:id="rId7"/>
-    <p:sldId id="295" r:id="rId8"/>
-    <p:sldId id="260" r:id="rId9"/>
-    <p:sldId id="292" r:id="rId10"/>
-    <p:sldId id="293" r:id="rId11"/>
-    <p:sldId id="262" r:id="rId12"/>
-    <p:sldId id="263" r:id="rId13"/>
-    <p:sldId id="264" r:id="rId14"/>
-    <p:sldId id="265" r:id="rId15"/>
-    <p:sldId id="266" r:id="rId16"/>
-    <p:sldId id="267" r:id="rId17"/>
-    <p:sldId id="268" r:id="rId18"/>
-    <p:sldId id="269" r:id="rId19"/>
-    <p:sldId id="270" r:id="rId20"/>
-    <p:sldId id="271" r:id="rId21"/>
-    <p:sldId id="272" r:id="rId22"/>
-    <p:sldId id="273" r:id="rId23"/>
-    <p:sldId id="274" r:id="rId24"/>
-    <p:sldId id="275" r:id="rId25"/>
-    <p:sldId id="276" r:id="rId26"/>
-    <p:sldId id="277" r:id="rId27"/>
-    <p:sldId id="278" r:id="rId28"/>
-    <p:sldId id="279" r:id="rId29"/>
-    <p:sldId id="280" r:id="rId30"/>
-    <p:sldId id="281" r:id="rId31"/>
-    <p:sldId id="282" r:id="rId32"/>
-    <p:sldId id="283" r:id="rId33"/>
-    <p:sldId id="284" r:id="rId34"/>
-    <p:sldId id="285" r:id="rId35"/>
-    <p:sldId id="286" r:id="rId36"/>
-    <p:sldId id="287" r:id="rId37"/>
-    <p:sldId id="288" r:id="rId38"/>
-    <p:sldId id="289" r:id="rId39"/>
-    <p:sldId id="290" r:id="rId40"/>
-    <p:sldId id="291" r:id="rId41"/>
+    <p:sldId id="298" r:id="rId3"/>
+    <p:sldId id="294" r:id="rId4"/>
+    <p:sldId id="297" r:id="rId5"/>
+    <p:sldId id="296" r:id="rId6"/>
+    <p:sldId id="257" r:id="rId7"/>
+    <p:sldId id="258" r:id="rId8"/>
+    <p:sldId id="295" r:id="rId9"/>
+    <p:sldId id="260" r:id="rId10"/>
+    <p:sldId id="292" r:id="rId11"/>
+    <p:sldId id="293" r:id="rId12"/>
+    <p:sldId id="262" r:id="rId13"/>
+    <p:sldId id="263" r:id="rId14"/>
+    <p:sldId id="264" r:id="rId15"/>
+    <p:sldId id="265" r:id="rId16"/>
+    <p:sldId id="266" r:id="rId17"/>
+    <p:sldId id="267" r:id="rId18"/>
+    <p:sldId id="268" r:id="rId19"/>
+    <p:sldId id="269" r:id="rId20"/>
+    <p:sldId id="270" r:id="rId21"/>
+    <p:sldId id="271" r:id="rId22"/>
+    <p:sldId id="272" r:id="rId23"/>
+    <p:sldId id="273" r:id="rId24"/>
+    <p:sldId id="274" r:id="rId25"/>
+    <p:sldId id="275" r:id="rId26"/>
+    <p:sldId id="276" r:id="rId27"/>
+    <p:sldId id="277" r:id="rId28"/>
+    <p:sldId id="278" r:id="rId29"/>
+    <p:sldId id="279" r:id="rId30"/>
+    <p:sldId id="280" r:id="rId31"/>
+    <p:sldId id="281" r:id="rId32"/>
+    <p:sldId id="282" r:id="rId33"/>
+    <p:sldId id="283" r:id="rId34"/>
+    <p:sldId id="284" r:id="rId35"/>
+    <p:sldId id="285" r:id="rId36"/>
+    <p:sldId id="286" r:id="rId37"/>
+    <p:sldId id="287" r:id="rId38"/>
+    <p:sldId id="288" r:id="rId39"/>
+    <p:sldId id="289" r:id="rId40"/>
+    <p:sldId id="290" r:id="rId41"/>
+    <p:sldId id="291" r:id="rId42"/>
   </p:sldIdLst>
   <p:sldSz cx="9144000" cy="6858000" type="screen4x3"/>
   <p:notesSz cx="6858000" cy="9144000"/>
@@ -327,7 +328,7 @@
           <a:p>
             <a:fld id="{02BB6FDC-F2C4-464B-9BAC-FAE7AFB0E257}" type="datetimeFigureOut">
               <a:rPr lang="en-IN" smtClean="0"/>
-              <a:t>29-04-2021</a:t>
+              <a:t>05-05-2021</a:t>
             </a:fld>
             <a:endParaRPr lang="en-IN"/>
           </a:p>
@@ -497,7 +498,7 @@
           <a:p>
             <a:fld id="{02BB6FDC-F2C4-464B-9BAC-FAE7AFB0E257}" type="datetimeFigureOut">
               <a:rPr lang="en-IN" smtClean="0"/>
-              <a:t>29-04-2021</a:t>
+              <a:t>05-05-2021</a:t>
             </a:fld>
             <a:endParaRPr lang="en-IN"/>
           </a:p>
@@ -677,7 +678,7 @@
           <a:p>
             <a:fld id="{02BB6FDC-F2C4-464B-9BAC-FAE7AFB0E257}" type="datetimeFigureOut">
               <a:rPr lang="en-IN" smtClean="0"/>
-              <a:t>29-04-2021</a:t>
+              <a:t>05-05-2021</a:t>
             </a:fld>
             <a:endParaRPr lang="en-IN"/>
           </a:p>
@@ -847,7 +848,7 @@
           <a:p>
             <a:fld id="{02BB6FDC-F2C4-464B-9BAC-FAE7AFB0E257}" type="datetimeFigureOut">
               <a:rPr lang="en-IN" smtClean="0"/>
-              <a:t>29-04-2021</a:t>
+              <a:t>05-05-2021</a:t>
             </a:fld>
             <a:endParaRPr lang="en-IN"/>
           </a:p>
@@ -1093,7 +1094,7 @@
           <a:p>
             <a:fld id="{02BB6FDC-F2C4-464B-9BAC-FAE7AFB0E257}" type="datetimeFigureOut">
               <a:rPr lang="en-IN" smtClean="0"/>
-              <a:t>29-04-2021</a:t>
+              <a:t>05-05-2021</a:t>
             </a:fld>
             <a:endParaRPr lang="en-IN"/>
           </a:p>
@@ -1381,7 +1382,7 @@
           <a:p>
             <a:fld id="{02BB6FDC-F2C4-464B-9BAC-FAE7AFB0E257}" type="datetimeFigureOut">
               <a:rPr lang="en-IN" smtClean="0"/>
-              <a:t>29-04-2021</a:t>
+              <a:t>05-05-2021</a:t>
             </a:fld>
             <a:endParaRPr lang="en-IN"/>
           </a:p>
@@ -1803,7 +1804,7 @@
           <a:p>
             <a:fld id="{02BB6FDC-F2C4-464B-9BAC-FAE7AFB0E257}" type="datetimeFigureOut">
               <a:rPr lang="en-IN" smtClean="0"/>
-              <a:t>29-04-2021</a:t>
+              <a:t>05-05-2021</a:t>
             </a:fld>
             <a:endParaRPr lang="en-IN"/>
           </a:p>
@@ -1921,7 +1922,7 @@
           <a:p>
             <a:fld id="{02BB6FDC-F2C4-464B-9BAC-FAE7AFB0E257}" type="datetimeFigureOut">
               <a:rPr lang="en-IN" smtClean="0"/>
-              <a:t>29-04-2021</a:t>
+              <a:t>05-05-2021</a:t>
             </a:fld>
             <a:endParaRPr lang="en-IN"/>
           </a:p>
@@ -2016,7 +2017,7 @@
           <a:p>
             <a:fld id="{02BB6FDC-F2C4-464B-9BAC-FAE7AFB0E257}" type="datetimeFigureOut">
               <a:rPr lang="en-IN" smtClean="0"/>
-              <a:t>29-04-2021</a:t>
+              <a:t>05-05-2021</a:t>
             </a:fld>
             <a:endParaRPr lang="en-IN"/>
           </a:p>
@@ -2293,7 +2294,7 @@
           <a:p>
             <a:fld id="{02BB6FDC-F2C4-464B-9BAC-FAE7AFB0E257}" type="datetimeFigureOut">
               <a:rPr lang="en-IN" smtClean="0"/>
-              <a:t>29-04-2021</a:t>
+              <a:t>05-05-2021</a:t>
             </a:fld>
             <a:endParaRPr lang="en-IN"/>
           </a:p>
@@ -2546,7 +2547,7 @@
           <a:p>
             <a:fld id="{02BB6FDC-F2C4-464B-9BAC-FAE7AFB0E257}" type="datetimeFigureOut">
               <a:rPr lang="en-IN" smtClean="0"/>
-              <a:t>29-04-2021</a:t>
+              <a:t>05-05-2021</a:t>
             </a:fld>
             <a:endParaRPr lang="en-IN"/>
           </a:p>
@@ -2764,7 +2765,7 @@
           <a:p>
             <a:fld id="{02BB6FDC-F2C4-464B-9BAC-FAE7AFB0E257}" type="datetimeFigureOut">
               <a:rPr lang="en-IN" smtClean="0"/>
-              <a:t>29-04-2021</a:t>
+              <a:t>05-05-2021</a:t>
             </a:fld>
             <a:endParaRPr lang="en-IN"/>
           </a:p>
@@ -3361,6 +3362,234 @@
       </p:grpSpPr>
       <p:sp>
         <p:nvSpPr>
+          <p:cNvPr id="2" name="Block Arc 1">
+            <a:extLst>
+              <a:ext uri="{FF2B5EF4-FFF2-40B4-BE49-F238E27FC236}">
+                <a16:creationId xmlns="" xmlns:a16="http://schemas.microsoft.com/office/drawing/2014/main" id="{50F54194-7244-4A73-A53A-5DF7B86F498D}"/>
+              </a:ext>
+            </a:extLst>
+          </p:cNvPr>
+          <p:cNvSpPr/>
+          <p:nvPr/>
+        </p:nvSpPr>
+        <p:spPr>
+          <a:xfrm>
+            <a:off x="3131820" y="1988820"/>
+            <a:ext cx="2880360" cy="2880360"/>
+          </a:xfrm>
+          <a:prstGeom prst="blockArc">
+            <a:avLst>
+              <a:gd name="adj1" fmla="val 10800000"/>
+              <a:gd name="adj2" fmla="val 9838672"/>
+              <a:gd name="adj3" fmla="val 9265"/>
+            </a:avLst>
+          </a:prstGeom>
+          <a:solidFill>
+            <a:schemeClr val="bg1"/>
+          </a:solidFill>
+          <a:ln w="190500">
+            <a:noFill/>
+          </a:ln>
+        </p:spPr>
+        <p:style>
+          <a:lnRef idx="2">
+            <a:schemeClr val="accent1">
+              <a:shade val="50000"/>
+            </a:schemeClr>
+          </a:lnRef>
+          <a:fillRef idx="1">
+            <a:schemeClr val="accent1"/>
+          </a:fillRef>
+          <a:effectRef idx="0">
+            <a:schemeClr val="accent1"/>
+          </a:effectRef>
+          <a:fontRef idx="minor">
+            <a:schemeClr val="lt1"/>
+          </a:fontRef>
+        </p:style>
+        <p:txBody>
+          <a:bodyPr rtlCol="0" anchor="ctr"/>
+          <a:lstStyle/>
+          <a:p>
+            <a:pPr algn="ctr"/>
+            <a:endParaRPr lang="en-IN"/>
+          </a:p>
+        </p:txBody>
+      </p:sp>
+      <p:sp>
+        <p:nvSpPr>
+          <p:cNvPr id="3" name="Right Triangle 2"/>
+          <p:cNvSpPr/>
+          <p:nvPr/>
+        </p:nvSpPr>
+        <p:spPr>
+          <a:xfrm rot="19800000">
+            <a:off x="2995083" y="2861428"/>
+            <a:ext cx="636815" cy="636815"/>
+          </a:xfrm>
+          <a:prstGeom prst="rtTriangle">
+            <a:avLst/>
+          </a:prstGeom>
+          <a:solidFill>
+            <a:schemeClr val="bg1"/>
+          </a:solidFill>
+          <a:ln w="190500">
+            <a:noFill/>
+          </a:ln>
+        </p:spPr>
+        <p:style>
+          <a:lnRef idx="2">
+            <a:schemeClr val="accent1">
+              <a:shade val="50000"/>
+            </a:schemeClr>
+          </a:lnRef>
+          <a:fillRef idx="1">
+            <a:schemeClr val="accent1"/>
+          </a:fillRef>
+          <a:effectRef idx="0">
+            <a:schemeClr val="accent1"/>
+          </a:effectRef>
+          <a:fontRef idx="minor">
+            <a:schemeClr val="lt1"/>
+          </a:fontRef>
+        </p:style>
+        <p:txBody>
+          <a:bodyPr rtlCol="0" anchor="ctr"/>
+          <a:lstStyle/>
+          <a:p>
+            <a:pPr algn="ctr"/>
+            <a:endParaRPr lang="en-IN"/>
+          </a:p>
+        </p:txBody>
+      </p:sp>
+      <p:sp>
+        <p:nvSpPr>
+          <p:cNvPr id="4" name="Rounded Rectangle 3"/>
+          <p:cNvSpPr/>
+          <p:nvPr/>
+        </p:nvSpPr>
+        <p:spPr>
+          <a:xfrm rot="19894297">
+            <a:off x="4248150" y="2590925"/>
+            <a:ext cx="276225" cy="1066800"/>
+          </a:xfrm>
+          <a:prstGeom prst="roundRect">
+            <a:avLst>
+              <a:gd name="adj" fmla="val 50000"/>
+            </a:avLst>
+          </a:prstGeom>
+          <a:solidFill>
+            <a:schemeClr val="bg1"/>
+          </a:solidFill>
+          <a:ln w="190500">
+            <a:noFill/>
+          </a:ln>
+        </p:spPr>
+        <p:style>
+          <a:lnRef idx="2">
+            <a:schemeClr val="accent1">
+              <a:shade val="50000"/>
+            </a:schemeClr>
+          </a:lnRef>
+          <a:fillRef idx="1">
+            <a:schemeClr val="accent1"/>
+          </a:fillRef>
+          <a:effectRef idx="0">
+            <a:schemeClr val="accent1"/>
+          </a:effectRef>
+          <a:fontRef idx="minor">
+            <a:schemeClr val="lt1"/>
+          </a:fontRef>
+        </p:style>
+        <p:txBody>
+          <a:bodyPr rtlCol="0" anchor="ctr"/>
+          <a:lstStyle/>
+          <a:p>
+            <a:pPr algn="ctr"/>
+            <a:endParaRPr lang="en-IN"/>
+          </a:p>
+        </p:txBody>
+      </p:sp>
+      <p:sp>
+        <p:nvSpPr>
+          <p:cNvPr id="5" name="Rounded Rectangle 4"/>
+          <p:cNvSpPr/>
+          <p:nvPr/>
+        </p:nvSpPr>
+        <p:spPr>
+          <a:xfrm rot="17100000">
+            <a:off x="4846746" y="3081389"/>
+            <a:ext cx="276225" cy="1066800"/>
+          </a:xfrm>
+          <a:prstGeom prst="roundRect">
+            <a:avLst>
+              <a:gd name="adj" fmla="val 50000"/>
+            </a:avLst>
+          </a:prstGeom>
+          <a:solidFill>
+            <a:schemeClr val="bg1"/>
+          </a:solidFill>
+          <a:ln w="190500">
+            <a:noFill/>
+          </a:ln>
+        </p:spPr>
+        <p:style>
+          <a:lnRef idx="2">
+            <a:schemeClr val="accent1">
+              <a:shade val="50000"/>
+            </a:schemeClr>
+          </a:lnRef>
+          <a:fillRef idx="1">
+            <a:schemeClr val="accent1"/>
+          </a:fillRef>
+          <a:effectRef idx="0">
+            <a:schemeClr val="accent1"/>
+          </a:effectRef>
+          <a:fontRef idx="minor">
+            <a:schemeClr val="lt1"/>
+          </a:fontRef>
+        </p:style>
+        <p:txBody>
+          <a:bodyPr rtlCol="0" anchor="ctr"/>
+          <a:lstStyle/>
+          <a:p>
+            <a:pPr algn="ctr"/>
+            <a:endParaRPr lang="en-IN"/>
+          </a:p>
+        </p:txBody>
+      </p:sp>
+    </p:spTree>
+    <p:extLst>
+      <p:ext uri="{BB962C8B-B14F-4D97-AF65-F5344CB8AC3E}">
+        <p14:creationId xmlns:p14="http://schemas.microsoft.com/office/powerpoint/2010/main" val="745623334"/>
+      </p:ext>
+    </p:extLst>
+  </p:cSld>
+  <p:clrMapOvr>
+    <a:masterClrMapping/>
+  </p:clrMapOvr>
+</p:sld>
+</file>
+
+<file path=ppt/slides/slide11.xml><?xml version="1.0" encoding="utf-8"?>
+<p:sld xmlns:a="http://schemas.openxmlformats.org/drawingml/2006/main" xmlns:r="http://schemas.openxmlformats.org/officeDocument/2006/relationships" xmlns:p="http://schemas.openxmlformats.org/presentationml/2006/main">
+  <p:cSld>
+    <p:spTree>
+      <p:nvGrpSpPr>
+        <p:cNvPr id="1" name=""/>
+        <p:cNvGrpSpPr/>
+        <p:nvPr/>
+      </p:nvGrpSpPr>
+      <p:grpSpPr>
+        <a:xfrm>
+          <a:off x="0" y="0"/>
+          <a:ext cx="0" cy="0"/>
+          <a:chOff x="0" y="0"/>
+          <a:chExt cx="0" cy="0"/>
+        </a:xfrm>
+      </p:grpSpPr>
+      <p:sp>
+        <p:nvSpPr>
           <p:cNvPr id="6" name="Oval 5"/>
           <p:cNvSpPr/>
           <p:nvPr/>
@@ -3420,7 +3649,7 @@
 </p:sld>
 </file>
 
-<file path=ppt/slides/slide11.xml><?xml version="1.0" encoding="utf-8"?>
+<file path=ppt/slides/slide12.xml><?xml version="1.0" encoding="utf-8"?>
 <p:sld xmlns:a="http://schemas.openxmlformats.org/drawingml/2006/main" xmlns:r="http://schemas.openxmlformats.org/officeDocument/2006/relationships" xmlns:p="http://schemas.openxmlformats.org/presentationml/2006/main">
   <p:cSld>
     <p:spTree>
@@ -3442,7 +3671,7 @@
           <p:cNvPr id="3" name="Rectangle: Rounded Corners 2">
             <a:extLst>
               <a:ext uri="{FF2B5EF4-FFF2-40B4-BE49-F238E27FC236}">
-                <a16:creationId xmlns:a16="http://schemas.microsoft.com/office/drawing/2014/main" xmlns="" id="{59DB4196-0687-4E82-A4C2-1855B40742C9}"/>
+                <a16:creationId xmlns="" xmlns:a16="http://schemas.microsoft.com/office/drawing/2014/main" id="{59DB4196-0687-4E82-A4C2-1855B40742C9}"/>
               </a:ext>
             </a:extLst>
           </p:cNvPr>
@@ -3513,7 +3742,7 @@
 </p:sld>
 </file>
 
-<file path=ppt/slides/slide12.xml><?xml version="1.0" encoding="utf-8"?>
+<file path=ppt/slides/slide13.xml><?xml version="1.0" encoding="utf-8"?>
 <p:sld xmlns:a="http://schemas.openxmlformats.org/drawingml/2006/main" xmlns:r="http://schemas.openxmlformats.org/officeDocument/2006/relationships" xmlns:p="http://schemas.openxmlformats.org/presentationml/2006/main">
   <p:cSld>
     <p:spTree>
@@ -3535,7 +3764,7 @@
           <p:cNvPr id="1028" name="Picture 4" descr="Breakfast, dinner, eat, eatery, eating, food, fork, kitchen, mall, menu,  restaurant, spoon icon">
             <a:extLst>
               <a:ext uri="{FF2B5EF4-FFF2-40B4-BE49-F238E27FC236}">
-                <a16:creationId xmlns:a16="http://schemas.microsoft.com/office/drawing/2014/main" xmlns="" id="{134BC9E7-1648-4284-8F8B-F48D3A77279E}"/>
+                <a16:creationId xmlns="" xmlns:a16="http://schemas.microsoft.com/office/drawing/2014/main" id="{134BC9E7-1648-4284-8F8B-F48D3A77279E}"/>
               </a:ext>
             </a:extLst>
           </p:cNvPr>
@@ -3582,7 +3811,7 @@
           <p:cNvPr id="17" name="Rectangle: Rounded Corners 16">
             <a:extLst>
               <a:ext uri="{FF2B5EF4-FFF2-40B4-BE49-F238E27FC236}">
-                <a16:creationId xmlns:a16="http://schemas.microsoft.com/office/drawing/2014/main" xmlns="" id="{8FF52E4B-F4AD-49B2-ADC5-256CFA6FC62C}"/>
+                <a16:creationId xmlns="" xmlns:a16="http://schemas.microsoft.com/office/drawing/2014/main" id="{8FF52E4B-F4AD-49B2-ADC5-256CFA6FC62C}"/>
               </a:ext>
             </a:extLst>
           </p:cNvPr>
@@ -3636,7 +3865,7 @@
           <p:cNvPr id="21" name="Rectangle: Rounded Corners 20">
             <a:extLst>
               <a:ext uri="{FF2B5EF4-FFF2-40B4-BE49-F238E27FC236}">
-                <a16:creationId xmlns:a16="http://schemas.microsoft.com/office/drawing/2014/main" xmlns="" id="{7A457185-7D9B-4F78-8A69-D2072A09BBEE}"/>
+                <a16:creationId xmlns="" xmlns:a16="http://schemas.microsoft.com/office/drawing/2014/main" id="{7A457185-7D9B-4F78-8A69-D2072A09BBEE}"/>
               </a:ext>
             </a:extLst>
           </p:cNvPr>
@@ -3698,7 +3927,7 @@
 </p:sld>
 </file>
 
-<file path=ppt/slides/slide13.xml><?xml version="1.0" encoding="utf-8"?>
+<file path=ppt/slides/slide14.xml><?xml version="1.0" encoding="utf-8"?>
 <p:sld xmlns:a="http://schemas.openxmlformats.org/drawingml/2006/main" xmlns:r="http://schemas.openxmlformats.org/officeDocument/2006/relationships" xmlns:p="http://schemas.openxmlformats.org/presentationml/2006/main">
   <p:cSld>
     <p:spTree>
@@ -3720,7 +3949,7 @@
           <p:cNvPr id="2050" name="Picture 2" descr="trash can,garbage can,rubbish bin icon - Buy this stock vector and explore  similar vectors at Adobe Stock | Adobe Stock">
             <a:extLst>
               <a:ext uri="{FF2B5EF4-FFF2-40B4-BE49-F238E27FC236}">
-                <a16:creationId xmlns:a16="http://schemas.microsoft.com/office/drawing/2014/main" xmlns="" id="{6AC0D9C4-4466-472E-B18A-1B3485F670A7}"/>
+                <a16:creationId xmlns="" xmlns:a16="http://schemas.microsoft.com/office/drawing/2014/main" id="{6AC0D9C4-4466-472E-B18A-1B3485F670A7}"/>
               </a:ext>
             </a:extLst>
           </p:cNvPr>
@@ -3767,7 +3996,7 @@
           <p:cNvPr id="2" name="Rectangle: Rounded Corners 1">
             <a:extLst>
               <a:ext uri="{FF2B5EF4-FFF2-40B4-BE49-F238E27FC236}">
-                <a16:creationId xmlns:a16="http://schemas.microsoft.com/office/drawing/2014/main" xmlns="" id="{C90FD948-D8A7-44C8-B812-1049E19BDCCC}"/>
+                <a16:creationId xmlns="" xmlns:a16="http://schemas.microsoft.com/office/drawing/2014/main" id="{C90FD948-D8A7-44C8-B812-1049E19BDCCC}"/>
               </a:ext>
             </a:extLst>
           </p:cNvPr>
@@ -3834,7 +4063,7 @@
 </p:sld>
 </file>
 
-<file path=ppt/slides/slide14.xml><?xml version="1.0" encoding="utf-8"?>
+<file path=ppt/slides/slide15.xml><?xml version="1.0" encoding="utf-8"?>
 <p:sld xmlns:a="http://schemas.openxmlformats.org/drawingml/2006/main" xmlns:r="http://schemas.openxmlformats.org/officeDocument/2006/relationships" xmlns:p="http://schemas.openxmlformats.org/presentationml/2006/main">
   <p:cSld>
     <p:spTree>
@@ -3856,7 +4085,7 @@
           <p:cNvPr id="16" name="Group 15">
             <a:extLst>
               <a:ext uri="{FF2B5EF4-FFF2-40B4-BE49-F238E27FC236}">
-                <a16:creationId xmlns:a16="http://schemas.microsoft.com/office/drawing/2014/main" xmlns="" id="{FBB9A665-68B6-4A50-A463-D808E77EBC3A}"/>
+                <a16:creationId xmlns="" xmlns:a16="http://schemas.microsoft.com/office/drawing/2014/main" id="{FBB9A665-68B6-4A50-A463-D808E77EBC3A}"/>
               </a:ext>
             </a:extLst>
           </p:cNvPr>
@@ -3876,7 +4105,7 @@
             <p:cNvPr id="3" name="Rectangle: Rounded Corners 2">
               <a:extLst>
                 <a:ext uri="{FF2B5EF4-FFF2-40B4-BE49-F238E27FC236}">
-                  <a16:creationId xmlns:a16="http://schemas.microsoft.com/office/drawing/2014/main" xmlns="" id="{83DB1C8D-34C1-4F43-9AEF-3E14743EEFF9}"/>
+                  <a16:creationId xmlns="" xmlns:a16="http://schemas.microsoft.com/office/drawing/2014/main" id="{83DB1C8D-34C1-4F43-9AEF-3E14743EEFF9}"/>
                 </a:ext>
               </a:extLst>
             </p:cNvPr>
@@ -3930,7 +4159,7 @@
             <p:cNvPr id="13" name="Rectangle: Rounded Corners 12">
               <a:extLst>
                 <a:ext uri="{FF2B5EF4-FFF2-40B4-BE49-F238E27FC236}">
-                  <a16:creationId xmlns:a16="http://schemas.microsoft.com/office/drawing/2014/main" xmlns="" id="{DB98CEC5-767D-492A-A315-5BB4560B0615}"/>
+                  <a16:creationId xmlns="" xmlns:a16="http://schemas.microsoft.com/office/drawing/2014/main" id="{DB98CEC5-767D-492A-A315-5BB4560B0615}"/>
                 </a:ext>
               </a:extLst>
             </p:cNvPr>
@@ -3984,7 +4213,7 @@
             <p:cNvPr id="14" name="Rectangle: Rounded Corners 13">
               <a:extLst>
                 <a:ext uri="{FF2B5EF4-FFF2-40B4-BE49-F238E27FC236}">
-                  <a16:creationId xmlns:a16="http://schemas.microsoft.com/office/drawing/2014/main" xmlns="" id="{3EB5E80A-68F6-4147-BCFF-F74DA3DB3E46}"/>
+                  <a16:creationId xmlns="" xmlns:a16="http://schemas.microsoft.com/office/drawing/2014/main" id="{3EB5E80A-68F6-4147-BCFF-F74DA3DB3E46}"/>
                 </a:ext>
               </a:extLst>
             </p:cNvPr>
@@ -4038,7 +4267,7 @@
             <p:cNvPr id="4" name="Group 3">
               <a:extLst>
                 <a:ext uri="{FF2B5EF4-FFF2-40B4-BE49-F238E27FC236}">
-                  <a16:creationId xmlns:a16="http://schemas.microsoft.com/office/drawing/2014/main" xmlns="" id="{C09CA0B7-DD08-4A0C-8031-8221863EB4B6}"/>
+                  <a16:creationId xmlns="" xmlns:a16="http://schemas.microsoft.com/office/drawing/2014/main" id="{C09CA0B7-DD08-4A0C-8031-8221863EB4B6}"/>
                 </a:ext>
               </a:extLst>
             </p:cNvPr>
@@ -4058,7 +4287,7 @@
               <p:cNvPr id="7" name="Rectangle: Rounded Corners 6">
                 <a:extLst>
                   <a:ext uri="{FF2B5EF4-FFF2-40B4-BE49-F238E27FC236}">
-                    <a16:creationId xmlns:a16="http://schemas.microsoft.com/office/drawing/2014/main" xmlns="" id="{176F5D69-CC78-4939-AFF5-F034C6E99C75}"/>
+                    <a16:creationId xmlns="" xmlns:a16="http://schemas.microsoft.com/office/drawing/2014/main" id="{176F5D69-CC78-4939-AFF5-F034C6E99C75}"/>
                   </a:ext>
                 </a:extLst>
               </p:cNvPr>
@@ -4112,7 +4341,7 @@
               <p:cNvPr id="10" name="Rectangle: Rounded Corners 9">
                 <a:extLst>
                   <a:ext uri="{FF2B5EF4-FFF2-40B4-BE49-F238E27FC236}">
-                    <a16:creationId xmlns:a16="http://schemas.microsoft.com/office/drawing/2014/main" xmlns="" id="{1E96A16F-B596-4FBA-B592-5FC334CF80DF}"/>
+                    <a16:creationId xmlns="" xmlns:a16="http://schemas.microsoft.com/office/drawing/2014/main" id="{1E96A16F-B596-4FBA-B592-5FC334CF80DF}"/>
                   </a:ext>
                 </a:extLst>
               </p:cNvPr>
@@ -4166,7 +4395,7 @@
               <p:cNvPr id="15" name="Rectangle: Rounded Corners 14">
                 <a:extLst>
                   <a:ext uri="{FF2B5EF4-FFF2-40B4-BE49-F238E27FC236}">
-                    <a16:creationId xmlns:a16="http://schemas.microsoft.com/office/drawing/2014/main" xmlns="" id="{7EDBA7E2-0AE8-47A3-92EA-137D8F358368}"/>
+                    <a16:creationId xmlns="" xmlns:a16="http://schemas.microsoft.com/office/drawing/2014/main" id="{7EDBA7E2-0AE8-47A3-92EA-137D8F358368}"/>
                   </a:ext>
                 </a:extLst>
               </p:cNvPr>
@@ -4230,7 +4459,7 @@
 </p:sld>
 </file>
 
-<file path=ppt/slides/slide15.xml><?xml version="1.0" encoding="utf-8"?>
+<file path=ppt/slides/slide16.xml><?xml version="1.0" encoding="utf-8"?>
 <p:sld xmlns:a="http://schemas.openxmlformats.org/drawingml/2006/main" xmlns:r="http://schemas.openxmlformats.org/officeDocument/2006/relationships" xmlns:p="http://schemas.openxmlformats.org/presentationml/2006/main">
   <p:cSld>
     <p:spTree>
@@ -4252,7 +4481,7 @@
           <p:cNvPr id="4" name="Picture 3">
             <a:extLst>
               <a:ext uri="{FF2B5EF4-FFF2-40B4-BE49-F238E27FC236}">
-                <a16:creationId xmlns:a16="http://schemas.microsoft.com/office/drawing/2014/main" xmlns="" id="{893C1B8B-E02B-4818-96B2-9BF08A7E2397}"/>
+                <a16:creationId xmlns="" xmlns:a16="http://schemas.microsoft.com/office/drawing/2014/main" id="{893C1B8B-E02B-4818-96B2-9BF08A7E2397}"/>
               </a:ext>
             </a:extLst>
           </p:cNvPr>
@@ -4288,7 +4517,7 @@
           <p:cNvPr id="6" name="Rectangle: Rounded Corners 5">
             <a:extLst>
               <a:ext uri="{FF2B5EF4-FFF2-40B4-BE49-F238E27FC236}">
-                <a16:creationId xmlns:a16="http://schemas.microsoft.com/office/drawing/2014/main" xmlns="" id="{B678A86C-6BC7-45F6-8B5A-F11EAEB83302}"/>
+                <a16:creationId xmlns="" xmlns:a16="http://schemas.microsoft.com/office/drawing/2014/main" id="{B678A86C-6BC7-45F6-8B5A-F11EAEB83302}"/>
               </a:ext>
             </a:extLst>
           </p:cNvPr>
@@ -4344,7 +4573,7 @@
           <p:cNvPr id="8" name="Group 7">
             <a:extLst>
               <a:ext uri="{FF2B5EF4-FFF2-40B4-BE49-F238E27FC236}">
-                <a16:creationId xmlns:a16="http://schemas.microsoft.com/office/drawing/2014/main" xmlns="" id="{41D584BE-0950-4B76-BAF0-054E324A1ECE}"/>
+                <a16:creationId xmlns="" xmlns:a16="http://schemas.microsoft.com/office/drawing/2014/main" id="{41D584BE-0950-4B76-BAF0-054E324A1ECE}"/>
               </a:ext>
             </a:extLst>
           </p:cNvPr>
@@ -4371,7 +4600,7 @@
             <p:cNvPr id="9" name="Rectangle: Rounded Corners 8">
               <a:extLst>
                 <a:ext uri="{FF2B5EF4-FFF2-40B4-BE49-F238E27FC236}">
-                  <a16:creationId xmlns:a16="http://schemas.microsoft.com/office/drawing/2014/main" xmlns="" id="{7CF64681-4B56-48E5-8473-9C2EEF5315A1}"/>
+                  <a16:creationId xmlns="" xmlns:a16="http://schemas.microsoft.com/office/drawing/2014/main" id="{7CF64681-4B56-48E5-8473-9C2EEF5315A1}"/>
                 </a:ext>
               </a:extLst>
             </p:cNvPr>
@@ -4423,7 +4652,7 @@
             <p:cNvPr id="10" name="Rectangle: Rounded Corners 9">
               <a:extLst>
                 <a:ext uri="{FF2B5EF4-FFF2-40B4-BE49-F238E27FC236}">
-                  <a16:creationId xmlns:a16="http://schemas.microsoft.com/office/drawing/2014/main" xmlns="" id="{FEC3FF94-A7BD-49A1-9D72-854FC6DF720B}"/>
+                  <a16:creationId xmlns="" xmlns:a16="http://schemas.microsoft.com/office/drawing/2014/main" id="{FEC3FF94-A7BD-49A1-9D72-854FC6DF720B}"/>
                 </a:ext>
               </a:extLst>
             </p:cNvPr>
@@ -4480,7 +4709,7 @@
           <p:cNvPr id="11" name="Rectangle: Rounded Corners 10">
             <a:extLst>
               <a:ext uri="{FF2B5EF4-FFF2-40B4-BE49-F238E27FC236}">
-                <a16:creationId xmlns:a16="http://schemas.microsoft.com/office/drawing/2014/main" xmlns="" id="{39E6E6C5-8ECD-4AC2-9314-A0D9C7964A9D}"/>
+                <a16:creationId xmlns="" xmlns:a16="http://schemas.microsoft.com/office/drawing/2014/main" id="{39E6E6C5-8ECD-4AC2-9314-A0D9C7964A9D}"/>
               </a:ext>
             </a:extLst>
           </p:cNvPr>
@@ -4534,7 +4763,7 @@
           <p:cNvPr id="5" name="Group 4">
             <a:extLst>
               <a:ext uri="{FF2B5EF4-FFF2-40B4-BE49-F238E27FC236}">
-                <a16:creationId xmlns:a16="http://schemas.microsoft.com/office/drawing/2014/main" xmlns="" id="{00607648-5214-4A6A-9269-7EE828B6459D}"/>
+                <a16:creationId xmlns="" xmlns:a16="http://schemas.microsoft.com/office/drawing/2014/main" id="{00607648-5214-4A6A-9269-7EE828B6459D}"/>
               </a:ext>
             </a:extLst>
           </p:cNvPr>
@@ -4554,7 +4783,7 @@
             <p:cNvPr id="2" name="Flowchart: Off-page Connector 1">
               <a:extLst>
                 <a:ext uri="{FF2B5EF4-FFF2-40B4-BE49-F238E27FC236}">
-                  <a16:creationId xmlns:a16="http://schemas.microsoft.com/office/drawing/2014/main" xmlns="" id="{022A41D4-8D7D-4F11-AE22-07A76C42B5C5}"/>
+                  <a16:creationId xmlns="" xmlns:a16="http://schemas.microsoft.com/office/drawing/2014/main" id="{022A41D4-8D7D-4F11-AE22-07A76C42B5C5}"/>
                 </a:ext>
               </a:extLst>
             </p:cNvPr>
@@ -4608,7 +4837,7 @@
             <p:cNvPr id="12" name="Flowchart: Off-page Connector 11">
               <a:extLst>
                 <a:ext uri="{FF2B5EF4-FFF2-40B4-BE49-F238E27FC236}">
-                  <a16:creationId xmlns:a16="http://schemas.microsoft.com/office/drawing/2014/main" xmlns="" id="{BC8BA1D5-5BDD-451B-8FE5-5776D661984E}"/>
+                  <a16:creationId xmlns="" xmlns:a16="http://schemas.microsoft.com/office/drawing/2014/main" id="{BC8BA1D5-5BDD-451B-8FE5-5776D661984E}"/>
                 </a:ext>
               </a:extLst>
             </p:cNvPr>
@@ -4661,7 +4890,7 @@
             <p:cNvPr id="14" name="Flowchart: Off-page Connector 13">
               <a:extLst>
                 <a:ext uri="{FF2B5EF4-FFF2-40B4-BE49-F238E27FC236}">
-                  <a16:creationId xmlns:a16="http://schemas.microsoft.com/office/drawing/2014/main" xmlns="" id="{8EF4A54E-54C3-4523-AEA9-926E131C3E87}"/>
+                  <a16:creationId xmlns="" xmlns:a16="http://schemas.microsoft.com/office/drawing/2014/main" id="{8EF4A54E-54C3-4523-AEA9-926E131C3E87}"/>
                 </a:ext>
               </a:extLst>
             </p:cNvPr>
@@ -4714,7 +4943,7 @@
           <p:cNvPr id="17" name="Flowchart: Off-page Connector 16">
             <a:extLst>
               <a:ext uri="{FF2B5EF4-FFF2-40B4-BE49-F238E27FC236}">
-                <a16:creationId xmlns:a16="http://schemas.microsoft.com/office/drawing/2014/main" xmlns="" id="{135B49B5-57F3-46FC-A1B0-9359315003EB}"/>
+                <a16:creationId xmlns="" xmlns:a16="http://schemas.microsoft.com/office/drawing/2014/main" id="{135B49B5-57F3-46FC-A1B0-9359315003EB}"/>
               </a:ext>
             </a:extLst>
           </p:cNvPr>
@@ -4843,7 +5072,7 @@
           <p:cNvPr id="18" name="Flowchart: Off-page Connector 17">
             <a:extLst>
               <a:ext uri="{FF2B5EF4-FFF2-40B4-BE49-F238E27FC236}">
-                <a16:creationId xmlns:a16="http://schemas.microsoft.com/office/drawing/2014/main" xmlns="" id="{E737D2D3-78EF-4E68-B92A-064A22C23820}"/>
+                <a16:creationId xmlns="" xmlns:a16="http://schemas.microsoft.com/office/drawing/2014/main" id="{E737D2D3-78EF-4E68-B92A-064A22C23820}"/>
               </a:ext>
             </a:extLst>
           </p:cNvPr>
@@ -4971,7 +5200,7 @@
           <p:cNvPr id="19" name="Flowchart: Off-page Connector 18">
             <a:extLst>
               <a:ext uri="{FF2B5EF4-FFF2-40B4-BE49-F238E27FC236}">
-                <a16:creationId xmlns:a16="http://schemas.microsoft.com/office/drawing/2014/main" xmlns="" id="{6F2D6C6C-F6B2-4AD6-A355-88D152E7ABBE}"/>
+                <a16:creationId xmlns="" xmlns:a16="http://schemas.microsoft.com/office/drawing/2014/main" id="{6F2D6C6C-F6B2-4AD6-A355-88D152E7ABBE}"/>
               </a:ext>
             </a:extLst>
           </p:cNvPr>
@@ -5113,7 +5342,7 @@
 </p:sld>
 </file>
 
-<file path=ppt/slides/slide16.xml><?xml version="1.0" encoding="utf-8"?>
+<file path=ppt/slides/slide17.xml><?xml version="1.0" encoding="utf-8"?>
 <p:sld xmlns:a="http://schemas.openxmlformats.org/drawingml/2006/main" xmlns:r="http://schemas.openxmlformats.org/officeDocument/2006/relationships" xmlns:p="http://schemas.openxmlformats.org/presentationml/2006/main">
   <p:cSld>
     <p:spTree>
@@ -5135,7 +5364,7 @@
           <p:cNvPr id="3" name="Speech Bubble: Oval 2">
             <a:extLst>
               <a:ext uri="{FF2B5EF4-FFF2-40B4-BE49-F238E27FC236}">
-                <a16:creationId xmlns:a16="http://schemas.microsoft.com/office/drawing/2014/main" xmlns="" id="{79F1B147-DA1D-4AF8-951E-F8176B89679F}"/>
+                <a16:creationId xmlns="" xmlns:a16="http://schemas.microsoft.com/office/drawing/2014/main" id="{79F1B147-DA1D-4AF8-951E-F8176B89679F}"/>
               </a:ext>
             </a:extLst>
           </p:cNvPr>
@@ -5198,7 +5427,7 @@
 </p:sld>
 </file>
 
-<file path=ppt/slides/slide17.xml><?xml version="1.0" encoding="utf-8"?>
+<file path=ppt/slides/slide18.xml><?xml version="1.0" encoding="utf-8"?>
 <p:sld xmlns:a="http://schemas.openxmlformats.org/drawingml/2006/main" xmlns:r="http://schemas.openxmlformats.org/officeDocument/2006/relationships" xmlns:p="http://schemas.openxmlformats.org/presentationml/2006/main">
   <p:cSld>
     <p:spTree>
@@ -5220,7 +5449,7 @@
           <p:cNvPr id="4" name="Rectangle: Rounded Corners 3">
             <a:extLst>
               <a:ext uri="{FF2B5EF4-FFF2-40B4-BE49-F238E27FC236}">
-                <a16:creationId xmlns:a16="http://schemas.microsoft.com/office/drawing/2014/main" xmlns="" id="{532DB011-E88D-4B95-B5E6-96CC2D277837}"/>
+                <a16:creationId xmlns="" xmlns:a16="http://schemas.microsoft.com/office/drawing/2014/main" id="{532DB011-E88D-4B95-B5E6-96CC2D277837}"/>
               </a:ext>
             </a:extLst>
           </p:cNvPr>
@@ -5276,7 +5505,7 @@
           <p:cNvPr id="5" name="Rectangle: Rounded Corners 4">
             <a:extLst>
               <a:ext uri="{FF2B5EF4-FFF2-40B4-BE49-F238E27FC236}">
-                <a16:creationId xmlns:a16="http://schemas.microsoft.com/office/drawing/2014/main" xmlns="" id="{90B2765F-ADB7-44D8-940A-CB41C96B4176}"/>
+                <a16:creationId xmlns="" xmlns:a16="http://schemas.microsoft.com/office/drawing/2014/main" id="{90B2765F-ADB7-44D8-940A-CB41C96B4176}"/>
               </a:ext>
             </a:extLst>
           </p:cNvPr>
@@ -5340,7 +5569,7 @@
 </p:sld>
 </file>
 
-<file path=ppt/slides/slide18.xml><?xml version="1.0" encoding="utf-8"?>
+<file path=ppt/slides/slide19.xml><?xml version="1.0" encoding="utf-8"?>
 <p:sld xmlns:a="http://schemas.openxmlformats.org/drawingml/2006/main" xmlns:r="http://schemas.openxmlformats.org/officeDocument/2006/relationships" xmlns:p="http://schemas.openxmlformats.org/presentationml/2006/main">
   <p:cSld>
     <p:spTree>
@@ -5362,7 +5591,7 @@
           <p:cNvPr id="4" name="Picture 3">
             <a:extLst>
               <a:ext uri="{FF2B5EF4-FFF2-40B4-BE49-F238E27FC236}">
-                <a16:creationId xmlns:a16="http://schemas.microsoft.com/office/drawing/2014/main" xmlns="" id="{29C3914B-9583-47E8-B98E-4081628F9CF2}"/>
+                <a16:creationId xmlns="" xmlns:a16="http://schemas.microsoft.com/office/drawing/2014/main" id="{29C3914B-9583-47E8-B98E-4081628F9CF2}"/>
               </a:ext>
             </a:extLst>
           </p:cNvPr>
@@ -5398,7 +5627,7 @@
           <p:cNvPr id="5" name="Heart 4">
             <a:extLst>
               <a:ext uri="{FF2B5EF4-FFF2-40B4-BE49-F238E27FC236}">
-                <a16:creationId xmlns:a16="http://schemas.microsoft.com/office/drawing/2014/main" xmlns="" id="{A9CB7D6B-1111-45B7-9BE6-9F6A4DE67728}"/>
+                <a16:creationId xmlns="" xmlns:a16="http://schemas.microsoft.com/office/drawing/2014/main" id="{A9CB7D6B-1111-45B7-9BE6-9F6A4DE67728}"/>
               </a:ext>
             </a:extLst>
           </p:cNvPr>
@@ -5469,7 +5698,177 @@
 </p:sld>
 </file>
 
-<file path=ppt/slides/slide19.xml><?xml version="1.0" encoding="utf-8"?>
+<file path=ppt/slides/slide2.xml><?xml version="1.0" encoding="utf-8"?>
+<p:sld xmlns:a="http://schemas.openxmlformats.org/drawingml/2006/main" xmlns:r="http://schemas.openxmlformats.org/officeDocument/2006/relationships" xmlns:p="http://schemas.openxmlformats.org/presentationml/2006/main">
+  <p:cSld>
+    <p:spTree>
+      <p:nvGrpSpPr>
+        <p:cNvPr id="1" name=""/>
+        <p:cNvGrpSpPr/>
+        <p:nvPr/>
+      </p:nvGrpSpPr>
+      <p:grpSpPr>
+        <a:xfrm>
+          <a:off x="0" y="0"/>
+          <a:ext cx="0" cy="0"/>
+          <a:chOff x="0" y="0"/>
+          <a:chExt cx="0" cy="0"/>
+        </a:xfrm>
+      </p:grpSpPr>
+      <p:sp>
+        <p:nvSpPr>
+          <p:cNvPr id="4" name="Oval 3"/>
+          <p:cNvSpPr/>
+          <p:nvPr/>
+        </p:nvSpPr>
+        <p:spPr>
+          <a:xfrm>
+            <a:off x="3355759" y="2212759"/>
+            <a:ext cx="2432482" cy="2432482"/>
+          </a:xfrm>
+          <a:prstGeom prst="ellipse">
+            <a:avLst/>
+          </a:prstGeom>
+          <a:noFill/>
+          <a:ln w="317500">
+            <a:solidFill>
+              <a:schemeClr val="bg1"/>
+            </a:solidFill>
+          </a:ln>
+        </p:spPr>
+        <p:style>
+          <a:lnRef idx="2">
+            <a:schemeClr val="accent1">
+              <a:shade val="50000"/>
+            </a:schemeClr>
+          </a:lnRef>
+          <a:fillRef idx="1">
+            <a:schemeClr val="accent1"/>
+          </a:fillRef>
+          <a:effectRef idx="0">
+            <a:schemeClr val="accent1"/>
+          </a:effectRef>
+          <a:fontRef idx="minor">
+            <a:schemeClr val="lt1"/>
+          </a:fontRef>
+        </p:style>
+        <p:txBody>
+          <a:bodyPr rtlCol="0" anchor="ctr"/>
+          <a:lstStyle/>
+          <a:p>
+            <a:pPr algn="ctr"/>
+            <a:endParaRPr lang="en-IN"/>
+          </a:p>
+        </p:txBody>
+      </p:sp>
+      <p:sp>
+        <p:nvSpPr>
+          <p:cNvPr id="6" name="Arc 5"/>
+          <p:cNvSpPr/>
+          <p:nvPr/>
+        </p:nvSpPr>
+        <p:spPr>
+          <a:xfrm>
+            <a:off x="3851910" y="2708910"/>
+            <a:ext cx="1440180" cy="1440180"/>
+          </a:xfrm>
+          <a:prstGeom prst="arc">
+            <a:avLst/>
+          </a:prstGeom>
+          <a:noFill/>
+          <a:ln w="317500" cap="rnd">
+            <a:solidFill>
+              <a:schemeClr val="bg1"/>
+            </a:solidFill>
+          </a:ln>
+        </p:spPr>
+        <p:style>
+          <a:lnRef idx="2">
+            <a:schemeClr val="accent1">
+              <a:shade val="50000"/>
+            </a:schemeClr>
+          </a:lnRef>
+          <a:fillRef idx="1">
+            <a:schemeClr val="accent1"/>
+          </a:fillRef>
+          <a:effectRef idx="0">
+            <a:schemeClr val="accent1"/>
+          </a:effectRef>
+          <a:fontRef idx="minor">
+            <a:schemeClr val="lt1"/>
+          </a:fontRef>
+        </p:style>
+        <p:txBody>
+          <a:bodyPr rtlCol="0" anchor="ctr"/>
+          <a:lstStyle/>
+          <a:p>
+            <a:pPr algn="ctr"/>
+            <a:endParaRPr lang="en-IN"/>
+          </a:p>
+        </p:txBody>
+      </p:sp>
+      <p:pic>
+        <p:nvPicPr>
+          <p:cNvPr id="1026" name="Picture 2" descr="C:\Repos\SlideAway\Assets\Textures\BallIconStart.png"/>
+          <p:cNvPicPr>
+            <a:picLocks noChangeAspect="1" noChangeArrowheads="1"/>
+          </p:cNvPicPr>
+          <p:nvPr/>
+        </p:nvPicPr>
+        <p:blipFill>
+          <a:blip r:embed="rId2">
+            <a:extLst>
+              <a:ext uri="{28A0092B-C50C-407E-A947-70E740481C1C}">
+                <a14:useLocalDpi xmlns:a14="http://schemas.microsoft.com/office/drawing/2010/main" val="0"/>
+              </a:ext>
+            </a:extLst>
+          </a:blip>
+          <a:srcRect/>
+          <a:stretch>
+            <a:fillRect/>
+          </a:stretch>
+        </p:blipFill>
+        <p:spPr bwMode="auto">
+          <a:xfrm>
+            <a:off x="3194418" y="2054465"/>
+            <a:ext cx="2755164" cy="2749069"/>
+          </a:xfrm>
+          <a:prstGeom prst="rect">
+            <a:avLst/>
+          </a:prstGeom>
+          <a:noFill/>
+          <a:extLst>
+            <a:ext uri="{909E8E84-426E-40DD-AFC4-6F175D3DCCD1}">
+              <a14:hiddenFill xmlns:a14="http://schemas.microsoft.com/office/drawing/2010/main">
+                <a:solidFill>
+                  <a:srgbClr val="FFFFFF"/>
+                </a:solidFill>
+              </a14:hiddenFill>
+            </a:ext>
+          </a:extLst>
+        </p:spPr>
+      </p:pic>
+    </p:spTree>
+    <p:extLst>
+      <p:ext uri="{BB962C8B-B14F-4D97-AF65-F5344CB8AC3E}">
+        <p14:creationId xmlns:p14="http://schemas.microsoft.com/office/powerpoint/2010/main" val="198311063"/>
+      </p:ext>
+    </p:extLst>
+  </p:cSld>
+  <p:clrMapOvr>
+    <a:masterClrMapping/>
+  </p:clrMapOvr>
+  <p:timing>
+    <p:tnLst>
+      <p:par>
+        <p:cTn id="1" dur="indefinite" restart="never" nodeType="tmRoot"/>
+      </p:par>
+    </p:tnLst>
+  </p:timing>
+</p:sld>
+</file>
+
+<file path=ppt/slides/slide20.xml><?xml version="1.0" encoding="utf-8"?>
 <p:sld xmlns:a="http://schemas.openxmlformats.org/drawingml/2006/main" xmlns:r="http://schemas.openxmlformats.org/officeDocument/2006/relationships" xmlns:p="http://schemas.openxmlformats.org/presentationml/2006/main">
   <p:cSld>
     <p:spTree>
@@ -5491,7 +5890,7 @@
           <p:cNvPr id="2" name="Rectangle 1">
             <a:extLst>
               <a:ext uri="{FF2B5EF4-FFF2-40B4-BE49-F238E27FC236}">
-                <a16:creationId xmlns:a16="http://schemas.microsoft.com/office/drawing/2014/main" xmlns="" id="{32C61CE2-8423-40A5-BD57-CB60A710678F}"/>
+                <a16:creationId xmlns="" xmlns:a16="http://schemas.microsoft.com/office/drawing/2014/main" id="{32C61CE2-8423-40A5-BD57-CB60A710678F}"/>
               </a:ext>
             </a:extLst>
           </p:cNvPr>
@@ -5551,90 +5950,7 @@
 </p:sld>
 </file>
 
-<file path=ppt/slides/slide2.xml><?xml version="1.0" encoding="utf-8"?>
-<p:sld xmlns:a="http://schemas.openxmlformats.org/drawingml/2006/main" xmlns:r="http://schemas.openxmlformats.org/officeDocument/2006/relationships" xmlns:p="http://schemas.openxmlformats.org/presentationml/2006/main">
-  <p:cSld>
-    <p:spTree>
-      <p:nvGrpSpPr>
-        <p:cNvPr id="1" name=""/>
-        <p:cNvGrpSpPr/>
-        <p:nvPr/>
-      </p:nvGrpSpPr>
-      <p:grpSpPr>
-        <a:xfrm>
-          <a:off x="0" y="0"/>
-          <a:ext cx="0" cy="0"/>
-          <a:chOff x="0" y="0"/>
-          <a:chExt cx="0" cy="0"/>
-        </a:xfrm>
-      </p:grpSpPr>
-      <p:sp>
-        <p:nvSpPr>
-          <p:cNvPr id="2" name="Rectangle 1"/>
-          <p:cNvSpPr/>
-          <p:nvPr/>
-        </p:nvSpPr>
-        <p:spPr>
-          <a:xfrm rot="18900000">
-            <a:off x="4438835" y="1957526"/>
-            <a:ext cx="266330" cy="2942948"/>
-          </a:xfrm>
-          <a:prstGeom prst="rect">
-            <a:avLst/>
-          </a:prstGeom>
-          <a:solidFill>
-            <a:schemeClr val="bg1"/>
-          </a:solidFill>
-          <a:ln>
-            <a:noFill/>
-          </a:ln>
-        </p:spPr>
-        <p:style>
-          <a:lnRef idx="2">
-            <a:schemeClr val="accent1">
-              <a:shade val="50000"/>
-            </a:schemeClr>
-          </a:lnRef>
-          <a:fillRef idx="1">
-            <a:schemeClr val="accent1"/>
-          </a:fillRef>
-          <a:effectRef idx="0">
-            <a:schemeClr val="accent1"/>
-          </a:effectRef>
-          <a:fontRef idx="minor">
-            <a:schemeClr val="lt1"/>
-          </a:fontRef>
-        </p:style>
-        <p:txBody>
-          <a:bodyPr rtlCol="0" anchor="ctr"/>
-          <a:lstStyle/>
-          <a:p>
-            <a:pPr algn="ctr"/>
-            <a:endParaRPr lang="en-IN"/>
-          </a:p>
-        </p:txBody>
-      </p:sp>
-    </p:spTree>
-    <p:extLst>
-      <p:ext uri="{BB962C8B-B14F-4D97-AF65-F5344CB8AC3E}">
-        <p14:creationId xmlns:p14="http://schemas.microsoft.com/office/powerpoint/2010/main" val="3332374155"/>
-      </p:ext>
-    </p:extLst>
-  </p:cSld>
-  <p:clrMapOvr>
-    <a:masterClrMapping/>
-  </p:clrMapOvr>
-  <p:timing>
-    <p:tnLst>
-      <p:par>
-        <p:cTn id="1" dur="indefinite" restart="never" nodeType="tmRoot"/>
-      </p:par>
-    </p:tnLst>
-  </p:timing>
-</p:sld>
-</file>
-
-<file path=ppt/slides/slide20.xml><?xml version="1.0" encoding="utf-8"?>
+<file path=ppt/slides/slide21.xml><?xml version="1.0" encoding="utf-8"?>
 <p:sld xmlns:a="http://schemas.openxmlformats.org/drawingml/2006/main" xmlns:r="http://schemas.openxmlformats.org/officeDocument/2006/relationships" xmlns:p="http://schemas.openxmlformats.org/presentationml/2006/main">
   <p:cSld>
     <p:spTree>
@@ -5656,7 +5972,7 @@
           <p:cNvPr id="3" name="Rectangle 2">
             <a:extLst>
               <a:ext uri="{FF2B5EF4-FFF2-40B4-BE49-F238E27FC236}">
-                <a16:creationId xmlns:a16="http://schemas.microsoft.com/office/drawing/2014/main" xmlns="" id="{207AF6DD-ECCA-43F6-9535-AE4D31B9762C}"/>
+                <a16:creationId xmlns="" xmlns:a16="http://schemas.microsoft.com/office/drawing/2014/main" id="{207AF6DD-ECCA-43F6-9535-AE4D31B9762C}"/>
               </a:ext>
             </a:extLst>
           </p:cNvPr>
@@ -5719,7 +6035,7 @@
 </p:sld>
 </file>
 
-<file path=ppt/slides/slide21.xml><?xml version="1.0" encoding="utf-8"?>
+<file path=ppt/slides/slide22.xml><?xml version="1.0" encoding="utf-8"?>
 <p:sld xmlns:a="http://schemas.openxmlformats.org/drawingml/2006/main" xmlns:r="http://schemas.openxmlformats.org/officeDocument/2006/relationships" xmlns:p="http://schemas.openxmlformats.org/presentationml/2006/main">
   <p:cSld>
     <p:spTree>
@@ -5741,7 +6057,7 @@
           <p:cNvPr id="18" name="Group 17">
             <a:extLst>
               <a:ext uri="{FF2B5EF4-FFF2-40B4-BE49-F238E27FC236}">
-                <a16:creationId xmlns:a16="http://schemas.microsoft.com/office/drawing/2014/main" xmlns="" id="{296FEBEB-E6C9-45D8-BED5-B963E50B6C8B}"/>
+                <a16:creationId xmlns="" xmlns:a16="http://schemas.microsoft.com/office/drawing/2014/main" id="{296FEBEB-E6C9-45D8-BED5-B963E50B6C8B}"/>
               </a:ext>
             </a:extLst>
           </p:cNvPr>
@@ -5761,7 +6077,7 @@
             <p:cNvPr id="2" name="Rectangle 1">
               <a:extLst>
                 <a:ext uri="{FF2B5EF4-FFF2-40B4-BE49-F238E27FC236}">
-                  <a16:creationId xmlns:a16="http://schemas.microsoft.com/office/drawing/2014/main" xmlns="" id="{6DC95FA6-49F0-43A7-9EB3-6B599F68F848}"/>
+                  <a16:creationId xmlns="" xmlns:a16="http://schemas.microsoft.com/office/drawing/2014/main" id="{6DC95FA6-49F0-43A7-9EB3-6B599F68F848}"/>
                 </a:ext>
               </a:extLst>
             </p:cNvPr>
@@ -5813,7 +6129,7 @@
             <p:cNvPr id="12" name="Rectangle 11">
               <a:extLst>
                 <a:ext uri="{FF2B5EF4-FFF2-40B4-BE49-F238E27FC236}">
-                  <a16:creationId xmlns:a16="http://schemas.microsoft.com/office/drawing/2014/main" xmlns="" id="{8C5E4EE9-8293-4139-8CF5-CC0A34FDBB41}"/>
+                  <a16:creationId xmlns="" xmlns:a16="http://schemas.microsoft.com/office/drawing/2014/main" id="{8C5E4EE9-8293-4139-8CF5-CC0A34FDBB41}"/>
                 </a:ext>
               </a:extLst>
             </p:cNvPr>
@@ -5867,7 +6183,7 @@
             <p:cNvPr id="13" name="Rectangle 12">
               <a:extLst>
                 <a:ext uri="{FF2B5EF4-FFF2-40B4-BE49-F238E27FC236}">
-                  <a16:creationId xmlns:a16="http://schemas.microsoft.com/office/drawing/2014/main" xmlns="" id="{D9ECCF58-240B-4FB2-A3F5-76942C811B28}"/>
+                  <a16:creationId xmlns="" xmlns:a16="http://schemas.microsoft.com/office/drawing/2014/main" id="{D9ECCF58-240B-4FB2-A3F5-76942C811B28}"/>
                 </a:ext>
               </a:extLst>
             </p:cNvPr>
@@ -5922,7 +6238,7 @@
           <p:cNvPr id="17" name="Rectangle: Rounded Corners 16">
             <a:extLst>
               <a:ext uri="{FF2B5EF4-FFF2-40B4-BE49-F238E27FC236}">
-                <a16:creationId xmlns:a16="http://schemas.microsoft.com/office/drawing/2014/main" xmlns="" id="{2A96BEB6-F9B6-4ADC-B384-0DBA22CE4EAA}"/>
+                <a16:creationId xmlns="" xmlns:a16="http://schemas.microsoft.com/office/drawing/2014/main" id="{2A96BEB6-F9B6-4ADC-B384-0DBA22CE4EAA}"/>
               </a:ext>
             </a:extLst>
           </p:cNvPr>
@@ -5981,7 +6297,7 @@
 </p:sld>
 </file>
 
-<file path=ppt/slides/slide22.xml><?xml version="1.0" encoding="utf-8"?>
+<file path=ppt/slides/slide23.xml><?xml version="1.0" encoding="utf-8"?>
 <p:sld xmlns:a="http://schemas.openxmlformats.org/drawingml/2006/main" xmlns:r="http://schemas.openxmlformats.org/officeDocument/2006/relationships" xmlns:p="http://schemas.openxmlformats.org/presentationml/2006/main">
   <p:cSld>
     <p:spTree>
@@ -6003,7 +6319,7 @@
           <p:cNvPr id="1026" name="Picture 2" descr="Fishing Reel Icon. Vector &amp; Photo (Free Trial) | Bigstock">
             <a:extLst>
               <a:ext uri="{FF2B5EF4-FFF2-40B4-BE49-F238E27FC236}">
-                <a16:creationId xmlns:a16="http://schemas.microsoft.com/office/drawing/2014/main" xmlns="" id="{42CD2598-1884-4198-8449-C9CBD1CEF439}"/>
+                <a16:creationId xmlns="" xmlns:a16="http://schemas.microsoft.com/office/drawing/2014/main" id="{42CD2598-1884-4198-8449-C9CBD1CEF439}"/>
               </a:ext>
             </a:extLst>
           </p:cNvPr>
@@ -6050,7 +6366,7 @@
           <p:cNvPr id="1028" name="Picture 4" descr="Fishing reel - Free sports icons">
             <a:extLst>
               <a:ext uri="{FF2B5EF4-FFF2-40B4-BE49-F238E27FC236}">
-                <a16:creationId xmlns:a16="http://schemas.microsoft.com/office/drawing/2014/main" xmlns="" id="{C3AFD24C-99DA-4921-A1CD-37620D1DFB48}"/>
+                <a16:creationId xmlns="" xmlns:a16="http://schemas.microsoft.com/office/drawing/2014/main" id="{C3AFD24C-99DA-4921-A1CD-37620D1DFB48}"/>
               </a:ext>
             </a:extLst>
           </p:cNvPr>
@@ -6097,7 +6413,7 @@
           <p:cNvPr id="36" name="Freeform: Shape 35">
             <a:extLst>
               <a:ext uri="{FF2B5EF4-FFF2-40B4-BE49-F238E27FC236}">
-                <a16:creationId xmlns:a16="http://schemas.microsoft.com/office/drawing/2014/main" xmlns="" id="{7C0A1675-41AB-4473-A1B1-DA52410A6636}"/>
+                <a16:creationId xmlns="" xmlns:a16="http://schemas.microsoft.com/office/drawing/2014/main" id="{7C0A1675-41AB-4473-A1B1-DA52410A6636}"/>
               </a:ext>
             </a:extLst>
           </p:cNvPr>
@@ -6691,7 +7007,7 @@
           <p:cNvPr id="21" name="Group 20">
             <a:extLst>
               <a:ext uri="{FF2B5EF4-FFF2-40B4-BE49-F238E27FC236}">
-                <a16:creationId xmlns:a16="http://schemas.microsoft.com/office/drawing/2014/main" xmlns="" id="{63EDE57A-D111-45CB-BB58-A3E574C2A061}"/>
+                <a16:creationId xmlns="" xmlns:a16="http://schemas.microsoft.com/office/drawing/2014/main" id="{63EDE57A-D111-45CB-BB58-A3E574C2A061}"/>
               </a:ext>
             </a:extLst>
           </p:cNvPr>
@@ -6711,7 +7027,7 @@
             <p:cNvPr id="22" name="Oval 21">
               <a:extLst>
                 <a:ext uri="{FF2B5EF4-FFF2-40B4-BE49-F238E27FC236}">
-                  <a16:creationId xmlns:a16="http://schemas.microsoft.com/office/drawing/2014/main" xmlns="" id="{36CD6310-BC74-420A-A87A-6967BD1377E2}"/>
+                  <a16:creationId xmlns="" xmlns:a16="http://schemas.microsoft.com/office/drawing/2014/main" id="{36CD6310-BC74-420A-A87A-6967BD1377E2}"/>
                 </a:ext>
               </a:extLst>
             </p:cNvPr>
@@ -6760,7 +7076,7 @@
             <p:cNvPr id="23" name="Oval 22">
               <a:extLst>
                 <a:ext uri="{FF2B5EF4-FFF2-40B4-BE49-F238E27FC236}">
-                  <a16:creationId xmlns:a16="http://schemas.microsoft.com/office/drawing/2014/main" xmlns="" id="{6E067BED-B36A-4BB9-8BAA-2F725D363FC9}"/>
+                  <a16:creationId xmlns="" xmlns:a16="http://schemas.microsoft.com/office/drawing/2014/main" id="{6E067BED-B36A-4BB9-8BAA-2F725D363FC9}"/>
                 </a:ext>
               </a:extLst>
             </p:cNvPr>
@@ -6812,7 +7128,7 @@
             <p:cNvPr id="24" name="Oval 23">
               <a:extLst>
                 <a:ext uri="{FF2B5EF4-FFF2-40B4-BE49-F238E27FC236}">
-                  <a16:creationId xmlns:a16="http://schemas.microsoft.com/office/drawing/2014/main" xmlns="" id="{5C9C3BAD-3123-4F35-A610-EEE18C0973B0}"/>
+                  <a16:creationId xmlns="" xmlns:a16="http://schemas.microsoft.com/office/drawing/2014/main" id="{5C9C3BAD-3123-4F35-A610-EEE18C0973B0}"/>
                 </a:ext>
               </a:extLst>
             </p:cNvPr>
@@ -6864,7 +7180,7 @@
             <p:cNvPr id="25" name="Group 24">
               <a:extLst>
                 <a:ext uri="{FF2B5EF4-FFF2-40B4-BE49-F238E27FC236}">
-                  <a16:creationId xmlns:a16="http://schemas.microsoft.com/office/drawing/2014/main" xmlns="" id="{3133B8AA-2578-44F2-B68A-D88D0EF5B419}"/>
+                  <a16:creationId xmlns="" xmlns:a16="http://schemas.microsoft.com/office/drawing/2014/main" id="{3133B8AA-2578-44F2-B68A-D88D0EF5B419}"/>
                 </a:ext>
               </a:extLst>
             </p:cNvPr>
@@ -6884,7 +7200,7 @@
               <p:cNvPr id="33" name="Oval 32">
                 <a:extLst>
                   <a:ext uri="{FF2B5EF4-FFF2-40B4-BE49-F238E27FC236}">
-                    <a16:creationId xmlns:a16="http://schemas.microsoft.com/office/drawing/2014/main" xmlns="" id="{D26644F3-46C9-4D4B-99EF-32026CDED056}"/>
+                    <a16:creationId xmlns="" xmlns:a16="http://schemas.microsoft.com/office/drawing/2014/main" id="{D26644F3-46C9-4D4B-99EF-32026CDED056}"/>
                   </a:ext>
                 </a:extLst>
               </p:cNvPr>
@@ -6936,7 +7252,7 @@
               <p:cNvPr id="34" name="Oval 33">
                 <a:extLst>
                   <a:ext uri="{FF2B5EF4-FFF2-40B4-BE49-F238E27FC236}">
-                    <a16:creationId xmlns:a16="http://schemas.microsoft.com/office/drawing/2014/main" xmlns="" id="{2FCEDCED-0E11-401D-A06A-3A0EA08BEC29}"/>
+                    <a16:creationId xmlns="" xmlns:a16="http://schemas.microsoft.com/office/drawing/2014/main" id="{2FCEDCED-0E11-401D-A06A-3A0EA08BEC29}"/>
                   </a:ext>
                 </a:extLst>
               </p:cNvPr>
@@ -6989,7 +7305,7 @@
             <p:cNvPr id="26" name="Group 25">
               <a:extLst>
                 <a:ext uri="{FF2B5EF4-FFF2-40B4-BE49-F238E27FC236}">
-                  <a16:creationId xmlns:a16="http://schemas.microsoft.com/office/drawing/2014/main" xmlns="" id="{B1BA5735-B8DF-43F1-BE41-AEC36D9B4D0D}"/>
+                  <a16:creationId xmlns="" xmlns:a16="http://schemas.microsoft.com/office/drawing/2014/main" id="{B1BA5735-B8DF-43F1-BE41-AEC36D9B4D0D}"/>
                 </a:ext>
               </a:extLst>
             </p:cNvPr>
@@ -7009,7 +7325,7 @@
               <p:cNvPr id="31" name="Oval 30">
                 <a:extLst>
                   <a:ext uri="{FF2B5EF4-FFF2-40B4-BE49-F238E27FC236}">
-                    <a16:creationId xmlns:a16="http://schemas.microsoft.com/office/drawing/2014/main" xmlns="" id="{DD9E0A75-9B49-44EB-A74D-64748A2C950E}"/>
+                    <a16:creationId xmlns="" xmlns:a16="http://schemas.microsoft.com/office/drawing/2014/main" id="{DD9E0A75-9B49-44EB-A74D-64748A2C950E}"/>
                   </a:ext>
                 </a:extLst>
               </p:cNvPr>
@@ -7061,7 +7377,7 @@
               <p:cNvPr id="32" name="Oval 31">
                 <a:extLst>
                   <a:ext uri="{FF2B5EF4-FFF2-40B4-BE49-F238E27FC236}">
-                    <a16:creationId xmlns:a16="http://schemas.microsoft.com/office/drawing/2014/main" xmlns="" id="{6F6267FB-6D55-4BBF-AE56-A4889852ADC3}"/>
+                    <a16:creationId xmlns="" xmlns:a16="http://schemas.microsoft.com/office/drawing/2014/main" id="{6F6267FB-6D55-4BBF-AE56-A4889852ADC3}"/>
                   </a:ext>
                 </a:extLst>
               </p:cNvPr>
@@ -7114,7 +7430,7 @@
             <p:cNvPr id="27" name="Group 26">
               <a:extLst>
                 <a:ext uri="{FF2B5EF4-FFF2-40B4-BE49-F238E27FC236}">
-                  <a16:creationId xmlns:a16="http://schemas.microsoft.com/office/drawing/2014/main" xmlns="" id="{3938A498-AD65-4C70-A0C4-3E9C1E8383E5}"/>
+                  <a16:creationId xmlns="" xmlns:a16="http://schemas.microsoft.com/office/drawing/2014/main" id="{3938A498-AD65-4C70-A0C4-3E9C1E8383E5}"/>
                 </a:ext>
               </a:extLst>
             </p:cNvPr>
@@ -7134,7 +7450,7 @@
               <p:cNvPr id="29" name="Oval 28">
                 <a:extLst>
                   <a:ext uri="{FF2B5EF4-FFF2-40B4-BE49-F238E27FC236}">
-                    <a16:creationId xmlns:a16="http://schemas.microsoft.com/office/drawing/2014/main" xmlns="" id="{CF878B12-6270-4B6A-896C-613922D70B91}"/>
+                    <a16:creationId xmlns="" xmlns:a16="http://schemas.microsoft.com/office/drawing/2014/main" id="{CF878B12-6270-4B6A-896C-613922D70B91}"/>
                   </a:ext>
                 </a:extLst>
               </p:cNvPr>
@@ -7186,7 +7502,7 @@
               <p:cNvPr id="30" name="Oval 29">
                 <a:extLst>
                   <a:ext uri="{FF2B5EF4-FFF2-40B4-BE49-F238E27FC236}">
-                    <a16:creationId xmlns:a16="http://schemas.microsoft.com/office/drawing/2014/main" xmlns="" id="{541E30A1-911C-4CB6-965A-4794CC47891A}"/>
+                    <a16:creationId xmlns="" xmlns:a16="http://schemas.microsoft.com/office/drawing/2014/main" id="{541E30A1-911C-4CB6-965A-4794CC47891A}"/>
                   </a:ext>
                 </a:extLst>
               </p:cNvPr>
@@ -7239,7 +7555,7 @@
             <p:cNvPr id="28" name="Oval 27">
               <a:extLst>
                 <a:ext uri="{FF2B5EF4-FFF2-40B4-BE49-F238E27FC236}">
-                  <a16:creationId xmlns:a16="http://schemas.microsoft.com/office/drawing/2014/main" xmlns="" id="{87BF42C7-7805-4F6A-88A5-7B6FE49F1749}"/>
+                  <a16:creationId xmlns="" xmlns:a16="http://schemas.microsoft.com/office/drawing/2014/main" id="{87BF42C7-7805-4F6A-88A5-7B6FE49F1749}"/>
                 </a:ext>
               </a:extLst>
             </p:cNvPr>
@@ -7292,7 +7608,7 @@
           <p:cNvPr id="37" name="Group 36">
             <a:extLst>
               <a:ext uri="{FF2B5EF4-FFF2-40B4-BE49-F238E27FC236}">
-                <a16:creationId xmlns:a16="http://schemas.microsoft.com/office/drawing/2014/main" xmlns="" id="{CC1A29CF-1719-4074-BBFD-580735A086D4}"/>
+                <a16:creationId xmlns="" xmlns:a16="http://schemas.microsoft.com/office/drawing/2014/main" id="{CC1A29CF-1719-4074-BBFD-580735A086D4}"/>
               </a:ext>
             </a:extLst>
           </p:cNvPr>
@@ -7315,7 +7631,7 @@
             <p:cNvPr id="19" name="Rectangle: Top Corners Rounded 18">
               <a:extLst>
                 <a:ext uri="{FF2B5EF4-FFF2-40B4-BE49-F238E27FC236}">
-                  <a16:creationId xmlns:a16="http://schemas.microsoft.com/office/drawing/2014/main" xmlns="" id="{94F72908-535E-4D89-8109-9F2A06ED09CE}"/>
+                  <a16:creationId xmlns="" xmlns:a16="http://schemas.microsoft.com/office/drawing/2014/main" id="{94F72908-535E-4D89-8109-9F2A06ED09CE}"/>
                 </a:ext>
               </a:extLst>
             </p:cNvPr>
@@ -7372,7 +7688,7 @@
             <p:cNvPr id="20" name="Oval 19">
               <a:extLst>
                 <a:ext uri="{FF2B5EF4-FFF2-40B4-BE49-F238E27FC236}">
-                  <a16:creationId xmlns:a16="http://schemas.microsoft.com/office/drawing/2014/main" xmlns="" id="{3225F8AE-768E-4B74-94DE-39957BD55381}"/>
+                  <a16:creationId xmlns="" xmlns:a16="http://schemas.microsoft.com/office/drawing/2014/main" id="{3225F8AE-768E-4B74-94DE-39957BD55381}"/>
                 </a:ext>
               </a:extLst>
             </p:cNvPr>
@@ -7427,7 +7743,7 @@
           <p:cNvPr id="39" name="Rectangle 38">
             <a:extLst>
               <a:ext uri="{FF2B5EF4-FFF2-40B4-BE49-F238E27FC236}">
-                <a16:creationId xmlns:a16="http://schemas.microsoft.com/office/drawing/2014/main" xmlns="" id="{4B52A79A-AB1B-41B3-9A6F-0A7F93BA70F8}"/>
+                <a16:creationId xmlns="" xmlns:a16="http://schemas.microsoft.com/office/drawing/2014/main" id="{4B52A79A-AB1B-41B3-9A6F-0A7F93BA70F8}"/>
               </a:ext>
             </a:extLst>
           </p:cNvPr>
@@ -7481,7 +7797,7 @@
           <p:cNvPr id="38" name="Rectangle: Rounded Corners 37">
             <a:extLst>
               <a:ext uri="{FF2B5EF4-FFF2-40B4-BE49-F238E27FC236}">
-                <a16:creationId xmlns:a16="http://schemas.microsoft.com/office/drawing/2014/main" xmlns="" id="{01DBCCA9-6713-48A8-A2EF-4BB8B8CBDA08}"/>
+                <a16:creationId xmlns="" xmlns:a16="http://schemas.microsoft.com/office/drawing/2014/main" id="{01DBCCA9-6713-48A8-A2EF-4BB8B8CBDA08}"/>
               </a:ext>
             </a:extLst>
           </p:cNvPr>
@@ -7537,7 +7853,7 @@
           <p:cNvPr id="42" name="Rectangle 41">
             <a:extLst>
               <a:ext uri="{FF2B5EF4-FFF2-40B4-BE49-F238E27FC236}">
-                <a16:creationId xmlns:a16="http://schemas.microsoft.com/office/drawing/2014/main" xmlns="" id="{2D3041F9-6C27-45E6-89FA-71A8C9AA6C57}"/>
+                <a16:creationId xmlns="" xmlns:a16="http://schemas.microsoft.com/office/drawing/2014/main" id="{2D3041F9-6C27-45E6-89FA-71A8C9AA6C57}"/>
               </a:ext>
             </a:extLst>
           </p:cNvPr>
@@ -7599,7 +7915,7 @@
 </p:sld>
 </file>
 
-<file path=ppt/slides/slide23.xml><?xml version="1.0" encoding="utf-8"?>
+<file path=ppt/slides/slide24.xml><?xml version="1.0" encoding="utf-8"?>
 <p:sld xmlns:a="http://schemas.openxmlformats.org/drawingml/2006/main" xmlns:r="http://schemas.openxmlformats.org/officeDocument/2006/relationships" xmlns:p="http://schemas.openxmlformats.org/presentationml/2006/main">
   <p:cSld>
     <p:spTree>
@@ -7621,7 +7937,7 @@
           <p:cNvPr id="2" name="Oval 1">
             <a:extLst>
               <a:ext uri="{FF2B5EF4-FFF2-40B4-BE49-F238E27FC236}">
-                <a16:creationId xmlns:a16="http://schemas.microsoft.com/office/drawing/2014/main" xmlns="" id="{BB94812E-CB64-4BF8-8336-2BB82264598F}"/>
+                <a16:creationId xmlns="" xmlns:a16="http://schemas.microsoft.com/office/drawing/2014/main" id="{BB94812E-CB64-4BF8-8336-2BB82264598F}"/>
               </a:ext>
             </a:extLst>
           </p:cNvPr>
@@ -7684,7 +8000,7 @@
 </p:sld>
 </file>
 
-<file path=ppt/slides/slide24.xml><?xml version="1.0" encoding="utf-8"?>
+<file path=ppt/slides/slide25.xml><?xml version="1.0" encoding="utf-8"?>
 <p:sld xmlns:a="http://schemas.openxmlformats.org/drawingml/2006/main" xmlns:r="http://schemas.openxmlformats.org/officeDocument/2006/relationships" xmlns:p="http://schemas.openxmlformats.org/presentationml/2006/main">
   <p:cSld>
     <p:spTree>
@@ -7706,7 +8022,7 @@
           <p:cNvPr id="2" name="Oval 1">
             <a:extLst>
               <a:ext uri="{FF2B5EF4-FFF2-40B4-BE49-F238E27FC236}">
-                <a16:creationId xmlns:a16="http://schemas.microsoft.com/office/drawing/2014/main" xmlns="" id="{BB94812E-CB64-4BF8-8336-2BB82264598F}"/>
+                <a16:creationId xmlns="" xmlns:a16="http://schemas.microsoft.com/office/drawing/2014/main" id="{BB94812E-CB64-4BF8-8336-2BB82264598F}"/>
               </a:ext>
             </a:extLst>
           </p:cNvPr>
@@ -7766,7 +8082,7 @@
 </p:sld>
 </file>
 
-<file path=ppt/slides/slide25.xml><?xml version="1.0" encoding="utf-8"?>
+<file path=ppt/slides/slide26.xml><?xml version="1.0" encoding="utf-8"?>
 <p:sld xmlns:a="http://schemas.openxmlformats.org/drawingml/2006/main" xmlns:r="http://schemas.openxmlformats.org/officeDocument/2006/relationships" xmlns:p="http://schemas.openxmlformats.org/presentationml/2006/main">
   <p:cSld>
     <p:spTree>
@@ -7788,7 +8104,7 @@
           <p:cNvPr id="8" name="Group 7">
             <a:extLst>
               <a:ext uri="{FF2B5EF4-FFF2-40B4-BE49-F238E27FC236}">
-                <a16:creationId xmlns:a16="http://schemas.microsoft.com/office/drawing/2014/main" xmlns="" id="{2C8FE924-E2A9-4FCF-AB10-4849252056CE}"/>
+                <a16:creationId xmlns="" xmlns:a16="http://schemas.microsoft.com/office/drawing/2014/main" id="{2C8FE924-E2A9-4FCF-AB10-4849252056CE}"/>
               </a:ext>
             </a:extLst>
           </p:cNvPr>
@@ -7808,7 +8124,7 @@
             <p:cNvPr id="2" name="Rectangle: Rounded Corners 1">
               <a:extLst>
                 <a:ext uri="{FF2B5EF4-FFF2-40B4-BE49-F238E27FC236}">
-                  <a16:creationId xmlns:a16="http://schemas.microsoft.com/office/drawing/2014/main" xmlns="" id="{41D21A81-62EB-45C0-959F-1C72D436A1ED}"/>
+                  <a16:creationId xmlns="" xmlns:a16="http://schemas.microsoft.com/office/drawing/2014/main" id="{41D21A81-62EB-45C0-959F-1C72D436A1ED}"/>
                 </a:ext>
               </a:extLst>
             </p:cNvPr>
@@ -7869,7 +8185,7 @@
             <p:cNvPr id="5" name="Rectangle: Top Corners Rounded 4">
               <a:extLst>
                 <a:ext uri="{FF2B5EF4-FFF2-40B4-BE49-F238E27FC236}">
-                  <a16:creationId xmlns:a16="http://schemas.microsoft.com/office/drawing/2014/main" xmlns="" id="{69AF57CF-2B55-4711-9CF7-242A6509C0C2}"/>
+                  <a16:creationId xmlns="" xmlns:a16="http://schemas.microsoft.com/office/drawing/2014/main" id="{69AF57CF-2B55-4711-9CF7-242A6509C0C2}"/>
                 </a:ext>
               </a:extLst>
             </p:cNvPr>
@@ -7924,7 +8240,7 @@
             <p:cNvPr id="6" name="Rectangle: Top Corners Rounded 5">
               <a:extLst>
                 <a:ext uri="{FF2B5EF4-FFF2-40B4-BE49-F238E27FC236}">
-                  <a16:creationId xmlns:a16="http://schemas.microsoft.com/office/drawing/2014/main" xmlns="" id="{5F370DD8-8227-4CDB-BA60-B8D18EEF3950}"/>
+                  <a16:creationId xmlns="" xmlns:a16="http://schemas.microsoft.com/office/drawing/2014/main" id="{5F370DD8-8227-4CDB-BA60-B8D18EEF3950}"/>
                 </a:ext>
               </a:extLst>
             </p:cNvPr>
@@ -7988,7 +8304,7 @@
 </p:sld>
 </file>
 
-<file path=ppt/slides/slide26.xml><?xml version="1.0" encoding="utf-8"?>
+<file path=ppt/slides/slide27.xml><?xml version="1.0" encoding="utf-8"?>
 <p:sld xmlns:a="http://schemas.openxmlformats.org/drawingml/2006/main" xmlns:r="http://schemas.openxmlformats.org/officeDocument/2006/relationships" xmlns:p="http://schemas.openxmlformats.org/presentationml/2006/main">
   <p:cSld>
     <p:spTree>
@@ -8010,7 +8326,7 @@
           <p:cNvPr id="8" name="Group 7">
             <a:extLst>
               <a:ext uri="{FF2B5EF4-FFF2-40B4-BE49-F238E27FC236}">
-                <a16:creationId xmlns:a16="http://schemas.microsoft.com/office/drawing/2014/main" xmlns="" id="{2C8FE924-E2A9-4FCF-AB10-4849252056CE}"/>
+                <a16:creationId xmlns="" xmlns:a16="http://schemas.microsoft.com/office/drawing/2014/main" id="{2C8FE924-E2A9-4FCF-AB10-4849252056CE}"/>
               </a:ext>
             </a:extLst>
           </p:cNvPr>
@@ -8030,7 +8346,7 @@
             <p:cNvPr id="2" name="Rectangle: Rounded Corners 1">
               <a:extLst>
                 <a:ext uri="{FF2B5EF4-FFF2-40B4-BE49-F238E27FC236}">
-                  <a16:creationId xmlns:a16="http://schemas.microsoft.com/office/drawing/2014/main" xmlns="" id="{41D21A81-62EB-45C0-959F-1C72D436A1ED}"/>
+                  <a16:creationId xmlns="" xmlns:a16="http://schemas.microsoft.com/office/drawing/2014/main" id="{41D21A81-62EB-45C0-959F-1C72D436A1ED}"/>
                 </a:ext>
               </a:extLst>
             </p:cNvPr>
@@ -8091,7 +8407,7 @@
             <p:cNvPr id="5" name="Rectangle: Top Corners Rounded 4">
               <a:extLst>
                 <a:ext uri="{FF2B5EF4-FFF2-40B4-BE49-F238E27FC236}">
-                  <a16:creationId xmlns:a16="http://schemas.microsoft.com/office/drawing/2014/main" xmlns="" id="{69AF57CF-2B55-4711-9CF7-242A6509C0C2}"/>
+                  <a16:creationId xmlns="" xmlns:a16="http://schemas.microsoft.com/office/drawing/2014/main" id="{69AF57CF-2B55-4711-9CF7-242A6509C0C2}"/>
                 </a:ext>
               </a:extLst>
             </p:cNvPr>
@@ -8162,7 +8478,7 @@
 </p:sld>
 </file>
 
-<file path=ppt/slides/slide27.xml><?xml version="1.0" encoding="utf-8"?>
+<file path=ppt/slides/slide28.xml><?xml version="1.0" encoding="utf-8"?>
 <p:sld xmlns:a="http://schemas.openxmlformats.org/drawingml/2006/main" xmlns:r="http://schemas.openxmlformats.org/officeDocument/2006/relationships" xmlns:p="http://schemas.openxmlformats.org/presentationml/2006/main">
   <p:cSld>
     <p:spTree>
@@ -8184,7 +8500,7 @@
           <p:cNvPr id="3" name="&quot;Not Allowed&quot; Symbol 2">
             <a:extLst>
               <a:ext uri="{FF2B5EF4-FFF2-40B4-BE49-F238E27FC236}">
-                <a16:creationId xmlns:a16="http://schemas.microsoft.com/office/drawing/2014/main" xmlns="" id="{364F1BE9-BD04-4A76-AFFF-4454208BA134}"/>
+                <a16:creationId xmlns="" xmlns:a16="http://schemas.microsoft.com/office/drawing/2014/main" id="{364F1BE9-BD04-4A76-AFFF-4454208BA134}"/>
               </a:ext>
             </a:extLst>
           </p:cNvPr>
@@ -8257,7 +8573,7 @@
 </p:sld>
 </file>
 
-<file path=ppt/slides/slide28.xml><?xml version="1.0" encoding="utf-8"?>
+<file path=ppt/slides/slide29.xml><?xml version="1.0" encoding="utf-8"?>
 <p:sld xmlns:a="http://schemas.openxmlformats.org/drawingml/2006/main" xmlns:r="http://schemas.openxmlformats.org/officeDocument/2006/relationships" xmlns:p="http://schemas.openxmlformats.org/presentationml/2006/main">
   <p:cSld>
     <p:spTree>
@@ -8279,7 +8595,7 @@
           <p:cNvPr id="3" name="L-Shape 2">
             <a:extLst>
               <a:ext uri="{FF2B5EF4-FFF2-40B4-BE49-F238E27FC236}">
-                <a16:creationId xmlns:a16="http://schemas.microsoft.com/office/drawing/2014/main" xmlns="" id="{4B6D5B79-FD53-4056-ADE3-1F8B0D882ECD}"/>
+                <a16:creationId xmlns="" xmlns:a16="http://schemas.microsoft.com/office/drawing/2014/main" id="{4B6D5B79-FD53-4056-ADE3-1F8B0D882ECD}"/>
               </a:ext>
             </a:extLst>
           </p:cNvPr>
@@ -8338,7 +8654,7 @@
           <p:cNvPr id="6" name="L-Shape 5">
             <a:extLst>
               <a:ext uri="{FF2B5EF4-FFF2-40B4-BE49-F238E27FC236}">
-                <a16:creationId xmlns:a16="http://schemas.microsoft.com/office/drawing/2014/main" xmlns="" id="{3F952716-7333-4F4A-A914-00948134503E}"/>
+                <a16:creationId xmlns="" xmlns:a16="http://schemas.microsoft.com/office/drawing/2014/main" id="{3F952716-7333-4F4A-A914-00948134503E}"/>
               </a:ext>
             </a:extLst>
           </p:cNvPr>
@@ -8397,7 +8713,7 @@
           <p:cNvPr id="7" name="L-Shape 6">
             <a:extLst>
               <a:ext uri="{FF2B5EF4-FFF2-40B4-BE49-F238E27FC236}">
-                <a16:creationId xmlns:a16="http://schemas.microsoft.com/office/drawing/2014/main" xmlns="" id="{887C30F7-ED54-41BA-9C34-79A1112E22C6}"/>
+                <a16:creationId xmlns="" xmlns:a16="http://schemas.microsoft.com/office/drawing/2014/main" id="{887C30F7-ED54-41BA-9C34-79A1112E22C6}"/>
               </a:ext>
             </a:extLst>
           </p:cNvPr>
@@ -8456,7 +8772,7 @@
           <p:cNvPr id="8" name="L-Shape 7">
             <a:extLst>
               <a:ext uri="{FF2B5EF4-FFF2-40B4-BE49-F238E27FC236}">
-                <a16:creationId xmlns:a16="http://schemas.microsoft.com/office/drawing/2014/main" xmlns="" id="{A18D6D78-3055-4CF7-A993-4219F0F334C4}"/>
+                <a16:creationId xmlns="" xmlns:a16="http://schemas.microsoft.com/office/drawing/2014/main" id="{A18D6D78-3055-4CF7-A993-4219F0F334C4}"/>
               </a:ext>
             </a:extLst>
           </p:cNvPr>
@@ -8523,7 +8839,90 @@
 </p:sld>
 </file>
 
-<file path=ppt/slides/slide29.xml><?xml version="1.0" encoding="utf-8"?>
+<file path=ppt/slides/slide3.xml><?xml version="1.0" encoding="utf-8"?>
+<p:sld xmlns:a="http://schemas.openxmlformats.org/drawingml/2006/main" xmlns:r="http://schemas.openxmlformats.org/officeDocument/2006/relationships" xmlns:p="http://schemas.openxmlformats.org/presentationml/2006/main">
+  <p:cSld>
+    <p:spTree>
+      <p:nvGrpSpPr>
+        <p:cNvPr id="1" name=""/>
+        <p:cNvGrpSpPr/>
+        <p:nvPr/>
+      </p:nvGrpSpPr>
+      <p:grpSpPr>
+        <a:xfrm>
+          <a:off x="0" y="0"/>
+          <a:ext cx="0" cy="0"/>
+          <a:chOff x="0" y="0"/>
+          <a:chExt cx="0" cy="0"/>
+        </a:xfrm>
+      </p:grpSpPr>
+      <p:sp>
+        <p:nvSpPr>
+          <p:cNvPr id="2" name="Rectangle 1"/>
+          <p:cNvSpPr/>
+          <p:nvPr/>
+        </p:nvSpPr>
+        <p:spPr>
+          <a:xfrm rot="18900000">
+            <a:off x="4438835" y="1957526"/>
+            <a:ext cx="266330" cy="2942948"/>
+          </a:xfrm>
+          <a:prstGeom prst="rect">
+            <a:avLst/>
+          </a:prstGeom>
+          <a:solidFill>
+            <a:schemeClr val="bg1"/>
+          </a:solidFill>
+          <a:ln>
+            <a:noFill/>
+          </a:ln>
+        </p:spPr>
+        <p:style>
+          <a:lnRef idx="2">
+            <a:schemeClr val="accent1">
+              <a:shade val="50000"/>
+            </a:schemeClr>
+          </a:lnRef>
+          <a:fillRef idx="1">
+            <a:schemeClr val="accent1"/>
+          </a:fillRef>
+          <a:effectRef idx="0">
+            <a:schemeClr val="accent1"/>
+          </a:effectRef>
+          <a:fontRef idx="minor">
+            <a:schemeClr val="lt1"/>
+          </a:fontRef>
+        </p:style>
+        <p:txBody>
+          <a:bodyPr rtlCol="0" anchor="ctr"/>
+          <a:lstStyle/>
+          <a:p>
+            <a:pPr algn="ctr"/>
+            <a:endParaRPr lang="en-IN"/>
+          </a:p>
+        </p:txBody>
+      </p:sp>
+    </p:spTree>
+    <p:extLst>
+      <p:ext uri="{BB962C8B-B14F-4D97-AF65-F5344CB8AC3E}">
+        <p14:creationId xmlns:p14="http://schemas.microsoft.com/office/powerpoint/2010/main" val="3332374155"/>
+      </p:ext>
+    </p:extLst>
+  </p:cSld>
+  <p:clrMapOvr>
+    <a:masterClrMapping/>
+  </p:clrMapOvr>
+  <p:timing>
+    <p:tnLst>
+      <p:par>
+        <p:cTn id="1" dur="indefinite" restart="never" nodeType="tmRoot"/>
+      </p:par>
+    </p:tnLst>
+  </p:timing>
+</p:sld>
+</file>
+
+<file path=ppt/slides/slide30.xml><?xml version="1.0" encoding="utf-8"?>
 <p:sld xmlns:a="http://schemas.openxmlformats.org/drawingml/2006/main" xmlns:r="http://schemas.openxmlformats.org/officeDocument/2006/relationships" xmlns:p="http://schemas.openxmlformats.org/presentationml/2006/main">
   <p:cSld>
     <p:spTree>
@@ -8545,7 +8944,7 @@
           <p:cNvPr id="8" name="Group 7">
             <a:extLst>
               <a:ext uri="{FF2B5EF4-FFF2-40B4-BE49-F238E27FC236}">
-                <a16:creationId xmlns:a16="http://schemas.microsoft.com/office/drawing/2014/main" xmlns="" id="{2C8FE924-E2A9-4FCF-AB10-4849252056CE}"/>
+                <a16:creationId xmlns="" xmlns:a16="http://schemas.microsoft.com/office/drawing/2014/main" id="{2C8FE924-E2A9-4FCF-AB10-4849252056CE}"/>
               </a:ext>
             </a:extLst>
           </p:cNvPr>
@@ -8565,7 +8964,7 @@
             <p:cNvPr id="2" name="Rectangle: Rounded Corners 1">
               <a:extLst>
                 <a:ext uri="{FF2B5EF4-FFF2-40B4-BE49-F238E27FC236}">
-                  <a16:creationId xmlns:a16="http://schemas.microsoft.com/office/drawing/2014/main" xmlns="" id="{41D21A81-62EB-45C0-959F-1C72D436A1ED}"/>
+                  <a16:creationId xmlns="" xmlns:a16="http://schemas.microsoft.com/office/drawing/2014/main" id="{41D21A81-62EB-45C0-959F-1C72D436A1ED}"/>
                 </a:ext>
               </a:extLst>
             </p:cNvPr>
@@ -8628,7 +9027,7 @@
             <p:cNvPr id="5" name="Rectangle: Top Corners Rounded 4">
               <a:extLst>
                 <a:ext uri="{FF2B5EF4-FFF2-40B4-BE49-F238E27FC236}">
-                  <a16:creationId xmlns:a16="http://schemas.microsoft.com/office/drawing/2014/main" xmlns="" id="{69AF57CF-2B55-4711-9CF7-242A6509C0C2}"/>
+                  <a16:creationId xmlns="" xmlns:a16="http://schemas.microsoft.com/office/drawing/2014/main" id="{69AF57CF-2B55-4711-9CF7-242A6509C0C2}"/>
                 </a:ext>
               </a:extLst>
             </p:cNvPr>
@@ -8683,7 +9082,7 @@
             <p:cNvPr id="6" name="Rectangle: Top Corners Rounded 5">
               <a:extLst>
                 <a:ext uri="{FF2B5EF4-FFF2-40B4-BE49-F238E27FC236}">
-                  <a16:creationId xmlns:a16="http://schemas.microsoft.com/office/drawing/2014/main" xmlns="" id="{5F370DD8-8227-4CDB-BA60-B8D18EEF3950}"/>
+                  <a16:creationId xmlns="" xmlns:a16="http://schemas.microsoft.com/office/drawing/2014/main" id="{5F370DD8-8227-4CDB-BA60-B8D18EEF3950}"/>
                 </a:ext>
               </a:extLst>
             </p:cNvPr>
@@ -8742,7 +9141,7 @@
           <p:cNvPr id="7" name="Group 6">
             <a:extLst>
               <a:ext uri="{FF2B5EF4-FFF2-40B4-BE49-F238E27FC236}">
-                <a16:creationId xmlns:a16="http://schemas.microsoft.com/office/drawing/2014/main" xmlns="" id="{AC3B8550-1AC4-4F80-8A05-11713579488F}"/>
+                <a16:creationId xmlns="" xmlns:a16="http://schemas.microsoft.com/office/drawing/2014/main" id="{AC3B8550-1AC4-4F80-8A05-11713579488F}"/>
               </a:ext>
             </a:extLst>
           </p:cNvPr>
@@ -8762,7 +9161,7 @@
             <p:cNvPr id="9" name="Rectangle: Rounded Corners 8">
               <a:extLst>
                 <a:ext uri="{FF2B5EF4-FFF2-40B4-BE49-F238E27FC236}">
-                  <a16:creationId xmlns:a16="http://schemas.microsoft.com/office/drawing/2014/main" xmlns="" id="{6FB75456-3298-444E-AC32-7AB754F66F90}"/>
+                  <a16:creationId xmlns="" xmlns:a16="http://schemas.microsoft.com/office/drawing/2014/main" id="{6FB75456-3298-444E-AC32-7AB754F66F90}"/>
                 </a:ext>
               </a:extLst>
             </p:cNvPr>
@@ -8825,7 +9224,7 @@
             <p:cNvPr id="10" name="Rectangle: Top Corners Rounded 9">
               <a:extLst>
                 <a:ext uri="{FF2B5EF4-FFF2-40B4-BE49-F238E27FC236}">
-                  <a16:creationId xmlns:a16="http://schemas.microsoft.com/office/drawing/2014/main" xmlns="" id="{7F5F5DFB-946A-440C-8D40-96AB03B69404}"/>
+                  <a16:creationId xmlns="" xmlns:a16="http://schemas.microsoft.com/office/drawing/2014/main" id="{7F5F5DFB-946A-440C-8D40-96AB03B69404}"/>
                 </a:ext>
               </a:extLst>
             </p:cNvPr>
@@ -8896,99 +9295,7 @@
 </p:sld>
 </file>
 
-<file path=ppt/slides/slide3.xml><?xml version="1.0" encoding="utf-8"?>
-<p:sld xmlns:a="http://schemas.openxmlformats.org/drawingml/2006/main" xmlns:r="http://schemas.openxmlformats.org/officeDocument/2006/relationships" xmlns:p="http://schemas.openxmlformats.org/presentationml/2006/main">
-  <p:cSld>
-    <p:spTree>
-      <p:nvGrpSpPr>
-        <p:cNvPr id="1" name=""/>
-        <p:cNvGrpSpPr/>
-        <p:nvPr/>
-      </p:nvGrpSpPr>
-      <p:grpSpPr>
-        <a:xfrm>
-          <a:off x="0" y="0"/>
-          <a:ext cx="0" cy="0"/>
-          <a:chOff x="0" y="0"/>
-          <a:chExt cx="0" cy="0"/>
-        </a:xfrm>
-      </p:grpSpPr>
-      <p:sp>
-        <p:nvSpPr>
-          <p:cNvPr id="3" name="Rounded Rectangle 2"/>
-          <p:cNvSpPr/>
-          <p:nvPr/>
-        </p:nvSpPr>
-        <p:spPr>
-          <a:xfrm>
-            <a:off x="3851910" y="2708910"/>
-            <a:ext cx="1440180" cy="1440180"/>
-          </a:xfrm>
-          <a:prstGeom prst="roundRect">
-            <a:avLst>
-              <a:gd name="adj" fmla="val 47189"/>
-            </a:avLst>
-          </a:prstGeom>
-          <a:solidFill>
-            <a:schemeClr val="bg1"/>
-          </a:solidFill>
-          <a:ln>
-            <a:noFill/>
-          </a:ln>
-          <a:effectLst>
-            <a:outerShdw blurRad="50800" dist="38100" dir="5400000" algn="t" rotWithShape="0">
-              <a:prstClr val="black">
-                <a:alpha val="40000"/>
-              </a:prstClr>
-            </a:outerShdw>
-          </a:effectLst>
-        </p:spPr>
-        <p:style>
-          <a:lnRef idx="2">
-            <a:schemeClr val="accent1">
-              <a:shade val="50000"/>
-            </a:schemeClr>
-          </a:lnRef>
-          <a:fillRef idx="1">
-            <a:schemeClr val="accent1"/>
-          </a:fillRef>
-          <a:effectRef idx="0">
-            <a:schemeClr val="accent1"/>
-          </a:effectRef>
-          <a:fontRef idx="minor">
-            <a:schemeClr val="lt1"/>
-          </a:fontRef>
-        </p:style>
-        <p:txBody>
-          <a:bodyPr rtlCol="0" anchor="ctr"/>
-          <a:lstStyle/>
-          <a:p>
-            <a:pPr algn="ctr"/>
-            <a:endParaRPr lang="en-IN"/>
-          </a:p>
-        </p:txBody>
-      </p:sp>
-    </p:spTree>
-    <p:extLst>
-      <p:ext uri="{BB962C8B-B14F-4D97-AF65-F5344CB8AC3E}">
-        <p14:creationId xmlns:p14="http://schemas.microsoft.com/office/powerpoint/2010/main" val="265401467"/>
-      </p:ext>
-    </p:extLst>
-  </p:cSld>
-  <p:clrMapOvr>
-    <a:masterClrMapping/>
-  </p:clrMapOvr>
-  <p:timing>
-    <p:tnLst>
-      <p:par>
-        <p:cTn id="1" dur="indefinite" restart="never" nodeType="tmRoot"/>
-      </p:par>
-    </p:tnLst>
-  </p:timing>
-</p:sld>
-</file>
-
-<file path=ppt/slides/slide30.xml><?xml version="1.0" encoding="utf-8"?>
+<file path=ppt/slides/slide31.xml><?xml version="1.0" encoding="utf-8"?>
 <p:sld xmlns:a="http://schemas.openxmlformats.org/drawingml/2006/main" xmlns:r="http://schemas.openxmlformats.org/officeDocument/2006/relationships" xmlns:p="http://schemas.openxmlformats.org/presentationml/2006/main">
   <p:cSld>
     <p:spTree>
@@ -9010,7 +9317,7 @@
           <p:cNvPr id="5" name="Oval 4">
             <a:extLst>
               <a:ext uri="{FF2B5EF4-FFF2-40B4-BE49-F238E27FC236}">
-                <a16:creationId xmlns:a16="http://schemas.microsoft.com/office/drawing/2014/main" xmlns="" id="{5CE85C29-C9E0-4DC2-9692-A83A4E8ECB26}"/>
+                <a16:creationId xmlns="" xmlns:a16="http://schemas.microsoft.com/office/drawing/2014/main" id="{5CE85C29-C9E0-4DC2-9692-A83A4E8ECB26}"/>
               </a:ext>
             </a:extLst>
           </p:cNvPr>
@@ -9079,7 +9386,7 @@
           <p:cNvPr id="3" name="Block Arc 2">
             <a:extLst>
               <a:ext uri="{FF2B5EF4-FFF2-40B4-BE49-F238E27FC236}">
-                <a16:creationId xmlns:a16="http://schemas.microsoft.com/office/drawing/2014/main" xmlns="" id="{55727453-48C0-4248-AC8F-2458A300A257}"/>
+                <a16:creationId xmlns="" xmlns:a16="http://schemas.microsoft.com/office/drawing/2014/main" id="{55727453-48C0-4248-AC8F-2458A300A257}"/>
               </a:ext>
             </a:extLst>
           </p:cNvPr>
@@ -9146,7 +9453,7 @@
           <p:cNvPr id="10" name="Block Arc 9">
             <a:extLst>
               <a:ext uri="{FF2B5EF4-FFF2-40B4-BE49-F238E27FC236}">
-                <a16:creationId xmlns:a16="http://schemas.microsoft.com/office/drawing/2014/main" xmlns="" id="{22EF910F-387C-4573-AA1C-23739886E288}"/>
+                <a16:creationId xmlns="" xmlns:a16="http://schemas.microsoft.com/office/drawing/2014/main" id="{22EF910F-387C-4573-AA1C-23739886E288}"/>
               </a:ext>
             </a:extLst>
           </p:cNvPr>
@@ -9213,7 +9520,7 @@
           <p:cNvPr id="11" name="Block Arc 10">
             <a:extLst>
               <a:ext uri="{FF2B5EF4-FFF2-40B4-BE49-F238E27FC236}">
-                <a16:creationId xmlns:a16="http://schemas.microsoft.com/office/drawing/2014/main" xmlns="" id="{FCECEC34-98B0-40FE-913A-5B8191258157}"/>
+                <a16:creationId xmlns="" xmlns:a16="http://schemas.microsoft.com/office/drawing/2014/main" id="{FCECEC34-98B0-40FE-913A-5B8191258157}"/>
               </a:ext>
             </a:extLst>
           </p:cNvPr>
@@ -9288,7 +9595,7 @@
 </p:sld>
 </file>
 
-<file path=ppt/slides/slide31.xml><?xml version="1.0" encoding="utf-8"?>
+<file path=ppt/slides/slide32.xml><?xml version="1.0" encoding="utf-8"?>
 <p:sld xmlns:a="http://schemas.openxmlformats.org/drawingml/2006/main" xmlns:r="http://schemas.openxmlformats.org/officeDocument/2006/relationships" xmlns:p="http://schemas.openxmlformats.org/presentationml/2006/main">
   <p:cSld>
     <p:spTree>
@@ -9310,7 +9617,7 @@
           <p:cNvPr id="7" name="Freeform: Shape 6">
             <a:extLst>
               <a:ext uri="{FF2B5EF4-FFF2-40B4-BE49-F238E27FC236}">
-                <a16:creationId xmlns:a16="http://schemas.microsoft.com/office/drawing/2014/main" xmlns="" id="{F165FF3A-79F0-4681-9C5F-D7BF753A653E}"/>
+                <a16:creationId xmlns="" xmlns:a16="http://schemas.microsoft.com/office/drawing/2014/main" id="{F165FF3A-79F0-4681-9C5F-D7BF753A653E}"/>
               </a:ext>
             </a:extLst>
           </p:cNvPr>
@@ -9603,7 +9910,7 @@
 </p:sld>
 </file>
 
-<file path=ppt/slides/slide32.xml><?xml version="1.0" encoding="utf-8"?>
+<file path=ppt/slides/slide33.xml><?xml version="1.0" encoding="utf-8"?>
 <p:sld xmlns:a="http://schemas.openxmlformats.org/drawingml/2006/main" xmlns:r="http://schemas.openxmlformats.org/officeDocument/2006/relationships" xmlns:p="http://schemas.openxmlformats.org/presentationml/2006/main">
   <p:cSld>
     <p:spTree>
@@ -9725,7 +10032,7 @@
           <p:cNvPr id="6" name="Rounded Rectangle 4">
             <a:extLst>
               <a:ext uri="{FF2B5EF4-FFF2-40B4-BE49-F238E27FC236}">
-                <a16:creationId xmlns:a16="http://schemas.microsoft.com/office/drawing/2014/main" xmlns="" id="{3485F0AD-70A9-404F-AE9D-6C3E9DA3D32F}"/>
+                <a16:creationId xmlns="" xmlns:a16="http://schemas.microsoft.com/office/drawing/2014/main" id="{3485F0AD-70A9-404F-AE9D-6C3E9DA3D32F}"/>
               </a:ext>
             </a:extLst>
           </p:cNvPr>
@@ -9779,7 +10086,7 @@
           <p:cNvPr id="7" name="Rounded Rectangle 3">
             <a:extLst>
               <a:ext uri="{FF2B5EF4-FFF2-40B4-BE49-F238E27FC236}">
-                <a16:creationId xmlns:a16="http://schemas.microsoft.com/office/drawing/2014/main" xmlns="" id="{BDDDC232-1895-4BA3-83DE-722E22507136}"/>
+                <a16:creationId xmlns="" xmlns:a16="http://schemas.microsoft.com/office/drawing/2014/main" id="{BDDDC232-1895-4BA3-83DE-722E22507136}"/>
               </a:ext>
             </a:extLst>
           </p:cNvPr>
@@ -9835,7 +10142,7 @@
           <p:cNvPr id="21" name="Group 20">
             <a:extLst>
               <a:ext uri="{FF2B5EF4-FFF2-40B4-BE49-F238E27FC236}">
-                <a16:creationId xmlns:a16="http://schemas.microsoft.com/office/drawing/2014/main" xmlns="" id="{43F10BE4-CCDE-4CAE-9B8E-7DEDF81FFAF2}"/>
+                <a16:creationId xmlns="" xmlns:a16="http://schemas.microsoft.com/office/drawing/2014/main" id="{43F10BE4-CCDE-4CAE-9B8E-7DEDF81FFAF2}"/>
               </a:ext>
             </a:extLst>
           </p:cNvPr>
@@ -9855,7 +10162,7 @@
             <p:cNvPr id="8" name="Rounded Rectangle 4">
               <a:extLst>
                 <a:ext uri="{FF2B5EF4-FFF2-40B4-BE49-F238E27FC236}">
-                  <a16:creationId xmlns:a16="http://schemas.microsoft.com/office/drawing/2014/main" xmlns="" id="{8209D2B2-9E54-41E4-BD79-1C8E09E5C52B}"/>
+                  <a16:creationId xmlns="" xmlns:a16="http://schemas.microsoft.com/office/drawing/2014/main" id="{8209D2B2-9E54-41E4-BD79-1C8E09E5C52B}"/>
                 </a:ext>
               </a:extLst>
             </p:cNvPr>
@@ -9909,7 +10216,7 @@
             <p:cNvPr id="18" name="Straight Connector 17">
               <a:extLst>
                 <a:ext uri="{FF2B5EF4-FFF2-40B4-BE49-F238E27FC236}">
-                  <a16:creationId xmlns:a16="http://schemas.microsoft.com/office/drawing/2014/main" xmlns="" id="{C17E63B2-3BC5-4E63-9740-4B53F50FA06D}"/>
+                  <a16:creationId xmlns="" xmlns:a16="http://schemas.microsoft.com/office/drawing/2014/main" id="{C17E63B2-3BC5-4E63-9740-4B53F50FA06D}"/>
                 </a:ext>
               </a:extLst>
             </p:cNvPr>
@@ -9964,7 +10271,7 @@
 </p:sld>
 </file>
 
-<file path=ppt/slides/slide33.xml><?xml version="1.0" encoding="utf-8"?>
+<file path=ppt/slides/slide34.xml><?xml version="1.0" encoding="utf-8"?>
 <p:sld xmlns:a="http://schemas.openxmlformats.org/drawingml/2006/main" xmlns:r="http://schemas.openxmlformats.org/officeDocument/2006/relationships" xmlns:p="http://schemas.openxmlformats.org/presentationml/2006/main">
   <p:cSld>
     <p:spTree>
@@ -9986,7 +10293,7 @@
           <p:cNvPr id="10" name="Group 9">
             <a:extLst>
               <a:ext uri="{FF2B5EF4-FFF2-40B4-BE49-F238E27FC236}">
-                <a16:creationId xmlns:a16="http://schemas.microsoft.com/office/drawing/2014/main" xmlns="" id="{A6205789-EF0B-4BA0-889A-5DD5304B2384}"/>
+                <a16:creationId xmlns="" xmlns:a16="http://schemas.microsoft.com/office/drawing/2014/main" id="{A6205789-EF0B-4BA0-889A-5DD5304B2384}"/>
               </a:ext>
             </a:extLst>
           </p:cNvPr>
@@ -10006,7 +10313,7 @@
             <p:cNvPr id="11" name="Rounded Rectangle 4">
               <a:extLst>
                 <a:ext uri="{FF2B5EF4-FFF2-40B4-BE49-F238E27FC236}">
-                  <a16:creationId xmlns:a16="http://schemas.microsoft.com/office/drawing/2014/main" xmlns="" id="{A1F57A30-623F-47FF-A411-608120B64C66}"/>
+                  <a16:creationId xmlns="" xmlns:a16="http://schemas.microsoft.com/office/drawing/2014/main" id="{A1F57A30-623F-47FF-A411-608120B64C66}"/>
                 </a:ext>
               </a:extLst>
             </p:cNvPr>
@@ -10060,7 +10367,7 @@
             <p:cNvPr id="12" name="Rounded Rectangle 4">
               <a:extLst>
                 <a:ext uri="{FF2B5EF4-FFF2-40B4-BE49-F238E27FC236}">
-                  <a16:creationId xmlns:a16="http://schemas.microsoft.com/office/drawing/2014/main" xmlns="" id="{5BCCC17E-7791-4171-BBBA-BBA6021C4B61}"/>
+                  <a16:creationId xmlns="" xmlns:a16="http://schemas.microsoft.com/office/drawing/2014/main" id="{5BCCC17E-7791-4171-BBBA-BBA6021C4B61}"/>
                 </a:ext>
               </a:extLst>
             </p:cNvPr>
@@ -10114,7 +10421,7 @@
             <p:cNvPr id="13" name="Rounded Rectangle 4">
               <a:extLst>
                 <a:ext uri="{FF2B5EF4-FFF2-40B4-BE49-F238E27FC236}">
-                  <a16:creationId xmlns:a16="http://schemas.microsoft.com/office/drawing/2014/main" xmlns="" id="{17116BF3-B4E5-4B9D-94C3-E847D7ADFA01}"/>
+                  <a16:creationId xmlns="" xmlns:a16="http://schemas.microsoft.com/office/drawing/2014/main" id="{17116BF3-B4E5-4B9D-94C3-E847D7ADFA01}"/>
                 </a:ext>
               </a:extLst>
             </p:cNvPr>
@@ -10168,7 +10475,7 @@
             <p:cNvPr id="14" name="Rounded Rectangle 4">
               <a:extLst>
                 <a:ext uri="{FF2B5EF4-FFF2-40B4-BE49-F238E27FC236}">
-                  <a16:creationId xmlns:a16="http://schemas.microsoft.com/office/drawing/2014/main" xmlns="" id="{9895E51C-C8F7-4BC3-B592-ACFA71345B40}"/>
+                  <a16:creationId xmlns="" xmlns:a16="http://schemas.microsoft.com/office/drawing/2014/main" id="{9895E51C-C8F7-4BC3-B592-ACFA71345B40}"/>
                 </a:ext>
               </a:extLst>
             </p:cNvPr>
@@ -10223,7 +10530,7 @@
           <p:cNvPr id="3" name="Group 2">
             <a:extLst>
               <a:ext uri="{FF2B5EF4-FFF2-40B4-BE49-F238E27FC236}">
-                <a16:creationId xmlns:a16="http://schemas.microsoft.com/office/drawing/2014/main" xmlns="" id="{E9FD4DCC-E1DF-48D8-A766-EBEB4BB31844}"/>
+                <a16:creationId xmlns="" xmlns:a16="http://schemas.microsoft.com/office/drawing/2014/main" id="{E9FD4DCC-E1DF-48D8-A766-EBEB4BB31844}"/>
               </a:ext>
             </a:extLst>
           </p:cNvPr>
@@ -10243,7 +10550,7 @@
             <p:cNvPr id="6" name="Rounded Rectangle 4">
               <a:extLst>
                 <a:ext uri="{FF2B5EF4-FFF2-40B4-BE49-F238E27FC236}">
-                  <a16:creationId xmlns:a16="http://schemas.microsoft.com/office/drawing/2014/main" xmlns="" id="{3485F0AD-70A9-404F-AE9D-6C3E9DA3D32F}"/>
+                  <a16:creationId xmlns="" xmlns:a16="http://schemas.microsoft.com/office/drawing/2014/main" id="{3485F0AD-70A9-404F-AE9D-6C3E9DA3D32F}"/>
                 </a:ext>
               </a:extLst>
             </p:cNvPr>
@@ -10297,7 +10604,7 @@
             <p:cNvPr id="7" name="Rounded Rectangle 4">
               <a:extLst>
                 <a:ext uri="{FF2B5EF4-FFF2-40B4-BE49-F238E27FC236}">
-                  <a16:creationId xmlns:a16="http://schemas.microsoft.com/office/drawing/2014/main" xmlns="" id="{C69A883F-4E84-4667-9CC2-CA7D225BB107}"/>
+                  <a16:creationId xmlns="" xmlns:a16="http://schemas.microsoft.com/office/drawing/2014/main" id="{C69A883F-4E84-4667-9CC2-CA7D225BB107}"/>
                 </a:ext>
               </a:extLst>
             </p:cNvPr>
@@ -10351,7 +10658,7 @@
             <p:cNvPr id="8" name="Rounded Rectangle 4">
               <a:extLst>
                 <a:ext uri="{FF2B5EF4-FFF2-40B4-BE49-F238E27FC236}">
-                  <a16:creationId xmlns:a16="http://schemas.microsoft.com/office/drawing/2014/main" xmlns="" id="{E2D36C2A-DFFD-4786-AD4B-60FC9FA14482}"/>
+                  <a16:creationId xmlns="" xmlns:a16="http://schemas.microsoft.com/office/drawing/2014/main" id="{E2D36C2A-DFFD-4786-AD4B-60FC9FA14482}"/>
                 </a:ext>
               </a:extLst>
             </p:cNvPr>
@@ -10405,7 +10712,7 @@
             <p:cNvPr id="9" name="Rounded Rectangle 4">
               <a:extLst>
                 <a:ext uri="{FF2B5EF4-FFF2-40B4-BE49-F238E27FC236}">
-                  <a16:creationId xmlns:a16="http://schemas.microsoft.com/office/drawing/2014/main" xmlns="" id="{126B3AA7-02E3-40F1-8546-7B3D97D2302D}"/>
+                  <a16:creationId xmlns="" xmlns:a16="http://schemas.microsoft.com/office/drawing/2014/main" id="{126B3AA7-02E3-40F1-8546-7B3D97D2302D}"/>
                 </a:ext>
               </a:extLst>
             </p:cNvPr>
@@ -10459,7 +10766,7 @@
             <p:cNvPr id="15" name="Rounded Rectangle 4">
               <a:extLst>
                 <a:ext uri="{FF2B5EF4-FFF2-40B4-BE49-F238E27FC236}">
-                  <a16:creationId xmlns:a16="http://schemas.microsoft.com/office/drawing/2014/main" xmlns="" id="{0CE60671-8D6D-4730-88BD-8B0FBE849613}"/>
+                  <a16:creationId xmlns="" xmlns:a16="http://schemas.microsoft.com/office/drawing/2014/main" id="{0CE60671-8D6D-4730-88BD-8B0FBE849613}"/>
                 </a:ext>
               </a:extLst>
             </p:cNvPr>
@@ -10513,7 +10820,7 @@
             <p:cNvPr id="16" name="Rounded Rectangle 4">
               <a:extLst>
                 <a:ext uri="{FF2B5EF4-FFF2-40B4-BE49-F238E27FC236}">
-                  <a16:creationId xmlns:a16="http://schemas.microsoft.com/office/drawing/2014/main" xmlns="" id="{8ABCDF2C-78C8-4B1B-A079-5C7CC0EDB793}"/>
+                  <a16:creationId xmlns="" xmlns:a16="http://schemas.microsoft.com/office/drawing/2014/main" id="{8ABCDF2C-78C8-4B1B-A079-5C7CC0EDB793}"/>
                 </a:ext>
               </a:extLst>
             </p:cNvPr>
@@ -10567,7 +10874,7 @@
             <p:cNvPr id="17" name="Rounded Rectangle 4">
               <a:extLst>
                 <a:ext uri="{FF2B5EF4-FFF2-40B4-BE49-F238E27FC236}">
-                  <a16:creationId xmlns:a16="http://schemas.microsoft.com/office/drawing/2014/main" xmlns="" id="{472041CA-791D-459C-A8CE-BCA958F85B3E}"/>
+                  <a16:creationId xmlns="" xmlns:a16="http://schemas.microsoft.com/office/drawing/2014/main" id="{472041CA-791D-459C-A8CE-BCA958F85B3E}"/>
                 </a:ext>
               </a:extLst>
             </p:cNvPr>
@@ -10621,7 +10928,7 @@
             <p:cNvPr id="18" name="Rounded Rectangle 4">
               <a:extLst>
                 <a:ext uri="{FF2B5EF4-FFF2-40B4-BE49-F238E27FC236}">
-                  <a16:creationId xmlns:a16="http://schemas.microsoft.com/office/drawing/2014/main" xmlns="" id="{EBC185CD-743E-4274-AFD6-440CF0AF24CD}"/>
+                  <a16:creationId xmlns="" xmlns:a16="http://schemas.microsoft.com/office/drawing/2014/main" id="{EBC185CD-743E-4274-AFD6-440CF0AF24CD}"/>
                 </a:ext>
               </a:extLst>
             </p:cNvPr>
@@ -10675,7 +10982,7 @@
             <p:cNvPr id="19" name="Rounded Rectangle 4">
               <a:extLst>
                 <a:ext uri="{FF2B5EF4-FFF2-40B4-BE49-F238E27FC236}">
-                  <a16:creationId xmlns:a16="http://schemas.microsoft.com/office/drawing/2014/main" xmlns="" id="{7C4773C1-5291-40ED-9E24-F9439EE920AC}"/>
+                  <a16:creationId xmlns="" xmlns:a16="http://schemas.microsoft.com/office/drawing/2014/main" id="{7C4773C1-5291-40ED-9E24-F9439EE920AC}"/>
                 </a:ext>
               </a:extLst>
             </p:cNvPr>
@@ -10730,7 +11037,7 @@
           <p:cNvPr id="20" name="Rectangle 19">
             <a:extLst>
               <a:ext uri="{FF2B5EF4-FFF2-40B4-BE49-F238E27FC236}">
-                <a16:creationId xmlns:a16="http://schemas.microsoft.com/office/drawing/2014/main" xmlns="" id="{9C90FE5E-16CA-40BA-A45A-7E5C4821922C}"/>
+                <a16:creationId xmlns="" xmlns:a16="http://schemas.microsoft.com/office/drawing/2014/main" id="{9C90FE5E-16CA-40BA-A45A-7E5C4821922C}"/>
               </a:ext>
             </a:extLst>
           </p:cNvPr>
@@ -10782,7 +11089,7 @@
           <p:cNvPr id="29" name="Group 28">
             <a:extLst>
               <a:ext uri="{FF2B5EF4-FFF2-40B4-BE49-F238E27FC236}">
-                <a16:creationId xmlns:a16="http://schemas.microsoft.com/office/drawing/2014/main" xmlns="" id="{494DB6CB-F438-4692-9109-14408BA9056B}"/>
+                <a16:creationId xmlns="" xmlns:a16="http://schemas.microsoft.com/office/drawing/2014/main" id="{494DB6CB-F438-4692-9109-14408BA9056B}"/>
               </a:ext>
             </a:extLst>
           </p:cNvPr>
@@ -10802,7 +11109,7 @@
             <p:cNvPr id="21" name="Rectangle 20">
               <a:extLst>
                 <a:ext uri="{FF2B5EF4-FFF2-40B4-BE49-F238E27FC236}">
-                  <a16:creationId xmlns:a16="http://schemas.microsoft.com/office/drawing/2014/main" xmlns="" id="{E4886657-7DE2-45D3-B9EE-F0CED45D1134}"/>
+                  <a16:creationId xmlns="" xmlns:a16="http://schemas.microsoft.com/office/drawing/2014/main" id="{E4886657-7DE2-45D3-B9EE-F0CED45D1134}"/>
                 </a:ext>
               </a:extLst>
             </p:cNvPr>
@@ -10854,7 +11161,7 @@
             <p:cNvPr id="24" name="Rectangle 23">
               <a:extLst>
                 <a:ext uri="{FF2B5EF4-FFF2-40B4-BE49-F238E27FC236}">
-                  <a16:creationId xmlns:a16="http://schemas.microsoft.com/office/drawing/2014/main" xmlns="" id="{BB0BA0DE-CFE9-49EA-A200-BDB2DA019A6C}"/>
+                  <a16:creationId xmlns="" xmlns:a16="http://schemas.microsoft.com/office/drawing/2014/main" id="{BB0BA0DE-CFE9-49EA-A200-BDB2DA019A6C}"/>
                 </a:ext>
               </a:extLst>
             </p:cNvPr>
@@ -10906,7 +11213,7 @@
             <p:cNvPr id="26" name="Rectangle 25">
               <a:extLst>
                 <a:ext uri="{FF2B5EF4-FFF2-40B4-BE49-F238E27FC236}">
-                  <a16:creationId xmlns:a16="http://schemas.microsoft.com/office/drawing/2014/main" xmlns="" id="{8B0CF26A-6751-40B7-AA2C-E5C19E5AFA6F}"/>
+                  <a16:creationId xmlns="" xmlns:a16="http://schemas.microsoft.com/office/drawing/2014/main" id="{8B0CF26A-6751-40B7-AA2C-E5C19E5AFA6F}"/>
                 </a:ext>
               </a:extLst>
             </p:cNvPr>
@@ -10958,7 +11265,7 @@
             <p:cNvPr id="28" name="Rectangle 27">
               <a:extLst>
                 <a:ext uri="{FF2B5EF4-FFF2-40B4-BE49-F238E27FC236}">
-                  <a16:creationId xmlns:a16="http://schemas.microsoft.com/office/drawing/2014/main" xmlns="" id="{45E130DE-DB96-4CBE-8A53-C12B423CDE0A}"/>
+                  <a16:creationId xmlns="" xmlns:a16="http://schemas.microsoft.com/office/drawing/2014/main" id="{45E130DE-DB96-4CBE-8A53-C12B423CDE0A}"/>
                 </a:ext>
               </a:extLst>
             </p:cNvPr>
@@ -11011,7 +11318,7 @@
           <p:cNvPr id="45" name="Group 44">
             <a:extLst>
               <a:ext uri="{FF2B5EF4-FFF2-40B4-BE49-F238E27FC236}">
-                <a16:creationId xmlns:a16="http://schemas.microsoft.com/office/drawing/2014/main" xmlns="" id="{ED89DBB8-00E6-4567-978D-A5C062E551E1}"/>
+                <a16:creationId xmlns="" xmlns:a16="http://schemas.microsoft.com/office/drawing/2014/main" id="{ED89DBB8-00E6-4567-978D-A5C062E551E1}"/>
               </a:ext>
             </a:extLst>
           </p:cNvPr>
@@ -11031,7 +11338,7 @@
             <p:cNvPr id="31" name="Rectangle 30">
               <a:extLst>
                 <a:ext uri="{FF2B5EF4-FFF2-40B4-BE49-F238E27FC236}">
-                  <a16:creationId xmlns:a16="http://schemas.microsoft.com/office/drawing/2014/main" xmlns="" id="{B95E63B7-D48A-4E03-A98A-01FFB0C48EFC}"/>
+                  <a16:creationId xmlns="" xmlns:a16="http://schemas.microsoft.com/office/drawing/2014/main" id="{B95E63B7-D48A-4E03-A98A-01FFB0C48EFC}"/>
                 </a:ext>
               </a:extLst>
             </p:cNvPr>
@@ -11083,7 +11390,7 @@
             <p:cNvPr id="32" name="Rectangle 31">
               <a:extLst>
                 <a:ext uri="{FF2B5EF4-FFF2-40B4-BE49-F238E27FC236}">
-                  <a16:creationId xmlns:a16="http://schemas.microsoft.com/office/drawing/2014/main" xmlns="" id="{D809C39E-05E3-4BC3-B534-A304E14181E5}"/>
+                  <a16:creationId xmlns="" xmlns:a16="http://schemas.microsoft.com/office/drawing/2014/main" id="{D809C39E-05E3-4BC3-B534-A304E14181E5}"/>
                 </a:ext>
               </a:extLst>
             </p:cNvPr>
@@ -11135,7 +11442,7 @@
             <p:cNvPr id="33" name="Rectangle 32">
               <a:extLst>
                 <a:ext uri="{FF2B5EF4-FFF2-40B4-BE49-F238E27FC236}">
-                  <a16:creationId xmlns:a16="http://schemas.microsoft.com/office/drawing/2014/main" xmlns="" id="{57513C37-D87F-4867-BB1C-AB0265DE8504}"/>
+                  <a16:creationId xmlns="" xmlns:a16="http://schemas.microsoft.com/office/drawing/2014/main" id="{57513C37-D87F-4867-BB1C-AB0265DE8504}"/>
                 </a:ext>
               </a:extLst>
             </p:cNvPr>
@@ -11187,7 +11494,7 @@
             <p:cNvPr id="34" name="Rectangle 33">
               <a:extLst>
                 <a:ext uri="{FF2B5EF4-FFF2-40B4-BE49-F238E27FC236}">
-                  <a16:creationId xmlns:a16="http://schemas.microsoft.com/office/drawing/2014/main" xmlns="" id="{7F88305E-9A19-4CD1-AFE9-AD5A63AE6250}"/>
+                  <a16:creationId xmlns="" xmlns:a16="http://schemas.microsoft.com/office/drawing/2014/main" id="{7F88305E-9A19-4CD1-AFE9-AD5A63AE6250}"/>
                 </a:ext>
               </a:extLst>
             </p:cNvPr>
@@ -11239,7 +11546,7 @@
             <p:cNvPr id="36" name="Rectangle 35">
               <a:extLst>
                 <a:ext uri="{FF2B5EF4-FFF2-40B4-BE49-F238E27FC236}">
-                  <a16:creationId xmlns:a16="http://schemas.microsoft.com/office/drawing/2014/main" xmlns="" id="{27AB44A4-567E-4F77-A380-FBB1E27BB3CC}"/>
+                  <a16:creationId xmlns="" xmlns:a16="http://schemas.microsoft.com/office/drawing/2014/main" id="{27AB44A4-567E-4F77-A380-FBB1E27BB3CC}"/>
                 </a:ext>
               </a:extLst>
             </p:cNvPr>
@@ -11291,7 +11598,7 @@
             <p:cNvPr id="38" name="Rectangle 37">
               <a:extLst>
                 <a:ext uri="{FF2B5EF4-FFF2-40B4-BE49-F238E27FC236}">
-                  <a16:creationId xmlns:a16="http://schemas.microsoft.com/office/drawing/2014/main" xmlns="" id="{2794DD45-3E32-4A33-BF6C-A5F3F0519A3F}"/>
+                  <a16:creationId xmlns="" xmlns:a16="http://schemas.microsoft.com/office/drawing/2014/main" id="{2794DD45-3E32-4A33-BF6C-A5F3F0519A3F}"/>
                 </a:ext>
               </a:extLst>
             </p:cNvPr>
@@ -11343,7 +11650,7 @@
             <p:cNvPr id="40" name="Rectangle 39">
               <a:extLst>
                 <a:ext uri="{FF2B5EF4-FFF2-40B4-BE49-F238E27FC236}">
-                  <a16:creationId xmlns:a16="http://schemas.microsoft.com/office/drawing/2014/main" xmlns="" id="{041B4176-C024-4F3A-AABA-B63D7C0C66CE}"/>
+                  <a16:creationId xmlns="" xmlns:a16="http://schemas.microsoft.com/office/drawing/2014/main" id="{041B4176-C024-4F3A-AABA-B63D7C0C66CE}"/>
                 </a:ext>
               </a:extLst>
             </p:cNvPr>
@@ -11395,7 +11702,7 @@
             <p:cNvPr id="42" name="Rectangle 41">
               <a:extLst>
                 <a:ext uri="{FF2B5EF4-FFF2-40B4-BE49-F238E27FC236}">
-                  <a16:creationId xmlns:a16="http://schemas.microsoft.com/office/drawing/2014/main" xmlns="" id="{7872883E-7751-48EC-A872-1D4934847CD2}"/>
+                  <a16:creationId xmlns="" xmlns:a16="http://schemas.microsoft.com/office/drawing/2014/main" id="{7872883E-7751-48EC-A872-1D4934847CD2}"/>
                 </a:ext>
               </a:extLst>
             </p:cNvPr>
@@ -11447,7 +11754,7 @@
             <p:cNvPr id="44" name="Rectangle 43">
               <a:extLst>
                 <a:ext uri="{FF2B5EF4-FFF2-40B4-BE49-F238E27FC236}">
-                  <a16:creationId xmlns:a16="http://schemas.microsoft.com/office/drawing/2014/main" xmlns="" id="{F8E36C9E-67D9-4E49-B1A5-6E5CEA56A90F}"/>
+                  <a16:creationId xmlns="" xmlns:a16="http://schemas.microsoft.com/office/drawing/2014/main" id="{F8E36C9E-67D9-4E49-B1A5-6E5CEA56A90F}"/>
                 </a:ext>
               </a:extLst>
             </p:cNvPr>
@@ -11500,7 +11807,7 @@
           <p:cNvPr id="2" name="Rectangle 1">
             <a:extLst>
               <a:ext uri="{FF2B5EF4-FFF2-40B4-BE49-F238E27FC236}">
-                <a16:creationId xmlns:a16="http://schemas.microsoft.com/office/drawing/2014/main" xmlns="" id="{FE5D35B2-2233-49B7-899A-3326D707F4CB}"/>
+                <a16:creationId xmlns="" xmlns:a16="http://schemas.microsoft.com/office/drawing/2014/main" id="{FE5D35B2-2233-49B7-899A-3326D707F4CB}"/>
               </a:ext>
             </a:extLst>
           </p:cNvPr>
@@ -11564,7 +11871,7 @@
 </p:sld>
 </file>
 
-<file path=ppt/slides/slide34.xml><?xml version="1.0" encoding="utf-8"?>
+<file path=ppt/slides/slide35.xml><?xml version="1.0" encoding="utf-8"?>
 <p:sld xmlns:a="http://schemas.openxmlformats.org/drawingml/2006/main" xmlns:r="http://schemas.openxmlformats.org/officeDocument/2006/relationships" xmlns:p="http://schemas.openxmlformats.org/presentationml/2006/main">
   <p:cSld>
     <p:spTree>
@@ -11586,7 +11893,7 @@
           <p:cNvPr id="5" name="Oval 4">
             <a:extLst>
               <a:ext uri="{FF2B5EF4-FFF2-40B4-BE49-F238E27FC236}">
-                <a16:creationId xmlns:a16="http://schemas.microsoft.com/office/drawing/2014/main" xmlns="" id="{5CE85C29-C9E0-4DC2-9692-A83A4E8ECB26}"/>
+                <a16:creationId xmlns="" xmlns:a16="http://schemas.microsoft.com/office/drawing/2014/main" id="{5CE85C29-C9E0-4DC2-9692-A83A4E8ECB26}"/>
               </a:ext>
             </a:extLst>
           </p:cNvPr>
@@ -11657,7 +11964,7 @@
           <p:cNvPr id="8" name="Oval 7">
             <a:extLst>
               <a:ext uri="{FF2B5EF4-FFF2-40B4-BE49-F238E27FC236}">
-                <a16:creationId xmlns:a16="http://schemas.microsoft.com/office/drawing/2014/main" xmlns="" id="{5725AE3B-260D-4152-B42C-402374412E31}"/>
+                <a16:creationId xmlns="" xmlns:a16="http://schemas.microsoft.com/office/drawing/2014/main" id="{5725AE3B-260D-4152-B42C-402374412E31}"/>
               </a:ext>
             </a:extLst>
           </p:cNvPr>
@@ -11721,7 +12028,7 @@
 </p:sld>
 </file>
 
-<file path=ppt/slides/slide35.xml><?xml version="1.0" encoding="utf-8"?>
+<file path=ppt/slides/slide36.xml><?xml version="1.0" encoding="utf-8"?>
 <p:sld xmlns:a="http://schemas.openxmlformats.org/drawingml/2006/main" xmlns:r="http://schemas.openxmlformats.org/officeDocument/2006/relationships" xmlns:p="http://schemas.openxmlformats.org/presentationml/2006/main">
   <p:cSld>
     <p:spTree>
@@ -11743,7 +12050,7 @@
           <p:cNvPr id="1026" name="Picture 2" descr="Archero 1.4.3 APK Download">
             <a:extLst>
               <a:ext uri="{FF2B5EF4-FFF2-40B4-BE49-F238E27FC236}">
-                <a16:creationId xmlns:a16="http://schemas.microsoft.com/office/drawing/2014/main" xmlns="" id="{6B6FC3BB-24B5-40E9-8988-16CDA19AEE96}"/>
+                <a16:creationId xmlns="" xmlns:a16="http://schemas.microsoft.com/office/drawing/2014/main" id="{6B6FC3BB-24B5-40E9-8988-16CDA19AEE96}"/>
               </a:ext>
             </a:extLst>
           </p:cNvPr>
@@ -11788,7 +12095,7 @@
           <p:cNvPr id="2" name="Circle: Hollow 1">
             <a:extLst>
               <a:ext uri="{FF2B5EF4-FFF2-40B4-BE49-F238E27FC236}">
-                <a16:creationId xmlns:a16="http://schemas.microsoft.com/office/drawing/2014/main" xmlns="" id="{62C64EB0-7A2B-4828-BDBB-E82B485700F5}"/>
+                <a16:creationId xmlns="" xmlns:a16="http://schemas.microsoft.com/office/drawing/2014/main" id="{62C64EB0-7A2B-4828-BDBB-E82B485700F5}"/>
               </a:ext>
             </a:extLst>
           </p:cNvPr>
@@ -11848,7 +12155,7 @@
           <p:cNvPr id="17" name="Freeform: Shape 16">
             <a:extLst>
               <a:ext uri="{FF2B5EF4-FFF2-40B4-BE49-F238E27FC236}">
-                <a16:creationId xmlns:a16="http://schemas.microsoft.com/office/drawing/2014/main" xmlns="" id="{013B213B-B3A8-46BD-8505-858079DC669A}"/>
+                <a16:creationId xmlns="" xmlns:a16="http://schemas.microsoft.com/office/drawing/2014/main" id="{013B213B-B3A8-46BD-8505-858079DC669A}"/>
               </a:ext>
             </a:extLst>
           </p:cNvPr>
@@ -12177,7 +12484,7 @@
           <p:cNvPr id="8" name="Oval 7">
             <a:extLst>
               <a:ext uri="{FF2B5EF4-FFF2-40B4-BE49-F238E27FC236}">
-                <a16:creationId xmlns:a16="http://schemas.microsoft.com/office/drawing/2014/main" xmlns="" id="{B448E0E3-14DE-4BDF-8127-E194DBC3C114}"/>
+                <a16:creationId xmlns="" xmlns:a16="http://schemas.microsoft.com/office/drawing/2014/main" id="{B448E0E3-14DE-4BDF-8127-E194DBC3C114}"/>
               </a:ext>
             </a:extLst>
           </p:cNvPr>
@@ -12233,7 +12540,7 @@
           <p:cNvPr id="15" name="Group 14">
             <a:extLst>
               <a:ext uri="{FF2B5EF4-FFF2-40B4-BE49-F238E27FC236}">
-                <a16:creationId xmlns:a16="http://schemas.microsoft.com/office/drawing/2014/main" xmlns="" id="{F309C236-CAAB-4873-A3E4-4857862B0035}"/>
+                <a16:creationId xmlns="" xmlns:a16="http://schemas.microsoft.com/office/drawing/2014/main" id="{F309C236-CAAB-4873-A3E4-4857862B0035}"/>
               </a:ext>
             </a:extLst>
           </p:cNvPr>
@@ -12253,7 +12560,7 @@
             <p:cNvPr id="18" name="Circle: Hollow 17">
               <a:extLst>
                 <a:ext uri="{FF2B5EF4-FFF2-40B4-BE49-F238E27FC236}">
-                  <a16:creationId xmlns:a16="http://schemas.microsoft.com/office/drawing/2014/main" xmlns="" id="{905502AC-2C95-493E-ABD8-7A5C23B0AB55}"/>
+                  <a16:creationId xmlns="" xmlns:a16="http://schemas.microsoft.com/office/drawing/2014/main" id="{905502AC-2C95-493E-ABD8-7A5C23B0AB55}"/>
                 </a:ext>
               </a:extLst>
             </p:cNvPr>
@@ -12311,7 +12618,7 @@
             <p:cNvPr id="19" name="Freeform: Shape 18">
               <a:extLst>
                 <a:ext uri="{FF2B5EF4-FFF2-40B4-BE49-F238E27FC236}">
-                  <a16:creationId xmlns:a16="http://schemas.microsoft.com/office/drawing/2014/main" xmlns="" id="{EC397DD4-E1BB-4644-B9D4-DE223BCA64E3}"/>
+                  <a16:creationId xmlns="" xmlns:a16="http://schemas.microsoft.com/office/drawing/2014/main" id="{EC397DD4-E1BB-4644-B9D4-DE223BCA64E3}"/>
                 </a:ext>
               </a:extLst>
             </p:cNvPr>
@@ -12625,7 +12932,7 @@
           <p:cNvPr id="28" name="Straight Connector 27">
             <a:extLst>
               <a:ext uri="{FF2B5EF4-FFF2-40B4-BE49-F238E27FC236}">
-                <a16:creationId xmlns:a16="http://schemas.microsoft.com/office/drawing/2014/main" xmlns="" id="{A8CDF03B-7684-4F8C-B314-5B341086EF9E}"/>
+                <a16:creationId xmlns="" xmlns:a16="http://schemas.microsoft.com/office/drawing/2014/main" id="{A8CDF03B-7684-4F8C-B314-5B341086EF9E}"/>
               </a:ext>
             </a:extLst>
           </p:cNvPr>
@@ -12661,7 +12968,7 @@
           <p:cNvPr id="3" name="Arc 2">
             <a:extLst>
               <a:ext uri="{FF2B5EF4-FFF2-40B4-BE49-F238E27FC236}">
-                <a16:creationId xmlns:a16="http://schemas.microsoft.com/office/drawing/2014/main" xmlns="" id="{F1DE6C16-66BA-4944-BAFA-DE19BAB319DB}"/>
+                <a16:creationId xmlns="" xmlns:a16="http://schemas.microsoft.com/office/drawing/2014/main" id="{F1DE6C16-66BA-4944-BAFA-DE19BAB319DB}"/>
               </a:ext>
             </a:extLst>
           </p:cNvPr>
@@ -12720,7 +13027,7 @@
           <p:cNvPr id="16" name="Arc 15">
             <a:extLst>
               <a:ext uri="{FF2B5EF4-FFF2-40B4-BE49-F238E27FC236}">
-                <a16:creationId xmlns:a16="http://schemas.microsoft.com/office/drawing/2014/main" xmlns="" id="{5C7BA855-062D-41FB-B829-A92492BC8D43}"/>
+                <a16:creationId xmlns="" xmlns:a16="http://schemas.microsoft.com/office/drawing/2014/main" id="{5C7BA855-062D-41FB-B829-A92492BC8D43}"/>
               </a:ext>
             </a:extLst>
           </p:cNvPr>
@@ -12779,7 +13086,7 @@
           <p:cNvPr id="12" name="Oval 11">
             <a:extLst>
               <a:ext uri="{FF2B5EF4-FFF2-40B4-BE49-F238E27FC236}">
-                <a16:creationId xmlns:a16="http://schemas.microsoft.com/office/drawing/2014/main" xmlns="" id="{FB0565F6-8DBF-4B85-88AD-5148B2CA8C2F}"/>
+                <a16:creationId xmlns="" xmlns:a16="http://schemas.microsoft.com/office/drawing/2014/main" id="{FB0565F6-8DBF-4B85-88AD-5148B2CA8C2F}"/>
               </a:ext>
             </a:extLst>
           </p:cNvPr>
@@ -12863,7 +13170,7 @@
 </p:sld>
 </file>
 
-<file path=ppt/slides/slide36.xml><?xml version="1.0" encoding="utf-8"?>
+<file path=ppt/slides/slide37.xml><?xml version="1.0" encoding="utf-8"?>
 <p:sld xmlns:a="http://schemas.openxmlformats.org/drawingml/2006/main" xmlns:r="http://schemas.openxmlformats.org/officeDocument/2006/relationships" xmlns:p="http://schemas.openxmlformats.org/presentationml/2006/main">
   <p:cSld>
     <p:spTree>
@@ -12949,7 +13256,7 @@
 </p:sld>
 </file>
 
-<file path=ppt/slides/slide37.xml><?xml version="1.0" encoding="utf-8"?>
+<file path=ppt/slides/slide38.xml><?xml version="1.0" encoding="utf-8"?>
 <p:sld xmlns:a="http://schemas.openxmlformats.org/drawingml/2006/main" xmlns:r="http://schemas.openxmlformats.org/officeDocument/2006/relationships" xmlns:p="http://schemas.openxmlformats.org/presentationml/2006/main">
   <p:cSld>
     <p:spTree>
@@ -12971,7 +13278,7 @@
           <p:cNvPr id="2" name="Oval 1">
             <a:extLst>
               <a:ext uri="{FF2B5EF4-FFF2-40B4-BE49-F238E27FC236}">
-                <a16:creationId xmlns:a16="http://schemas.microsoft.com/office/drawing/2014/main" xmlns="" id="{BB9FA810-2B32-4230-AFB2-CDCBF6192A9E}"/>
+                <a16:creationId xmlns="" xmlns:a16="http://schemas.microsoft.com/office/drawing/2014/main" id="{BB9FA810-2B32-4230-AFB2-CDCBF6192A9E}"/>
               </a:ext>
             </a:extLst>
           </p:cNvPr>
@@ -13042,7 +13349,7 @@
           <p:cNvPr id="3" name="Oval 2">
             <a:extLst>
               <a:ext uri="{FF2B5EF4-FFF2-40B4-BE49-F238E27FC236}">
-                <a16:creationId xmlns:a16="http://schemas.microsoft.com/office/drawing/2014/main" xmlns="" id="{1FAA4FC1-4D62-4338-8A62-D903A26423EE}"/>
+                <a16:creationId xmlns="" xmlns:a16="http://schemas.microsoft.com/office/drawing/2014/main" id="{1FAA4FC1-4D62-4338-8A62-D903A26423EE}"/>
               </a:ext>
             </a:extLst>
           </p:cNvPr>
@@ -13126,7 +13433,7 @@
 </p:sld>
 </file>
 
-<file path=ppt/slides/slide38.xml><?xml version="1.0" encoding="utf-8"?>
+<file path=ppt/slides/slide39.xml><?xml version="1.0" encoding="utf-8"?>
 <p:sld xmlns:a="http://schemas.openxmlformats.org/drawingml/2006/main" xmlns:r="http://schemas.openxmlformats.org/officeDocument/2006/relationships" xmlns:p="http://schemas.openxmlformats.org/presentationml/2006/main">
   <p:cSld>
     <p:spTree>
@@ -13148,7 +13455,7 @@
           <p:cNvPr id="7" name="Freeform: Shape 6">
             <a:extLst>
               <a:ext uri="{FF2B5EF4-FFF2-40B4-BE49-F238E27FC236}">
-                <a16:creationId xmlns:a16="http://schemas.microsoft.com/office/drawing/2014/main" xmlns="" id="{6F8E5CDA-EFCE-44B8-BC67-987C59E77E33}"/>
+                <a16:creationId xmlns="" xmlns:a16="http://schemas.microsoft.com/office/drawing/2014/main" id="{6F8E5CDA-EFCE-44B8-BC67-987C59E77E33}"/>
               </a:ext>
             </a:extLst>
           </p:cNvPr>
@@ -13375,7 +13682,99 @@
 </p:sld>
 </file>
 
-<file path=ppt/slides/slide39.xml><?xml version="1.0" encoding="utf-8"?>
+<file path=ppt/slides/slide4.xml><?xml version="1.0" encoding="utf-8"?>
+<p:sld xmlns:a="http://schemas.openxmlformats.org/drawingml/2006/main" xmlns:r="http://schemas.openxmlformats.org/officeDocument/2006/relationships" xmlns:p="http://schemas.openxmlformats.org/presentationml/2006/main">
+  <p:cSld>
+    <p:spTree>
+      <p:nvGrpSpPr>
+        <p:cNvPr id="1" name=""/>
+        <p:cNvGrpSpPr/>
+        <p:nvPr/>
+      </p:nvGrpSpPr>
+      <p:grpSpPr>
+        <a:xfrm>
+          <a:off x="0" y="0"/>
+          <a:ext cx="0" cy="0"/>
+          <a:chOff x="0" y="0"/>
+          <a:chExt cx="0" cy="0"/>
+        </a:xfrm>
+      </p:grpSpPr>
+      <p:sp>
+        <p:nvSpPr>
+          <p:cNvPr id="3" name="Rounded Rectangle 2"/>
+          <p:cNvSpPr/>
+          <p:nvPr/>
+        </p:nvSpPr>
+        <p:spPr>
+          <a:xfrm>
+            <a:off x="3851910" y="2708910"/>
+            <a:ext cx="1440180" cy="1440180"/>
+          </a:xfrm>
+          <a:prstGeom prst="roundRect">
+            <a:avLst>
+              <a:gd name="adj" fmla="val 47189"/>
+            </a:avLst>
+          </a:prstGeom>
+          <a:solidFill>
+            <a:schemeClr val="bg1"/>
+          </a:solidFill>
+          <a:ln>
+            <a:noFill/>
+          </a:ln>
+          <a:effectLst>
+            <a:outerShdw blurRad="50800" dist="38100" dir="5400000" algn="t" rotWithShape="0">
+              <a:prstClr val="black">
+                <a:alpha val="40000"/>
+              </a:prstClr>
+            </a:outerShdw>
+          </a:effectLst>
+        </p:spPr>
+        <p:style>
+          <a:lnRef idx="2">
+            <a:schemeClr val="accent1">
+              <a:shade val="50000"/>
+            </a:schemeClr>
+          </a:lnRef>
+          <a:fillRef idx="1">
+            <a:schemeClr val="accent1"/>
+          </a:fillRef>
+          <a:effectRef idx="0">
+            <a:schemeClr val="accent1"/>
+          </a:effectRef>
+          <a:fontRef idx="minor">
+            <a:schemeClr val="lt1"/>
+          </a:fontRef>
+        </p:style>
+        <p:txBody>
+          <a:bodyPr rtlCol="0" anchor="ctr"/>
+          <a:lstStyle/>
+          <a:p>
+            <a:pPr algn="ctr"/>
+            <a:endParaRPr lang="en-IN"/>
+          </a:p>
+        </p:txBody>
+      </p:sp>
+    </p:spTree>
+    <p:extLst>
+      <p:ext uri="{BB962C8B-B14F-4D97-AF65-F5344CB8AC3E}">
+        <p14:creationId xmlns:p14="http://schemas.microsoft.com/office/powerpoint/2010/main" val="265401467"/>
+      </p:ext>
+    </p:extLst>
+  </p:cSld>
+  <p:clrMapOvr>
+    <a:masterClrMapping/>
+  </p:clrMapOvr>
+  <p:timing>
+    <p:tnLst>
+      <p:par>
+        <p:cTn id="1" dur="indefinite" restart="never" nodeType="tmRoot"/>
+      </p:par>
+    </p:tnLst>
+  </p:timing>
+</p:sld>
+</file>
+
+<file path=ppt/slides/slide40.xml><?xml version="1.0" encoding="utf-8"?>
 <p:sld xmlns:a="http://schemas.openxmlformats.org/drawingml/2006/main" xmlns:r="http://schemas.openxmlformats.org/officeDocument/2006/relationships" xmlns:p="http://schemas.openxmlformats.org/presentationml/2006/main">
   <p:cSld>
     <p:spTree>
@@ -13397,7 +13796,7 @@
           <p:cNvPr id="4" name="Rectangle: Rounded Corners 3">
             <a:extLst>
               <a:ext uri="{FF2B5EF4-FFF2-40B4-BE49-F238E27FC236}">
-                <a16:creationId xmlns:a16="http://schemas.microsoft.com/office/drawing/2014/main" xmlns="" id="{FE6125FE-148F-4C48-AA05-7BC4E92676FA}"/>
+                <a16:creationId xmlns="" xmlns:a16="http://schemas.microsoft.com/office/drawing/2014/main" id="{FE6125FE-148F-4C48-AA05-7BC4E92676FA}"/>
               </a:ext>
             </a:extLst>
           </p:cNvPr>
@@ -13468,7 +13867,467 @@
 </p:sld>
 </file>
 
-<file path=ppt/slides/slide4.xml><?xml version="1.0" encoding="utf-8"?>
+<file path=ppt/slides/slide41.xml><?xml version="1.0" encoding="utf-8"?>
+<p:sld xmlns:a="http://schemas.openxmlformats.org/drawingml/2006/main" xmlns:r="http://schemas.openxmlformats.org/officeDocument/2006/relationships" xmlns:p="http://schemas.openxmlformats.org/presentationml/2006/main">
+  <p:cSld>
+    <p:spTree>
+      <p:nvGrpSpPr>
+        <p:cNvPr id="1" name=""/>
+        <p:cNvGrpSpPr/>
+        <p:nvPr/>
+      </p:nvGrpSpPr>
+      <p:grpSpPr>
+        <a:xfrm>
+          <a:off x="0" y="0"/>
+          <a:ext cx="0" cy="0"/>
+          <a:chOff x="0" y="0"/>
+          <a:chExt cx="0" cy="0"/>
+        </a:xfrm>
+      </p:grpSpPr>
+      <p:sp>
+        <p:nvSpPr>
+          <p:cNvPr id="12" name="Oval 11">
+            <a:extLst>
+              <a:ext uri="{FF2B5EF4-FFF2-40B4-BE49-F238E27FC236}">
+                <a16:creationId xmlns="" xmlns:a16="http://schemas.microsoft.com/office/drawing/2014/main" id="{1A059B5F-1408-40FB-BD3A-59B1FF9E11A3}"/>
+              </a:ext>
+            </a:extLst>
+          </p:cNvPr>
+          <p:cNvSpPr/>
+          <p:nvPr/>
+        </p:nvSpPr>
+        <p:spPr>
+          <a:xfrm>
+            <a:off x="-1984883" y="2357874"/>
+            <a:ext cx="3095625" cy="2428640"/>
+          </a:xfrm>
+          <a:prstGeom prst="ellipse">
+            <a:avLst/>
+          </a:prstGeom>
+          <a:solidFill>
+            <a:schemeClr val="accent2">
+              <a:lumMod val="60000"/>
+              <a:lumOff val="40000"/>
+            </a:schemeClr>
+          </a:solidFill>
+          <a:ln>
+            <a:noFill/>
+          </a:ln>
+        </p:spPr>
+        <p:style>
+          <a:lnRef idx="2">
+            <a:schemeClr val="accent1">
+              <a:shade val="50000"/>
+            </a:schemeClr>
+          </a:lnRef>
+          <a:fillRef idx="1">
+            <a:schemeClr val="accent1"/>
+          </a:fillRef>
+          <a:effectRef idx="0">
+            <a:schemeClr val="accent1"/>
+          </a:effectRef>
+          <a:fontRef idx="minor">
+            <a:schemeClr val="lt1"/>
+          </a:fontRef>
+        </p:style>
+        <p:txBody>
+          <a:bodyPr rtlCol="0" anchor="ctr"/>
+          <a:lstStyle/>
+          <a:p>
+            <a:pPr algn="ctr"/>
+            <a:endParaRPr lang="en-IN"/>
+          </a:p>
+        </p:txBody>
+      </p:sp>
+      <p:sp>
+        <p:nvSpPr>
+          <p:cNvPr id="6" name="Oval 5">
+            <a:extLst>
+              <a:ext uri="{FF2B5EF4-FFF2-40B4-BE49-F238E27FC236}">
+                <a16:creationId xmlns="" xmlns:a16="http://schemas.microsoft.com/office/drawing/2014/main" id="{B3780517-6320-40FB-9E67-BC059FDA6F3C}"/>
+              </a:ext>
+            </a:extLst>
+          </p:cNvPr>
+          <p:cNvSpPr/>
+          <p:nvPr/>
+        </p:nvSpPr>
+        <p:spPr>
+          <a:xfrm>
+            <a:off x="3024188" y="2138785"/>
+            <a:ext cx="3095625" cy="2428640"/>
+          </a:xfrm>
+          <a:prstGeom prst="ellipse">
+            <a:avLst/>
+          </a:prstGeom>
+          <a:solidFill>
+            <a:schemeClr val="accent2">
+              <a:lumMod val="60000"/>
+              <a:lumOff val="40000"/>
+            </a:schemeClr>
+          </a:solidFill>
+          <a:ln>
+            <a:noFill/>
+          </a:ln>
+        </p:spPr>
+        <p:style>
+          <a:lnRef idx="2">
+            <a:schemeClr val="accent1">
+              <a:shade val="50000"/>
+            </a:schemeClr>
+          </a:lnRef>
+          <a:fillRef idx="1">
+            <a:schemeClr val="accent1"/>
+          </a:fillRef>
+          <a:effectRef idx="0">
+            <a:schemeClr val="accent1"/>
+          </a:effectRef>
+          <a:fontRef idx="minor">
+            <a:schemeClr val="lt1"/>
+          </a:fontRef>
+        </p:style>
+        <p:txBody>
+          <a:bodyPr rtlCol="0" anchor="ctr"/>
+          <a:lstStyle/>
+          <a:p>
+            <a:pPr algn="ctr"/>
+            <a:endParaRPr lang="en-IN"/>
+          </a:p>
+        </p:txBody>
+      </p:sp>
+      <p:sp>
+        <p:nvSpPr>
+          <p:cNvPr id="7" name="Freeform: Shape 6">
+            <a:extLst>
+              <a:ext uri="{FF2B5EF4-FFF2-40B4-BE49-F238E27FC236}">
+                <a16:creationId xmlns="" xmlns:a16="http://schemas.microsoft.com/office/drawing/2014/main" id="{AECFE025-7D33-4E00-BA80-F948E98F4107}"/>
+              </a:ext>
+            </a:extLst>
+          </p:cNvPr>
+          <p:cNvSpPr/>
+          <p:nvPr/>
+        </p:nvSpPr>
+        <p:spPr>
+          <a:xfrm>
+            <a:off x="3052638" y="2587209"/>
+            <a:ext cx="3038723" cy="1969970"/>
+          </a:xfrm>
+          <a:custGeom>
+            <a:avLst/>
+            <a:gdLst>
+              <a:gd name="connsiteX0" fmla="*/ 1516906 w 3038723"/>
+              <a:gd name="connsiteY0" fmla="*/ 0 h 1969970"/>
+              <a:gd name="connsiteX1" fmla="*/ 3033273 w 3038723"/>
+              <a:gd name="connsiteY1" fmla="*/ 969592 h 1969970"/>
+              <a:gd name="connsiteX2" fmla="*/ 3038723 w 3038723"/>
+              <a:gd name="connsiteY2" fmla="*/ 997605 h 1969970"/>
+              <a:gd name="connsiteX3" fmla="*/ 3038183 w 3038723"/>
+              <a:gd name="connsiteY3" fmla="*/ 1000378 h 1969970"/>
+              <a:gd name="connsiteX4" fmla="*/ 1521816 w 3038723"/>
+              <a:gd name="connsiteY4" fmla="*/ 1969970 h 1969970"/>
+              <a:gd name="connsiteX5" fmla="*/ 5449 w 3038723"/>
+              <a:gd name="connsiteY5" fmla="*/ 1000378 h 1969970"/>
+              <a:gd name="connsiteX6" fmla="*/ 0 w 3038723"/>
+              <a:gd name="connsiteY6" fmla="*/ 972365 h 1969970"/>
+              <a:gd name="connsiteX7" fmla="*/ 539 w 3038723"/>
+              <a:gd name="connsiteY7" fmla="*/ 969592 h 1969970"/>
+              <a:gd name="connsiteX8" fmla="*/ 1516906 w 3038723"/>
+              <a:gd name="connsiteY8" fmla="*/ 0 h 1969970"/>
+            </a:gdLst>
+            <a:ahLst/>
+            <a:cxnLst>
+              <a:cxn ang="0">
+                <a:pos x="connsiteX0" y="connsiteY0"/>
+              </a:cxn>
+              <a:cxn ang="0">
+                <a:pos x="connsiteX1" y="connsiteY1"/>
+              </a:cxn>
+              <a:cxn ang="0">
+                <a:pos x="connsiteX2" y="connsiteY2"/>
+              </a:cxn>
+              <a:cxn ang="0">
+                <a:pos x="connsiteX3" y="connsiteY3"/>
+              </a:cxn>
+              <a:cxn ang="0">
+                <a:pos x="connsiteX4" y="connsiteY4"/>
+              </a:cxn>
+              <a:cxn ang="0">
+                <a:pos x="connsiteX5" y="connsiteY5"/>
+              </a:cxn>
+              <a:cxn ang="0">
+                <a:pos x="connsiteX6" y="connsiteY6"/>
+              </a:cxn>
+              <a:cxn ang="0">
+                <a:pos x="connsiteX7" y="connsiteY7"/>
+              </a:cxn>
+              <a:cxn ang="0">
+                <a:pos x="connsiteX8" y="connsiteY8"/>
+              </a:cxn>
+            </a:cxnLst>
+            <a:rect l="l" t="t" r="r" b="b"/>
+            <a:pathLst>
+              <a:path w="3038723" h="1969970">
+                <a:moveTo>
+                  <a:pt x="1516906" y="0"/>
+                </a:moveTo>
+                <a:cubicBezTo>
+                  <a:pt x="2264886" y="0"/>
+                  <a:pt x="2888946" y="416248"/>
+                  <a:pt x="3033273" y="969592"/>
+                </a:cubicBezTo>
+                <a:lnTo>
+                  <a:pt x="3038723" y="997605"/>
+                </a:lnTo>
+                <a:lnTo>
+                  <a:pt x="3038183" y="1000378"/>
+                </a:lnTo>
+                <a:cubicBezTo>
+                  <a:pt x="2893856" y="1553723"/>
+                  <a:pt x="2269796" y="1969970"/>
+                  <a:pt x="1521816" y="1969970"/>
+                </a:cubicBezTo>
+                <a:cubicBezTo>
+                  <a:pt x="773836" y="1969970"/>
+                  <a:pt x="149777" y="1553723"/>
+                  <a:pt x="5449" y="1000378"/>
+                </a:cubicBezTo>
+                <a:lnTo>
+                  <a:pt x="0" y="972365"/>
+                </a:lnTo>
+                <a:lnTo>
+                  <a:pt x="539" y="969592"/>
+                </a:lnTo>
+                <a:cubicBezTo>
+                  <a:pt x="144867" y="416248"/>
+                  <a:pt x="768926" y="0"/>
+                  <a:pt x="1516906" y="0"/>
+                </a:cubicBezTo>
+                <a:close/>
+              </a:path>
+            </a:pathLst>
+          </a:custGeom>
+          <a:solidFill>
+            <a:schemeClr val="tx1"/>
+          </a:solidFill>
+          <a:ln>
+            <a:noFill/>
+          </a:ln>
+        </p:spPr>
+        <p:style>
+          <a:lnRef idx="2">
+            <a:schemeClr val="accent1">
+              <a:shade val="50000"/>
+            </a:schemeClr>
+          </a:lnRef>
+          <a:fillRef idx="1">
+            <a:schemeClr val="accent1"/>
+          </a:fillRef>
+          <a:effectRef idx="0">
+            <a:schemeClr val="accent1"/>
+          </a:effectRef>
+          <a:fontRef idx="minor">
+            <a:schemeClr val="lt1"/>
+          </a:fontRef>
+        </p:style>
+        <p:txBody>
+          <a:bodyPr wrap="square" rtlCol="0" anchor="ctr">
+            <a:noAutofit/>
+          </a:bodyPr>
+          <a:lstStyle/>
+          <a:p>
+            <a:pPr algn="ctr"/>
+            <a:endParaRPr lang="en-IN"/>
+          </a:p>
+        </p:txBody>
+      </p:sp>
+      <p:sp>
+        <p:nvSpPr>
+          <p:cNvPr id="9" name="Freeform: Shape 8">
+            <a:extLst>
+              <a:ext uri="{FF2B5EF4-FFF2-40B4-BE49-F238E27FC236}">
+                <a16:creationId xmlns="" xmlns:a16="http://schemas.microsoft.com/office/drawing/2014/main" id="{B3A41357-7409-4936-82F9-F5D0CFB8DA54}"/>
+              </a:ext>
+            </a:extLst>
+          </p:cNvPr>
+          <p:cNvSpPr/>
+          <p:nvPr/>
+        </p:nvSpPr>
+        <p:spPr>
+          <a:xfrm>
+            <a:off x="-1956431" y="2801169"/>
+            <a:ext cx="3038723" cy="1969970"/>
+          </a:xfrm>
+          <a:custGeom>
+            <a:avLst/>
+            <a:gdLst>
+              <a:gd name="connsiteX0" fmla="*/ 1516906 w 3038723"/>
+              <a:gd name="connsiteY0" fmla="*/ 0 h 1969970"/>
+              <a:gd name="connsiteX1" fmla="*/ 3033273 w 3038723"/>
+              <a:gd name="connsiteY1" fmla="*/ 969592 h 1969970"/>
+              <a:gd name="connsiteX2" fmla="*/ 3038723 w 3038723"/>
+              <a:gd name="connsiteY2" fmla="*/ 997605 h 1969970"/>
+              <a:gd name="connsiteX3" fmla="*/ 3038183 w 3038723"/>
+              <a:gd name="connsiteY3" fmla="*/ 1000378 h 1969970"/>
+              <a:gd name="connsiteX4" fmla="*/ 1521816 w 3038723"/>
+              <a:gd name="connsiteY4" fmla="*/ 1969970 h 1969970"/>
+              <a:gd name="connsiteX5" fmla="*/ 5449 w 3038723"/>
+              <a:gd name="connsiteY5" fmla="*/ 1000378 h 1969970"/>
+              <a:gd name="connsiteX6" fmla="*/ 0 w 3038723"/>
+              <a:gd name="connsiteY6" fmla="*/ 972365 h 1969970"/>
+              <a:gd name="connsiteX7" fmla="*/ 539 w 3038723"/>
+              <a:gd name="connsiteY7" fmla="*/ 969592 h 1969970"/>
+              <a:gd name="connsiteX8" fmla="*/ 1516906 w 3038723"/>
+              <a:gd name="connsiteY8" fmla="*/ 0 h 1969970"/>
+            </a:gdLst>
+            <a:ahLst/>
+            <a:cxnLst>
+              <a:cxn ang="0">
+                <a:pos x="connsiteX0" y="connsiteY0"/>
+              </a:cxn>
+              <a:cxn ang="0">
+                <a:pos x="connsiteX1" y="connsiteY1"/>
+              </a:cxn>
+              <a:cxn ang="0">
+                <a:pos x="connsiteX2" y="connsiteY2"/>
+              </a:cxn>
+              <a:cxn ang="0">
+                <a:pos x="connsiteX3" y="connsiteY3"/>
+              </a:cxn>
+              <a:cxn ang="0">
+                <a:pos x="connsiteX4" y="connsiteY4"/>
+              </a:cxn>
+              <a:cxn ang="0">
+                <a:pos x="connsiteX5" y="connsiteY5"/>
+              </a:cxn>
+              <a:cxn ang="0">
+                <a:pos x="connsiteX6" y="connsiteY6"/>
+              </a:cxn>
+              <a:cxn ang="0">
+                <a:pos x="connsiteX7" y="connsiteY7"/>
+              </a:cxn>
+              <a:cxn ang="0">
+                <a:pos x="connsiteX8" y="connsiteY8"/>
+              </a:cxn>
+            </a:cxnLst>
+            <a:rect l="l" t="t" r="r" b="b"/>
+            <a:pathLst>
+              <a:path w="3038723" h="1969970">
+                <a:moveTo>
+                  <a:pt x="1516906" y="0"/>
+                </a:moveTo>
+                <a:cubicBezTo>
+                  <a:pt x="2264886" y="0"/>
+                  <a:pt x="2888946" y="416248"/>
+                  <a:pt x="3033273" y="969592"/>
+                </a:cubicBezTo>
+                <a:lnTo>
+                  <a:pt x="3038723" y="997605"/>
+                </a:lnTo>
+                <a:lnTo>
+                  <a:pt x="3038183" y="1000378"/>
+                </a:lnTo>
+                <a:cubicBezTo>
+                  <a:pt x="2893856" y="1553723"/>
+                  <a:pt x="2269796" y="1969970"/>
+                  <a:pt x="1521816" y="1969970"/>
+                </a:cubicBezTo>
+                <a:cubicBezTo>
+                  <a:pt x="773836" y="1969970"/>
+                  <a:pt x="149777" y="1553723"/>
+                  <a:pt x="5449" y="1000378"/>
+                </a:cubicBezTo>
+                <a:lnTo>
+                  <a:pt x="0" y="972365"/>
+                </a:lnTo>
+                <a:lnTo>
+                  <a:pt x="539" y="969592"/>
+                </a:lnTo>
+                <a:cubicBezTo>
+                  <a:pt x="144867" y="416248"/>
+                  <a:pt x="768926" y="0"/>
+                  <a:pt x="1516906" y="0"/>
+                </a:cubicBezTo>
+                <a:close/>
+              </a:path>
+            </a:pathLst>
+          </a:custGeom>
+          <a:solidFill>
+            <a:schemeClr val="tx1"/>
+          </a:solidFill>
+          <a:ln>
+            <a:noFill/>
+          </a:ln>
+        </p:spPr>
+        <p:style>
+          <a:lnRef idx="2">
+            <a:schemeClr val="accent1">
+              <a:shade val="50000"/>
+            </a:schemeClr>
+          </a:lnRef>
+          <a:fillRef idx="1">
+            <a:schemeClr val="accent1"/>
+          </a:fillRef>
+          <a:effectRef idx="0">
+            <a:schemeClr val="accent1"/>
+          </a:effectRef>
+          <a:fontRef idx="minor">
+            <a:schemeClr val="lt1"/>
+          </a:fontRef>
+        </p:style>
+        <p:txBody>
+          <a:bodyPr wrap="square" rtlCol="0" anchor="ctr">
+            <a:noAutofit/>
+          </a:bodyPr>
+          <a:lstStyle/>
+          <a:p>
+            <a:pPr algn="ctr"/>
+            <a:endParaRPr lang="en-IN"/>
+          </a:p>
+        </p:txBody>
+      </p:sp>
+      <p:pic>
+        <p:nvPicPr>
+          <p:cNvPr id="8" name="Picture 7">
+            <a:extLst>
+              <a:ext uri="{FF2B5EF4-FFF2-40B4-BE49-F238E27FC236}">
+                <a16:creationId xmlns="" xmlns:a16="http://schemas.microsoft.com/office/drawing/2014/main" id="{8F1CB0A6-96B4-4825-9109-5803C657C1FB}"/>
+              </a:ext>
+            </a:extLst>
+          </p:cNvPr>
+          <p:cNvPicPr>
+            <a:picLocks noChangeAspect="1"/>
+          </p:cNvPicPr>
+          <p:nvPr/>
+        </p:nvPicPr>
+        <p:blipFill>
+          <a:blip r:embed="rId2"/>
+          <a:stretch>
+            <a:fillRect/>
+          </a:stretch>
+        </p:blipFill>
+        <p:spPr>
+          <a:xfrm>
+            <a:off x="6848850" y="1009124"/>
+            <a:ext cx="2645764" cy="5554060"/>
+          </a:xfrm>
+          <a:prstGeom prst="rect">
+            <a:avLst/>
+          </a:prstGeom>
+        </p:spPr>
+      </p:pic>
+    </p:spTree>
+    <p:extLst>
+      <p:ext uri="{BB962C8B-B14F-4D97-AF65-F5344CB8AC3E}">
+        <p14:creationId xmlns:p14="http://schemas.microsoft.com/office/powerpoint/2010/main" val="3753511821"/>
+      </p:ext>
+    </p:extLst>
+  </p:cSld>
+  <p:clrMapOvr>
+    <a:masterClrMapping/>
+  </p:clrMapOvr>
+</p:sld>
+</file>
+
+<file path=ppt/slides/slide5.xml><?xml version="1.0" encoding="utf-8"?>
 <p:sld xmlns:a="http://schemas.openxmlformats.org/drawingml/2006/main" xmlns:r="http://schemas.openxmlformats.org/officeDocument/2006/relationships" xmlns:p="http://schemas.openxmlformats.org/presentationml/2006/main">
   <p:cSld>
     <p:spTree>
@@ -14098,467 +14957,7 @@
 </p:sld>
 </file>
 
-<file path=ppt/slides/slide40.xml><?xml version="1.0" encoding="utf-8"?>
-<p:sld xmlns:a="http://schemas.openxmlformats.org/drawingml/2006/main" xmlns:r="http://schemas.openxmlformats.org/officeDocument/2006/relationships" xmlns:p="http://schemas.openxmlformats.org/presentationml/2006/main">
-  <p:cSld>
-    <p:spTree>
-      <p:nvGrpSpPr>
-        <p:cNvPr id="1" name=""/>
-        <p:cNvGrpSpPr/>
-        <p:nvPr/>
-      </p:nvGrpSpPr>
-      <p:grpSpPr>
-        <a:xfrm>
-          <a:off x="0" y="0"/>
-          <a:ext cx="0" cy="0"/>
-          <a:chOff x="0" y="0"/>
-          <a:chExt cx="0" cy="0"/>
-        </a:xfrm>
-      </p:grpSpPr>
-      <p:sp>
-        <p:nvSpPr>
-          <p:cNvPr id="12" name="Oval 11">
-            <a:extLst>
-              <a:ext uri="{FF2B5EF4-FFF2-40B4-BE49-F238E27FC236}">
-                <a16:creationId xmlns:a16="http://schemas.microsoft.com/office/drawing/2014/main" xmlns="" id="{1A059B5F-1408-40FB-BD3A-59B1FF9E11A3}"/>
-              </a:ext>
-            </a:extLst>
-          </p:cNvPr>
-          <p:cNvSpPr/>
-          <p:nvPr/>
-        </p:nvSpPr>
-        <p:spPr>
-          <a:xfrm>
-            <a:off x="-1984883" y="2357874"/>
-            <a:ext cx="3095625" cy="2428640"/>
-          </a:xfrm>
-          <a:prstGeom prst="ellipse">
-            <a:avLst/>
-          </a:prstGeom>
-          <a:solidFill>
-            <a:schemeClr val="accent2">
-              <a:lumMod val="60000"/>
-              <a:lumOff val="40000"/>
-            </a:schemeClr>
-          </a:solidFill>
-          <a:ln>
-            <a:noFill/>
-          </a:ln>
-        </p:spPr>
-        <p:style>
-          <a:lnRef idx="2">
-            <a:schemeClr val="accent1">
-              <a:shade val="50000"/>
-            </a:schemeClr>
-          </a:lnRef>
-          <a:fillRef idx="1">
-            <a:schemeClr val="accent1"/>
-          </a:fillRef>
-          <a:effectRef idx="0">
-            <a:schemeClr val="accent1"/>
-          </a:effectRef>
-          <a:fontRef idx="minor">
-            <a:schemeClr val="lt1"/>
-          </a:fontRef>
-        </p:style>
-        <p:txBody>
-          <a:bodyPr rtlCol="0" anchor="ctr"/>
-          <a:lstStyle/>
-          <a:p>
-            <a:pPr algn="ctr"/>
-            <a:endParaRPr lang="en-IN"/>
-          </a:p>
-        </p:txBody>
-      </p:sp>
-      <p:sp>
-        <p:nvSpPr>
-          <p:cNvPr id="6" name="Oval 5">
-            <a:extLst>
-              <a:ext uri="{FF2B5EF4-FFF2-40B4-BE49-F238E27FC236}">
-                <a16:creationId xmlns:a16="http://schemas.microsoft.com/office/drawing/2014/main" xmlns="" id="{B3780517-6320-40FB-9E67-BC059FDA6F3C}"/>
-              </a:ext>
-            </a:extLst>
-          </p:cNvPr>
-          <p:cNvSpPr/>
-          <p:nvPr/>
-        </p:nvSpPr>
-        <p:spPr>
-          <a:xfrm>
-            <a:off x="3024188" y="2138785"/>
-            <a:ext cx="3095625" cy="2428640"/>
-          </a:xfrm>
-          <a:prstGeom prst="ellipse">
-            <a:avLst/>
-          </a:prstGeom>
-          <a:solidFill>
-            <a:schemeClr val="accent2">
-              <a:lumMod val="60000"/>
-              <a:lumOff val="40000"/>
-            </a:schemeClr>
-          </a:solidFill>
-          <a:ln>
-            <a:noFill/>
-          </a:ln>
-        </p:spPr>
-        <p:style>
-          <a:lnRef idx="2">
-            <a:schemeClr val="accent1">
-              <a:shade val="50000"/>
-            </a:schemeClr>
-          </a:lnRef>
-          <a:fillRef idx="1">
-            <a:schemeClr val="accent1"/>
-          </a:fillRef>
-          <a:effectRef idx="0">
-            <a:schemeClr val="accent1"/>
-          </a:effectRef>
-          <a:fontRef idx="minor">
-            <a:schemeClr val="lt1"/>
-          </a:fontRef>
-        </p:style>
-        <p:txBody>
-          <a:bodyPr rtlCol="0" anchor="ctr"/>
-          <a:lstStyle/>
-          <a:p>
-            <a:pPr algn="ctr"/>
-            <a:endParaRPr lang="en-IN"/>
-          </a:p>
-        </p:txBody>
-      </p:sp>
-      <p:sp>
-        <p:nvSpPr>
-          <p:cNvPr id="7" name="Freeform: Shape 6">
-            <a:extLst>
-              <a:ext uri="{FF2B5EF4-FFF2-40B4-BE49-F238E27FC236}">
-                <a16:creationId xmlns:a16="http://schemas.microsoft.com/office/drawing/2014/main" xmlns="" id="{AECFE025-7D33-4E00-BA80-F948E98F4107}"/>
-              </a:ext>
-            </a:extLst>
-          </p:cNvPr>
-          <p:cNvSpPr/>
-          <p:nvPr/>
-        </p:nvSpPr>
-        <p:spPr>
-          <a:xfrm>
-            <a:off x="3052638" y="2587209"/>
-            <a:ext cx="3038723" cy="1969970"/>
-          </a:xfrm>
-          <a:custGeom>
-            <a:avLst/>
-            <a:gdLst>
-              <a:gd name="connsiteX0" fmla="*/ 1516906 w 3038723"/>
-              <a:gd name="connsiteY0" fmla="*/ 0 h 1969970"/>
-              <a:gd name="connsiteX1" fmla="*/ 3033273 w 3038723"/>
-              <a:gd name="connsiteY1" fmla="*/ 969592 h 1969970"/>
-              <a:gd name="connsiteX2" fmla="*/ 3038723 w 3038723"/>
-              <a:gd name="connsiteY2" fmla="*/ 997605 h 1969970"/>
-              <a:gd name="connsiteX3" fmla="*/ 3038183 w 3038723"/>
-              <a:gd name="connsiteY3" fmla="*/ 1000378 h 1969970"/>
-              <a:gd name="connsiteX4" fmla="*/ 1521816 w 3038723"/>
-              <a:gd name="connsiteY4" fmla="*/ 1969970 h 1969970"/>
-              <a:gd name="connsiteX5" fmla="*/ 5449 w 3038723"/>
-              <a:gd name="connsiteY5" fmla="*/ 1000378 h 1969970"/>
-              <a:gd name="connsiteX6" fmla="*/ 0 w 3038723"/>
-              <a:gd name="connsiteY6" fmla="*/ 972365 h 1969970"/>
-              <a:gd name="connsiteX7" fmla="*/ 539 w 3038723"/>
-              <a:gd name="connsiteY7" fmla="*/ 969592 h 1969970"/>
-              <a:gd name="connsiteX8" fmla="*/ 1516906 w 3038723"/>
-              <a:gd name="connsiteY8" fmla="*/ 0 h 1969970"/>
-            </a:gdLst>
-            <a:ahLst/>
-            <a:cxnLst>
-              <a:cxn ang="0">
-                <a:pos x="connsiteX0" y="connsiteY0"/>
-              </a:cxn>
-              <a:cxn ang="0">
-                <a:pos x="connsiteX1" y="connsiteY1"/>
-              </a:cxn>
-              <a:cxn ang="0">
-                <a:pos x="connsiteX2" y="connsiteY2"/>
-              </a:cxn>
-              <a:cxn ang="0">
-                <a:pos x="connsiteX3" y="connsiteY3"/>
-              </a:cxn>
-              <a:cxn ang="0">
-                <a:pos x="connsiteX4" y="connsiteY4"/>
-              </a:cxn>
-              <a:cxn ang="0">
-                <a:pos x="connsiteX5" y="connsiteY5"/>
-              </a:cxn>
-              <a:cxn ang="0">
-                <a:pos x="connsiteX6" y="connsiteY6"/>
-              </a:cxn>
-              <a:cxn ang="0">
-                <a:pos x="connsiteX7" y="connsiteY7"/>
-              </a:cxn>
-              <a:cxn ang="0">
-                <a:pos x="connsiteX8" y="connsiteY8"/>
-              </a:cxn>
-            </a:cxnLst>
-            <a:rect l="l" t="t" r="r" b="b"/>
-            <a:pathLst>
-              <a:path w="3038723" h="1969970">
-                <a:moveTo>
-                  <a:pt x="1516906" y="0"/>
-                </a:moveTo>
-                <a:cubicBezTo>
-                  <a:pt x="2264886" y="0"/>
-                  <a:pt x="2888946" y="416248"/>
-                  <a:pt x="3033273" y="969592"/>
-                </a:cubicBezTo>
-                <a:lnTo>
-                  <a:pt x="3038723" y="997605"/>
-                </a:lnTo>
-                <a:lnTo>
-                  <a:pt x="3038183" y="1000378"/>
-                </a:lnTo>
-                <a:cubicBezTo>
-                  <a:pt x="2893856" y="1553723"/>
-                  <a:pt x="2269796" y="1969970"/>
-                  <a:pt x="1521816" y="1969970"/>
-                </a:cubicBezTo>
-                <a:cubicBezTo>
-                  <a:pt x="773836" y="1969970"/>
-                  <a:pt x="149777" y="1553723"/>
-                  <a:pt x="5449" y="1000378"/>
-                </a:cubicBezTo>
-                <a:lnTo>
-                  <a:pt x="0" y="972365"/>
-                </a:lnTo>
-                <a:lnTo>
-                  <a:pt x="539" y="969592"/>
-                </a:lnTo>
-                <a:cubicBezTo>
-                  <a:pt x="144867" y="416248"/>
-                  <a:pt x="768926" y="0"/>
-                  <a:pt x="1516906" y="0"/>
-                </a:cubicBezTo>
-                <a:close/>
-              </a:path>
-            </a:pathLst>
-          </a:custGeom>
-          <a:solidFill>
-            <a:schemeClr val="tx1"/>
-          </a:solidFill>
-          <a:ln>
-            <a:noFill/>
-          </a:ln>
-        </p:spPr>
-        <p:style>
-          <a:lnRef idx="2">
-            <a:schemeClr val="accent1">
-              <a:shade val="50000"/>
-            </a:schemeClr>
-          </a:lnRef>
-          <a:fillRef idx="1">
-            <a:schemeClr val="accent1"/>
-          </a:fillRef>
-          <a:effectRef idx="0">
-            <a:schemeClr val="accent1"/>
-          </a:effectRef>
-          <a:fontRef idx="minor">
-            <a:schemeClr val="lt1"/>
-          </a:fontRef>
-        </p:style>
-        <p:txBody>
-          <a:bodyPr wrap="square" rtlCol="0" anchor="ctr">
-            <a:noAutofit/>
-          </a:bodyPr>
-          <a:lstStyle/>
-          <a:p>
-            <a:pPr algn="ctr"/>
-            <a:endParaRPr lang="en-IN"/>
-          </a:p>
-        </p:txBody>
-      </p:sp>
-      <p:sp>
-        <p:nvSpPr>
-          <p:cNvPr id="9" name="Freeform: Shape 8">
-            <a:extLst>
-              <a:ext uri="{FF2B5EF4-FFF2-40B4-BE49-F238E27FC236}">
-                <a16:creationId xmlns:a16="http://schemas.microsoft.com/office/drawing/2014/main" xmlns="" id="{B3A41357-7409-4936-82F9-F5D0CFB8DA54}"/>
-              </a:ext>
-            </a:extLst>
-          </p:cNvPr>
-          <p:cNvSpPr/>
-          <p:nvPr/>
-        </p:nvSpPr>
-        <p:spPr>
-          <a:xfrm>
-            <a:off x="-1956431" y="2801169"/>
-            <a:ext cx="3038723" cy="1969970"/>
-          </a:xfrm>
-          <a:custGeom>
-            <a:avLst/>
-            <a:gdLst>
-              <a:gd name="connsiteX0" fmla="*/ 1516906 w 3038723"/>
-              <a:gd name="connsiteY0" fmla="*/ 0 h 1969970"/>
-              <a:gd name="connsiteX1" fmla="*/ 3033273 w 3038723"/>
-              <a:gd name="connsiteY1" fmla="*/ 969592 h 1969970"/>
-              <a:gd name="connsiteX2" fmla="*/ 3038723 w 3038723"/>
-              <a:gd name="connsiteY2" fmla="*/ 997605 h 1969970"/>
-              <a:gd name="connsiteX3" fmla="*/ 3038183 w 3038723"/>
-              <a:gd name="connsiteY3" fmla="*/ 1000378 h 1969970"/>
-              <a:gd name="connsiteX4" fmla="*/ 1521816 w 3038723"/>
-              <a:gd name="connsiteY4" fmla="*/ 1969970 h 1969970"/>
-              <a:gd name="connsiteX5" fmla="*/ 5449 w 3038723"/>
-              <a:gd name="connsiteY5" fmla="*/ 1000378 h 1969970"/>
-              <a:gd name="connsiteX6" fmla="*/ 0 w 3038723"/>
-              <a:gd name="connsiteY6" fmla="*/ 972365 h 1969970"/>
-              <a:gd name="connsiteX7" fmla="*/ 539 w 3038723"/>
-              <a:gd name="connsiteY7" fmla="*/ 969592 h 1969970"/>
-              <a:gd name="connsiteX8" fmla="*/ 1516906 w 3038723"/>
-              <a:gd name="connsiteY8" fmla="*/ 0 h 1969970"/>
-            </a:gdLst>
-            <a:ahLst/>
-            <a:cxnLst>
-              <a:cxn ang="0">
-                <a:pos x="connsiteX0" y="connsiteY0"/>
-              </a:cxn>
-              <a:cxn ang="0">
-                <a:pos x="connsiteX1" y="connsiteY1"/>
-              </a:cxn>
-              <a:cxn ang="0">
-                <a:pos x="connsiteX2" y="connsiteY2"/>
-              </a:cxn>
-              <a:cxn ang="0">
-                <a:pos x="connsiteX3" y="connsiteY3"/>
-              </a:cxn>
-              <a:cxn ang="0">
-                <a:pos x="connsiteX4" y="connsiteY4"/>
-              </a:cxn>
-              <a:cxn ang="0">
-                <a:pos x="connsiteX5" y="connsiteY5"/>
-              </a:cxn>
-              <a:cxn ang="0">
-                <a:pos x="connsiteX6" y="connsiteY6"/>
-              </a:cxn>
-              <a:cxn ang="0">
-                <a:pos x="connsiteX7" y="connsiteY7"/>
-              </a:cxn>
-              <a:cxn ang="0">
-                <a:pos x="connsiteX8" y="connsiteY8"/>
-              </a:cxn>
-            </a:cxnLst>
-            <a:rect l="l" t="t" r="r" b="b"/>
-            <a:pathLst>
-              <a:path w="3038723" h="1969970">
-                <a:moveTo>
-                  <a:pt x="1516906" y="0"/>
-                </a:moveTo>
-                <a:cubicBezTo>
-                  <a:pt x="2264886" y="0"/>
-                  <a:pt x="2888946" y="416248"/>
-                  <a:pt x="3033273" y="969592"/>
-                </a:cubicBezTo>
-                <a:lnTo>
-                  <a:pt x="3038723" y="997605"/>
-                </a:lnTo>
-                <a:lnTo>
-                  <a:pt x="3038183" y="1000378"/>
-                </a:lnTo>
-                <a:cubicBezTo>
-                  <a:pt x="2893856" y="1553723"/>
-                  <a:pt x="2269796" y="1969970"/>
-                  <a:pt x="1521816" y="1969970"/>
-                </a:cubicBezTo>
-                <a:cubicBezTo>
-                  <a:pt x="773836" y="1969970"/>
-                  <a:pt x="149777" y="1553723"/>
-                  <a:pt x="5449" y="1000378"/>
-                </a:cubicBezTo>
-                <a:lnTo>
-                  <a:pt x="0" y="972365"/>
-                </a:lnTo>
-                <a:lnTo>
-                  <a:pt x="539" y="969592"/>
-                </a:lnTo>
-                <a:cubicBezTo>
-                  <a:pt x="144867" y="416248"/>
-                  <a:pt x="768926" y="0"/>
-                  <a:pt x="1516906" y="0"/>
-                </a:cubicBezTo>
-                <a:close/>
-              </a:path>
-            </a:pathLst>
-          </a:custGeom>
-          <a:solidFill>
-            <a:schemeClr val="tx1"/>
-          </a:solidFill>
-          <a:ln>
-            <a:noFill/>
-          </a:ln>
-        </p:spPr>
-        <p:style>
-          <a:lnRef idx="2">
-            <a:schemeClr val="accent1">
-              <a:shade val="50000"/>
-            </a:schemeClr>
-          </a:lnRef>
-          <a:fillRef idx="1">
-            <a:schemeClr val="accent1"/>
-          </a:fillRef>
-          <a:effectRef idx="0">
-            <a:schemeClr val="accent1"/>
-          </a:effectRef>
-          <a:fontRef idx="minor">
-            <a:schemeClr val="lt1"/>
-          </a:fontRef>
-        </p:style>
-        <p:txBody>
-          <a:bodyPr wrap="square" rtlCol="0" anchor="ctr">
-            <a:noAutofit/>
-          </a:bodyPr>
-          <a:lstStyle/>
-          <a:p>
-            <a:pPr algn="ctr"/>
-            <a:endParaRPr lang="en-IN"/>
-          </a:p>
-        </p:txBody>
-      </p:sp>
-      <p:pic>
-        <p:nvPicPr>
-          <p:cNvPr id="8" name="Picture 7">
-            <a:extLst>
-              <a:ext uri="{FF2B5EF4-FFF2-40B4-BE49-F238E27FC236}">
-                <a16:creationId xmlns:a16="http://schemas.microsoft.com/office/drawing/2014/main" xmlns="" id="{8F1CB0A6-96B4-4825-9109-5803C657C1FB}"/>
-              </a:ext>
-            </a:extLst>
-          </p:cNvPr>
-          <p:cNvPicPr>
-            <a:picLocks noChangeAspect="1"/>
-          </p:cNvPicPr>
-          <p:nvPr/>
-        </p:nvPicPr>
-        <p:blipFill>
-          <a:blip r:embed="rId2"/>
-          <a:stretch>
-            <a:fillRect/>
-          </a:stretch>
-        </p:blipFill>
-        <p:spPr>
-          <a:xfrm>
-            <a:off x="6848850" y="1009124"/>
-            <a:ext cx="2645764" cy="5554060"/>
-          </a:xfrm>
-          <a:prstGeom prst="rect">
-            <a:avLst/>
-          </a:prstGeom>
-        </p:spPr>
-      </p:pic>
-    </p:spTree>
-    <p:extLst>
-      <p:ext uri="{BB962C8B-B14F-4D97-AF65-F5344CB8AC3E}">
-        <p14:creationId xmlns:p14="http://schemas.microsoft.com/office/powerpoint/2010/main" val="3753511821"/>
-      </p:ext>
-    </p:extLst>
-  </p:cSld>
-  <p:clrMapOvr>
-    <a:masterClrMapping/>
-  </p:clrMapOvr>
-</p:sld>
-</file>
-
-<file path=ppt/slides/slide5.xml><?xml version="1.0" encoding="utf-8"?>
+<file path=ppt/slides/slide6.xml><?xml version="1.0" encoding="utf-8"?>
 <p:sld xmlns:a="http://schemas.openxmlformats.org/drawingml/2006/main" xmlns:r="http://schemas.openxmlformats.org/officeDocument/2006/relationships" xmlns:p="http://schemas.openxmlformats.org/presentationml/2006/main">
   <p:cSld>
     <p:spTree>
@@ -15014,7 +15413,7 @@
 </p:sld>
 </file>
 
-<file path=ppt/slides/slide6.xml><?xml version="1.0" encoding="utf-8"?>
+<file path=ppt/slides/slide7.xml><?xml version="1.0" encoding="utf-8"?>
 <p:sld xmlns:a="http://schemas.openxmlformats.org/drawingml/2006/main" xmlns:r="http://schemas.openxmlformats.org/officeDocument/2006/relationships" xmlns:p="http://schemas.openxmlformats.org/presentationml/2006/main">
   <p:cSld>
     <p:spTree>
@@ -15177,7 +15576,7 @@
 </p:sld>
 </file>
 
-<file path=ppt/slides/slide7.xml><?xml version="1.0" encoding="utf-8"?>
+<file path=ppt/slides/slide8.xml><?xml version="1.0" encoding="utf-8"?>
 <p:sld xmlns:a="http://schemas.openxmlformats.org/drawingml/2006/main" xmlns:r="http://schemas.openxmlformats.org/officeDocument/2006/relationships" xmlns:p="http://schemas.openxmlformats.org/presentationml/2006/main">
   <p:cSld>
     <p:spTree>
@@ -15382,7 +15781,7 @@
 </p:sld>
 </file>
 
-<file path=ppt/slides/slide8.xml><?xml version="1.0" encoding="utf-8"?>
+<file path=ppt/slides/slide9.xml><?xml version="1.0" encoding="utf-8"?>
 <p:sld xmlns:a="http://schemas.openxmlformats.org/drawingml/2006/main" xmlns:r="http://schemas.openxmlformats.org/officeDocument/2006/relationships" xmlns:p="http://schemas.openxmlformats.org/presentationml/2006/main">
   <p:cSld>
     <p:spTree>
@@ -15523,234 +15922,6 @@
       </p:par>
     </p:tnLst>
   </p:timing>
-</p:sld>
-</file>
-
-<file path=ppt/slides/slide9.xml><?xml version="1.0" encoding="utf-8"?>
-<p:sld xmlns:a="http://schemas.openxmlformats.org/drawingml/2006/main" xmlns:r="http://schemas.openxmlformats.org/officeDocument/2006/relationships" xmlns:p="http://schemas.openxmlformats.org/presentationml/2006/main">
-  <p:cSld>
-    <p:spTree>
-      <p:nvGrpSpPr>
-        <p:cNvPr id="1" name=""/>
-        <p:cNvGrpSpPr/>
-        <p:nvPr/>
-      </p:nvGrpSpPr>
-      <p:grpSpPr>
-        <a:xfrm>
-          <a:off x="0" y="0"/>
-          <a:ext cx="0" cy="0"/>
-          <a:chOff x="0" y="0"/>
-          <a:chExt cx="0" cy="0"/>
-        </a:xfrm>
-      </p:grpSpPr>
-      <p:sp>
-        <p:nvSpPr>
-          <p:cNvPr id="2" name="Block Arc 1">
-            <a:extLst>
-              <a:ext uri="{FF2B5EF4-FFF2-40B4-BE49-F238E27FC236}">
-                <a16:creationId xmlns:a16="http://schemas.microsoft.com/office/drawing/2014/main" xmlns="" id="{50F54194-7244-4A73-A53A-5DF7B86F498D}"/>
-              </a:ext>
-            </a:extLst>
-          </p:cNvPr>
-          <p:cNvSpPr/>
-          <p:nvPr/>
-        </p:nvSpPr>
-        <p:spPr>
-          <a:xfrm>
-            <a:off x="3131820" y="1988820"/>
-            <a:ext cx="2880360" cy="2880360"/>
-          </a:xfrm>
-          <a:prstGeom prst="blockArc">
-            <a:avLst>
-              <a:gd name="adj1" fmla="val 10800000"/>
-              <a:gd name="adj2" fmla="val 9838672"/>
-              <a:gd name="adj3" fmla="val 9265"/>
-            </a:avLst>
-          </a:prstGeom>
-          <a:solidFill>
-            <a:schemeClr val="bg1"/>
-          </a:solidFill>
-          <a:ln w="190500">
-            <a:noFill/>
-          </a:ln>
-        </p:spPr>
-        <p:style>
-          <a:lnRef idx="2">
-            <a:schemeClr val="accent1">
-              <a:shade val="50000"/>
-            </a:schemeClr>
-          </a:lnRef>
-          <a:fillRef idx="1">
-            <a:schemeClr val="accent1"/>
-          </a:fillRef>
-          <a:effectRef idx="0">
-            <a:schemeClr val="accent1"/>
-          </a:effectRef>
-          <a:fontRef idx="minor">
-            <a:schemeClr val="lt1"/>
-          </a:fontRef>
-        </p:style>
-        <p:txBody>
-          <a:bodyPr rtlCol="0" anchor="ctr"/>
-          <a:lstStyle/>
-          <a:p>
-            <a:pPr algn="ctr"/>
-            <a:endParaRPr lang="en-IN"/>
-          </a:p>
-        </p:txBody>
-      </p:sp>
-      <p:sp>
-        <p:nvSpPr>
-          <p:cNvPr id="3" name="Right Triangle 2"/>
-          <p:cNvSpPr/>
-          <p:nvPr/>
-        </p:nvSpPr>
-        <p:spPr>
-          <a:xfrm rot="19800000">
-            <a:off x="2995083" y="2861428"/>
-            <a:ext cx="636815" cy="636815"/>
-          </a:xfrm>
-          <a:prstGeom prst="rtTriangle">
-            <a:avLst/>
-          </a:prstGeom>
-          <a:solidFill>
-            <a:schemeClr val="bg1"/>
-          </a:solidFill>
-          <a:ln w="190500">
-            <a:noFill/>
-          </a:ln>
-        </p:spPr>
-        <p:style>
-          <a:lnRef idx="2">
-            <a:schemeClr val="accent1">
-              <a:shade val="50000"/>
-            </a:schemeClr>
-          </a:lnRef>
-          <a:fillRef idx="1">
-            <a:schemeClr val="accent1"/>
-          </a:fillRef>
-          <a:effectRef idx="0">
-            <a:schemeClr val="accent1"/>
-          </a:effectRef>
-          <a:fontRef idx="minor">
-            <a:schemeClr val="lt1"/>
-          </a:fontRef>
-        </p:style>
-        <p:txBody>
-          <a:bodyPr rtlCol="0" anchor="ctr"/>
-          <a:lstStyle/>
-          <a:p>
-            <a:pPr algn="ctr"/>
-            <a:endParaRPr lang="en-IN"/>
-          </a:p>
-        </p:txBody>
-      </p:sp>
-      <p:sp>
-        <p:nvSpPr>
-          <p:cNvPr id="4" name="Rounded Rectangle 3"/>
-          <p:cNvSpPr/>
-          <p:nvPr/>
-        </p:nvSpPr>
-        <p:spPr>
-          <a:xfrm rot="19894297">
-            <a:off x="4248150" y="2590925"/>
-            <a:ext cx="276225" cy="1066800"/>
-          </a:xfrm>
-          <a:prstGeom prst="roundRect">
-            <a:avLst>
-              <a:gd name="adj" fmla="val 50000"/>
-            </a:avLst>
-          </a:prstGeom>
-          <a:solidFill>
-            <a:schemeClr val="bg1"/>
-          </a:solidFill>
-          <a:ln w="190500">
-            <a:noFill/>
-          </a:ln>
-        </p:spPr>
-        <p:style>
-          <a:lnRef idx="2">
-            <a:schemeClr val="accent1">
-              <a:shade val="50000"/>
-            </a:schemeClr>
-          </a:lnRef>
-          <a:fillRef idx="1">
-            <a:schemeClr val="accent1"/>
-          </a:fillRef>
-          <a:effectRef idx="0">
-            <a:schemeClr val="accent1"/>
-          </a:effectRef>
-          <a:fontRef idx="minor">
-            <a:schemeClr val="lt1"/>
-          </a:fontRef>
-        </p:style>
-        <p:txBody>
-          <a:bodyPr rtlCol="0" anchor="ctr"/>
-          <a:lstStyle/>
-          <a:p>
-            <a:pPr algn="ctr"/>
-            <a:endParaRPr lang="en-IN"/>
-          </a:p>
-        </p:txBody>
-      </p:sp>
-      <p:sp>
-        <p:nvSpPr>
-          <p:cNvPr id="5" name="Rounded Rectangle 4"/>
-          <p:cNvSpPr/>
-          <p:nvPr/>
-        </p:nvSpPr>
-        <p:spPr>
-          <a:xfrm rot="17100000">
-            <a:off x="4846746" y="3081389"/>
-            <a:ext cx="276225" cy="1066800"/>
-          </a:xfrm>
-          <a:prstGeom prst="roundRect">
-            <a:avLst>
-              <a:gd name="adj" fmla="val 50000"/>
-            </a:avLst>
-          </a:prstGeom>
-          <a:solidFill>
-            <a:schemeClr val="bg1"/>
-          </a:solidFill>
-          <a:ln w="190500">
-            <a:noFill/>
-          </a:ln>
-        </p:spPr>
-        <p:style>
-          <a:lnRef idx="2">
-            <a:schemeClr val="accent1">
-              <a:shade val="50000"/>
-            </a:schemeClr>
-          </a:lnRef>
-          <a:fillRef idx="1">
-            <a:schemeClr val="accent1"/>
-          </a:fillRef>
-          <a:effectRef idx="0">
-            <a:schemeClr val="accent1"/>
-          </a:effectRef>
-          <a:fontRef idx="minor">
-            <a:schemeClr val="lt1"/>
-          </a:fontRef>
-        </p:style>
-        <p:txBody>
-          <a:bodyPr rtlCol="0" anchor="ctr"/>
-          <a:lstStyle/>
-          <a:p>
-            <a:pPr algn="ctr"/>
-            <a:endParaRPr lang="en-IN"/>
-          </a:p>
-        </p:txBody>
-      </p:sp>
-    </p:spTree>
-    <p:extLst>
-      <p:ext uri="{BB962C8B-B14F-4D97-AF65-F5344CB8AC3E}">
-        <p14:creationId xmlns:p14="http://schemas.microsoft.com/office/powerpoint/2010/main" val="745623334"/>
-      </p:ext>
-    </p:extLst>
-  </p:cSld>
-  <p:clrMapOvr>
-    <a:masterClrMapping/>
-  </p:clrMapOvr>
 </p:sld>
 </file>
 

</xml_diff>